<commit_message>
change alpha of plots to 0.5
</commit_message>
<xml_diff>
--- a/working_drafts/figs/TXeco_fig6_SEM.pptx
+++ b/working_drafts/figs/TXeco_fig6_SEM.pptx
@@ -202,7 +202,7 @@
           <a:p>
             <a:fld id="{9C8338E3-F40D-F146-8D3B-4726E84D5200}" type="datetimeFigureOut">
               <a:rPr lang="en-US" smtClean="0"/>
-              <a:t>9/28/23</a:t>
+              <a:t>9/29/23</a:t>
             </a:fld>
             <a:endParaRPr lang="en-US"/>
           </a:p>
@@ -1109,7 +1109,7 @@
           <a:p>
             <a:fld id="{D3A28AA4-801E-B147-9E5C-6E6DBA6E23D1}" type="datetimeFigureOut">
               <a:rPr lang="en-US" smtClean="0"/>
-              <a:t>9/28/23</a:t>
+              <a:t>9/29/23</a:t>
             </a:fld>
             <a:endParaRPr lang="en-US"/>
           </a:p>
@@ -1279,7 +1279,7 @@
           <a:p>
             <a:fld id="{D3A28AA4-801E-B147-9E5C-6E6DBA6E23D1}" type="datetimeFigureOut">
               <a:rPr lang="en-US" smtClean="0"/>
-              <a:t>9/28/23</a:t>
+              <a:t>9/29/23</a:t>
             </a:fld>
             <a:endParaRPr lang="en-US"/>
           </a:p>
@@ -1459,7 +1459,7 @@
           <a:p>
             <a:fld id="{D3A28AA4-801E-B147-9E5C-6E6DBA6E23D1}" type="datetimeFigureOut">
               <a:rPr lang="en-US" smtClean="0"/>
-              <a:t>9/28/23</a:t>
+              <a:t>9/29/23</a:t>
             </a:fld>
             <a:endParaRPr lang="en-US"/>
           </a:p>
@@ -1629,7 +1629,7 @@
           <a:p>
             <a:fld id="{D3A28AA4-801E-B147-9E5C-6E6DBA6E23D1}" type="datetimeFigureOut">
               <a:rPr lang="en-US" smtClean="0"/>
-              <a:t>9/28/23</a:t>
+              <a:t>9/29/23</a:t>
             </a:fld>
             <a:endParaRPr lang="en-US"/>
           </a:p>
@@ -1873,7 +1873,7 @@
           <a:p>
             <a:fld id="{D3A28AA4-801E-B147-9E5C-6E6DBA6E23D1}" type="datetimeFigureOut">
               <a:rPr lang="en-US" smtClean="0"/>
-              <a:t>9/28/23</a:t>
+              <a:t>9/29/23</a:t>
             </a:fld>
             <a:endParaRPr lang="en-US"/>
           </a:p>
@@ -2105,7 +2105,7 @@
           <a:p>
             <a:fld id="{D3A28AA4-801E-B147-9E5C-6E6DBA6E23D1}" type="datetimeFigureOut">
               <a:rPr lang="en-US" smtClean="0"/>
-              <a:t>9/28/23</a:t>
+              <a:t>9/29/23</a:t>
             </a:fld>
             <a:endParaRPr lang="en-US"/>
           </a:p>
@@ -2472,7 +2472,7 @@
           <a:p>
             <a:fld id="{D3A28AA4-801E-B147-9E5C-6E6DBA6E23D1}" type="datetimeFigureOut">
               <a:rPr lang="en-US" smtClean="0"/>
-              <a:t>9/28/23</a:t>
+              <a:t>9/29/23</a:t>
             </a:fld>
             <a:endParaRPr lang="en-US"/>
           </a:p>
@@ -2590,7 +2590,7 @@
           <a:p>
             <a:fld id="{D3A28AA4-801E-B147-9E5C-6E6DBA6E23D1}" type="datetimeFigureOut">
               <a:rPr lang="en-US" smtClean="0"/>
-              <a:t>9/28/23</a:t>
+              <a:t>9/29/23</a:t>
             </a:fld>
             <a:endParaRPr lang="en-US"/>
           </a:p>
@@ -2685,7 +2685,7 @@
           <a:p>
             <a:fld id="{D3A28AA4-801E-B147-9E5C-6E6DBA6E23D1}" type="datetimeFigureOut">
               <a:rPr lang="en-US" smtClean="0"/>
-              <a:t>9/28/23</a:t>
+              <a:t>9/29/23</a:t>
             </a:fld>
             <a:endParaRPr lang="en-US"/>
           </a:p>
@@ -2962,7 +2962,7 @@
           <a:p>
             <a:fld id="{D3A28AA4-801E-B147-9E5C-6E6DBA6E23D1}" type="datetimeFigureOut">
               <a:rPr lang="en-US" smtClean="0"/>
-              <a:t>9/28/23</a:t>
+              <a:t>9/29/23</a:t>
             </a:fld>
             <a:endParaRPr lang="en-US"/>
           </a:p>
@@ -3219,7 +3219,7 @@
           <a:p>
             <a:fld id="{D3A28AA4-801E-B147-9E5C-6E6DBA6E23D1}" type="datetimeFigureOut">
               <a:rPr lang="en-US" smtClean="0"/>
-              <a:t>9/28/23</a:t>
+              <a:t>9/29/23</a:t>
             </a:fld>
             <a:endParaRPr lang="en-US"/>
           </a:p>
@@ -3432,7 +3432,7 @@
           <a:p>
             <a:fld id="{D3A28AA4-801E-B147-9E5C-6E6DBA6E23D1}" type="datetimeFigureOut">
               <a:rPr lang="en-US" smtClean="0"/>
-              <a:t>9/28/23</a:t>
+              <a:t>9/29/23</a:t>
             </a:fld>
             <a:endParaRPr lang="en-US"/>
           </a:p>
@@ -18429,7 +18429,7 @@
         </p:nvCxnSpPr>
         <p:spPr>
           <a:xfrm flipV="1">
-            <a:off x="13441165" y="12219519"/>
+            <a:off x="13451675" y="12219519"/>
             <a:ext cx="3786813" cy="1934370"/>
           </a:xfrm>
           <a:prstGeom prst="bentConnector3">
@@ -18437,7 +18437,7 @@
               <a:gd name="adj1" fmla="val 77877"/>
             </a:avLst>
           </a:prstGeom>
-          <a:ln w="85090">
+          <a:ln w="86106">
             <a:solidFill>
               <a:srgbClr val="C00000">
                 <a:alpha val="50000"/>
@@ -18482,7 +18482,7 @@
           <a:prstGeom prst="straightConnector1">
             <a:avLst/>
           </a:prstGeom>
-          <a:ln w="85090">
+          <a:ln w="86106">
             <a:solidFill>
               <a:srgbClr val="C00000">
                 <a:alpha val="50000"/>
@@ -18574,7 +18574,7 @@
               <a:gd name="adj1" fmla="val 742"/>
             </a:avLst>
           </a:prstGeom>
-          <a:ln w="37592">
+          <a:ln w="40767">
             <a:solidFill>
               <a:srgbClr val="C00000">
                 <a:alpha val="50000"/>
@@ -18620,7 +18620,7 @@
           <a:prstGeom prst="bentConnector2">
             <a:avLst/>
           </a:prstGeom>
-          <a:ln w="17653">
+          <a:ln w="16891">
             <a:solidFill>
               <a:srgbClr val="C00000"/>
             </a:solidFill>
@@ -18700,7 +18700,7 @@
           <a:prstGeom prst="straightConnector1">
             <a:avLst/>
           </a:prstGeom>
-          <a:ln w="23114">
+          <a:ln w="23241">
             <a:solidFill>
               <a:schemeClr val="bg1">
                 <a:lumMod val="50000"/>
@@ -18746,11 +18746,11 @@
           </a:xfrm>
           <a:prstGeom prst="bentConnector4">
             <a:avLst>
-              <a:gd name="adj1" fmla="val -27607"/>
-              <a:gd name="adj2" fmla="val 151884"/>
+              <a:gd name="adj1" fmla="val -15739"/>
+              <a:gd name="adj2" fmla="val 146522"/>
             </a:avLst>
           </a:prstGeom>
-          <a:ln w="42926">
+          <a:ln w="36576">
             <a:solidFill>
               <a:schemeClr val="accent1">
                 <a:lumMod val="75000"/>
@@ -18798,7 +18798,7 @@
           <a:prstGeom prst="straightConnector1">
             <a:avLst/>
           </a:prstGeom>
-          <a:ln w="68961">
+          <a:ln w="71374">
             <a:solidFill>
               <a:srgbClr val="C00000">
                 <a:alpha val="50000"/>
@@ -18844,58 +18844,7 @@
           <a:prstGeom prst="bentConnector2">
             <a:avLst/>
           </a:prstGeom>
-          <a:ln w="56134">
-            <a:solidFill>
-              <a:schemeClr val="accent1">
-                <a:lumMod val="75000"/>
-                <a:alpha val="50000"/>
-              </a:schemeClr>
-            </a:solidFill>
-            <a:tailEnd type="triangle"/>
-          </a:ln>
-        </p:spPr>
-        <p:style>
-          <a:lnRef idx="1">
-            <a:schemeClr val="accent1"/>
-          </a:lnRef>
-          <a:fillRef idx="0">
-            <a:schemeClr val="accent1"/>
-          </a:fillRef>
-          <a:effectRef idx="0">
-            <a:schemeClr val="accent1"/>
-          </a:effectRef>
-          <a:fontRef idx="minor">
-            <a:schemeClr val="tx1"/>
-          </a:fontRef>
-        </p:style>
-      </p:cxnSp>
-      <p:cxnSp>
-        <p:nvCxnSpPr>
-          <p:cNvPr id="129" name="Elbow Connector 128">
-            <a:extLst>
-              <a:ext uri="{FF2B5EF4-FFF2-40B4-BE49-F238E27FC236}">
-                <a16:creationId xmlns:a16="http://schemas.microsoft.com/office/drawing/2014/main" id="{CC42D919-D3D4-7A00-7527-A8EF0790A129}"/>
-              </a:ext>
-            </a:extLst>
-          </p:cNvPr>
-          <p:cNvCxnSpPr>
-            <a:cxnSpLocks/>
-            <a:stCxn id="63" idx="0"/>
-          </p:cNvCxnSpPr>
-          <p:nvPr/>
-        </p:nvCxnSpPr>
-        <p:spPr>
-          <a:xfrm rot="16200000" flipH="1">
-            <a:off x="12815829" y="6110911"/>
-            <a:ext cx="1128704" cy="8046396"/>
-          </a:xfrm>
-          <a:prstGeom prst="bentConnector4">
-            <a:avLst>
-              <a:gd name="adj1" fmla="val -39911"/>
-              <a:gd name="adj2" fmla="val 99940"/>
-            </a:avLst>
-          </a:prstGeom>
-          <a:ln w="30607">
+          <a:ln w="58419">
             <a:solidFill>
               <a:schemeClr val="accent1">
                 <a:lumMod val="75000"/>
@@ -19086,104 +19035,11 @@
           <a:prstGeom prst="straightConnector1">
             <a:avLst/>
           </a:prstGeom>
-          <a:ln w="33274">
+          <a:ln w="40640">
             <a:solidFill>
               <a:srgbClr val="C00000">
                 <a:alpha val="50000"/>
               </a:srgbClr>
-            </a:solidFill>
-            <a:tailEnd type="triangle"/>
-          </a:ln>
-        </p:spPr>
-        <p:style>
-          <a:lnRef idx="1">
-            <a:schemeClr val="accent1"/>
-          </a:lnRef>
-          <a:fillRef idx="0">
-            <a:schemeClr val="accent1"/>
-          </a:fillRef>
-          <a:effectRef idx="0">
-            <a:schemeClr val="accent1"/>
-          </a:effectRef>
-          <a:fontRef idx="minor">
-            <a:schemeClr val="tx1"/>
-          </a:fontRef>
-        </p:style>
-      </p:cxnSp>
-      <p:cxnSp>
-        <p:nvCxnSpPr>
-          <p:cNvPr id="152" name="Elbow Connector 151">
-            <a:extLst>
-              <a:ext uri="{FF2B5EF4-FFF2-40B4-BE49-F238E27FC236}">
-                <a16:creationId xmlns:a16="http://schemas.microsoft.com/office/drawing/2014/main" id="{81F7E556-E97A-091B-90E4-5F8880D9B5EE}"/>
-              </a:ext>
-            </a:extLst>
-          </p:cNvPr>
-          <p:cNvCxnSpPr/>
-          <p:nvPr/>
-        </p:nvCxnSpPr>
-        <p:spPr>
-          <a:xfrm rot="16200000" flipH="1">
-            <a:off x="8172361" y="11075719"/>
-            <a:ext cx="2366861" cy="1109382"/>
-          </a:xfrm>
-          <a:prstGeom prst="bentConnector3">
-            <a:avLst>
-              <a:gd name="adj1" fmla="val 72442"/>
-            </a:avLst>
-          </a:prstGeom>
-          <a:ln w="22098">
-            <a:solidFill>
-              <a:srgbClr val="C00000">
-                <a:alpha val="50000"/>
-              </a:srgbClr>
-            </a:solidFill>
-            <a:tailEnd type="triangle"/>
-          </a:ln>
-        </p:spPr>
-        <p:style>
-          <a:lnRef idx="1">
-            <a:schemeClr val="accent1"/>
-          </a:lnRef>
-          <a:fillRef idx="0">
-            <a:schemeClr val="accent1"/>
-          </a:fillRef>
-          <a:effectRef idx="0">
-            <a:schemeClr val="accent1"/>
-          </a:effectRef>
-          <a:fontRef idx="minor">
-            <a:schemeClr val="tx1"/>
-          </a:fontRef>
-        </p:style>
-      </p:cxnSp>
-      <p:cxnSp>
-        <p:nvCxnSpPr>
-          <p:cNvPr id="155" name="Elbow Connector 154">
-            <a:extLst>
-              <a:ext uri="{FF2B5EF4-FFF2-40B4-BE49-F238E27FC236}">
-                <a16:creationId xmlns:a16="http://schemas.microsoft.com/office/drawing/2014/main" id="{3E57EC6F-4D45-9806-2316-EDCAEBCACB1C}"/>
-              </a:ext>
-            </a:extLst>
-          </p:cNvPr>
-          <p:cNvCxnSpPr>
-            <a:stCxn id="63" idx="3"/>
-          </p:cNvCxnSpPr>
-          <p:nvPr/>
-        </p:nvCxnSpPr>
-        <p:spPr>
-          <a:xfrm>
-            <a:off x="10266682" y="10008369"/>
-            <a:ext cx="511136" cy="690092"/>
-          </a:xfrm>
-          <a:prstGeom prst="bentConnector2">
-            <a:avLst/>
-          </a:prstGeom>
-          <a:ln w="13462">
-            <a:solidFill>
-              <a:schemeClr val="accent1">
-                <a:lumMod val="75000"/>
-                <a:alpha val="50000"/>
-              </a:schemeClr>
             </a:solidFill>
             <a:tailEnd type="triangle"/>
           </a:ln>
@@ -19219,7 +19075,7 @@
         </p:nvCxnSpPr>
         <p:spPr>
           <a:xfrm rot="10800000" flipV="1">
-            <a:off x="11049308" y="10642541"/>
+            <a:off x="11086093" y="10642541"/>
             <a:ext cx="3199099" cy="650028"/>
           </a:xfrm>
           <a:prstGeom prst="bentConnector3">
@@ -19227,7 +19083,7 @@
               <a:gd name="adj1" fmla="val 2081"/>
             </a:avLst>
           </a:prstGeom>
-          <a:ln w="136906">
+          <a:ln w="142240">
             <a:solidFill>
               <a:srgbClr val="C00000">
                 <a:alpha val="50000"/>
@@ -21746,103 +21602,6 @@
           </a:p>
         </p:txBody>
       </p:sp>
-      <p:cxnSp>
-        <p:nvCxnSpPr>
-          <p:cNvPr id="159" name="Elbow Connector 158">
-            <a:extLst>
-              <a:ext uri="{FF2B5EF4-FFF2-40B4-BE49-F238E27FC236}">
-                <a16:creationId xmlns:a16="http://schemas.microsoft.com/office/drawing/2014/main" id="{767B25D0-16A3-7396-92C8-715D66597C69}"/>
-              </a:ext>
-            </a:extLst>
-          </p:cNvPr>
-          <p:cNvCxnSpPr>
-            <a:cxnSpLocks/>
-          </p:cNvCxnSpPr>
-          <p:nvPr/>
-        </p:nvCxnSpPr>
-        <p:spPr>
-          <a:xfrm>
-            <a:off x="10266682" y="9774814"/>
-            <a:ext cx="1812963" cy="1156753"/>
-          </a:xfrm>
-          <a:prstGeom prst="bentConnector3">
-            <a:avLst>
-              <a:gd name="adj1" fmla="val 59503"/>
-            </a:avLst>
-          </a:prstGeom>
-          <a:ln w="7112">
-            <a:solidFill>
-              <a:schemeClr val="bg1">
-                <a:lumMod val="50000"/>
-                <a:alpha val="50000"/>
-              </a:schemeClr>
-            </a:solidFill>
-            <a:prstDash val="sysDash"/>
-          </a:ln>
-        </p:spPr>
-        <p:style>
-          <a:lnRef idx="1">
-            <a:schemeClr val="accent1"/>
-          </a:lnRef>
-          <a:fillRef idx="0">
-            <a:schemeClr val="accent1"/>
-          </a:fillRef>
-          <a:effectRef idx="0">
-            <a:schemeClr val="accent1"/>
-          </a:effectRef>
-          <a:fontRef idx="minor">
-            <a:schemeClr val="tx1"/>
-          </a:fontRef>
-        </p:style>
-      </p:cxnSp>
-      <p:cxnSp>
-        <p:nvCxnSpPr>
-          <p:cNvPr id="164" name="Straight Arrow Connector 163">
-            <a:extLst>
-              <a:ext uri="{FF2B5EF4-FFF2-40B4-BE49-F238E27FC236}">
-                <a16:creationId xmlns:a16="http://schemas.microsoft.com/office/drawing/2014/main" id="{2AF15EB3-6278-8DFD-7624-DAD7F78CFEEE}"/>
-              </a:ext>
-            </a:extLst>
-          </p:cNvPr>
-          <p:cNvCxnSpPr>
-            <a:cxnSpLocks/>
-          </p:cNvCxnSpPr>
-          <p:nvPr/>
-        </p:nvCxnSpPr>
-        <p:spPr>
-          <a:xfrm flipH="1">
-            <a:off x="12075340" y="10928855"/>
-            <a:ext cx="4305" cy="811820"/>
-          </a:xfrm>
-          <a:prstGeom prst="straightConnector1">
-            <a:avLst/>
-          </a:prstGeom>
-          <a:ln w="7112">
-            <a:solidFill>
-              <a:schemeClr val="bg1">
-                <a:lumMod val="50000"/>
-                <a:alpha val="50000"/>
-              </a:schemeClr>
-            </a:solidFill>
-            <a:prstDash val="sysDash"/>
-            <a:tailEnd type="triangle"/>
-          </a:ln>
-        </p:spPr>
-        <p:style>
-          <a:lnRef idx="1">
-            <a:schemeClr val="accent1"/>
-          </a:lnRef>
-          <a:fillRef idx="0">
-            <a:schemeClr val="accent1"/>
-          </a:fillRef>
-          <a:effectRef idx="0">
-            <a:schemeClr val="accent1"/>
-          </a:effectRef>
-          <a:fontRef idx="minor">
-            <a:schemeClr val="tx1"/>
-          </a:fontRef>
-        </p:style>
-      </p:cxnSp>
       <p:grpSp>
         <p:nvGrpSpPr>
           <p:cNvPr id="30" name="Group 29">
@@ -22100,7 +21859,7 @@
           <a:prstGeom prst="bentConnector2">
             <a:avLst/>
           </a:prstGeom>
-          <a:ln w="20574">
+          <a:ln w="18415">
             <a:solidFill>
               <a:schemeClr val="accent1">
                 <a:lumMod val="75000"/>
@@ -22237,7 +21996,7 @@
           <a:prstGeom prst="bentConnector2">
             <a:avLst/>
           </a:prstGeom>
-          <a:ln w="39624">
+          <a:ln w="42418">
             <a:solidFill>
               <a:schemeClr val="bg1">
                 <a:lumMod val="50000"/>
@@ -22273,14 +22032,12 @@
           </p:cNvPr>
           <p:cNvCxnSpPr>
             <a:cxnSpLocks/>
-            <a:stCxn id="24" idx="2"/>
-            <a:endCxn id="17" idx="1"/>
           </p:cNvCxnSpPr>
           <p:nvPr/>
         </p:nvCxnSpPr>
         <p:spPr>
           <a:xfrm rot="16200000" flipH="1">
-            <a:off x="15686128" y="12182679"/>
+            <a:off x="15665108" y="12182679"/>
             <a:ext cx="634555" cy="1504991"/>
           </a:xfrm>
           <a:prstGeom prst="bentConnector2">
@@ -22319,14 +22076,12 @@
           </p:cNvPr>
           <p:cNvCxnSpPr>
             <a:cxnSpLocks/>
-            <a:stCxn id="20" idx="0"/>
-            <a:endCxn id="11" idx="0"/>
           </p:cNvCxnSpPr>
           <p:nvPr/>
         </p:nvCxnSpPr>
         <p:spPr>
           <a:xfrm rot="16200000" flipH="1">
-            <a:off x="17842760" y="10535382"/>
+            <a:off x="17842760" y="10524872"/>
             <a:ext cx="1040309" cy="1394631"/>
           </a:xfrm>
           <a:prstGeom prst="bentConnector3">
@@ -22369,14 +22124,12 @@
           </p:cNvPr>
           <p:cNvCxnSpPr>
             <a:cxnSpLocks/>
-            <a:stCxn id="17" idx="2"/>
-            <a:endCxn id="11" idx="2"/>
           </p:cNvCxnSpPr>
           <p:nvPr/>
         </p:nvCxnSpPr>
         <p:spPr>
           <a:xfrm rot="5400000" flipH="1" flipV="1">
-            <a:off x="17832420" y="12463254"/>
+            <a:off x="17832420" y="12479019"/>
             <a:ext cx="1060989" cy="1394631"/>
           </a:xfrm>
           <a:prstGeom prst="bentConnector3">
@@ -22418,14 +22171,13 @@
             </a:extLst>
           </p:cNvPr>
           <p:cNvCxnSpPr>
-            <a:stCxn id="12" idx="0"/>
-            <a:endCxn id="23" idx="2"/>
+            <a:cxnSpLocks/>
           </p:cNvCxnSpPr>
           <p:nvPr/>
         </p:nvCxnSpPr>
         <p:spPr>
           <a:xfrm flipV="1">
-            <a:off x="12521813" y="12628576"/>
+            <a:off x="12521813" y="12644341"/>
             <a:ext cx="6350" cy="1079290"/>
           </a:xfrm>
           <a:prstGeom prst="straightConnector1">
@@ -22997,76 +22749,6 @@
               <a:t>N availability</a:t>
             </a:r>
             <a:endParaRPr lang="en-US" sz="2400" b="1" dirty="0">
-              <a:solidFill>
-                <a:schemeClr val="tx1"/>
-              </a:solidFill>
-              <a:latin typeface="Arial" panose="020B0604020202020204" pitchFamily="34" charset="0"/>
-              <a:cs typeface="Arial" panose="020B0604020202020204" pitchFamily="34" charset="0"/>
-            </a:endParaRPr>
-          </a:p>
-        </p:txBody>
-      </p:sp>
-      <p:sp>
-        <p:nvSpPr>
-          <p:cNvPr id="63" name="Rectangle 62">
-            <a:extLst>
-              <a:ext uri="{FF2B5EF4-FFF2-40B4-BE49-F238E27FC236}">
-                <a16:creationId xmlns:a16="http://schemas.microsoft.com/office/drawing/2014/main" id="{A947E591-BFFA-7599-D68F-6084C1444072}"/>
-              </a:ext>
-            </a:extLst>
-          </p:cNvPr>
-          <p:cNvSpPr/>
-          <p:nvPr/>
-        </p:nvSpPr>
-        <p:spPr>
-          <a:xfrm>
-            <a:off x="8447284" y="9569757"/>
-            <a:ext cx="1819398" cy="877223"/>
-          </a:xfrm>
-          <a:prstGeom prst="rect">
-            <a:avLst/>
-          </a:prstGeom>
-          <a:solidFill>
-            <a:schemeClr val="bg1"/>
-          </a:solidFill>
-          <a:ln w="38100">
-            <a:solidFill>
-              <a:schemeClr val="tx1"/>
-            </a:solidFill>
-          </a:ln>
-        </p:spPr>
-        <p:style>
-          <a:lnRef idx="2">
-            <a:schemeClr val="accent1">
-              <a:shade val="50000"/>
-            </a:schemeClr>
-          </a:lnRef>
-          <a:fillRef idx="1">
-            <a:schemeClr val="accent1"/>
-          </a:fillRef>
-          <a:effectRef idx="0">
-            <a:schemeClr val="accent1"/>
-          </a:effectRef>
-          <a:fontRef idx="minor">
-            <a:schemeClr val="lt1"/>
-          </a:fontRef>
-        </p:style>
-        <p:txBody>
-          <a:bodyPr rtlCol="0" anchor="ctr"/>
-          <a:lstStyle/>
-          <a:p>
-            <a:pPr algn="ctr"/>
-            <a:r>
-              <a:rPr lang="en-US" sz="2400" b="1" i="1" dirty="0">
-                <a:solidFill>
-                  <a:schemeClr val="tx1"/>
-                </a:solidFill>
-                <a:latin typeface="Arial" panose="020B0604020202020204" pitchFamily="34" charset="0"/>
-                <a:cs typeface="Arial" panose="020B0604020202020204" pitchFamily="34" charset="0"/>
-              </a:rPr>
-              <a:t>% clay content</a:t>
-            </a:r>
-            <a:endParaRPr lang="en-US" sz="2400" i="1" dirty="0">
               <a:solidFill>
                 <a:schemeClr val="tx1"/>
               </a:solidFill>

</xml_diff>

<commit_message>
add helen feedback, revise figs, add some meat to conclusions section
</commit_message>
<xml_diff>
--- a/working_drafts/figs/TXeco_fig6_SEM.pptx
+++ b/working_drafts/figs/TXeco_fig6_SEM.pptx
@@ -202,7 +202,7 @@
           <a:p>
             <a:fld id="{9C8338E3-F40D-F146-8D3B-4726E84D5200}" type="datetimeFigureOut">
               <a:rPr lang="en-US" smtClean="0"/>
-              <a:t>9/29/23</a:t>
+              <a:t>10/16/23</a:t>
             </a:fld>
             <a:endParaRPr lang="en-US"/>
           </a:p>
@@ -1109,7 +1109,7 @@
           <a:p>
             <a:fld id="{D3A28AA4-801E-B147-9E5C-6E6DBA6E23D1}" type="datetimeFigureOut">
               <a:rPr lang="en-US" smtClean="0"/>
-              <a:t>9/29/23</a:t>
+              <a:t>10/16/23</a:t>
             </a:fld>
             <a:endParaRPr lang="en-US"/>
           </a:p>
@@ -1279,7 +1279,7 @@
           <a:p>
             <a:fld id="{D3A28AA4-801E-B147-9E5C-6E6DBA6E23D1}" type="datetimeFigureOut">
               <a:rPr lang="en-US" smtClean="0"/>
-              <a:t>9/29/23</a:t>
+              <a:t>10/16/23</a:t>
             </a:fld>
             <a:endParaRPr lang="en-US"/>
           </a:p>
@@ -1459,7 +1459,7 @@
           <a:p>
             <a:fld id="{D3A28AA4-801E-B147-9E5C-6E6DBA6E23D1}" type="datetimeFigureOut">
               <a:rPr lang="en-US" smtClean="0"/>
-              <a:t>9/29/23</a:t>
+              <a:t>10/16/23</a:t>
             </a:fld>
             <a:endParaRPr lang="en-US"/>
           </a:p>
@@ -1629,7 +1629,7 @@
           <a:p>
             <a:fld id="{D3A28AA4-801E-B147-9E5C-6E6DBA6E23D1}" type="datetimeFigureOut">
               <a:rPr lang="en-US" smtClean="0"/>
-              <a:t>9/29/23</a:t>
+              <a:t>10/16/23</a:t>
             </a:fld>
             <a:endParaRPr lang="en-US"/>
           </a:p>
@@ -1873,7 +1873,7 @@
           <a:p>
             <a:fld id="{D3A28AA4-801E-B147-9E5C-6E6DBA6E23D1}" type="datetimeFigureOut">
               <a:rPr lang="en-US" smtClean="0"/>
-              <a:t>9/29/23</a:t>
+              <a:t>10/16/23</a:t>
             </a:fld>
             <a:endParaRPr lang="en-US"/>
           </a:p>
@@ -2105,7 +2105,7 @@
           <a:p>
             <a:fld id="{D3A28AA4-801E-B147-9E5C-6E6DBA6E23D1}" type="datetimeFigureOut">
               <a:rPr lang="en-US" smtClean="0"/>
-              <a:t>9/29/23</a:t>
+              <a:t>10/16/23</a:t>
             </a:fld>
             <a:endParaRPr lang="en-US"/>
           </a:p>
@@ -2472,7 +2472,7 @@
           <a:p>
             <a:fld id="{D3A28AA4-801E-B147-9E5C-6E6DBA6E23D1}" type="datetimeFigureOut">
               <a:rPr lang="en-US" smtClean="0"/>
-              <a:t>9/29/23</a:t>
+              <a:t>10/16/23</a:t>
             </a:fld>
             <a:endParaRPr lang="en-US"/>
           </a:p>
@@ -2590,7 +2590,7 @@
           <a:p>
             <a:fld id="{D3A28AA4-801E-B147-9E5C-6E6DBA6E23D1}" type="datetimeFigureOut">
               <a:rPr lang="en-US" smtClean="0"/>
-              <a:t>9/29/23</a:t>
+              <a:t>10/16/23</a:t>
             </a:fld>
             <a:endParaRPr lang="en-US"/>
           </a:p>
@@ -2685,7 +2685,7 @@
           <a:p>
             <a:fld id="{D3A28AA4-801E-B147-9E5C-6E6DBA6E23D1}" type="datetimeFigureOut">
               <a:rPr lang="en-US" smtClean="0"/>
-              <a:t>9/29/23</a:t>
+              <a:t>10/16/23</a:t>
             </a:fld>
             <a:endParaRPr lang="en-US"/>
           </a:p>
@@ -2962,7 +2962,7 @@
           <a:p>
             <a:fld id="{D3A28AA4-801E-B147-9E5C-6E6DBA6E23D1}" type="datetimeFigureOut">
               <a:rPr lang="en-US" smtClean="0"/>
-              <a:t>9/29/23</a:t>
+              <a:t>10/16/23</a:t>
             </a:fld>
             <a:endParaRPr lang="en-US"/>
           </a:p>
@@ -3219,7 +3219,7 @@
           <a:p>
             <a:fld id="{D3A28AA4-801E-B147-9E5C-6E6DBA6E23D1}" type="datetimeFigureOut">
               <a:rPr lang="en-US" smtClean="0"/>
-              <a:t>9/29/23</a:t>
+              <a:t>10/16/23</a:t>
             </a:fld>
             <a:endParaRPr lang="en-US"/>
           </a:p>
@@ -3432,7 +3432,7 @@
           <a:p>
             <a:fld id="{D3A28AA4-801E-B147-9E5C-6E6DBA6E23D1}" type="datetimeFigureOut">
               <a:rPr lang="en-US" smtClean="0"/>
-              <a:t>9/29/23</a:t>
+              <a:t>10/16/23</a:t>
             </a:fld>
             <a:endParaRPr lang="en-US"/>
           </a:p>
@@ -13492,12 +13492,12 @@
         </p:nvCxnSpPr>
         <p:spPr>
           <a:xfrm flipV="1">
-            <a:off x="13445941" y="12219519"/>
-            <a:ext cx="3786813" cy="1934370"/>
+            <a:off x="13445941" y="12223926"/>
+            <a:ext cx="3822884" cy="1929963"/>
           </a:xfrm>
           <a:prstGeom prst="bentConnector3">
             <a:avLst>
-              <a:gd name="adj1" fmla="val 77877"/>
+              <a:gd name="adj1" fmla="val 76577"/>
             </a:avLst>
           </a:prstGeom>
           <a:ln w="85090">
@@ -13540,8 +13540,8 @@
         </p:nvCxnSpPr>
         <p:spPr>
           <a:xfrm flipV="1">
-            <a:off x="17215605" y="11628113"/>
-            <a:ext cx="0" cy="634790"/>
+            <a:off x="17225130" y="11628113"/>
+            <a:ext cx="0" cy="551173"/>
           </a:xfrm>
           <a:prstGeom prst="straightConnector1">
             <a:avLst/>
@@ -13585,7 +13585,7 @@
         </p:nvCxnSpPr>
         <p:spPr>
           <a:xfrm>
-            <a:off x="11164817" y="13461788"/>
+            <a:off x="11164817" y="13302762"/>
             <a:ext cx="5556606" cy="0"/>
           </a:xfrm>
           <a:prstGeom prst="straightConnector1">
@@ -13597,7 +13597,8 @@
                 <a:alpha val="50000"/>
               </a:srgbClr>
             </a:solidFill>
-            <a:tailEnd type="triangle"/>
+            <a:headEnd type="oval" w="med" len="med"/>
+            <a:tailEnd type="triangle" w="med" len="med"/>
           </a:ln>
         </p:spPr>
         <p:style>
@@ -13631,12 +13632,12 @@
         </p:nvCxnSpPr>
         <p:spPr>
           <a:xfrm flipV="1">
-            <a:off x="12770212" y="11451456"/>
-            <a:ext cx="3985691" cy="346965"/>
+            <a:off x="12767972" y="11443505"/>
+            <a:ext cx="3987931" cy="289219"/>
           </a:xfrm>
           <a:prstGeom prst="bentConnector3">
             <a:avLst>
-              <a:gd name="adj1" fmla="val 742"/>
+              <a:gd name="adj1" fmla="val 37"/>
             </a:avLst>
           </a:prstGeom>
           <a:ln w="37592">
@@ -13645,7 +13646,8 @@
                 <a:alpha val="50000"/>
               </a:srgbClr>
             </a:solidFill>
-            <a:tailEnd type="triangle"/>
+            <a:headEnd type="oval" w="med" len="med"/>
+            <a:tailEnd type="triangle" w="med" len="med"/>
           </a:ln>
         </p:spPr>
         <p:style>
@@ -13679,8 +13681,8 @@
         </p:nvCxnSpPr>
         <p:spPr>
           <a:xfrm rot="5400000" flipH="1" flipV="1">
-            <a:off x="10571509" y="11959279"/>
-            <a:ext cx="634554" cy="1459355"/>
+            <a:off x="10662366" y="11843539"/>
+            <a:ext cx="452840" cy="1459354"/>
           </a:xfrm>
           <a:prstGeom prst="bentConnector2">
             <a:avLst/>
@@ -13689,7 +13691,8 @@
             <a:solidFill>
               <a:srgbClr val="C00000"/>
             </a:solidFill>
-            <a:tailEnd type="triangle"/>
+            <a:headEnd type="oval" w="med" len="med"/>
+            <a:tailEnd type="triangle" w="med" len="med"/>
           </a:ln>
         </p:spPr>
         <p:style>
@@ -13850,7 +13853,7 @@
             </a:extLst>
           </p:cNvPr>
           <p:cNvCxnSpPr>
-            <a:stCxn id="17" idx="0"/>
+            <a:cxnSpLocks/>
             <a:endCxn id="20" idx="2"/>
           </p:cNvCxnSpPr>
           <p:nvPr/>
@@ -13858,7 +13861,7 @@
         <p:spPr>
           <a:xfrm flipV="1">
             <a:off x="17665600" y="11589766"/>
-            <a:ext cx="0" cy="1224075"/>
+            <a:ext cx="0" cy="1208173"/>
           </a:xfrm>
           <a:prstGeom prst="straightConnector1">
             <a:avLst/>
@@ -13869,7 +13872,8 @@
                 <a:alpha val="50000"/>
               </a:srgbClr>
             </a:solidFill>
-            <a:tailEnd type="triangle"/>
+            <a:headEnd type="oval" w="med" len="med"/>
+            <a:tailEnd type="triangle" w="med" len="med"/>
           </a:ln>
         </p:spPr>
         <p:style>
@@ -14101,12 +14105,12 @@
         </p:nvCxnSpPr>
         <p:spPr>
           <a:xfrm>
-            <a:off x="10777818" y="11070591"/>
-            <a:ext cx="4231040" cy="670084"/>
+            <a:off x="11095549" y="10999207"/>
+            <a:ext cx="3920792" cy="699162"/>
           </a:xfrm>
           <a:prstGeom prst="bentConnector3">
             <a:avLst>
-              <a:gd name="adj1" fmla="val 100057"/>
+              <a:gd name="adj1" fmla="val 100091"/>
             </a:avLst>
           </a:prstGeom>
           <a:ln w="14477">
@@ -14115,7 +14119,8 @@
                 <a:alpha val="50000"/>
               </a:srgbClr>
             </a:solidFill>
-            <a:tailEnd type="triangle"/>
+            <a:headEnd type="oval" w="med" len="med"/>
+            <a:tailEnd type="triangle" w="med" len="med"/>
           </a:ln>
         </p:spPr>
         <p:style>
@@ -14147,7 +14152,7 @@
         </p:nvCxnSpPr>
         <p:spPr>
           <a:xfrm>
-            <a:off x="9607913" y="11599460"/>
+            <a:off x="9607913" y="11607411"/>
             <a:ext cx="0" cy="1225296"/>
           </a:xfrm>
           <a:prstGeom prst="straightConnector1">
@@ -14159,7 +14164,8 @@
                 <a:alpha val="50000"/>
               </a:srgbClr>
             </a:solidFill>
-            <a:tailEnd type="triangle"/>
+            <a:headEnd type="oval" w="med" len="med"/>
+            <a:tailEnd type="triangle" w="med" len="med"/>
           </a:ln>
         </p:spPr>
         <p:style>
@@ -14186,17 +14192,19 @@
               </a:ext>
             </a:extLst>
           </p:cNvPr>
-          <p:cNvCxnSpPr/>
+          <p:cNvCxnSpPr>
+            <a:cxnSpLocks/>
+          </p:cNvCxnSpPr>
           <p:nvPr/>
         </p:nvCxnSpPr>
         <p:spPr>
           <a:xfrm rot="16200000" flipH="1">
-            <a:off x="8172361" y="11075719"/>
-            <a:ext cx="2366861" cy="1109382"/>
+            <a:off x="8194881" y="11083168"/>
+            <a:ext cx="2330640" cy="1118202"/>
           </a:xfrm>
           <a:prstGeom prst="bentConnector3">
             <a:avLst>
-              <a:gd name="adj1" fmla="val 72442"/>
+              <a:gd name="adj1" fmla="val 72176"/>
             </a:avLst>
           </a:prstGeom>
           <a:ln w="22098">
@@ -14205,7 +14213,8 @@
                 <a:alpha val="50000"/>
               </a:srgbClr>
             </a:solidFill>
-            <a:tailEnd type="triangle"/>
+            <a:headEnd type="oval" w="med" len="med"/>
+            <a:tailEnd type="triangle" w="med" len="med"/>
           </a:ln>
         </p:spPr>
         <p:style>
@@ -14286,12 +14295,12 @@
         </p:nvCxnSpPr>
         <p:spPr>
           <a:xfrm rot="10800000" flipV="1">
-            <a:off x="11049308" y="10642541"/>
-            <a:ext cx="3199099" cy="650028"/>
+            <a:off x="11066450" y="10647746"/>
+            <a:ext cx="3033374" cy="629113"/>
           </a:xfrm>
           <a:prstGeom prst="bentConnector3">
             <a:avLst>
-              <a:gd name="adj1" fmla="val 2081"/>
+              <a:gd name="adj1" fmla="val -66"/>
             </a:avLst>
           </a:prstGeom>
           <a:ln w="136906">
@@ -14300,7 +14309,8 @@
                 <a:alpha val="50000"/>
               </a:srgbClr>
             </a:solidFill>
-            <a:tailEnd type="triangle"/>
+            <a:headEnd type="oval" w="med" len="med"/>
+            <a:tailEnd type="triangle" w="med" len="med"/>
           </a:ln>
         </p:spPr>
         <p:style>
@@ -15040,12 +15050,14 @@
           <p:nvPr/>
         </p:nvCxnSpPr>
         <p:spPr>
-          <a:xfrm rot="16200000" flipH="1">
-            <a:off x="10588195" y="4027462"/>
-            <a:ext cx="601182" cy="1459355"/>
-          </a:xfrm>
-          <a:prstGeom prst="bentConnector2">
-            <a:avLst/>
+          <a:xfrm>
+            <a:off x="10159108" y="4506165"/>
+            <a:ext cx="1453008" cy="511480"/>
+          </a:xfrm>
+          <a:prstGeom prst="bentConnector3">
+            <a:avLst>
+              <a:gd name="adj1" fmla="val 240"/>
+            </a:avLst>
           </a:prstGeom>
           <a:ln w="76200">
             <a:solidFill>
@@ -15082,13 +15094,14 @@
           </p:cNvPr>
           <p:cNvCxnSpPr>
             <a:cxnSpLocks/>
+            <a:stCxn id="59" idx="0"/>
           </p:cNvCxnSpPr>
           <p:nvPr/>
         </p:nvCxnSpPr>
         <p:spPr>
           <a:xfrm rot="5400000" flipH="1" flipV="1">
-            <a:off x="10571509" y="5067371"/>
-            <a:ext cx="634554" cy="1459355"/>
+            <a:off x="10706354" y="5026852"/>
+            <a:ext cx="358515" cy="1453005"/>
           </a:xfrm>
           <a:prstGeom prst="bentConnector2">
             <a:avLst/>
@@ -15097,7 +15110,8 @@
             <a:solidFill>
               <a:srgbClr val="C00000"/>
             </a:solidFill>
-            <a:tailEnd type="triangle"/>
+            <a:headEnd type="oval" w="med" len="med"/>
+            <a:tailEnd type="triangle" w="med" len="med"/>
           </a:ln>
         </p:spPr>
         <p:style>
@@ -15187,7 +15201,8 @@
             <a:solidFill>
               <a:srgbClr val="C00000"/>
             </a:solidFill>
-            <a:tailEnd type="triangle"/>
+            <a:headEnd type="oval" w="med" len="med"/>
+            <a:tailEnd type="triangle" w="med" len="med"/>
           </a:ln>
         </p:spPr>
         <p:style>
@@ -15232,7 +15247,8 @@
             <a:solidFill>
               <a:srgbClr val="C00000"/>
             </a:solidFill>
-            <a:tailEnd type="triangle"/>
+            <a:headEnd type="oval" w="med" len="med"/>
+            <a:tailEnd type="triangle" w="med" len="med"/>
           </a:ln>
         </p:spPr>
         <p:style>
@@ -15278,7 +15294,8 @@
             <a:solidFill>
               <a:srgbClr val="C00000"/>
             </a:solidFill>
-            <a:tailEnd type="triangle"/>
+            <a:headEnd type="oval" w="med" len="med"/>
+            <a:tailEnd type="triangle" w="med" len="med"/>
           </a:ln>
         </p:spPr>
         <p:style>
@@ -15423,7 +15440,8 @@
             <a:solidFill>
               <a:srgbClr val="C00000"/>
             </a:solidFill>
-            <a:tailEnd type="triangle"/>
+            <a:headEnd type="oval" w="med" len="med"/>
+            <a:tailEnd type="triangle" w="med" len="med"/>
           </a:ln>
         </p:spPr>
         <p:style>
@@ -15468,7 +15486,8 @@
             <a:solidFill>
               <a:srgbClr val="C00000"/>
             </a:solidFill>
-            <a:tailEnd type="triangle"/>
+            <a:headEnd type="oval" w="med" len="med"/>
+            <a:tailEnd type="triangle" w="med" len="med"/>
           </a:ln>
         </p:spPr>
         <p:style>
@@ -16281,10 +16300,10 @@
       </p:sp>
       <p:sp>
         <p:nvSpPr>
-          <p:cNvPr id="135" name="TextBox 134">
-            <a:extLst>
-              <a:ext uri="{FF2B5EF4-FFF2-40B4-BE49-F238E27FC236}">
-                <a16:creationId xmlns:a16="http://schemas.microsoft.com/office/drawing/2014/main" id="{96C78DFC-34B8-605C-0129-B4367D564AF6}"/>
+          <p:cNvPr id="137" name="TextBox 136">
+            <a:extLst>
+              <a:ext uri="{FF2B5EF4-FFF2-40B4-BE49-F238E27FC236}">
+                <a16:creationId xmlns:a16="http://schemas.microsoft.com/office/drawing/2014/main" id="{86CF5AAA-FDF5-26FE-58EC-373A7BD9125F}"/>
               </a:ext>
             </a:extLst>
           </p:cNvPr>
@@ -16293,7 +16312,7 @@
         </p:nvSpPr>
         <p:spPr>
           <a:xfrm>
-            <a:off x="10582516" y="5320541"/>
+            <a:off x="13533413" y="5103628"/>
             <a:ext cx="479618" cy="369332"/>
           </a:xfrm>
           <a:prstGeom prst="rect">
@@ -16304,7 +16323,9 @@
           </a:solidFill>
           <a:ln w="28575">
             <a:solidFill>
-              <a:srgbClr val="C00000"/>
+              <a:schemeClr val="accent1">
+                <a:lumMod val="75000"/>
+              </a:schemeClr>
             </a:solidFill>
           </a:ln>
         </p:spPr>
@@ -16319,234 +16340,7 @@
                 <a:latin typeface="Arial" panose="020B0604020202020204" pitchFamily="34" charset="0"/>
                 <a:cs typeface="Arial" panose="020B0604020202020204" pitchFamily="34" charset="0"/>
               </a:rPr>
-              <a:t>H1</a:t>
-            </a:r>
-          </a:p>
-        </p:txBody>
-      </p:sp>
-      <p:sp>
-        <p:nvSpPr>
-          <p:cNvPr id="136" name="TextBox 135">
-            <a:extLst>
-              <a:ext uri="{FF2B5EF4-FFF2-40B4-BE49-F238E27FC236}">
-                <a16:creationId xmlns:a16="http://schemas.microsoft.com/office/drawing/2014/main" id="{A61646C8-1A2D-2C32-5F90-82021DB95D40}"/>
-              </a:ext>
-            </a:extLst>
-          </p:cNvPr>
-          <p:cNvSpPr txBox="1"/>
-          <p:nvPr/>
-        </p:nvSpPr>
-        <p:spPr>
-          <a:xfrm>
-            <a:off x="12288354" y="4070823"/>
-            <a:ext cx="479618" cy="369332"/>
-          </a:xfrm>
-          <a:prstGeom prst="rect">
-            <a:avLst/>
-          </a:prstGeom>
-          <a:solidFill>
-            <a:schemeClr val="bg1"/>
-          </a:solidFill>
-          <a:ln w="28575">
-            <a:solidFill>
-              <a:srgbClr val="C00000"/>
-            </a:solidFill>
-          </a:ln>
-        </p:spPr>
-        <p:txBody>
-          <a:bodyPr wrap="none" rtlCol="0">
-            <a:spAutoFit/>
-          </a:bodyPr>
-          <a:lstStyle/>
-          <a:p>
-            <a:r>
-              <a:rPr lang="en-US" b="1" dirty="0">
-                <a:latin typeface="Arial" panose="020B0604020202020204" pitchFamily="34" charset="0"/>
-                <a:cs typeface="Arial" panose="020B0604020202020204" pitchFamily="34" charset="0"/>
-              </a:rPr>
-              <a:t>H1</a:t>
-            </a:r>
-          </a:p>
-        </p:txBody>
-      </p:sp>
-      <p:sp>
-        <p:nvSpPr>
-          <p:cNvPr id="137" name="TextBox 136">
-            <a:extLst>
-              <a:ext uri="{FF2B5EF4-FFF2-40B4-BE49-F238E27FC236}">
-                <a16:creationId xmlns:a16="http://schemas.microsoft.com/office/drawing/2014/main" id="{86CF5AAA-FDF5-26FE-58EC-373A7BD9125F}"/>
-              </a:ext>
-            </a:extLst>
-          </p:cNvPr>
-          <p:cNvSpPr txBox="1"/>
-          <p:nvPr/>
-        </p:nvSpPr>
-        <p:spPr>
-          <a:xfrm>
-            <a:off x="13533413" y="5103628"/>
-            <a:ext cx="479618" cy="369332"/>
-          </a:xfrm>
-          <a:prstGeom prst="rect">
-            <a:avLst/>
-          </a:prstGeom>
-          <a:solidFill>
-            <a:schemeClr val="bg1"/>
-          </a:solidFill>
-          <a:ln w="28575">
-            <a:solidFill>
-              <a:schemeClr val="accent1">
-                <a:lumMod val="75000"/>
-              </a:schemeClr>
-            </a:solidFill>
-          </a:ln>
-        </p:spPr>
-        <p:txBody>
-          <a:bodyPr wrap="none" rtlCol="0">
-            <a:spAutoFit/>
-          </a:bodyPr>
-          <a:lstStyle/>
-          <a:p>
-            <a:r>
-              <a:rPr lang="en-US" b="1" dirty="0">
-                <a:latin typeface="Arial" panose="020B0604020202020204" pitchFamily="34" charset="0"/>
-                <a:cs typeface="Arial" panose="020B0604020202020204" pitchFamily="34" charset="0"/>
-              </a:rPr>
               <a:t>H2</a:t>
-            </a:r>
-          </a:p>
-        </p:txBody>
-      </p:sp>
-      <p:sp>
-        <p:nvSpPr>
-          <p:cNvPr id="139" name="TextBox 138">
-            <a:extLst>
-              <a:ext uri="{FF2B5EF4-FFF2-40B4-BE49-F238E27FC236}">
-                <a16:creationId xmlns:a16="http://schemas.microsoft.com/office/drawing/2014/main" id="{98186FAE-EF23-21EC-0CCB-D03CAD71095C}"/>
-              </a:ext>
-            </a:extLst>
-          </p:cNvPr>
-          <p:cNvSpPr txBox="1"/>
-          <p:nvPr/>
-        </p:nvSpPr>
-        <p:spPr>
-          <a:xfrm>
-            <a:off x="14497924" y="4070823"/>
-            <a:ext cx="479618" cy="369332"/>
-          </a:xfrm>
-          <a:prstGeom prst="rect">
-            <a:avLst/>
-          </a:prstGeom>
-          <a:solidFill>
-            <a:schemeClr val="bg1"/>
-          </a:solidFill>
-          <a:ln w="28575">
-            <a:solidFill>
-              <a:srgbClr val="C00000"/>
-            </a:solidFill>
-          </a:ln>
-        </p:spPr>
-        <p:txBody>
-          <a:bodyPr wrap="none" rtlCol="0">
-            <a:spAutoFit/>
-          </a:bodyPr>
-          <a:lstStyle/>
-          <a:p>
-            <a:r>
-              <a:rPr lang="en-US" b="1" dirty="0">
-                <a:latin typeface="Arial" panose="020B0604020202020204" pitchFamily="34" charset="0"/>
-                <a:cs typeface="Arial" panose="020B0604020202020204" pitchFamily="34" charset="0"/>
-              </a:rPr>
-              <a:t>H2</a:t>
-            </a:r>
-          </a:p>
-        </p:txBody>
-      </p:sp>
-      <p:sp>
-        <p:nvSpPr>
-          <p:cNvPr id="141" name="TextBox 140">
-            <a:extLst>
-              <a:ext uri="{FF2B5EF4-FFF2-40B4-BE49-F238E27FC236}">
-                <a16:creationId xmlns:a16="http://schemas.microsoft.com/office/drawing/2014/main" id="{28768F57-8B2B-8D86-DDA0-6963206DCDB4}"/>
-              </a:ext>
-            </a:extLst>
-          </p:cNvPr>
-          <p:cNvSpPr txBox="1"/>
-          <p:nvPr/>
-        </p:nvSpPr>
-        <p:spPr>
-          <a:xfrm>
-            <a:off x="15682024" y="4070823"/>
-            <a:ext cx="479618" cy="369332"/>
-          </a:xfrm>
-          <a:prstGeom prst="rect">
-            <a:avLst/>
-          </a:prstGeom>
-          <a:solidFill>
-            <a:schemeClr val="bg1"/>
-          </a:solidFill>
-          <a:ln w="28575">
-            <a:solidFill>
-              <a:srgbClr val="C00000"/>
-            </a:solidFill>
-          </a:ln>
-        </p:spPr>
-        <p:txBody>
-          <a:bodyPr wrap="none" rtlCol="0">
-            <a:spAutoFit/>
-          </a:bodyPr>
-          <a:lstStyle/>
-          <a:p>
-            <a:r>
-              <a:rPr lang="en-US" b="1" dirty="0">
-                <a:latin typeface="Arial" panose="020B0604020202020204" pitchFamily="34" charset="0"/>
-                <a:cs typeface="Arial" panose="020B0604020202020204" pitchFamily="34" charset="0"/>
-              </a:rPr>
-              <a:t>H3</a:t>
-            </a:r>
-          </a:p>
-        </p:txBody>
-      </p:sp>
-      <p:sp>
-        <p:nvSpPr>
-          <p:cNvPr id="143" name="TextBox 142">
-            <a:extLst>
-              <a:ext uri="{FF2B5EF4-FFF2-40B4-BE49-F238E27FC236}">
-                <a16:creationId xmlns:a16="http://schemas.microsoft.com/office/drawing/2014/main" id="{FFAB9832-7D9C-F5F9-16D7-9D155076C833}"/>
-              </a:ext>
-            </a:extLst>
-          </p:cNvPr>
-          <p:cNvSpPr txBox="1"/>
-          <p:nvPr/>
-        </p:nvSpPr>
-        <p:spPr>
-          <a:xfrm>
-            <a:off x="15682024" y="6173881"/>
-            <a:ext cx="479618" cy="369332"/>
-          </a:xfrm>
-          <a:prstGeom prst="rect">
-            <a:avLst/>
-          </a:prstGeom>
-          <a:solidFill>
-            <a:schemeClr val="bg1"/>
-          </a:solidFill>
-          <a:ln w="28575">
-            <a:solidFill>
-              <a:srgbClr val="C00000"/>
-            </a:solidFill>
-          </a:ln>
-        </p:spPr>
-        <p:txBody>
-          <a:bodyPr wrap="none" rtlCol="0">
-            <a:spAutoFit/>
-          </a:bodyPr>
-          <a:lstStyle/>
-          <a:p>
-            <a:r>
-              <a:rPr lang="en-US" b="1" dirty="0">
-                <a:latin typeface="Arial" panose="020B0604020202020204" pitchFamily="34" charset="0"/>
-                <a:cs typeface="Arial" panose="020B0604020202020204" pitchFamily="34" charset="0"/>
-              </a:rPr>
-              <a:t>H3</a:t>
             </a:r>
           </a:p>
         </p:txBody>
@@ -16565,7 +16359,7 @@
         </p:nvSpPr>
         <p:spPr>
           <a:xfrm>
-            <a:off x="10581651" y="4876825"/>
+            <a:off x="10561029" y="4840933"/>
             <a:ext cx="479618" cy="369332"/>
           </a:xfrm>
           <a:prstGeom prst="rect">
@@ -16579,51 +16373,6 @@
               <a:schemeClr val="accent1">
                 <a:lumMod val="75000"/>
               </a:schemeClr>
-            </a:solidFill>
-          </a:ln>
-        </p:spPr>
-        <p:txBody>
-          <a:bodyPr wrap="none" rtlCol="0">
-            <a:spAutoFit/>
-          </a:bodyPr>
-          <a:lstStyle/>
-          <a:p>
-            <a:r>
-              <a:rPr lang="en-US" b="1" dirty="0">
-                <a:latin typeface="Arial" panose="020B0604020202020204" pitchFamily="34" charset="0"/>
-                <a:cs typeface="Arial" panose="020B0604020202020204" pitchFamily="34" charset="0"/>
-              </a:rPr>
-              <a:t>H1</a:t>
-            </a:r>
-          </a:p>
-        </p:txBody>
-      </p:sp>
-      <p:sp>
-        <p:nvSpPr>
-          <p:cNvPr id="145" name="TextBox 144">
-            <a:extLst>
-              <a:ext uri="{FF2B5EF4-FFF2-40B4-BE49-F238E27FC236}">
-                <a16:creationId xmlns:a16="http://schemas.microsoft.com/office/drawing/2014/main" id="{F68FF02E-DFE4-2B16-F73C-064E2DFE0FF9}"/>
-              </a:ext>
-            </a:extLst>
-          </p:cNvPr>
-          <p:cNvSpPr txBox="1"/>
-          <p:nvPr/>
-        </p:nvSpPr>
-        <p:spPr>
-          <a:xfrm>
-            <a:off x="12288354" y="6172178"/>
-            <a:ext cx="479618" cy="369332"/>
-          </a:xfrm>
-          <a:prstGeom prst="rect">
-            <a:avLst/>
-          </a:prstGeom>
-          <a:solidFill>
-            <a:schemeClr val="bg1"/>
-          </a:solidFill>
-          <a:ln w="28575">
-            <a:solidFill>
-              <a:srgbClr val="C00000"/>
             </a:solidFill>
           </a:ln>
         </p:spPr>
@@ -17036,7 +16785,8 @@
               <a:solidFill>
                 <a:srgbClr val="C00000"/>
               </a:solidFill>
-              <a:tailEnd type="triangle"/>
+              <a:headEnd type="oval" w="med" len="med"/>
+              <a:tailEnd type="triangle" w="med" len="med"/>
             </a:ln>
           </p:spPr>
           <p:style>
@@ -17253,8 +17003,8 @@
         </p:nvCxnSpPr>
         <p:spPr>
           <a:xfrm>
-            <a:off x="14752676" y="10642604"/>
-            <a:ext cx="0" cy="1098071"/>
+            <a:off x="14752676" y="10674408"/>
+            <a:ext cx="0" cy="1058316"/>
           </a:xfrm>
           <a:prstGeom prst="straightConnector1">
             <a:avLst/>
@@ -17263,7 +17013,8 @@
             <a:solidFill>
               <a:srgbClr val="C00000"/>
             </a:solidFill>
-            <a:tailEnd type="triangle"/>
+            <a:headEnd type="oval" w="med" len="med"/>
+            <a:tailEnd type="triangle" w="med" len="med"/>
           </a:ln>
         </p:spPr>
         <p:style>
@@ -17291,18 +17042,20 @@
             </a:extLst>
           </p:cNvPr>
           <p:cNvCxnSpPr>
-            <a:stCxn id="24" idx="0"/>
+            <a:cxnSpLocks/>
             <a:endCxn id="20" idx="1"/>
           </p:cNvCxnSpPr>
           <p:nvPr/>
         </p:nvCxnSpPr>
         <p:spPr>
-          <a:xfrm rot="5400000" flipH="1" flipV="1">
-            <a:off x="15708645" y="10693420"/>
-            <a:ext cx="589520" cy="1504991"/>
-          </a:xfrm>
-          <a:prstGeom prst="bentConnector2">
-            <a:avLst/>
+          <a:xfrm flipV="1">
+            <a:off x="15488359" y="11151155"/>
+            <a:ext cx="1267542" cy="589520"/>
+          </a:xfrm>
+          <a:prstGeom prst="bentConnector3">
+            <a:avLst>
+              <a:gd name="adj1" fmla="val -2546"/>
+            </a:avLst>
           </a:prstGeom>
           <a:ln w="39624">
             <a:solidFill>
@@ -17340,15 +17093,13 @@
           </p:cNvPr>
           <p:cNvCxnSpPr>
             <a:cxnSpLocks/>
-            <a:stCxn id="24" idx="2"/>
-            <a:endCxn id="17" idx="1"/>
           </p:cNvCxnSpPr>
           <p:nvPr/>
         </p:nvCxnSpPr>
         <p:spPr>
           <a:xfrm rot="16200000" flipH="1">
-            <a:off x="15686128" y="12182679"/>
-            <a:ext cx="634555" cy="1504991"/>
+            <a:off x="15775194" y="12109515"/>
+            <a:ext cx="421944" cy="1470513"/>
           </a:xfrm>
           <a:prstGeom prst="bentConnector2">
             <a:avLst/>
@@ -17357,7 +17108,8 @@
             <a:solidFill>
               <a:srgbClr val="C00000"/>
             </a:solidFill>
-            <a:tailEnd type="triangle"/>
+            <a:headEnd type="oval" w="med" len="med"/>
+            <a:tailEnd type="triangle" w="med" len="med"/>
           </a:ln>
         </p:spPr>
         <p:style>
@@ -17485,14 +17237,13 @@
             </a:extLst>
           </p:cNvPr>
           <p:cNvCxnSpPr>
-            <a:stCxn id="12" idx="0"/>
-            <a:endCxn id="23" idx="2"/>
+            <a:cxnSpLocks/>
           </p:cNvCxnSpPr>
           <p:nvPr/>
         </p:nvCxnSpPr>
         <p:spPr>
           <a:xfrm flipV="1">
-            <a:off x="12521813" y="12628576"/>
+            <a:off x="12521813" y="12645508"/>
             <a:ext cx="6350" cy="1079290"/>
           </a:xfrm>
           <a:prstGeom prst="straightConnector1">
@@ -17502,7 +17253,8 @@
             <a:solidFill>
               <a:srgbClr val="C00000"/>
             </a:solidFill>
-            <a:tailEnd type="triangle"/>
+            <a:headEnd type="oval" w="med" len="med"/>
+            <a:tailEnd type="triangle" w="med" len="med"/>
           </a:ln>
         </p:spPr>
         <p:style>
@@ -18380,6 +18132,618 @@
               <a:latin typeface="Arial" panose="020B0604020202020204" pitchFamily="34" charset="0"/>
               <a:cs typeface="Arial" panose="020B0604020202020204" pitchFamily="34" charset="0"/>
             </a:endParaRPr>
+          </a:p>
+        </p:txBody>
+      </p:sp>
+      <p:sp>
+        <p:nvSpPr>
+          <p:cNvPr id="167" name="Oval 166">
+            <a:extLst>
+              <a:ext uri="{FF2B5EF4-FFF2-40B4-BE49-F238E27FC236}">
+                <a16:creationId xmlns:a16="http://schemas.microsoft.com/office/drawing/2014/main" id="{6E415612-2CE1-257D-1E7A-DFE4E83EB874}"/>
+              </a:ext>
+            </a:extLst>
+          </p:cNvPr>
+          <p:cNvSpPr>
+            <a:spLocks noChangeAspect="1"/>
+          </p:cNvSpPr>
+          <p:nvPr/>
+        </p:nvSpPr>
+        <p:spPr>
+          <a:xfrm>
+            <a:off x="12278782" y="4007318"/>
+            <a:ext cx="486059" cy="486059"/>
+          </a:xfrm>
+          <a:prstGeom prst="ellipse">
+            <a:avLst/>
+          </a:prstGeom>
+          <a:solidFill>
+            <a:schemeClr val="bg1"/>
+          </a:solidFill>
+          <a:ln w="28575">
+            <a:solidFill>
+              <a:srgbClr val="C00000"/>
+            </a:solidFill>
+          </a:ln>
+        </p:spPr>
+        <p:style>
+          <a:lnRef idx="2">
+            <a:schemeClr val="accent1">
+              <a:shade val="15000"/>
+            </a:schemeClr>
+          </a:lnRef>
+          <a:fillRef idx="1">
+            <a:schemeClr val="accent1"/>
+          </a:fillRef>
+          <a:effectRef idx="0">
+            <a:schemeClr val="accent1"/>
+          </a:effectRef>
+          <a:fontRef idx="minor">
+            <a:schemeClr val="lt1"/>
+          </a:fontRef>
+        </p:style>
+        <p:txBody>
+          <a:bodyPr rtlCol="0" anchor="ctr"/>
+          <a:lstStyle/>
+          <a:p>
+            <a:endParaRPr lang="en-US" b="1" dirty="0">
+              <a:solidFill>
+                <a:schemeClr val="tx1"/>
+              </a:solidFill>
+              <a:latin typeface="Arial" panose="020B0604020202020204" pitchFamily="34" charset="0"/>
+              <a:cs typeface="Arial" panose="020B0604020202020204" pitchFamily="34" charset="0"/>
+            </a:endParaRPr>
+          </a:p>
+        </p:txBody>
+      </p:sp>
+      <p:sp>
+        <p:nvSpPr>
+          <p:cNvPr id="136" name="TextBox 135">
+            <a:extLst>
+              <a:ext uri="{FF2B5EF4-FFF2-40B4-BE49-F238E27FC236}">
+                <a16:creationId xmlns:a16="http://schemas.microsoft.com/office/drawing/2014/main" id="{A61646C8-1A2D-2C32-5F90-82021DB95D40}"/>
+              </a:ext>
+            </a:extLst>
+          </p:cNvPr>
+          <p:cNvSpPr txBox="1"/>
+          <p:nvPr/>
+        </p:nvSpPr>
+        <p:spPr>
+          <a:xfrm>
+            <a:off x="12285223" y="4065681"/>
+            <a:ext cx="479618" cy="369332"/>
+          </a:xfrm>
+          <a:prstGeom prst="rect">
+            <a:avLst/>
+          </a:prstGeom>
+          <a:noFill/>
+          <a:ln w="28575">
+            <a:noFill/>
+          </a:ln>
+        </p:spPr>
+        <p:txBody>
+          <a:bodyPr wrap="none" rtlCol="0">
+            <a:spAutoFit/>
+          </a:bodyPr>
+          <a:lstStyle/>
+          <a:p>
+            <a:r>
+              <a:rPr lang="en-US" b="1" dirty="0">
+                <a:latin typeface="Arial" panose="020B0604020202020204" pitchFamily="34" charset="0"/>
+                <a:cs typeface="Arial" panose="020B0604020202020204" pitchFamily="34" charset="0"/>
+              </a:rPr>
+              <a:t>H1</a:t>
+            </a:r>
+          </a:p>
+        </p:txBody>
+      </p:sp>
+      <p:sp>
+        <p:nvSpPr>
+          <p:cNvPr id="168" name="Oval 167">
+            <a:extLst>
+              <a:ext uri="{FF2B5EF4-FFF2-40B4-BE49-F238E27FC236}">
+                <a16:creationId xmlns:a16="http://schemas.microsoft.com/office/drawing/2014/main" id="{DB649EF0-2175-7EB4-6303-619383AE8331}"/>
+              </a:ext>
+            </a:extLst>
+          </p:cNvPr>
+          <p:cNvSpPr>
+            <a:spLocks noChangeAspect="1"/>
+          </p:cNvSpPr>
+          <p:nvPr/>
+        </p:nvSpPr>
+        <p:spPr>
+          <a:xfrm>
+            <a:off x="10563250" y="5322602"/>
+            <a:ext cx="486059" cy="486059"/>
+          </a:xfrm>
+          <a:prstGeom prst="ellipse">
+            <a:avLst/>
+          </a:prstGeom>
+          <a:solidFill>
+            <a:schemeClr val="bg1"/>
+          </a:solidFill>
+          <a:ln w="28575">
+            <a:solidFill>
+              <a:srgbClr val="C00000"/>
+            </a:solidFill>
+          </a:ln>
+        </p:spPr>
+        <p:style>
+          <a:lnRef idx="2">
+            <a:schemeClr val="accent1">
+              <a:shade val="15000"/>
+            </a:schemeClr>
+          </a:lnRef>
+          <a:fillRef idx="1">
+            <a:schemeClr val="accent1"/>
+          </a:fillRef>
+          <a:effectRef idx="0">
+            <a:schemeClr val="accent1"/>
+          </a:effectRef>
+          <a:fontRef idx="minor">
+            <a:schemeClr val="lt1"/>
+          </a:fontRef>
+        </p:style>
+        <p:txBody>
+          <a:bodyPr rtlCol="0" anchor="ctr"/>
+          <a:lstStyle/>
+          <a:p>
+            <a:endParaRPr lang="en-US" b="1" dirty="0">
+              <a:solidFill>
+                <a:schemeClr val="tx1"/>
+              </a:solidFill>
+              <a:latin typeface="Arial" panose="020B0604020202020204" pitchFamily="34" charset="0"/>
+              <a:cs typeface="Arial" panose="020B0604020202020204" pitchFamily="34" charset="0"/>
+            </a:endParaRPr>
+          </a:p>
+        </p:txBody>
+      </p:sp>
+      <p:sp>
+        <p:nvSpPr>
+          <p:cNvPr id="170" name="TextBox 169">
+            <a:extLst>
+              <a:ext uri="{FF2B5EF4-FFF2-40B4-BE49-F238E27FC236}">
+                <a16:creationId xmlns:a16="http://schemas.microsoft.com/office/drawing/2014/main" id="{DEC5290A-D483-02D4-F938-849E87645AA0}"/>
+              </a:ext>
+            </a:extLst>
+          </p:cNvPr>
+          <p:cNvSpPr txBox="1"/>
+          <p:nvPr/>
+        </p:nvSpPr>
+        <p:spPr>
+          <a:xfrm>
+            <a:off x="10566742" y="5380965"/>
+            <a:ext cx="479618" cy="369332"/>
+          </a:xfrm>
+          <a:prstGeom prst="rect">
+            <a:avLst/>
+          </a:prstGeom>
+          <a:noFill/>
+          <a:ln w="28575">
+            <a:noFill/>
+          </a:ln>
+        </p:spPr>
+        <p:txBody>
+          <a:bodyPr wrap="none" rtlCol="0">
+            <a:spAutoFit/>
+          </a:bodyPr>
+          <a:lstStyle/>
+          <a:p>
+            <a:r>
+              <a:rPr lang="en-US" b="1" dirty="0">
+                <a:latin typeface="Arial" panose="020B0604020202020204" pitchFamily="34" charset="0"/>
+                <a:cs typeface="Arial" panose="020B0604020202020204" pitchFamily="34" charset="0"/>
+              </a:rPr>
+              <a:t>H1</a:t>
+            </a:r>
+          </a:p>
+        </p:txBody>
+      </p:sp>
+      <p:sp>
+        <p:nvSpPr>
+          <p:cNvPr id="177" name="Oval 176">
+            <a:extLst>
+              <a:ext uri="{FF2B5EF4-FFF2-40B4-BE49-F238E27FC236}">
+                <a16:creationId xmlns:a16="http://schemas.microsoft.com/office/drawing/2014/main" id="{04160229-FD6A-B47D-B882-48B75E91D21B}"/>
+              </a:ext>
+            </a:extLst>
+          </p:cNvPr>
+          <p:cNvSpPr>
+            <a:spLocks noChangeAspect="1"/>
+          </p:cNvSpPr>
+          <p:nvPr/>
+        </p:nvSpPr>
+        <p:spPr>
+          <a:xfrm>
+            <a:off x="12275290" y="6077254"/>
+            <a:ext cx="486059" cy="486059"/>
+          </a:xfrm>
+          <a:prstGeom prst="ellipse">
+            <a:avLst/>
+          </a:prstGeom>
+          <a:solidFill>
+            <a:schemeClr val="bg1"/>
+          </a:solidFill>
+          <a:ln w="28575">
+            <a:solidFill>
+              <a:srgbClr val="C00000"/>
+            </a:solidFill>
+          </a:ln>
+        </p:spPr>
+        <p:style>
+          <a:lnRef idx="2">
+            <a:schemeClr val="accent1">
+              <a:shade val="15000"/>
+            </a:schemeClr>
+          </a:lnRef>
+          <a:fillRef idx="1">
+            <a:schemeClr val="accent1"/>
+          </a:fillRef>
+          <a:effectRef idx="0">
+            <a:schemeClr val="accent1"/>
+          </a:effectRef>
+          <a:fontRef idx="minor">
+            <a:schemeClr val="lt1"/>
+          </a:fontRef>
+        </p:style>
+        <p:txBody>
+          <a:bodyPr rtlCol="0" anchor="ctr"/>
+          <a:lstStyle/>
+          <a:p>
+            <a:endParaRPr lang="en-US" b="1" dirty="0">
+              <a:solidFill>
+                <a:schemeClr val="tx1"/>
+              </a:solidFill>
+              <a:latin typeface="Arial" panose="020B0604020202020204" pitchFamily="34" charset="0"/>
+              <a:cs typeface="Arial" panose="020B0604020202020204" pitchFamily="34" charset="0"/>
+            </a:endParaRPr>
+          </a:p>
+        </p:txBody>
+      </p:sp>
+      <p:sp>
+        <p:nvSpPr>
+          <p:cNvPr id="178" name="TextBox 177">
+            <a:extLst>
+              <a:ext uri="{FF2B5EF4-FFF2-40B4-BE49-F238E27FC236}">
+                <a16:creationId xmlns:a16="http://schemas.microsoft.com/office/drawing/2014/main" id="{1DCE30B5-61F8-F6DD-5E82-BA1EA46AC39C}"/>
+              </a:ext>
+            </a:extLst>
+          </p:cNvPr>
+          <p:cNvSpPr txBox="1"/>
+          <p:nvPr/>
+        </p:nvSpPr>
+        <p:spPr>
+          <a:xfrm>
+            <a:off x="12278782" y="6135617"/>
+            <a:ext cx="479618" cy="369332"/>
+          </a:xfrm>
+          <a:prstGeom prst="rect">
+            <a:avLst/>
+          </a:prstGeom>
+          <a:noFill/>
+          <a:ln w="28575">
+            <a:noFill/>
+          </a:ln>
+        </p:spPr>
+        <p:txBody>
+          <a:bodyPr wrap="none" rtlCol="0">
+            <a:spAutoFit/>
+          </a:bodyPr>
+          <a:lstStyle/>
+          <a:p>
+            <a:r>
+              <a:rPr lang="en-US" b="1" dirty="0">
+                <a:latin typeface="Arial" panose="020B0604020202020204" pitchFamily="34" charset="0"/>
+                <a:cs typeface="Arial" panose="020B0604020202020204" pitchFamily="34" charset="0"/>
+              </a:rPr>
+              <a:t>H1</a:t>
+            </a:r>
+          </a:p>
+        </p:txBody>
+      </p:sp>
+      <p:sp>
+        <p:nvSpPr>
+          <p:cNvPr id="179" name="Oval 178">
+            <a:extLst>
+              <a:ext uri="{FF2B5EF4-FFF2-40B4-BE49-F238E27FC236}">
+                <a16:creationId xmlns:a16="http://schemas.microsoft.com/office/drawing/2014/main" id="{4CBE1731-8159-965B-09F4-DE32B5826DC7}"/>
+              </a:ext>
+            </a:extLst>
+          </p:cNvPr>
+          <p:cNvSpPr>
+            <a:spLocks noChangeAspect="1"/>
+          </p:cNvSpPr>
+          <p:nvPr/>
+        </p:nvSpPr>
+        <p:spPr>
+          <a:xfrm>
+            <a:off x="14515463" y="4007318"/>
+            <a:ext cx="486059" cy="486059"/>
+          </a:xfrm>
+          <a:prstGeom prst="ellipse">
+            <a:avLst/>
+          </a:prstGeom>
+          <a:solidFill>
+            <a:schemeClr val="bg1"/>
+          </a:solidFill>
+          <a:ln w="28575">
+            <a:solidFill>
+              <a:srgbClr val="C00000"/>
+            </a:solidFill>
+          </a:ln>
+        </p:spPr>
+        <p:style>
+          <a:lnRef idx="2">
+            <a:schemeClr val="accent1">
+              <a:shade val="15000"/>
+            </a:schemeClr>
+          </a:lnRef>
+          <a:fillRef idx="1">
+            <a:schemeClr val="accent1"/>
+          </a:fillRef>
+          <a:effectRef idx="0">
+            <a:schemeClr val="accent1"/>
+          </a:effectRef>
+          <a:fontRef idx="minor">
+            <a:schemeClr val="lt1"/>
+          </a:fontRef>
+        </p:style>
+        <p:txBody>
+          <a:bodyPr rtlCol="0" anchor="ctr"/>
+          <a:lstStyle/>
+          <a:p>
+            <a:endParaRPr lang="en-US" b="1" dirty="0">
+              <a:solidFill>
+                <a:schemeClr val="tx1"/>
+              </a:solidFill>
+              <a:latin typeface="Arial" panose="020B0604020202020204" pitchFamily="34" charset="0"/>
+              <a:cs typeface="Arial" panose="020B0604020202020204" pitchFamily="34" charset="0"/>
+            </a:endParaRPr>
+          </a:p>
+        </p:txBody>
+      </p:sp>
+      <p:sp>
+        <p:nvSpPr>
+          <p:cNvPr id="180" name="TextBox 179">
+            <a:extLst>
+              <a:ext uri="{FF2B5EF4-FFF2-40B4-BE49-F238E27FC236}">
+                <a16:creationId xmlns:a16="http://schemas.microsoft.com/office/drawing/2014/main" id="{43035090-1B1E-5384-D575-6A2843D20688}"/>
+              </a:ext>
+            </a:extLst>
+          </p:cNvPr>
+          <p:cNvSpPr txBox="1"/>
+          <p:nvPr/>
+        </p:nvSpPr>
+        <p:spPr>
+          <a:xfrm>
+            <a:off x="14518955" y="4065681"/>
+            <a:ext cx="479618" cy="369332"/>
+          </a:xfrm>
+          <a:prstGeom prst="rect">
+            <a:avLst/>
+          </a:prstGeom>
+          <a:noFill/>
+          <a:ln w="28575">
+            <a:noFill/>
+          </a:ln>
+        </p:spPr>
+        <p:txBody>
+          <a:bodyPr wrap="none" rtlCol="0">
+            <a:spAutoFit/>
+          </a:bodyPr>
+          <a:lstStyle/>
+          <a:p>
+            <a:r>
+              <a:rPr lang="en-US" b="1" dirty="0">
+                <a:latin typeface="Arial" panose="020B0604020202020204" pitchFamily="34" charset="0"/>
+                <a:cs typeface="Arial" panose="020B0604020202020204" pitchFamily="34" charset="0"/>
+              </a:rPr>
+              <a:t>H2</a:t>
+            </a:r>
+          </a:p>
+        </p:txBody>
+      </p:sp>
+      <p:sp>
+        <p:nvSpPr>
+          <p:cNvPr id="181" name="Oval 180">
+            <a:extLst>
+              <a:ext uri="{FF2B5EF4-FFF2-40B4-BE49-F238E27FC236}">
+                <a16:creationId xmlns:a16="http://schemas.microsoft.com/office/drawing/2014/main" id="{BE4DEF69-D21B-951E-B0F5-08438C4358CB}"/>
+              </a:ext>
+            </a:extLst>
+          </p:cNvPr>
+          <p:cNvSpPr>
+            <a:spLocks noChangeAspect="1"/>
+          </p:cNvSpPr>
+          <p:nvPr/>
+        </p:nvSpPr>
+        <p:spPr>
+          <a:xfrm>
+            <a:off x="15720983" y="4006663"/>
+            <a:ext cx="486059" cy="486059"/>
+          </a:xfrm>
+          <a:prstGeom prst="ellipse">
+            <a:avLst/>
+          </a:prstGeom>
+          <a:solidFill>
+            <a:schemeClr val="bg1"/>
+          </a:solidFill>
+          <a:ln w="28575">
+            <a:solidFill>
+              <a:srgbClr val="C00000"/>
+            </a:solidFill>
+          </a:ln>
+        </p:spPr>
+        <p:style>
+          <a:lnRef idx="2">
+            <a:schemeClr val="accent1">
+              <a:shade val="15000"/>
+            </a:schemeClr>
+          </a:lnRef>
+          <a:fillRef idx="1">
+            <a:schemeClr val="accent1"/>
+          </a:fillRef>
+          <a:effectRef idx="0">
+            <a:schemeClr val="accent1"/>
+          </a:effectRef>
+          <a:fontRef idx="minor">
+            <a:schemeClr val="lt1"/>
+          </a:fontRef>
+        </p:style>
+        <p:txBody>
+          <a:bodyPr rtlCol="0" anchor="ctr"/>
+          <a:lstStyle/>
+          <a:p>
+            <a:endParaRPr lang="en-US" b="1" dirty="0">
+              <a:solidFill>
+                <a:schemeClr val="tx1"/>
+              </a:solidFill>
+              <a:latin typeface="Arial" panose="020B0604020202020204" pitchFamily="34" charset="0"/>
+              <a:cs typeface="Arial" panose="020B0604020202020204" pitchFamily="34" charset="0"/>
+            </a:endParaRPr>
+          </a:p>
+        </p:txBody>
+      </p:sp>
+      <p:sp>
+        <p:nvSpPr>
+          <p:cNvPr id="182" name="TextBox 181">
+            <a:extLst>
+              <a:ext uri="{FF2B5EF4-FFF2-40B4-BE49-F238E27FC236}">
+                <a16:creationId xmlns:a16="http://schemas.microsoft.com/office/drawing/2014/main" id="{9DC1553E-5FFC-75AD-3FE7-92E5E1FF8017}"/>
+              </a:ext>
+            </a:extLst>
+          </p:cNvPr>
+          <p:cNvSpPr txBox="1"/>
+          <p:nvPr/>
+        </p:nvSpPr>
+        <p:spPr>
+          <a:xfrm>
+            <a:off x="15724475" y="4065026"/>
+            <a:ext cx="479618" cy="369332"/>
+          </a:xfrm>
+          <a:prstGeom prst="rect">
+            <a:avLst/>
+          </a:prstGeom>
+          <a:noFill/>
+          <a:ln w="28575">
+            <a:noFill/>
+          </a:ln>
+        </p:spPr>
+        <p:txBody>
+          <a:bodyPr wrap="none" rtlCol="0">
+            <a:spAutoFit/>
+          </a:bodyPr>
+          <a:lstStyle/>
+          <a:p>
+            <a:r>
+              <a:rPr lang="en-US" b="1" dirty="0">
+                <a:latin typeface="Arial" panose="020B0604020202020204" pitchFamily="34" charset="0"/>
+                <a:cs typeface="Arial" panose="020B0604020202020204" pitchFamily="34" charset="0"/>
+              </a:rPr>
+              <a:t>H3</a:t>
+            </a:r>
+          </a:p>
+        </p:txBody>
+      </p:sp>
+      <p:sp>
+        <p:nvSpPr>
+          <p:cNvPr id="183" name="Oval 182">
+            <a:extLst>
+              <a:ext uri="{FF2B5EF4-FFF2-40B4-BE49-F238E27FC236}">
+                <a16:creationId xmlns:a16="http://schemas.microsoft.com/office/drawing/2014/main" id="{56EFBD94-52BB-047D-E98D-E1E53CD2B919}"/>
+              </a:ext>
+            </a:extLst>
+          </p:cNvPr>
+          <p:cNvSpPr>
+            <a:spLocks noChangeAspect="1"/>
+          </p:cNvSpPr>
+          <p:nvPr/>
+        </p:nvSpPr>
+        <p:spPr>
+          <a:xfrm>
+            <a:off x="15713980" y="6100307"/>
+            <a:ext cx="486059" cy="486059"/>
+          </a:xfrm>
+          <a:prstGeom prst="ellipse">
+            <a:avLst/>
+          </a:prstGeom>
+          <a:solidFill>
+            <a:schemeClr val="bg1"/>
+          </a:solidFill>
+          <a:ln w="28575">
+            <a:solidFill>
+              <a:srgbClr val="C00000"/>
+            </a:solidFill>
+          </a:ln>
+        </p:spPr>
+        <p:style>
+          <a:lnRef idx="2">
+            <a:schemeClr val="accent1">
+              <a:shade val="15000"/>
+            </a:schemeClr>
+          </a:lnRef>
+          <a:fillRef idx="1">
+            <a:schemeClr val="accent1"/>
+          </a:fillRef>
+          <a:effectRef idx="0">
+            <a:schemeClr val="accent1"/>
+          </a:effectRef>
+          <a:fontRef idx="minor">
+            <a:schemeClr val="lt1"/>
+          </a:fontRef>
+        </p:style>
+        <p:txBody>
+          <a:bodyPr rtlCol="0" anchor="ctr"/>
+          <a:lstStyle/>
+          <a:p>
+            <a:endParaRPr lang="en-US" b="1" dirty="0">
+              <a:solidFill>
+                <a:schemeClr val="tx1"/>
+              </a:solidFill>
+              <a:latin typeface="Arial" panose="020B0604020202020204" pitchFamily="34" charset="0"/>
+              <a:cs typeface="Arial" panose="020B0604020202020204" pitchFamily="34" charset="0"/>
+            </a:endParaRPr>
+          </a:p>
+        </p:txBody>
+      </p:sp>
+      <p:sp>
+        <p:nvSpPr>
+          <p:cNvPr id="184" name="TextBox 183">
+            <a:extLst>
+              <a:ext uri="{FF2B5EF4-FFF2-40B4-BE49-F238E27FC236}">
+                <a16:creationId xmlns:a16="http://schemas.microsoft.com/office/drawing/2014/main" id="{2B7ACEAA-BFCC-DD1A-4FBD-586B8DD3DAEA}"/>
+              </a:ext>
+            </a:extLst>
+          </p:cNvPr>
+          <p:cNvSpPr txBox="1"/>
+          <p:nvPr/>
+        </p:nvSpPr>
+        <p:spPr>
+          <a:xfrm>
+            <a:off x="15717472" y="6158670"/>
+            <a:ext cx="479618" cy="369332"/>
+          </a:xfrm>
+          <a:prstGeom prst="rect">
+            <a:avLst/>
+          </a:prstGeom>
+          <a:noFill/>
+          <a:ln w="28575">
+            <a:noFill/>
+          </a:ln>
+        </p:spPr>
+        <p:txBody>
+          <a:bodyPr wrap="none" rtlCol="0">
+            <a:spAutoFit/>
+          </a:bodyPr>
+          <a:lstStyle/>
+          <a:p>
+            <a:r>
+              <a:rPr lang="en-US" b="1" dirty="0">
+                <a:latin typeface="Arial" panose="020B0604020202020204" pitchFamily="34" charset="0"/>
+                <a:cs typeface="Arial" panose="020B0604020202020204" pitchFamily="34" charset="0"/>
+              </a:rPr>
+              <a:t>H3</a:t>
+            </a:r>
           </a:p>
         </p:txBody>
       </p:sp>

</xml_diff>

<commit_message>
add some formatting for jEco, change SEM output
</commit_message>
<xml_diff>
--- a/working_drafts/figs/TXeco_fig6_SEM.pptx
+++ b/working_drafts/figs/TXeco_fig6_SEM.pptx
@@ -202,7 +202,7 @@
           <a:p>
             <a:fld id="{9C8338E3-F40D-F146-8D3B-4726E84D5200}" type="datetimeFigureOut">
               <a:rPr lang="en-US" smtClean="0"/>
-              <a:t>10/16/23</a:t>
+              <a:t>10/18/23</a:t>
             </a:fld>
             <a:endParaRPr lang="en-US"/>
           </a:p>
@@ -1109,7 +1109,7 @@
           <a:p>
             <a:fld id="{D3A28AA4-801E-B147-9E5C-6E6DBA6E23D1}" type="datetimeFigureOut">
               <a:rPr lang="en-US" smtClean="0"/>
-              <a:t>10/16/23</a:t>
+              <a:t>10/18/23</a:t>
             </a:fld>
             <a:endParaRPr lang="en-US"/>
           </a:p>
@@ -1279,7 +1279,7 @@
           <a:p>
             <a:fld id="{D3A28AA4-801E-B147-9E5C-6E6DBA6E23D1}" type="datetimeFigureOut">
               <a:rPr lang="en-US" smtClean="0"/>
-              <a:t>10/16/23</a:t>
+              <a:t>10/18/23</a:t>
             </a:fld>
             <a:endParaRPr lang="en-US"/>
           </a:p>
@@ -1459,7 +1459,7 @@
           <a:p>
             <a:fld id="{D3A28AA4-801E-B147-9E5C-6E6DBA6E23D1}" type="datetimeFigureOut">
               <a:rPr lang="en-US" smtClean="0"/>
-              <a:t>10/16/23</a:t>
+              <a:t>10/18/23</a:t>
             </a:fld>
             <a:endParaRPr lang="en-US"/>
           </a:p>
@@ -1629,7 +1629,7 @@
           <a:p>
             <a:fld id="{D3A28AA4-801E-B147-9E5C-6E6DBA6E23D1}" type="datetimeFigureOut">
               <a:rPr lang="en-US" smtClean="0"/>
-              <a:t>10/16/23</a:t>
+              <a:t>10/18/23</a:t>
             </a:fld>
             <a:endParaRPr lang="en-US"/>
           </a:p>
@@ -1873,7 +1873,7 @@
           <a:p>
             <a:fld id="{D3A28AA4-801E-B147-9E5C-6E6DBA6E23D1}" type="datetimeFigureOut">
               <a:rPr lang="en-US" smtClean="0"/>
-              <a:t>10/16/23</a:t>
+              <a:t>10/18/23</a:t>
             </a:fld>
             <a:endParaRPr lang="en-US"/>
           </a:p>
@@ -2105,7 +2105,7 @@
           <a:p>
             <a:fld id="{D3A28AA4-801E-B147-9E5C-6E6DBA6E23D1}" type="datetimeFigureOut">
               <a:rPr lang="en-US" smtClean="0"/>
-              <a:t>10/16/23</a:t>
+              <a:t>10/18/23</a:t>
             </a:fld>
             <a:endParaRPr lang="en-US"/>
           </a:p>
@@ -2472,7 +2472,7 @@
           <a:p>
             <a:fld id="{D3A28AA4-801E-B147-9E5C-6E6DBA6E23D1}" type="datetimeFigureOut">
               <a:rPr lang="en-US" smtClean="0"/>
-              <a:t>10/16/23</a:t>
+              <a:t>10/18/23</a:t>
             </a:fld>
             <a:endParaRPr lang="en-US"/>
           </a:p>
@@ -2590,7 +2590,7 @@
           <a:p>
             <a:fld id="{D3A28AA4-801E-B147-9E5C-6E6DBA6E23D1}" type="datetimeFigureOut">
               <a:rPr lang="en-US" smtClean="0"/>
-              <a:t>10/16/23</a:t>
+              <a:t>10/18/23</a:t>
             </a:fld>
             <a:endParaRPr lang="en-US"/>
           </a:p>
@@ -2685,7 +2685,7 @@
           <a:p>
             <a:fld id="{D3A28AA4-801E-B147-9E5C-6E6DBA6E23D1}" type="datetimeFigureOut">
               <a:rPr lang="en-US" smtClean="0"/>
-              <a:t>10/16/23</a:t>
+              <a:t>10/18/23</a:t>
             </a:fld>
             <a:endParaRPr lang="en-US"/>
           </a:p>
@@ -2962,7 +2962,7 @@
           <a:p>
             <a:fld id="{D3A28AA4-801E-B147-9E5C-6E6DBA6E23D1}" type="datetimeFigureOut">
               <a:rPr lang="en-US" smtClean="0"/>
-              <a:t>10/16/23</a:t>
+              <a:t>10/18/23</a:t>
             </a:fld>
             <a:endParaRPr lang="en-US"/>
           </a:p>
@@ -3219,7 +3219,7 @@
           <a:p>
             <a:fld id="{D3A28AA4-801E-B147-9E5C-6E6DBA6E23D1}" type="datetimeFigureOut">
               <a:rPr lang="en-US" smtClean="0"/>
-              <a:t>10/16/23</a:t>
+              <a:t>10/18/23</a:t>
             </a:fld>
             <a:endParaRPr lang="en-US"/>
           </a:p>
@@ -3432,7 +3432,7 @@
           <a:p>
             <a:fld id="{D3A28AA4-801E-B147-9E5C-6E6DBA6E23D1}" type="datetimeFigureOut">
               <a:rPr lang="en-US" smtClean="0"/>
-              <a:t>10/16/23</a:t>
+              <a:t>10/18/23</a:t>
             </a:fld>
             <a:endParaRPr lang="en-US"/>
           </a:p>
@@ -18779,124 +18779,32 @@
       </p:grpSpPr>
       <p:cxnSp>
         <p:nvCxnSpPr>
-          <p:cNvPr id="169" name="Elbow Connector 168">
-            <a:extLst>
-              <a:ext uri="{FF2B5EF4-FFF2-40B4-BE49-F238E27FC236}">
-                <a16:creationId xmlns:a16="http://schemas.microsoft.com/office/drawing/2014/main" id="{E9C4FFF5-B216-F1F1-94F2-316CF4741880}"/>
-              </a:ext>
-            </a:extLst>
-          </p:cNvPr>
-          <p:cNvCxnSpPr>
-            <a:cxnSpLocks/>
-          </p:cNvCxnSpPr>
+          <p:cNvPr id="138" name="Straight Arrow Connector 137">
+            <a:extLst>
+              <a:ext uri="{FF2B5EF4-FFF2-40B4-BE49-F238E27FC236}">
+                <a16:creationId xmlns:a16="http://schemas.microsoft.com/office/drawing/2014/main" id="{178CBA08-89EC-294E-0EC2-191244E430D5}"/>
+              </a:ext>
+            </a:extLst>
+          </p:cNvPr>
+          <p:cNvCxnSpPr/>
           <p:nvPr/>
         </p:nvCxnSpPr>
         <p:spPr>
-          <a:xfrm flipV="1">
-            <a:off x="13451675" y="12219519"/>
-            <a:ext cx="3786813" cy="1934370"/>
-          </a:xfrm>
-          <a:prstGeom prst="bentConnector3">
-            <a:avLst>
-              <a:gd name="adj1" fmla="val 77877"/>
-            </a:avLst>
-          </a:prstGeom>
-          <a:ln w="86106">
+          <a:xfrm>
+            <a:off x="11174342" y="13461788"/>
+            <a:ext cx="5556606" cy="0"/>
+          </a:xfrm>
+          <a:prstGeom prst="straightConnector1">
+            <a:avLst/>
+          </a:prstGeom>
+          <a:ln w="53848">
             <a:solidFill>
               <a:srgbClr val="C00000">
                 <a:alpha val="50000"/>
               </a:srgbClr>
             </a:solidFill>
-          </a:ln>
-        </p:spPr>
-        <p:style>
-          <a:lnRef idx="1">
-            <a:schemeClr val="accent1"/>
-          </a:lnRef>
-          <a:fillRef idx="0">
-            <a:schemeClr val="accent1"/>
-          </a:fillRef>
-          <a:effectRef idx="0">
-            <a:schemeClr val="accent1"/>
-          </a:effectRef>
-          <a:fontRef idx="minor">
-            <a:schemeClr val="tx1"/>
-          </a:fontRef>
-        </p:style>
-      </p:cxnSp>
-      <p:cxnSp>
-        <p:nvCxnSpPr>
-          <p:cNvPr id="172" name="Straight Arrow Connector 171">
-            <a:extLst>
-              <a:ext uri="{FF2B5EF4-FFF2-40B4-BE49-F238E27FC236}">
-                <a16:creationId xmlns:a16="http://schemas.microsoft.com/office/drawing/2014/main" id="{99A7F893-3C94-27E1-A247-0543276C4529}"/>
-              </a:ext>
-            </a:extLst>
-          </p:cNvPr>
-          <p:cNvCxnSpPr>
-            <a:cxnSpLocks/>
-          </p:cNvCxnSpPr>
-          <p:nvPr/>
-        </p:nvCxnSpPr>
-        <p:spPr>
-          <a:xfrm flipV="1">
-            <a:off x="17287945" y="11624291"/>
-            <a:ext cx="0" cy="634790"/>
-          </a:xfrm>
-          <a:prstGeom prst="straightConnector1">
-            <a:avLst/>
-          </a:prstGeom>
-          <a:ln w="86106">
-            <a:solidFill>
-              <a:srgbClr val="C00000">
-                <a:alpha val="50000"/>
-              </a:srgbClr>
-            </a:solidFill>
-            <a:tailEnd type="triangle"/>
-          </a:ln>
-        </p:spPr>
-        <p:style>
-          <a:lnRef idx="1">
-            <a:schemeClr val="accent1"/>
-          </a:lnRef>
-          <a:fillRef idx="0">
-            <a:schemeClr val="accent1"/>
-          </a:fillRef>
-          <a:effectRef idx="0">
-            <a:schemeClr val="accent1"/>
-          </a:effectRef>
-          <a:fontRef idx="minor">
-            <a:schemeClr val="tx1"/>
-          </a:fontRef>
-        </p:style>
-      </p:cxnSp>
-      <p:cxnSp>
-        <p:nvCxnSpPr>
-          <p:cNvPr id="138" name="Straight Arrow Connector 137">
-            <a:extLst>
-              <a:ext uri="{FF2B5EF4-FFF2-40B4-BE49-F238E27FC236}">
-                <a16:creationId xmlns:a16="http://schemas.microsoft.com/office/drawing/2014/main" id="{178CBA08-89EC-294E-0EC2-191244E430D5}"/>
-              </a:ext>
-            </a:extLst>
-          </p:cNvPr>
-          <p:cNvCxnSpPr/>
-          <p:nvPr/>
-        </p:nvCxnSpPr>
-        <p:spPr>
-          <a:xfrm>
-            <a:off x="11164817" y="13461788"/>
-            <a:ext cx="5556606" cy="0"/>
-          </a:xfrm>
-          <a:prstGeom prst="straightConnector1">
-            <a:avLst/>
-          </a:prstGeom>
-          <a:ln w="54483">
-            <a:solidFill>
-              <a:srgbClr val="C00000">
-                <a:alpha val="50000"/>
-              </a:srgbClr>
-            </a:solidFill>
-            <a:tailEnd type="triangle"/>
+            <a:headEnd type="oval" w="med" len="med"/>
+            <a:tailEnd type="triangle" w="med" len="med"/>
           </a:ln>
         </p:spPr>
         <p:style>
@@ -18930,21 +18838,22 @@
         </p:nvCxnSpPr>
         <p:spPr>
           <a:xfrm flipV="1">
-            <a:off x="12770212" y="11451456"/>
-            <a:ext cx="3985691" cy="346965"/>
+            <a:off x="12891239" y="11470506"/>
+            <a:ext cx="3864664" cy="264294"/>
           </a:xfrm>
           <a:prstGeom prst="bentConnector3">
             <a:avLst>
-              <a:gd name="adj1" fmla="val 742"/>
+              <a:gd name="adj1" fmla="val 50"/>
             </a:avLst>
           </a:prstGeom>
-          <a:ln w="40767">
+          <a:ln w="36195">
             <a:solidFill>
               <a:srgbClr val="C00000">
                 <a:alpha val="50000"/>
               </a:srgbClr>
             </a:solidFill>
-            <a:tailEnd type="triangle"/>
+            <a:headEnd type="oval" w="med" len="med"/>
+            <a:tailEnd type="triangle" w="med" len="med"/>
           </a:ln>
         </p:spPr>
         <p:style>
@@ -18978,17 +18887,18 @@
         </p:nvCxnSpPr>
         <p:spPr>
           <a:xfrm rot="5400000" flipH="1" flipV="1">
-            <a:off x="10571509" y="11959279"/>
-            <a:ext cx="634554" cy="1459355"/>
+            <a:off x="10662366" y="11849372"/>
+            <a:ext cx="452840" cy="1459354"/>
           </a:xfrm>
           <a:prstGeom prst="bentConnector2">
             <a:avLst/>
           </a:prstGeom>
-          <a:ln w="16891">
+          <a:ln w="18161">
             <a:solidFill>
               <a:srgbClr val="C00000"/>
             </a:solidFill>
-            <a:tailEnd type="triangle"/>
+            <a:headEnd type="oval" w="med" len="med"/>
+            <a:tailEnd type="triangle" w="med" len="med"/>
           </a:ln>
         </p:spPr>
         <p:style>
@@ -19064,7 +18974,7 @@
           <a:prstGeom prst="straightConnector1">
             <a:avLst/>
           </a:prstGeom>
-          <a:ln w="23241">
+          <a:ln w="24130">
             <a:solidFill>
               <a:schemeClr val="bg1">
                 <a:lumMod val="50000"/>
@@ -19114,7 +19024,7 @@
               <a:gd name="adj2" fmla="val 146522"/>
             </a:avLst>
           </a:prstGeom>
-          <a:ln w="36576">
+          <a:ln w="35052">
             <a:solidFill>
               <a:schemeClr val="accent1">
                 <a:lumMod val="75000"/>
@@ -19162,13 +19072,14 @@
           <a:prstGeom prst="straightConnector1">
             <a:avLst/>
           </a:prstGeom>
-          <a:ln w="71374">
+          <a:ln w="78994">
             <a:solidFill>
               <a:srgbClr val="C00000">
                 <a:alpha val="50000"/>
               </a:srgbClr>
             </a:solidFill>
-            <a:tailEnd type="triangle"/>
+            <a:headEnd type="oval" w="med" len="med"/>
+            <a:tailEnd type="triangle" w="med" len="med"/>
           </a:ln>
         </p:spPr>
         <p:style>
@@ -19208,7 +19119,7 @@
           <a:prstGeom prst="bentConnector2">
             <a:avLst/>
           </a:prstGeom>
-          <a:ln w="58419">
+          <a:ln w="60960">
             <a:solidFill>
               <a:schemeClr val="accent1">
                 <a:lumMod val="75000"/>
@@ -19259,13 +19170,14 @@
               <a:gd name="adj2" fmla="val 99935"/>
             </a:avLst>
           </a:prstGeom>
-          <a:ln w="82550">
+          <a:ln w="97536">
             <a:solidFill>
               <a:srgbClr val="C00000">
                 <a:alpha val="50000"/>
               </a:srgbClr>
             </a:solidFill>
-            <a:tailEnd type="triangle"/>
+            <a:headEnd type="oval" w="med" len="med"/>
+            <a:tailEnd type="triangle" w="med" len="med"/>
           </a:ln>
         </p:spPr>
         <p:style>
@@ -19298,22 +19210,23 @@
           <p:nvPr/>
         </p:nvCxnSpPr>
         <p:spPr>
-          <a:xfrm flipV="1">
-            <a:off x="13431512" y="12651061"/>
-            <a:ext cx="1315128" cy="1165957"/>
+          <a:xfrm rot="5400000" flipH="1" flipV="1">
+            <a:off x="13455626" y="12644578"/>
+            <a:ext cx="1356827" cy="1356354"/>
           </a:xfrm>
           <a:prstGeom prst="bentConnector3">
             <a:avLst>
-              <a:gd name="adj1" fmla="val 100102"/>
+              <a:gd name="adj1" fmla="val -77"/>
             </a:avLst>
           </a:prstGeom>
-          <a:ln w="154559">
+          <a:ln w="156210">
             <a:solidFill>
               <a:srgbClr val="C00000">
                 <a:alpha val="50000"/>
               </a:srgbClr>
             </a:solidFill>
-            <a:tailEnd type="triangle"/>
+            <a:headEnd type="oval" w="med" len="med"/>
+            <a:tailEnd type="triangle" w="med" len="med"/>
           </a:ln>
         </p:spPr>
         <p:style>
@@ -19347,21 +19260,22 @@
         </p:nvCxnSpPr>
         <p:spPr>
           <a:xfrm>
-            <a:off x="10777818" y="11070591"/>
-            <a:ext cx="4231040" cy="670084"/>
+            <a:off x="11086092" y="10995025"/>
+            <a:ext cx="3922766" cy="729775"/>
           </a:xfrm>
           <a:prstGeom prst="bentConnector3">
             <a:avLst>
-              <a:gd name="adj1" fmla="val 100057"/>
+              <a:gd name="adj1" fmla="val 100020"/>
             </a:avLst>
           </a:prstGeom>
-          <a:ln w="14477">
+          <a:ln w="14731">
             <a:solidFill>
               <a:srgbClr val="C00000">
                 <a:alpha val="50000"/>
               </a:srgbClr>
             </a:solidFill>
-            <a:tailEnd type="triangle"/>
+            <a:headEnd type="oval" w="med" len="med"/>
+            <a:tailEnd type="triangle" w="med" len="med"/>
           </a:ln>
         </p:spPr>
         <p:style>
@@ -19388,24 +19302,27 @@
               </a:ext>
             </a:extLst>
           </p:cNvPr>
-          <p:cNvCxnSpPr/>
+          <p:cNvCxnSpPr>
+            <a:cxnSpLocks/>
+          </p:cNvCxnSpPr>
           <p:nvPr/>
         </p:nvCxnSpPr>
         <p:spPr>
           <a:xfrm>
-            <a:off x="9607913" y="11599460"/>
-            <a:ext cx="0" cy="1225296"/>
+            <a:off x="9607913" y="11605241"/>
+            <a:ext cx="0" cy="1200465"/>
           </a:xfrm>
           <a:prstGeom prst="straightConnector1">
             <a:avLst/>
           </a:prstGeom>
-          <a:ln w="40640">
+          <a:ln w="41910">
             <a:solidFill>
               <a:srgbClr val="C00000">
                 <a:alpha val="50000"/>
               </a:srgbClr>
             </a:solidFill>
-            <a:tailEnd type="triangle"/>
+            <a:headEnd type="oval" w="med" len="med"/>
+            <a:tailEnd type="triangle" w="med" len="med"/>
           </a:ln>
         </p:spPr>
         <p:style>
@@ -19444,16 +19361,17 @@
           </a:xfrm>
           <a:prstGeom prst="bentConnector3">
             <a:avLst>
-              <a:gd name="adj1" fmla="val 2081"/>
+              <a:gd name="adj1" fmla="val 97"/>
             </a:avLst>
           </a:prstGeom>
-          <a:ln w="142240">
+          <a:ln w="142875">
             <a:solidFill>
               <a:srgbClr val="C00000">
                 <a:alpha val="50000"/>
               </a:srgbClr>
             </a:solidFill>
-            <a:tailEnd type="triangle"/>
+            <a:headEnd type="oval" w="med" len="med"/>
+            <a:tailEnd type="triangle" w="med" len="med"/>
           </a:ln>
         </p:spPr>
         <p:style>
@@ -20178,12 +20096,88 @@
           </p:txBody>
         </p:sp>
       </p:grpSp>
+      <p:sp>
+        <p:nvSpPr>
+          <p:cNvPr id="149" name="TextBox 148">
+            <a:extLst>
+              <a:ext uri="{FF2B5EF4-FFF2-40B4-BE49-F238E27FC236}">
+                <a16:creationId xmlns:a16="http://schemas.microsoft.com/office/drawing/2014/main" id="{D8D6FF3E-9BC1-6885-3818-081674D7A9BB}"/>
+              </a:ext>
+            </a:extLst>
+          </p:cNvPr>
+          <p:cNvSpPr txBox="1"/>
+          <p:nvPr/>
+        </p:nvSpPr>
+        <p:spPr>
+          <a:xfrm>
+            <a:off x="6821334" y="1362220"/>
+            <a:ext cx="813043" cy="707886"/>
+          </a:xfrm>
+          <a:prstGeom prst="rect">
+            <a:avLst/>
+          </a:prstGeom>
+          <a:noFill/>
+        </p:spPr>
+        <p:txBody>
+          <a:bodyPr wrap="none" rtlCol="0">
+            <a:spAutoFit/>
+          </a:bodyPr>
+          <a:lstStyle/>
+          <a:p>
+            <a:r>
+              <a:rPr lang="en-US" sz="4000" dirty="0">
+                <a:latin typeface="Arial" panose="020B0604020202020204" pitchFamily="34" charset="0"/>
+                <a:cs typeface="Arial" panose="020B0604020202020204" pitchFamily="34" charset="0"/>
+              </a:rPr>
+              <a:t>(a)</a:t>
+            </a:r>
+          </a:p>
+        </p:txBody>
+      </p:sp>
+      <p:sp>
+        <p:nvSpPr>
+          <p:cNvPr id="151" name="TextBox 150">
+            <a:extLst>
+              <a:ext uri="{FF2B5EF4-FFF2-40B4-BE49-F238E27FC236}">
+                <a16:creationId xmlns:a16="http://schemas.microsoft.com/office/drawing/2014/main" id="{A3BBA8C7-956C-159A-EBA5-AB354F4F9504}"/>
+              </a:ext>
+            </a:extLst>
+          </p:cNvPr>
+          <p:cNvSpPr txBox="1"/>
+          <p:nvPr/>
+        </p:nvSpPr>
+        <p:spPr>
+          <a:xfrm>
+            <a:off x="6821334" y="8194814"/>
+            <a:ext cx="813043" cy="707886"/>
+          </a:xfrm>
+          <a:prstGeom prst="rect">
+            <a:avLst/>
+          </a:prstGeom>
+          <a:noFill/>
+        </p:spPr>
+        <p:txBody>
+          <a:bodyPr wrap="none" rtlCol="0">
+            <a:spAutoFit/>
+          </a:bodyPr>
+          <a:lstStyle/>
+          <a:p>
+            <a:r>
+              <a:rPr lang="en-US" sz="4000" dirty="0">
+                <a:latin typeface="Arial" panose="020B0604020202020204" pitchFamily="34" charset="0"/>
+                <a:cs typeface="Arial" panose="020B0604020202020204" pitchFamily="34" charset="0"/>
+              </a:rPr>
+              <a:t>(b)</a:t>
+            </a:r>
+          </a:p>
+        </p:txBody>
+      </p:sp>
       <p:cxnSp>
         <p:nvCxnSpPr>
-          <p:cNvPr id="33" name="Elbow Connector 32">
-            <a:extLst>
-              <a:ext uri="{FF2B5EF4-FFF2-40B4-BE49-F238E27FC236}">
-                <a16:creationId xmlns:a16="http://schemas.microsoft.com/office/drawing/2014/main" id="{EC0F46AD-5660-6595-B31A-61C6180ED332}"/>
+          <p:cNvPr id="31" name="Elbow Connector 30">
+            <a:extLst>
+              <a:ext uri="{FF2B5EF4-FFF2-40B4-BE49-F238E27FC236}">
+                <a16:creationId xmlns:a16="http://schemas.microsoft.com/office/drawing/2014/main" id="{C7EFE26F-7F6A-1C58-17DB-D9A4DE6DA6A4}"/>
               </a:ext>
             </a:extLst>
           </p:cNvPr>
@@ -20194,13 +20188,13 @@
         </p:nvCxnSpPr>
         <p:spPr>
           <a:xfrm rot="16200000" flipH="1">
-            <a:off x="10588195" y="4027462"/>
+            <a:off x="10588195" y="10909845"/>
             <a:ext cx="601182" cy="1459355"/>
           </a:xfrm>
           <a:prstGeom prst="bentConnector2">
             <a:avLst/>
           </a:prstGeom>
-          <a:ln w="76200">
+          <a:ln w="19177">
             <a:solidFill>
               <a:schemeClr val="accent1">
                 <a:lumMod val="75000"/>
@@ -20226,10 +20220,10 @@
       </p:cxnSp>
       <p:cxnSp>
         <p:nvCxnSpPr>
-          <p:cNvPr id="35" name="Elbow Connector 34">
-            <a:extLst>
-              <a:ext uri="{FF2B5EF4-FFF2-40B4-BE49-F238E27FC236}">
-                <a16:creationId xmlns:a16="http://schemas.microsoft.com/office/drawing/2014/main" id="{50E19493-3854-A720-39E0-8F5F8ADE2A64}"/>
+          <p:cNvPr id="43" name="Straight Arrow Connector 42">
+            <a:extLst>
+              <a:ext uri="{FF2B5EF4-FFF2-40B4-BE49-F238E27FC236}">
+                <a16:creationId xmlns:a16="http://schemas.microsoft.com/office/drawing/2014/main" id="{6C8D84F6-E7F2-457E-C6CE-71B0F87335B1}"/>
               </a:ext>
             </a:extLst>
           </p:cNvPr>
@@ -20239,16 +20233,18 @@
           <p:nvPr/>
         </p:nvCxnSpPr>
         <p:spPr>
-          <a:xfrm rot="5400000" flipH="1" flipV="1">
-            <a:off x="10571509" y="5067371"/>
-            <a:ext cx="634554" cy="1459355"/>
-          </a:xfrm>
-          <a:prstGeom prst="bentConnector2">
+          <a:xfrm>
+            <a:off x="13437862" y="12179286"/>
+            <a:ext cx="892510" cy="0"/>
+          </a:xfrm>
+          <a:prstGeom prst="straightConnector1">
             <a:avLst/>
           </a:prstGeom>
-          <a:ln w="76200">
-            <a:solidFill>
-              <a:srgbClr val="C00000"/>
+          <a:ln w="66802">
+            <a:solidFill>
+              <a:schemeClr val="accent1">
+                <a:lumMod val="75000"/>
+              </a:schemeClr>
             </a:solidFill>
             <a:tailEnd type="triangle"/>
           </a:ln>
@@ -20270,10 +20266,10 @@
       </p:cxnSp>
       <p:cxnSp>
         <p:nvCxnSpPr>
-          <p:cNvPr id="36" name="Straight Arrow Connector 35">
-            <a:extLst>
-              <a:ext uri="{FF2B5EF4-FFF2-40B4-BE49-F238E27FC236}">
-                <a16:creationId xmlns:a16="http://schemas.microsoft.com/office/drawing/2014/main" id="{45D5937C-5D36-E169-4D0F-023886A80C1A}"/>
+          <p:cNvPr id="45" name="Straight Arrow Connector 44">
+            <a:extLst>
+              <a:ext uri="{FF2B5EF4-FFF2-40B4-BE49-F238E27FC236}">
+                <a16:creationId xmlns:a16="http://schemas.microsoft.com/office/drawing/2014/main" id="{6071B235-6C4D-6C35-571A-EA3AE9A92167}"/>
               </a:ext>
             </a:extLst>
           </p:cNvPr>
@@ -20284,18 +20280,17 @@
         </p:nvCxnSpPr>
         <p:spPr>
           <a:xfrm>
-            <a:off x="13437862" y="5287378"/>
-            <a:ext cx="892510" cy="0"/>
+            <a:off x="14750198" y="10677683"/>
+            <a:ext cx="5843" cy="1050299"/>
           </a:xfrm>
           <a:prstGeom prst="straightConnector1">
             <a:avLst/>
           </a:prstGeom>
-          <a:ln w="76200">
-            <a:solidFill>
-              <a:schemeClr val="accent1">
-                <a:lumMod val="75000"/>
-              </a:schemeClr>
-            </a:solidFill>
+          <a:ln w="20193">
+            <a:solidFill>
+              <a:srgbClr val="C00000"/>
+            </a:solidFill>
+            <a:headEnd type="oval"/>
             <a:tailEnd type="triangle"/>
           </a:ln>
         </p:spPr>
@@ -20316,30 +20311,34 @@
       </p:cxnSp>
       <p:cxnSp>
         <p:nvCxnSpPr>
-          <p:cNvPr id="37" name="Straight Arrow Connector 36">
-            <a:extLst>
-              <a:ext uri="{FF2B5EF4-FFF2-40B4-BE49-F238E27FC236}">
-                <a16:creationId xmlns:a16="http://schemas.microsoft.com/office/drawing/2014/main" id="{90EA0816-427E-79B2-9FB9-CE215E56C699}"/>
+          <p:cNvPr id="50" name="Elbow Connector 49">
+            <a:extLst>
+              <a:ext uri="{FF2B5EF4-FFF2-40B4-BE49-F238E27FC236}">
+                <a16:creationId xmlns:a16="http://schemas.microsoft.com/office/drawing/2014/main" id="{1A91E203-0108-68AF-3E35-4118D6B6B8BA}"/>
               </a:ext>
             </a:extLst>
           </p:cNvPr>
           <p:cNvCxnSpPr>
-            <a:cxnSpLocks/>
+            <a:stCxn id="24" idx="0"/>
+            <a:endCxn id="20" idx="1"/>
           </p:cNvCxnSpPr>
           <p:nvPr/>
         </p:nvCxnSpPr>
         <p:spPr>
-          <a:xfrm>
-            <a:off x="14752676" y="3750696"/>
-            <a:ext cx="0" cy="1098071"/>
-          </a:xfrm>
-          <a:prstGeom prst="straightConnector1">
+          <a:xfrm rot="5400000" flipH="1" flipV="1">
+            <a:off x="15708645" y="10693420"/>
+            <a:ext cx="589520" cy="1504991"/>
+          </a:xfrm>
+          <a:prstGeom prst="bentConnector2">
             <a:avLst/>
           </a:prstGeom>
-          <a:ln w="76200">
-            <a:solidFill>
-              <a:srgbClr val="C00000"/>
-            </a:solidFill>
+          <a:ln w="39116">
+            <a:solidFill>
+              <a:schemeClr val="bg1">
+                <a:lumMod val="50000"/>
+              </a:schemeClr>
+            </a:solidFill>
+            <a:prstDash val="sysDash"/>
             <a:tailEnd type="triangle"/>
           </a:ln>
         </p:spPr>
@@ -20360,32 +20359,32 @@
       </p:cxnSp>
       <p:cxnSp>
         <p:nvCxnSpPr>
-          <p:cNvPr id="38" name="Elbow Connector 37">
-            <a:extLst>
-              <a:ext uri="{FF2B5EF4-FFF2-40B4-BE49-F238E27FC236}">
-                <a16:creationId xmlns:a16="http://schemas.microsoft.com/office/drawing/2014/main" id="{859603B8-D0E6-EE9A-F84B-52C9406FA63A}"/>
+          <p:cNvPr id="51" name="Elbow Connector 50">
+            <a:extLst>
+              <a:ext uri="{FF2B5EF4-FFF2-40B4-BE49-F238E27FC236}">
+                <a16:creationId xmlns:a16="http://schemas.microsoft.com/office/drawing/2014/main" id="{4B9A6050-891E-DD21-BF59-4A2C98309D21}"/>
               </a:ext>
             </a:extLst>
           </p:cNvPr>
           <p:cNvCxnSpPr>
-            <a:stCxn id="56" idx="0"/>
-            <a:endCxn id="54" idx="1"/>
+            <a:cxnSpLocks/>
           </p:cNvCxnSpPr>
           <p:nvPr/>
         </p:nvCxnSpPr>
         <p:spPr>
-          <a:xfrm rot="5400000" flipH="1" flipV="1">
-            <a:off x="15708645" y="3801512"/>
-            <a:ext cx="589520" cy="1504991"/>
+          <a:xfrm rot="16200000" flipH="1">
+            <a:off x="15665108" y="12182679"/>
+            <a:ext cx="634555" cy="1504991"/>
           </a:xfrm>
           <a:prstGeom prst="bentConnector2">
             <a:avLst/>
           </a:prstGeom>
-          <a:ln w="76200">
+          <a:ln w="65532">
             <a:solidFill>
               <a:srgbClr val="C00000"/>
             </a:solidFill>
-            <a:tailEnd type="triangle"/>
+            <a:headEnd type="oval" w="med" len="med"/>
+            <a:tailEnd type="triangle" w="med" len="med"/>
           </a:ln>
         </p:spPr>
         <p:style>
@@ -20405,31 +20404,33 @@
       </p:cxnSp>
       <p:cxnSp>
         <p:nvCxnSpPr>
-          <p:cNvPr id="39" name="Elbow Connector 38">
-            <a:extLst>
-              <a:ext uri="{FF2B5EF4-FFF2-40B4-BE49-F238E27FC236}">
-                <a16:creationId xmlns:a16="http://schemas.microsoft.com/office/drawing/2014/main" id="{29D60A06-6943-3A58-68B7-7034E65EA528}"/>
+          <p:cNvPr id="57" name="Elbow Connector 56">
+            <a:extLst>
+              <a:ext uri="{FF2B5EF4-FFF2-40B4-BE49-F238E27FC236}">
+                <a16:creationId xmlns:a16="http://schemas.microsoft.com/office/drawing/2014/main" id="{C692133E-2952-0ECD-87D3-B8F051B6F346}"/>
               </a:ext>
             </a:extLst>
           </p:cNvPr>
           <p:cNvCxnSpPr>
             <a:cxnSpLocks/>
-            <a:stCxn id="56" idx="2"/>
-            <a:endCxn id="52" idx="1"/>
           </p:cNvCxnSpPr>
           <p:nvPr/>
         </p:nvCxnSpPr>
         <p:spPr>
           <a:xfrm rot="16200000" flipH="1">
-            <a:off x="15686128" y="5290771"/>
-            <a:ext cx="634555" cy="1504991"/>
-          </a:xfrm>
-          <a:prstGeom prst="bentConnector2">
-            <a:avLst/>
-          </a:prstGeom>
-          <a:ln w="76200">
-            <a:solidFill>
-              <a:srgbClr val="C00000"/>
+            <a:off x="17842760" y="10524872"/>
+            <a:ext cx="1040309" cy="1394631"/>
+          </a:xfrm>
+          <a:prstGeom prst="bentConnector3">
+            <a:avLst>
+              <a:gd name="adj1" fmla="val -21974"/>
+            </a:avLst>
+          </a:prstGeom>
+          <a:ln w="190246">
+            <a:solidFill>
+              <a:schemeClr val="accent1">
+                <a:lumMod val="75000"/>
+              </a:schemeClr>
             </a:solidFill>
             <a:tailEnd type="triangle"/>
           </a:ln>
@@ -20451,31 +20452,29 @@
       </p:cxnSp>
       <p:cxnSp>
         <p:nvCxnSpPr>
-          <p:cNvPr id="40" name="Elbow Connector 39">
-            <a:extLst>
-              <a:ext uri="{FF2B5EF4-FFF2-40B4-BE49-F238E27FC236}">
-                <a16:creationId xmlns:a16="http://schemas.microsoft.com/office/drawing/2014/main" id="{4A46A1A7-2A77-6FE6-7F0F-43E4ED681435}"/>
+          <p:cNvPr id="58" name="Elbow Connector 57">
+            <a:extLst>
+              <a:ext uri="{FF2B5EF4-FFF2-40B4-BE49-F238E27FC236}">
+                <a16:creationId xmlns:a16="http://schemas.microsoft.com/office/drawing/2014/main" id="{2A6C5F73-DA31-2131-4A22-7E2D5FC27865}"/>
               </a:ext>
             </a:extLst>
           </p:cNvPr>
           <p:cNvCxnSpPr>
             <a:cxnSpLocks/>
-            <a:stCxn id="54" idx="0"/>
-            <a:endCxn id="49" idx="0"/>
           </p:cNvCxnSpPr>
           <p:nvPr/>
         </p:nvCxnSpPr>
         <p:spPr>
-          <a:xfrm rot="16200000" flipH="1">
-            <a:off x="17846944" y="3639291"/>
-            <a:ext cx="1026724" cy="1389412"/>
+          <a:xfrm rot="5400000" flipH="1" flipV="1">
+            <a:off x="17832420" y="12479019"/>
+            <a:ext cx="1060989" cy="1394631"/>
           </a:xfrm>
           <a:prstGeom prst="bentConnector3">
             <a:avLst>
-              <a:gd name="adj1" fmla="val -22265"/>
+              <a:gd name="adj1" fmla="val -21546"/>
             </a:avLst>
           </a:prstGeom>
-          <a:ln w="76200">
+          <a:ln w="173990">
             <a:solidFill>
               <a:schemeClr val="accent1">
                 <a:lumMod val="75000"/>
@@ -20501,28 +20500,764 @@
       </p:cxnSp>
       <p:cxnSp>
         <p:nvCxnSpPr>
-          <p:cNvPr id="41" name="Elbow Connector 40">
-            <a:extLst>
-              <a:ext uri="{FF2B5EF4-FFF2-40B4-BE49-F238E27FC236}">
-                <a16:creationId xmlns:a16="http://schemas.microsoft.com/office/drawing/2014/main" id="{AB1A162C-7815-C762-CF6D-7CCB7FDB7733}"/>
+          <p:cNvPr id="160" name="Straight Arrow Connector 159">
+            <a:extLst>
+              <a:ext uri="{FF2B5EF4-FFF2-40B4-BE49-F238E27FC236}">
+                <a16:creationId xmlns:a16="http://schemas.microsoft.com/office/drawing/2014/main" id="{B7BC32FF-CA01-6112-27E7-E36B0ED38566}"/>
               </a:ext>
             </a:extLst>
           </p:cNvPr>
           <p:cNvCxnSpPr>
             <a:cxnSpLocks/>
-            <a:stCxn id="52" idx="2"/>
-            <a:endCxn id="49" idx="2"/>
           </p:cNvCxnSpPr>
           <p:nvPr/>
         </p:nvCxnSpPr>
         <p:spPr>
-          <a:xfrm rot="5400000" flipH="1" flipV="1">
-            <a:off x="17823019" y="5567163"/>
-            <a:ext cx="1074574" cy="1389412"/>
+          <a:xfrm flipV="1">
+            <a:off x="12521813" y="12644341"/>
+            <a:ext cx="6350" cy="1079290"/>
+          </a:xfrm>
+          <a:prstGeom prst="straightConnector1">
+            <a:avLst/>
+          </a:prstGeom>
+          <a:ln w="172847">
+            <a:solidFill>
+              <a:srgbClr val="C00000"/>
+            </a:solidFill>
+            <a:headEnd type="oval" w="med" len="med"/>
+            <a:tailEnd type="triangle" w="med" len="med"/>
+          </a:ln>
+        </p:spPr>
+        <p:style>
+          <a:lnRef idx="1">
+            <a:schemeClr val="accent1"/>
+          </a:lnRef>
+          <a:fillRef idx="0">
+            <a:schemeClr val="accent1"/>
+          </a:fillRef>
+          <a:effectRef idx="0">
+            <a:schemeClr val="accent1"/>
+          </a:effectRef>
+          <a:fontRef idx="minor">
+            <a:schemeClr val="tx1"/>
+          </a:fontRef>
+        </p:style>
+      </p:cxnSp>
+      <p:sp>
+        <p:nvSpPr>
+          <p:cNvPr id="23" name="Rectangle 22">
+            <a:extLst>
+              <a:ext uri="{FF2B5EF4-FFF2-40B4-BE49-F238E27FC236}">
+                <a16:creationId xmlns:a16="http://schemas.microsoft.com/office/drawing/2014/main" id="{C3510981-FE55-509B-F5B4-9D8C4012346D}"/>
+              </a:ext>
+            </a:extLst>
+          </p:cNvPr>
+          <p:cNvSpPr/>
+          <p:nvPr/>
+        </p:nvSpPr>
+        <p:spPr>
+          <a:xfrm>
+            <a:off x="11618464" y="11751353"/>
+            <a:ext cx="1819398" cy="877223"/>
+          </a:xfrm>
+          <a:prstGeom prst="rect">
+            <a:avLst/>
+          </a:prstGeom>
+          <a:solidFill>
+            <a:schemeClr val="bg1"/>
+          </a:solidFill>
+          <a:ln w="38100">
+            <a:solidFill>
+              <a:schemeClr val="tx1"/>
+            </a:solidFill>
+          </a:ln>
+        </p:spPr>
+        <p:style>
+          <a:lnRef idx="2">
+            <a:schemeClr val="accent1">
+              <a:shade val="50000"/>
+            </a:schemeClr>
+          </a:lnRef>
+          <a:fillRef idx="1">
+            <a:schemeClr val="accent1"/>
+          </a:fillRef>
+          <a:effectRef idx="0">
+            <a:schemeClr val="accent1"/>
+          </a:effectRef>
+          <a:fontRef idx="minor">
+            <a:schemeClr val="lt1"/>
+          </a:fontRef>
+        </p:style>
+        <p:txBody>
+          <a:bodyPr rtlCol="0" anchor="ctr"/>
+          <a:lstStyle/>
+          <a:p>
+            <a:pPr algn="ctr"/>
+            <a:r>
+              <a:rPr lang="el-GR" sz="2400" b="1" i="1" dirty="0">
+                <a:solidFill>
+                  <a:schemeClr val="tx1"/>
+                </a:solidFill>
+                <a:latin typeface="Arial" panose="020B0604020202020204" pitchFamily="34" charset="0"/>
+                <a:cs typeface="Arial" panose="020B0604020202020204" pitchFamily="34" charset="0"/>
+              </a:rPr>
+              <a:t>β</a:t>
+            </a:r>
+            <a:endParaRPr lang="en-US" sz="2400" b="1" i="1" dirty="0">
+              <a:solidFill>
+                <a:schemeClr val="tx1"/>
+              </a:solidFill>
+              <a:latin typeface="Arial" panose="020B0604020202020204" pitchFamily="34" charset="0"/>
+              <a:cs typeface="Arial" panose="020B0604020202020204" pitchFamily="34" charset="0"/>
+            </a:endParaRPr>
+          </a:p>
+        </p:txBody>
+      </p:sp>
+      <p:sp>
+        <p:nvSpPr>
+          <p:cNvPr id="28" name="Rectangle 27">
+            <a:extLst>
+              <a:ext uri="{FF2B5EF4-FFF2-40B4-BE49-F238E27FC236}">
+                <a16:creationId xmlns:a16="http://schemas.microsoft.com/office/drawing/2014/main" id="{F9845BF1-920A-DFA4-A428-9653A04CD2C8}"/>
+              </a:ext>
+            </a:extLst>
+          </p:cNvPr>
+          <p:cNvSpPr/>
+          <p:nvPr/>
+        </p:nvSpPr>
+        <p:spPr>
+          <a:xfrm>
+            <a:off x="11618464" y="9774814"/>
+            <a:ext cx="1819398" cy="877223"/>
+          </a:xfrm>
+          <a:prstGeom prst="rect">
+            <a:avLst/>
+          </a:prstGeom>
+          <a:solidFill>
+            <a:schemeClr val="bg1"/>
+          </a:solidFill>
+          <a:ln w="38100">
+            <a:solidFill>
+              <a:schemeClr val="tx1"/>
+            </a:solidFill>
+          </a:ln>
+        </p:spPr>
+        <p:style>
+          <a:lnRef idx="2">
+            <a:schemeClr val="accent1">
+              <a:shade val="50000"/>
+            </a:schemeClr>
+          </a:lnRef>
+          <a:fillRef idx="1">
+            <a:schemeClr val="accent1"/>
+          </a:fillRef>
+          <a:effectRef idx="0">
+            <a:schemeClr val="accent1"/>
+          </a:effectRef>
+          <a:fontRef idx="minor">
+            <a:schemeClr val="lt1"/>
+          </a:fontRef>
+        </p:style>
+        <p:txBody>
+          <a:bodyPr rtlCol="0" anchor="ctr"/>
+          <a:lstStyle/>
+          <a:p>
+            <a:pPr algn="ctr"/>
+            <a:r>
+              <a:rPr lang="en-US" sz="2400" b="1" i="1" dirty="0">
+                <a:solidFill>
+                  <a:schemeClr val="tx1"/>
+                </a:solidFill>
+                <a:latin typeface="Arial" panose="020B0604020202020204" pitchFamily="34" charset="0"/>
+                <a:cs typeface="Arial" panose="020B0604020202020204" pitchFamily="34" charset="0"/>
+              </a:rPr>
+              <a:t>N</a:t>
+            </a:r>
+            <a:r>
+              <a:rPr lang="en-US" sz="2400" b="1" baseline="-25000" dirty="0">
+                <a:solidFill>
+                  <a:schemeClr val="tx1"/>
+                </a:solidFill>
+                <a:latin typeface="Arial" panose="020B0604020202020204" pitchFamily="34" charset="0"/>
+                <a:cs typeface="Arial" panose="020B0604020202020204" pitchFamily="34" charset="0"/>
+              </a:rPr>
+              <a:t>fixation</a:t>
+            </a:r>
+            <a:endParaRPr lang="en-US" sz="2400" i="1" dirty="0">
+              <a:solidFill>
+                <a:schemeClr val="tx1"/>
+              </a:solidFill>
+              <a:latin typeface="Arial" panose="020B0604020202020204" pitchFamily="34" charset="0"/>
+              <a:cs typeface="Arial" panose="020B0604020202020204" pitchFamily="34" charset="0"/>
+            </a:endParaRPr>
+          </a:p>
+        </p:txBody>
+      </p:sp>
+      <p:sp>
+        <p:nvSpPr>
+          <p:cNvPr id="11" name="Rectangle 10">
+            <a:extLst>
+              <a:ext uri="{FF2B5EF4-FFF2-40B4-BE49-F238E27FC236}">
+                <a16:creationId xmlns:a16="http://schemas.microsoft.com/office/drawing/2014/main" id="{612EA15D-68B8-4207-39F2-1F2B218F4B4D}"/>
+              </a:ext>
+            </a:extLst>
+          </p:cNvPr>
+          <p:cNvSpPr/>
+          <p:nvPr/>
+        </p:nvSpPr>
+        <p:spPr>
+          <a:xfrm>
+            <a:off x="18150532" y="11752852"/>
+            <a:ext cx="1819398" cy="877223"/>
+          </a:xfrm>
+          <a:prstGeom prst="rect">
+            <a:avLst/>
+          </a:prstGeom>
+          <a:solidFill>
+            <a:schemeClr val="bg1"/>
+          </a:solidFill>
+          <a:ln w="38100">
+            <a:solidFill>
+              <a:schemeClr val="tx1"/>
+            </a:solidFill>
+          </a:ln>
+        </p:spPr>
+        <p:style>
+          <a:lnRef idx="2">
+            <a:schemeClr val="accent1">
+              <a:shade val="50000"/>
+            </a:schemeClr>
+          </a:lnRef>
+          <a:fillRef idx="1">
+            <a:schemeClr val="accent1"/>
+          </a:fillRef>
+          <a:effectRef idx="0">
+            <a:schemeClr val="accent1"/>
+          </a:effectRef>
+          <a:fontRef idx="minor">
+            <a:schemeClr val="lt1"/>
+          </a:fontRef>
+        </p:style>
+        <p:txBody>
+          <a:bodyPr rtlCol="0" anchor="ctr"/>
+          <a:lstStyle/>
+          <a:p>
+            <a:pPr algn="ctr"/>
+            <a:r>
+              <a:rPr lang="el-GR" sz="2400" b="1" i="1" dirty="0">
+                <a:solidFill>
+                  <a:schemeClr val="tx1"/>
+                </a:solidFill>
+                <a:latin typeface="Arial" panose="020B0604020202020204" pitchFamily="34" charset="0"/>
+                <a:cs typeface="Arial" panose="020B0604020202020204" pitchFamily="34" charset="0"/>
+              </a:rPr>
+              <a:t>Ν</a:t>
+            </a:r>
+            <a:r>
+              <a:rPr lang="en-US" sz="2400" b="1" baseline="-25000" dirty="0">
+                <a:solidFill>
+                  <a:schemeClr val="tx1"/>
+                </a:solidFill>
+                <a:latin typeface="Arial" panose="020B0604020202020204" pitchFamily="34" charset="0"/>
+                <a:cs typeface="Arial" panose="020B0604020202020204" pitchFamily="34" charset="0"/>
+              </a:rPr>
+              <a:t>area</a:t>
+            </a:r>
+            <a:endParaRPr lang="en-US" sz="2400" b="1" i="1" dirty="0">
+              <a:solidFill>
+                <a:schemeClr val="tx1"/>
+              </a:solidFill>
+              <a:latin typeface="Arial" panose="020B0604020202020204" pitchFamily="34" charset="0"/>
+              <a:cs typeface="Arial" panose="020B0604020202020204" pitchFamily="34" charset="0"/>
+            </a:endParaRPr>
+          </a:p>
+        </p:txBody>
+      </p:sp>
+      <p:sp>
+        <p:nvSpPr>
+          <p:cNvPr id="17" name="Rectangle 16">
+            <a:extLst>
+              <a:ext uri="{FF2B5EF4-FFF2-40B4-BE49-F238E27FC236}">
+                <a16:creationId xmlns:a16="http://schemas.microsoft.com/office/drawing/2014/main" id="{5CF0D2AF-8598-6EDA-181B-6A30A35A32CE}"/>
+              </a:ext>
+            </a:extLst>
+          </p:cNvPr>
+          <p:cNvSpPr/>
+          <p:nvPr/>
+        </p:nvSpPr>
+        <p:spPr>
+          <a:xfrm>
+            <a:off x="16755901" y="12813841"/>
+            <a:ext cx="1819398" cy="877223"/>
+          </a:xfrm>
+          <a:prstGeom prst="rect">
+            <a:avLst/>
+          </a:prstGeom>
+          <a:solidFill>
+            <a:schemeClr val="bg1"/>
+          </a:solidFill>
+          <a:ln w="38100">
+            <a:solidFill>
+              <a:schemeClr val="tx1"/>
+            </a:solidFill>
+          </a:ln>
+        </p:spPr>
+        <p:style>
+          <a:lnRef idx="2">
+            <a:schemeClr val="accent1">
+              <a:shade val="50000"/>
+            </a:schemeClr>
+          </a:lnRef>
+          <a:fillRef idx="1">
+            <a:schemeClr val="accent1"/>
+          </a:fillRef>
+          <a:effectRef idx="0">
+            <a:schemeClr val="accent1"/>
+          </a:effectRef>
+          <a:fontRef idx="minor">
+            <a:schemeClr val="lt1"/>
+          </a:fontRef>
+        </p:style>
+        <p:txBody>
+          <a:bodyPr rtlCol="0" anchor="ctr"/>
+          <a:lstStyle/>
+          <a:p>
+            <a:pPr algn="ctr"/>
+            <a:r>
+              <a:rPr lang="en-US" sz="2400" b="1" i="1" dirty="0">
+                <a:solidFill>
+                  <a:schemeClr val="tx1"/>
+                </a:solidFill>
+                <a:latin typeface="Arial" panose="020B0604020202020204" pitchFamily="34" charset="0"/>
+                <a:cs typeface="Arial" panose="020B0604020202020204" pitchFamily="34" charset="0"/>
+              </a:rPr>
+              <a:t>M</a:t>
+            </a:r>
+            <a:r>
+              <a:rPr lang="en-US" sz="2400" b="1" baseline="-25000" dirty="0">
+                <a:solidFill>
+                  <a:schemeClr val="tx1"/>
+                </a:solidFill>
+                <a:latin typeface="Arial" panose="020B0604020202020204" pitchFamily="34" charset="0"/>
+                <a:cs typeface="Arial" panose="020B0604020202020204" pitchFamily="34" charset="0"/>
+              </a:rPr>
+              <a:t>area</a:t>
+            </a:r>
+            <a:endParaRPr lang="en-US" sz="2400" b="1" i="1" dirty="0">
+              <a:solidFill>
+                <a:schemeClr val="tx1"/>
+              </a:solidFill>
+              <a:latin typeface="Arial" panose="020B0604020202020204" pitchFamily="34" charset="0"/>
+              <a:cs typeface="Arial" panose="020B0604020202020204" pitchFamily="34" charset="0"/>
+            </a:endParaRPr>
+          </a:p>
+        </p:txBody>
+      </p:sp>
+      <p:sp>
+        <p:nvSpPr>
+          <p:cNvPr id="20" name="Rectangle 19">
+            <a:extLst>
+              <a:ext uri="{FF2B5EF4-FFF2-40B4-BE49-F238E27FC236}">
+                <a16:creationId xmlns:a16="http://schemas.microsoft.com/office/drawing/2014/main" id="{27FC6D2D-F10F-B106-3C23-5AEBE11DFAC5}"/>
+              </a:ext>
+            </a:extLst>
+          </p:cNvPr>
+          <p:cNvSpPr/>
+          <p:nvPr/>
+        </p:nvSpPr>
+        <p:spPr>
+          <a:xfrm>
+            <a:off x="16755901" y="10712543"/>
+            <a:ext cx="1819398" cy="877223"/>
+          </a:xfrm>
+          <a:prstGeom prst="rect">
+            <a:avLst/>
+          </a:prstGeom>
+          <a:solidFill>
+            <a:schemeClr val="bg1"/>
+          </a:solidFill>
+          <a:ln w="38100">
+            <a:solidFill>
+              <a:schemeClr val="tx1"/>
+            </a:solidFill>
+          </a:ln>
+        </p:spPr>
+        <p:style>
+          <a:lnRef idx="2">
+            <a:schemeClr val="accent1">
+              <a:shade val="50000"/>
+            </a:schemeClr>
+          </a:lnRef>
+          <a:fillRef idx="1">
+            <a:schemeClr val="accent1"/>
+          </a:fillRef>
+          <a:effectRef idx="0">
+            <a:schemeClr val="accent1"/>
+          </a:effectRef>
+          <a:fontRef idx="minor">
+            <a:schemeClr val="lt1"/>
+          </a:fontRef>
+        </p:style>
+        <p:txBody>
+          <a:bodyPr rtlCol="0" anchor="ctr"/>
+          <a:lstStyle/>
+          <a:p>
+            <a:pPr algn="ctr"/>
+            <a:r>
+              <a:rPr lang="en-US" sz="2400" b="1" i="1" dirty="0">
+                <a:solidFill>
+                  <a:schemeClr val="tx1"/>
+                </a:solidFill>
+                <a:latin typeface="Arial" panose="020B0604020202020204" pitchFamily="34" charset="0"/>
+                <a:cs typeface="Arial" panose="020B0604020202020204" pitchFamily="34" charset="0"/>
+              </a:rPr>
+              <a:t>N</a:t>
+            </a:r>
+            <a:r>
+              <a:rPr lang="en-US" sz="2400" b="1" baseline="-25000" dirty="0">
+                <a:solidFill>
+                  <a:schemeClr val="tx1"/>
+                </a:solidFill>
+                <a:latin typeface="Arial" panose="020B0604020202020204" pitchFamily="34" charset="0"/>
+                <a:cs typeface="Arial" panose="020B0604020202020204" pitchFamily="34" charset="0"/>
+              </a:rPr>
+              <a:t>mass</a:t>
+            </a:r>
+            <a:endParaRPr lang="en-US" sz="2400" b="1" i="1" dirty="0">
+              <a:solidFill>
+                <a:schemeClr val="tx1"/>
+              </a:solidFill>
+              <a:latin typeface="Arial" panose="020B0604020202020204" pitchFamily="34" charset="0"/>
+              <a:cs typeface="Arial" panose="020B0604020202020204" pitchFamily="34" charset="0"/>
+            </a:endParaRPr>
+          </a:p>
+        </p:txBody>
+      </p:sp>
+      <p:sp>
+        <p:nvSpPr>
+          <p:cNvPr id="24" name="Rectangle 23">
+            <a:extLst>
+              <a:ext uri="{FF2B5EF4-FFF2-40B4-BE49-F238E27FC236}">
+                <a16:creationId xmlns:a16="http://schemas.microsoft.com/office/drawing/2014/main" id="{B27ADCE2-63D0-A5FF-CAAC-360272DBA0BD}"/>
+              </a:ext>
+            </a:extLst>
+          </p:cNvPr>
+          <p:cNvSpPr/>
+          <p:nvPr/>
+        </p:nvSpPr>
+        <p:spPr>
+          <a:xfrm>
+            <a:off x="14341211" y="11740675"/>
+            <a:ext cx="1819398" cy="877223"/>
+          </a:xfrm>
+          <a:prstGeom prst="rect">
+            <a:avLst/>
+          </a:prstGeom>
+          <a:solidFill>
+            <a:schemeClr val="bg1"/>
+          </a:solidFill>
+          <a:ln w="38100">
+            <a:solidFill>
+              <a:schemeClr val="tx1"/>
+            </a:solidFill>
+          </a:ln>
+        </p:spPr>
+        <p:style>
+          <a:lnRef idx="2">
+            <a:schemeClr val="accent1">
+              <a:shade val="50000"/>
+            </a:schemeClr>
+          </a:lnRef>
+          <a:fillRef idx="1">
+            <a:schemeClr val="accent1"/>
+          </a:fillRef>
+          <a:effectRef idx="0">
+            <a:schemeClr val="accent1"/>
+          </a:effectRef>
+          <a:fontRef idx="minor">
+            <a:schemeClr val="lt1"/>
+          </a:fontRef>
+        </p:style>
+        <p:txBody>
+          <a:bodyPr rtlCol="0" anchor="ctr"/>
+          <a:lstStyle/>
+          <a:p>
+            <a:pPr algn="ctr"/>
+            <a:r>
+              <a:rPr lang="en-US" sz="2400" b="1" i="1" dirty="0">
+                <a:solidFill>
+                  <a:schemeClr val="tx1"/>
+                </a:solidFill>
+                <a:latin typeface="Arial" panose="020B0604020202020204" pitchFamily="34" charset="0"/>
+                <a:cs typeface="Arial" panose="020B0604020202020204" pitchFamily="34" charset="0"/>
+              </a:rPr>
+              <a:t>C</a:t>
+            </a:r>
+            <a:r>
+              <a:rPr lang="en-US" sz="2400" b="1" baseline="-25000" dirty="0">
+                <a:solidFill>
+                  <a:schemeClr val="tx1"/>
+                </a:solidFill>
+                <a:latin typeface="Arial" panose="020B0604020202020204" pitchFamily="34" charset="0"/>
+                <a:cs typeface="Arial" panose="020B0604020202020204" pitchFamily="34" charset="0"/>
+              </a:rPr>
+              <a:t>i</a:t>
+            </a:r>
+            <a:r>
+              <a:rPr lang="en-US" sz="2400" b="1" i="1" dirty="0">
+                <a:solidFill>
+                  <a:schemeClr val="tx1"/>
+                </a:solidFill>
+                <a:latin typeface="Arial" panose="020B0604020202020204" pitchFamily="34" charset="0"/>
+                <a:cs typeface="Arial" panose="020B0604020202020204" pitchFamily="34" charset="0"/>
+              </a:rPr>
+              <a:t>:C</a:t>
+            </a:r>
+            <a:r>
+              <a:rPr lang="en-US" sz="2400" b="1" baseline="-25000" dirty="0">
+                <a:solidFill>
+                  <a:schemeClr val="tx1"/>
+                </a:solidFill>
+                <a:latin typeface="Arial" panose="020B0604020202020204" pitchFamily="34" charset="0"/>
+                <a:cs typeface="Arial" panose="020B0604020202020204" pitchFamily="34" charset="0"/>
+              </a:rPr>
+              <a:t>a</a:t>
+            </a:r>
+          </a:p>
+        </p:txBody>
+      </p:sp>
+      <p:sp>
+        <p:nvSpPr>
+          <p:cNvPr id="27" name="Rectangle 26">
+            <a:extLst>
+              <a:ext uri="{FF2B5EF4-FFF2-40B4-BE49-F238E27FC236}">
+                <a16:creationId xmlns:a16="http://schemas.microsoft.com/office/drawing/2014/main" id="{66815A72-A478-F607-8624-6D6512D0A23A}"/>
+              </a:ext>
+            </a:extLst>
+          </p:cNvPr>
+          <p:cNvSpPr/>
+          <p:nvPr/>
+        </p:nvSpPr>
+        <p:spPr>
+          <a:xfrm>
+            <a:off x="9153401" y="12824519"/>
+            <a:ext cx="2011416" cy="877223"/>
+          </a:xfrm>
+          <a:prstGeom prst="rect">
+            <a:avLst/>
+          </a:prstGeom>
+          <a:solidFill>
+            <a:schemeClr val="bg1"/>
+          </a:solidFill>
+          <a:ln w="38100">
+            <a:solidFill>
+              <a:schemeClr val="tx1"/>
+            </a:solidFill>
+          </a:ln>
+        </p:spPr>
+        <p:style>
+          <a:lnRef idx="2">
+            <a:schemeClr val="accent1">
+              <a:shade val="50000"/>
+            </a:schemeClr>
+          </a:lnRef>
+          <a:fillRef idx="1">
+            <a:schemeClr val="accent1"/>
+          </a:fillRef>
+          <a:effectRef idx="0">
+            <a:schemeClr val="accent1"/>
+          </a:effectRef>
+          <a:fontRef idx="minor">
+            <a:schemeClr val="lt1"/>
+          </a:fontRef>
+        </p:style>
+        <p:txBody>
+          <a:bodyPr rtlCol="0" anchor="ctr"/>
+          <a:lstStyle/>
+          <a:p>
+            <a:pPr algn="ctr"/>
+            <a:r>
+              <a:rPr lang="en-US" sz="2400" b="1" i="1" dirty="0">
+                <a:solidFill>
+                  <a:schemeClr val="tx1"/>
+                </a:solidFill>
+                <a:latin typeface="Arial" panose="020B0604020202020204" pitchFamily="34" charset="0"/>
+                <a:cs typeface="Arial" panose="020B0604020202020204" pitchFamily="34" charset="0"/>
+              </a:rPr>
+              <a:t>N availability</a:t>
+            </a:r>
+            <a:endParaRPr lang="en-US" sz="2400" b="1" dirty="0">
+              <a:solidFill>
+                <a:schemeClr val="tx1"/>
+              </a:solidFill>
+              <a:latin typeface="Arial" panose="020B0604020202020204" pitchFamily="34" charset="0"/>
+              <a:cs typeface="Arial" panose="020B0604020202020204" pitchFamily="34" charset="0"/>
+            </a:endParaRPr>
+          </a:p>
+        </p:txBody>
+      </p:sp>
+      <p:sp>
+        <p:nvSpPr>
+          <p:cNvPr id="29" name="Rectangle 28">
+            <a:extLst>
+              <a:ext uri="{FF2B5EF4-FFF2-40B4-BE49-F238E27FC236}">
+                <a16:creationId xmlns:a16="http://schemas.microsoft.com/office/drawing/2014/main" id="{32327FC8-D9F4-D197-4681-DC89C3E206D2}"/>
+              </a:ext>
+            </a:extLst>
+          </p:cNvPr>
+          <p:cNvSpPr/>
+          <p:nvPr/>
+        </p:nvSpPr>
+        <p:spPr>
+          <a:xfrm>
+            <a:off x="9249410" y="10711560"/>
+            <a:ext cx="1819398" cy="877223"/>
+          </a:xfrm>
+          <a:prstGeom prst="rect">
+            <a:avLst/>
+          </a:prstGeom>
+          <a:solidFill>
+            <a:schemeClr val="bg1"/>
+          </a:solidFill>
+          <a:ln w="38100">
+            <a:solidFill>
+              <a:schemeClr val="tx1"/>
+            </a:solidFill>
+          </a:ln>
+        </p:spPr>
+        <p:style>
+          <a:lnRef idx="2">
+            <a:schemeClr val="accent1">
+              <a:shade val="50000"/>
+            </a:schemeClr>
+          </a:lnRef>
+          <a:fillRef idx="1">
+            <a:schemeClr val="accent1"/>
+          </a:fillRef>
+          <a:effectRef idx="0">
+            <a:schemeClr val="accent1"/>
+          </a:effectRef>
+          <a:fontRef idx="minor">
+            <a:schemeClr val="lt1"/>
+          </a:fontRef>
+        </p:style>
+        <p:txBody>
+          <a:bodyPr rtlCol="0" anchor="ctr"/>
+          <a:lstStyle/>
+          <a:p>
+            <a:pPr algn="ctr"/>
+            <a:r>
+              <a:rPr lang="en-US" sz="2400" b="1" i="1" dirty="0">
+                <a:solidFill>
+                  <a:schemeClr val="tx1"/>
+                </a:solidFill>
+                <a:latin typeface="Arial" panose="020B0604020202020204" pitchFamily="34" charset="0"/>
+                <a:cs typeface="Arial" panose="020B0604020202020204" pitchFamily="34" charset="0"/>
+              </a:rPr>
+              <a:t>Soil moisture</a:t>
+            </a:r>
+            <a:endParaRPr lang="en-US" sz="2400" b="1" dirty="0">
+              <a:solidFill>
+                <a:schemeClr val="tx1"/>
+              </a:solidFill>
+              <a:latin typeface="Arial" panose="020B0604020202020204" pitchFamily="34" charset="0"/>
+              <a:cs typeface="Arial" panose="020B0604020202020204" pitchFamily="34" charset="0"/>
+            </a:endParaRPr>
+          </a:p>
+        </p:txBody>
+      </p:sp>
+      <p:sp>
+        <p:nvSpPr>
+          <p:cNvPr id="22" name="Rectangle 21">
+            <a:extLst>
+              <a:ext uri="{FF2B5EF4-FFF2-40B4-BE49-F238E27FC236}">
+                <a16:creationId xmlns:a16="http://schemas.microsoft.com/office/drawing/2014/main" id="{A80C041E-0131-071A-4799-F8F798234F95}"/>
+              </a:ext>
+            </a:extLst>
+          </p:cNvPr>
+          <p:cNvSpPr/>
+          <p:nvPr/>
+        </p:nvSpPr>
+        <p:spPr>
+          <a:xfrm>
+            <a:off x="13842977" y="9774814"/>
+            <a:ext cx="1819398" cy="877223"/>
+          </a:xfrm>
+          <a:prstGeom prst="rect">
+            <a:avLst/>
+          </a:prstGeom>
+          <a:solidFill>
+            <a:schemeClr val="bg1"/>
+          </a:solidFill>
+          <a:ln w="38100">
+            <a:solidFill>
+              <a:schemeClr val="tx1"/>
+            </a:solidFill>
+          </a:ln>
+        </p:spPr>
+        <p:style>
+          <a:lnRef idx="2">
+            <a:schemeClr val="accent1">
+              <a:shade val="50000"/>
+            </a:schemeClr>
+          </a:lnRef>
+          <a:fillRef idx="1">
+            <a:schemeClr val="accent1"/>
+          </a:fillRef>
+          <a:effectRef idx="0">
+            <a:schemeClr val="accent1"/>
+          </a:effectRef>
+          <a:fontRef idx="minor">
+            <a:schemeClr val="lt1"/>
+          </a:fontRef>
+        </p:style>
+        <p:txBody>
+          <a:bodyPr rtlCol="0" anchor="ctr"/>
+          <a:lstStyle/>
+          <a:p>
+            <a:pPr algn="ctr"/>
+            <a:r>
+              <a:rPr lang="en-US" sz="2400" b="1" i="1" dirty="0">
+                <a:solidFill>
+                  <a:schemeClr val="tx1"/>
+                </a:solidFill>
+                <a:latin typeface="Arial" panose="020B0604020202020204" pitchFamily="34" charset="0"/>
+                <a:cs typeface="Arial" panose="020B0604020202020204" pitchFamily="34" charset="0"/>
+              </a:rPr>
+              <a:t>VPD</a:t>
+            </a:r>
+            <a:endParaRPr lang="en-US" sz="2400" b="1" dirty="0">
+              <a:solidFill>
+                <a:schemeClr val="tx1"/>
+              </a:solidFill>
+              <a:latin typeface="Arial" panose="020B0604020202020204" pitchFamily="34" charset="0"/>
+              <a:cs typeface="Arial" panose="020B0604020202020204" pitchFamily="34" charset="0"/>
+            </a:endParaRPr>
+          </a:p>
+        </p:txBody>
+      </p:sp>
+      <p:cxnSp>
+        <p:nvCxnSpPr>
+          <p:cNvPr id="63" name="Elbow Connector 62">
+            <a:extLst>
+              <a:ext uri="{FF2B5EF4-FFF2-40B4-BE49-F238E27FC236}">
+                <a16:creationId xmlns:a16="http://schemas.microsoft.com/office/drawing/2014/main" id="{93773D16-A7A4-9E1C-BC15-9019F70CFB52}"/>
+              </a:ext>
+            </a:extLst>
+          </p:cNvPr>
+          <p:cNvCxnSpPr>
+            <a:cxnSpLocks/>
+          </p:cNvCxnSpPr>
+          <p:nvPr/>
+        </p:nvCxnSpPr>
+        <p:spPr>
+          <a:xfrm>
+            <a:off x="10159108" y="4506165"/>
+            <a:ext cx="1453008" cy="511480"/>
           </a:xfrm>
           <a:prstGeom prst="bentConnector3">
             <a:avLst>
-              <a:gd name="adj1" fmla="val -21274"/>
+              <a:gd name="adj1" fmla="val 240"/>
             </a:avLst>
           </a:prstGeom>
           <a:ln w="76200">
@@ -20551,32 +21286,32 @@
       </p:cxnSp>
       <p:cxnSp>
         <p:nvCxnSpPr>
-          <p:cNvPr id="42" name="Straight Arrow Connector 41">
-            <a:extLst>
-              <a:ext uri="{FF2B5EF4-FFF2-40B4-BE49-F238E27FC236}">
-                <a16:creationId xmlns:a16="http://schemas.microsoft.com/office/drawing/2014/main" id="{F46CF9C1-01C2-6397-41A6-32005AB7C98A}"/>
+          <p:cNvPr id="129" name="Elbow Connector 128">
+            <a:extLst>
+              <a:ext uri="{FF2B5EF4-FFF2-40B4-BE49-F238E27FC236}">
+                <a16:creationId xmlns:a16="http://schemas.microsoft.com/office/drawing/2014/main" id="{88659933-2D67-2BC4-8196-BEBC126C5A61}"/>
               </a:ext>
             </a:extLst>
           </p:cNvPr>
           <p:cNvCxnSpPr>
-            <a:stCxn id="48" idx="2"/>
-            <a:endCxn id="47" idx="0"/>
+            <a:cxnSpLocks/>
           </p:cNvCxnSpPr>
           <p:nvPr/>
         </p:nvCxnSpPr>
         <p:spPr>
-          <a:xfrm>
-            <a:off x="12528163" y="3760129"/>
-            <a:ext cx="0" cy="1099316"/>
-          </a:xfrm>
-          <a:prstGeom prst="straightConnector1">
+          <a:xfrm rot="5400000" flipH="1" flipV="1">
+            <a:off x="10706354" y="5026852"/>
+            <a:ext cx="358515" cy="1453005"/>
+          </a:xfrm>
+          <a:prstGeom prst="bentConnector2">
             <a:avLst/>
           </a:prstGeom>
           <a:ln w="76200">
             <a:solidFill>
               <a:srgbClr val="C00000"/>
             </a:solidFill>
-            <a:tailEnd type="triangle"/>
+            <a:headEnd type="oval" w="med" len="med"/>
+            <a:tailEnd type="triangle" w="med" len="med"/>
           </a:ln>
         </p:spPr>
         <p:style>
@@ -20596,16 +21331,346 @@
       </p:cxnSp>
       <p:cxnSp>
         <p:nvCxnSpPr>
-          <p:cNvPr id="44" name="Straight Arrow Connector 43">
-            <a:extLst>
-              <a:ext uri="{FF2B5EF4-FFF2-40B4-BE49-F238E27FC236}">
-                <a16:creationId xmlns:a16="http://schemas.microsoft.com/office/drawing/2014/main" id="{F8939DF1-14F5-5C44-C0CF-FAE2D9FD8FA2}"/>
+          <p:cNvPr id="134" name="Straight Arrow Connector 133">
+            <a:extLst>
+              <a:ext uri="{FF2B5EF4-FFF2-40B4-BE49-F238E27FC236}">
+                <a16:creationId xmlns:a16="http://schemas.microsoft.com/office/drawing/2014/main" id="{F37F5FA4-FCE3-53AF-173E-69C602BFDE00}"/>
               </a:ext>
             </a:extLst>
           </p:cNvPr>
           <p:cNvCxnSpPr>
-            <a:stCxn id="46" idx="0"/>
-            <a:endCxn id="47" idx="2"/>
+            <a:cxnSpLocks/>
+          </p:cNvCxnSpPr>
+          <p:nvPr/>
+        </p:nvCxnSpPr>
+        <p:spPr>
+          <a:xfrm>
+            <a:off x="13437862" y="5287378"/>
+            <a:ext cx="892510" cy="0"/>
+          </a:xfrm>
+          <a:prstGeom prst="straightConnector1">
+            <a:avLst/>
+          </a:prstGeom>
+          <a:ln w="76200">
+            <a:solidFill>
+              <a:schemeClr val="accent1">
+                <a:lumMod val="75000"/>
+              </a:schemeClr>
+            </a:solidFill>
+            <a:tailEnd type="triangle"/>
+          </a:ln>
+        </p:spPr>
+        <p:style>
+          <a:lnRef idx="1">
+            <a:schemeClr val="accent1"/>
+          </a:lnRef>
+          <a:fillRef idx="0">
+            <a:schemeClr val="accent1"/>
+          </a:fillRef>
+          <a:effectRef idx="0">
+            <a:schemeClr val="accent1"/>
+          </a:effectRef>
+          <a:fontRef idx="minor">
+            <a:schemeClr val="tx1"/>
+          </a:fontRef>
+        </p:style>
+      </p:cxnSp>
+      <p:cxnSp>
+        <p:nvCxnSpPr>
+          <p:cNvPr id="152" name="Straight Arrow Connector 151">
+            <a:extLst>
+              <a:ext uri="{FF2B5EF4-FFF2-40B4-BE49-F238E27FC236}">
+                <a16:creationId xmlns:a16="http://schemas.microsoft.com/office/drawing/2014/main" id="{708FD72B-182D-1852-C4AC-62AC97690E87}"/>
+              </a:ext>
+            </a:extLst>
+          </p:cNvPr>
+          <p:cNvCxnSpPr>
+            <a:cxnSpLocks/>
+          </p:cNvCxnSpPr>
+          <p:nvPr/>
+        </p:nvCxnSpPr>
+        <p:spPr>
+          <a:xfrm>
+            <a:off x="14752676" y="3750696"/>
+            <a:ext cx="0" cy="1098071"/>
+          </a:xfrm>
+          <a:prstGeom prst="straightConnector1">
+            <a:avLst/>
+          </a:prstGeom>
+          <a:ln w="76200">
+            <a:solidFill>
+              <a:srgbClr val="C00000"/>
+            </a:solidFill>
+            <a:headEnd type="oval" w="med" len="med"/>
+            <a:tailEnd type="triangle" w="med" len="med"/>
+          </a:ln>
+        </p:spPr>
+        <p:style>
+          <a:lnRef idx="1">
+            <a:schemeClr val="accent1"/>
+          </a:lnRef>
+          <a:fillRef idx="0">
+            <a:schemeClr val="accent1"/>
+          </a:fillRef>
+          <a:effectRef idx="0">
+            <a:schemeClr val="accent1"/>
+          </a:effectRef>
+          <a:fontRef idx="minor">
+            <a:schemeClr val="tx1"/>
+          </a:fontRef>
+        </p:style>
+      </p:cxnSp>
+      <p:cxnSp>
+        <p:nvCxnSpPr>
+          <p:cNvPr id="153" name="Elbow Connector 152">
+            <a:extLst>
+              <a:ext uri="{FF2B5EF4-FFF2-40B4-BE49-F238E27FC236}">
+                <a16:creationId xmlns:a16="http://schemas.microsoft.com/office/drawing/2014/main" id="{75BA9AF0-DB33-8B83-AE5B-FA15682817E4}"/>
+              </a:ext>
+            </a:extLst>
+          </p:cNvPr>
+          <p:cNvCxnSpPr>
+            <a:stCxn id="170" idx="0"/>
+            <a:endCxn id="167" idx="1"/>
+          </p:cNvCxnSpPr>
+          <p:nvPr/>
+        </p:nvCxnSpPr>
+        <p:spPr>
+          <a:xfrm rot="5400000" flipH="1" flipV="1">
+            <a:off x="15708645" y="3801512"/>
+            <a:ext cx="589520" cy="1504991"/>
+          </a:xfrm>
+          <a:prstGeom prst="bentConnector2">
+            <a:avLst/>
+          </a:prstGeom>
+          <a:ln w="76200">
+            <a:solidFill>
+              <a:srgbClr val="C00000"/>
+            </a:solidFill>
+            <a:headEnd type="oval" w="med" len="med"/>
+            <a:tailEnd type="triangle" w="med" len="med"/>
+          </a:ln>
+        </p:spPr>
+        <p:style>
+          <a:lnRef idx="1">
+            <a:schemeClr val="accent1"/>
+          </a:lnRef>
+          <a:fillRef idx="0">
+            <a:schemeClr val="accent1"/>
+          </a:fillRef>
+          <a:effectRef idx="0">
+            <a:schemeClr val="accent1"/>
+          </a:effectRef>
+          <a:fontRef idx="minor">
+            <a:schemeClr val="tx1"/>
+          </a:fontRef>
+        </p:style>
+      </p:cxnSp>
+      <p:cxnSp>
+        <p:nvCxnSpPr>
+          <p:cNvPr id="154" name="Elbow Connector 153">
+            <a:extLst>
+              <a:ext uri="{FF2B5EF4-FFF2-40B4-BE49-F238E27FC236}">
+                <a16:creationId xmlns:a16="http://schemas.microsoft.com/office/drawing/2014/main" id="{2C891C58-29DD-E49F-C8DC-72B0A46FC261}"/>
+              </a:ext>
+            </a:extLst>
+          </p:cNvPr>
+          <p:cNvCxnSpPr>
+            <a:cxnSpLocks/>
+            <a:stCxn id="170" idx="2"/>
+            <a:endCxn id="166" idx="1"/>
+          </p:cNvCxnSpPr>
+          <p:nvPr/>
+        </p:nvCxnSpPr>
+        <p:spPr>
+          <a:xfrm rot="16200000" flipH="1">
+            <a:off x="15686128" y="5290771"/>
+            <a:ext cx="634555" cy="1504991"/>
+          </a:xfrm>
+          <a:prstGeom prst="bentConnector2">
+            <a:avLst/>
+          </a:prstGeom>
+          <a:ln w="76200">
+            <a:solidFill>
+              <a:srgbClr val="C00000"/>
+            </a:solidFill>
+            <a:headEnd type="oval" w="med" len="med"/>
+            <a:tailEnd type="triangle" w="med" len="med"/>
+          </a:ln>
+        </p:spPr>
+        <p:style>
+          <a:lnRef idx="1">
+            <a:schemeClr val="accent1"/>
+          </a:lnRef>
+          <a:fillRef idx="0">
+            <a:schemeClr val="accent1"/>
+          </a:fillRef>
+          <a:effectRef idx="0">
+            <a:schemeClr val="accent1"/>
+          </a:effectRef>
+          <a:fontRef idx="minor">
+            <a:schemeClr val="tx1"/>
+          </a:fontRef>
+        </p:style>
+      </p:cxnSp>
+      <p:cxnSp>
+        <p:nvCxnSpPr>
+          <p:cNvPr id="155" name="Elbow Connector 154">
+            <a:extLst>
+              <a:ext uri="{FF2B5EF4-FFF2-40B4-BE49-F238E27FC236}">
+                <a16:creationId xmlns:a16="http://schemas.microsoft.com/office/drawing/2014/main" id="{FB07FB16-48F2-0383-63DF-758619D9AA23}"/>
+              </a:ext>
+            </a:extLst>
+          </p:cNvPr>
+          <p:cNvCxnSpPr>
+            <a:cxnSpLocks/>
+            <a:stCxn id="167" idx="0"/>
+            <a:endCxn id="165" idx="0"/>
+          </p:cNvCxnSpPr>
+          <p:nvPr/>
+        </p:nvCxnSpPr>
+        <p:spPr>
+          <a:xfrm rot="16200000" flipH="1">
+            <a:off x="18273408" y="3212826"/>
+            <a:ext cx="1061295" cy="2276912"/>
+          </a:xfrm>
+          <a:prstGeom prst="bentConnector3">
+            <a:avLst>
+              <a:gd name="adj1" fmla="val -21540"/>
+            </a:avLst>
+          </a:prstGeom>
+          <a:ln w="76200">
+            <a:solidFill>
+              <a:schemeClr val="accent1">
+                <a:lumMod val="75000"/>
+              </a:schemeClr>
+            </a:solidFill>
+            <a:tailEnd type="triangle"/>
+          </a:ln>
+        </p:spPr>
+        <p:style>
+          <a:lnRef idx="1">
+            <a:schemeClr val="accent1"/>
+          </a:lnRef>
+          <a:fillRef idx="0">
+            <a:schemeClr val="accent1"/>
+          </a:fillRef>
+          <a:effectRef idx="0">
+            <a:schemeClr val="accent1"/>
+          </a:effectRef>
+          <a:fontRef idx="minor">
+            <a:schemeClr val="tx1"/>
+          </a:fontRef>
+        </p:style>
+      </p:cxnSp>
+      <p:cxnSp>
+        <p:nvCxnSpPr>
+          <p:cNvPr id="156" name="Elbow Connector 155">
+            <a:extLst>
+              <a:ext uri="{FF2B5EF4-FFF2-40B4-BE49-F238E27FC236}">
+                <a16:creationId xmlns:a16="http://schemas.microsoft.com/office/drawing/2014/main" id="{DE448E4C-65BB-DEE6-C2CC-3521524ABF3B}"/>
+              </a:ext>
+            </a:extLst>
+          </p:cNvPr>
+          <p:cNvCxnSpPr>
+            <a:cxnSpLocks/>
+            <a:stCxn id="166" idx="2"/>
+            <a:endCxn id="165" idx="2"/>
+          </p:cNvCxnSpPr>
+          <p:nvPr/>
+        </p:nvCxnSpPr>
+        <p:spPr>
+          <a:xfrm rot="5400000" flipH="1" flipV="1">
+            <a:off x="18284054" y="5140699"/>
+            <a:ext cx="1040003" cy="2276912"/>
+          </a:xfrm>
+          <a:prstGeom prst="bentConnector3">
+            <a:avLst>
+              <a:gd name="adj1" fmla="val -21981"/>
+            </a:avLst>
+          </a:prstGeom>
+          <a:ln w="76200">
+            <a:solidFill>
+              <a:schemeClr val="accent1">
+                <a:lumMod val="75000"/>
+              </a:schemeClr>
+            </a:solidFill>
+            <a:tailEnd type="triangle"/>
+          </a:ln>
+        </p:spPr>
+        <p:style>
+          <a:lnRef idx="1">
+            <a:schemeClr val="accent1"/>
+          </a:lnRef>
+          <a:fillRef idx="0">
+            <a:schemeClr val="accent1"/>
+          </a:fillRef>
+          <a:effectRef idx="0">
+            <a:schemeClr val="accent1"/>
+          </a:effectRef>
+          <a:fontRef idx="minor">
+            <a:schemeClr val="tx1"/>
+          </a:fontRef>
+        </p:style>
+      </p:cxnSp>
+      <p:cxnSp>
+        <p:nvCxnSpPr>
+          <p:cNvPr id="159" name="Straight Arrow Connector 158">
+            <a:extLst>
+              <a:ext uri="{FF2B5EF4-FFF2-40B4-BE49-F238E27FC236}">
+                <a16:creationId xmlns:a16="http://schemas.microsoft.com/office/drawing/2014/main" id="{ABDF017A-5DCF-333E-39FD-40EC9F79BFE7}"/>
+              </a:ext>
+            </a:extLst>
+          </p:cNvPr>
+          <p:cNvCxnSpPr>
+            <a:stCxn id="164" idx="2"/>
+            <a:endCxn id="163" idx="0"/>
+          </p:cNvCxnSpPr>
+          <p:nvPr/>
+        </p:nvCxnSpPr>
+        <p:spPr>
+          <a:xfrm>
+            <a:off x="12528163" y="3760129"/>
+            <a:ext cx="0" cy="1099316"/>
+          </a:xfrm>
+          <a:prstGeom prst="straightConnector1">
+            <a:avLst/>
+          </a:prstGeom>
+          <a:ln w="76200">
+            <a:solidFill>
+              <a:srgbClr val="C00000"/>
+            </a:solidFill>
+            <a:headEnd type="oval" w="med" len="med"/>
+            <a:tailEnd type="triangle" w="med" len="med"/>
+          </a:ln>
+        </p:spPr>
+        <p:style>
+          <a:lnRef idx="1">
+            <a:schemeClr val="accent1"/>
+          </a:lnRef>
+          <a:fillRef idx="0">
+            <a:schemeClr val="accent1"/>
+          </a:fillRef>
+          <a:effectRef idx="0">
+            <a:schemeClr val="accent1"/>
+          </a:effectRef>
+          <a:fontRef idx="minor">
+            <a:schemeClr val="tx1"/>
+          </a:fontRef>
+        </p:style>
+      </p:cxnSp>
+      <p:cxnSp>
+        <p:nvCxnSpPr>
+          <p:cNvPr id="161" name="Straight Arrow Connector 160">
+            <a:extLst>
+              <a:ext uri="{FF2B5EF4-FFF2-40B4-BE49-F238E27FC236}">
+                <a16:creationId xmlns:a16="http://schemas.microsoft.com/office/drawing/2014/main" id="{6B892F48-C8C6-6A4A-E886-10C138C62892}"/>
+              </a:ext>
+            </a:extLst>
+          </p:cNvPr>
+          <p:cNvCxnSpPr>
+            <a:stCxn id="162" idx="0"/>
+            <a:endCxn id="163" idx="2"/>
           </p:cNvCxnSpPr>
           <p:nvPr/>
         </p:nvCxnSpPr>
@@ -20621,7 +21686,8 @@
             <a:solidFill>
               <a:srgbClr val="C00000"/>
             </a:solidFill>
-            <a:tailEnd type="triangle"/>
+            <a:headEnd type="oval" w="med" len="med"/>
+            <a:tailEnd type="triangle" w="med" len="med"/>
           </a:ln>
         </p:spPr>
         <p:style>
@@ -20641,10 +21707,10 @@
       </p:cxnSp>
       <p:sp>
         <p:nvSpPr>
-          <p:cNvPr id="46" name="Rectangle 45">
-            <a:extLst>
-              <a:ext uri="{FF2B5EF4-FFF2-40B4-BE49-F238E27FC236}">
-                <a16:creationId xmlns:a16="http://schemas.microsoft.com/office/drawing/2014/main" id="{29FDBAE8-929B-B4F7-DE8F-65E91C01F6C0}"/>
+          <p:cNvPr id="162" name="Rectangle 161">
+            <a:extLst>
+              <a:ext uri="{FF2B5EF4-FFF2-40B4-BE49-F238E27FC236}">
+                <a16:creationId xmlns:a16="http://schemas.microsoft.com/office/drawing/2014/main" id="{79D21678-870B-6E2D-D0DD-DDB73D33C236}"/>
               </a:ext>
             </a:extLst>
           </p:cNvPr>
@@ -20741,10 +21807,10 @@
       </p:sp>
       <p:sp>
         <p:nvSpPr>
-          <p:cNvPr id="47" name="Rectangle 46">
-            <a:extLst>
-              <a:ext uri="{FF2B5EF4-FFF2-40B4-BE49-F238E27FC236}">
-                <a16:creationId xmlns:a16="http://schemas.microsoft.com/office/drawing/2014/main" id="{B860504E-7719-24C0-850A-FE09A0360A57}"/>
+          <p:cNvPr id="163" name="Rectangle 162">
+            <a:extLst>
+              <a:ext uri="{FF2B5EF4-FFF2-40B4-BE49-F238E27FC236}">
+                <a16:creationId xmlns:a16="http://schemas.microsoft.com/office/drawing/2014/main" id="{0C5B1774-A929-BAB1-B05A-E174EFFE9B41}"/>
               </a:ext>
             </a:extLst>
           </p:cNvPr>
@@ -20811,10 +21877,10 @@
       </p:sp>
       <p:sp>
         <p:nvSpPr>
-          <p:cNvPr id="48" name="Rectangle 47">
-            <a:extLst>
-              <a:ext uri="{FF2B5EF4-FFF2-40B4-BE49-F238E27FC236}">
-                <a16:creationId xmlns:a16="http://schemas.microsoft.com/office/drawing/2014/main" id="{96820659-AC17-7F0F-22C3-49708746BE55}"/>
+          <p:cNvPr id="164" name="Rectangle 163">
+            <a:extLst>
+              <a:ext uri="{FF2B5EF4-FFF2-40B4-BE49-F238E27FC236}">
+                <a16:creationId xmlns:a16="http://schemas.microsoft.com/office/drawing/2014/main" id="{720CBE34-8EBB-141B-E34D-AFDA2FFFB0AB}"/>
               </a:ext>
             </a:extLst>
           </p:cNvPr>
@@ -20891,10 +21957,10 @@
       </p:sp>
       <p:sp>
         <p:nvSpPr>
-          <p:cNvPr id="49" name="Rectangle 48">
-            <a:extLst>
-              <a:ext uri="{FF2B5EF4-FFF2-40B4-BE49-F238E27FC236}">
-                <a16:creationId xmlns:a16="http://schemas.microsoft.com/office/drawing/2014/main" id="{A7F691CE-5608-A4EF-678C-B8E070B99839}"/>
+          <p:cNvPr id="165" name="Rectangle 164">
+            <a:extLst>
+              <a:ext uri="{FF2B5EF4-FFF2-40B4-BE49-F238E27FC236}">
+                <a16:creationId xmlns:a16="http://schemas.microsoft.com/office/drawing/2014/main" id="{A8C4031F-AC9A-D9F2-7A1E-5D1AF9B18989}"/>
               </a:ext>
             </a:extLst>
           </p:cNvPr>
@@ -20903,7 +21969,7 @@
         </p:nvSpPr>
         <p:spPr>
           <a:xfrm>
-            <a:off x="18145313" y="4847359"/>
+            <a:off x="19032813" y="4881930"/>
             <a:ext cx="1819398" cy="877223"/>
           </a:xfrm>
           <a:prstGeom prst="rect">
@@ -20971,10 +22037,10 @@
       </p:sp>
       <p:sp>
         <p:nvSpPr>
-          <p:cNvPr id="52" name="Rectangle 51">
-            <a:extLst>
-              <a:ext uri="{FF2B5EF4-FFF2-40B4-BE49-F238E27FC236}">
-                <a16:creationId xmlns:a16="http://schemas.microsoft.com/office/drawing/2014/main" id="{29A51647-A19D-0B57-8FBA-FE70434DD264}"/>
+          <p:cNvPr id="166" name="Rectangle 165">
+            <a:extLst>
+              <a:ext uri="{FF2B5EF4-FFF2-40B4-BE49-F238E27FC236}">
+                <a16:creationId xmlns:a16="http://schemas.microsoft.com/office/drawing/2014/main" id="{725ADC28-54D7-CEE1-FC6D-8F665DC694C0}"/>
               </a:ext>
             </a:extLst>
           </p:cNvPr>
@@ -21051,10 +22117,10 @@
       </p:sp>
       <p:sp>
         <p:nvSpPr>
-          <p:cNvPr id="54" name="Rectangle 53">
-            <a:extLst>
-              <a:ext uri="{FF2B5EF4-FFF2-40B4-BE49-F238E27FC236}">
-                <a16:creationId xmlns:a16="http://schemas.microsoft.com/office/drawing/2014/main" id="{50A3E08C-77EB-A1D1-9ED6-2215975BD100}"/>
+          <p:cNvPr id="167" name="Rectangle 166">
+            <a:extLst>
+              <a:ext uri="{FF2B5EF4-FFF2-40B4-BE49-F238E27FC236}">
+                <a16:creationId xmlns:a16="http://schemas.microsoft.com/office/drawing/2014/main" id="{511EF347-A359-440B-B837-C0EC773C7DB8}"/>
               </a:ext>
             </a:extLst>
           </p:cNvPr>
@@ -21131,10 +22197,10 @@
       </p:sp>
       <p:sp>
         <p:nvSpPr>
-          <p:cNvPr id="55" name="Rectangle 54">
-            <a:extLst>
-              <a:ext uri="{FF2B5EF4-FFF2-40B4-BE49-F238E27FC236}">
-                <a16:creationId xmlns:a16="http://schemas.microsoft.com/office/drawing/2014/main" id="{8DBFFA3C-CD1A-F46F-93B1-A3843B14AD4E}"/>
+          <p:cNvPr id="168" name="Rectangle 167">
+            <a:extLst>
+              <a:ext uri="{FF2B5EF4-FFF2-40B4-BE49-F238E27FC236}">
+                <a16:creationId xmlns:a16="http://schemas.microsoft.com/office/drawing/2014/main" id="{835BAB16-C2F7-2715-9782-7093EE52161C}"/>
               </a:ext>
             </a:extLst>
           </p:cNvPr>
@@ -21201,10 +22267,10 @@
       </p:sp>
       <p:sp>
         <p:nvSpPr>
-          <p:cNvPr id="56" name="Rectangle 55">
-            <a:extLst>
-              <a:ext uri="{FF2B5EF4-FFF2-40B4-BE49-F238E27FC236}">
-                <a16:creationId xmlns:a16="http://schemas.microsoft.com/office/drawing/2014/main" id="{AA465BDE-30CB-DD0A-7758-175E922F2521}"/>
+          <p:cNvPr id="170" name="Rectangle 169">
+            <a:extLst>
+              <a:ext uri="{FF2B5EF4-FFF2-40B4-BE49-F238E27FC236}">
+                <a16:creationId xmlns:a16="http://schemas.microsoft.com/office/drawing/2014/main" id="{FD1A4BF9-B304-6274-42AB-32FA0114F3EC}"/>
               </a:ext>
             </a:extLst>
           </p:cNvPr>
@@ -21294,10 +22360,10 @@
       </p:sp>
       <p:sp>
         <p:nvSpPr>
-          <p:cNvPr id="59" name="Rectangle 58">
-            <a:extLst>
-              <a:ext uri="{FF2B5EF4-FFF2-40B4-BE49-F238E27FC236}">
-                <a16:creationId xmlns:a16="http://schemas.microsoft.com/office/drawing/2014/main" id="{1977F76D-0FBD-8087-DBAA-54315992CD4A}"/>
+          <p:cNvPr id="171" name="Rectangle 170">
+            <a:extLst>
+              <a:ext uri="{FF2B5EF4-FFF2-40B4-BE49-F238E27FC236}">
+                <a16:creationId xmlns:a16="http://schemas.microsoft.com/office/drawing/2014/main" id="{6CAD8A43-B8F0-AAA1-81A3-C47D55AAD42F}"/>
               </a:ext>
             </a:extLst>
           </p:cNvPr>
@@ -21306,8 +22372,8 @@
         </p:nvSpPr>
         <p:spPr>
           <a:xfrm>
-            <a:off x="9153401" y="5932611"/>
-            <a:ext cx="2011416" cy="877223"/>
+            <a:off x="9249410" y="3819652"/>
+            <a:ext cx="1819398" cy="877223"/>
           </a:xfrm>
           <a:prstGeom prst="rect">
             <a:avLst/>
@@ -21350,7 +22416,7 @@
                 <a:latin typeface="Arial" panose="020B0604020202020204" pitchFamily="34" charset="0"/>
                 <a:cs typeface="Arial" panose="020B0604020202020204" pitchFamily="34" charset="0"/>
               </a:rPr>
-              <a:t>N availability</a:t>
+              <a:t>Soil moisture</a:t>
             </a:r>
             <a:endParaRPr lang="en-US" sz="2400" b="1" dirty="0">
               <a:solidFill>
@@ -21364,89 +22430,19 @@
       </p:sp>
       <p:sp>
         <p:nvSpPr>
-          <p:cNvPr id="61" name="Rectangle 60">
-            <a:extLst>
-              <a:ext uri="{FF2B5EF4-FFF2-40B4-BE49-F238E27FC236}">
-                <a16:creationId xmlns:a16="http://schemas.microsoft.com/office/drawing/2014/main" id="{8E9F4384-3875-D07A-0FBD-7661C371A8AB}"/>
-              </a:ext>
-            </a:extLst>
-          </p:cNvPr>
-          <p:cNvSpPr/>
+          <p:cNvPr id="173" name="TextBox 172">
+            <a:extLst>
+              <a:ext uri="{FF2B5EF4-FFF2-40B4-BE49-F238E27FC236}">
+                <a16:creationId xmlns:a16="http://schemas.microsoft.com/office/drawing/2014/main" id="{8D3E0A0D-0DFA-9B76-4E85-9D8343379A96}"/>
+              </a:ext>
+            </a:extLst>
+          </p:cNvPr>
+          <p:cNvSpPr txBox="1"/>
           <p:nvPr/>
         </p:nvSpPr>
         <p:spPr>
           <a:xfrm>
-            <a:off x="9249410" y="3819652"/>
-            <a:ext cx="1819398" cy="877223"/>
-          </a:xfrm>
-          <a:prstGeom prst="rect">
-            <a:avLst/>
-          </a:prstGeom>
-          <a:solidFill>
-            <a:schemeClr val="bg1"/>
-          </a:solidFill>
-          <a:ln w="38100">
-            <a:solidFill>
-              <a:schemeClr val="tx1"/>
-            </a:solidFill>
-          </a:ln>
-        </p:spPr>
-        <p:style>
-          <a:lnRef idx="2">
-            <a:schemeClr val="accent1">
-              <a:shade val="50000"/>
-            </a:schemeClr>
-          </a:lnRef>
-          <a:fillRef idx="1">
-            <a:schemeClr val="accent1"/>
-          </a:fillRef>
-          <a:effectRef idx="0">
-            <a:schemeClr val="accent1"/>
-          </a:effectRef>
-          <a:fontRef idx="minor">
-            <a:schemeClr val="lt1"/>
-          </a:fontRef>
-        </p:style>
-        <p:txBody>
-          <a:bodyPr rtlCol="0" anchor="ctr"/>
-          <a:lstStyle/>
-          <a:p>
-            <a:pPr algn="ctr"/>
-            <a:r>
-              <a:rPr lang="en-US" sz="2400" b="1" i="1" dirty="0">
-                <a:solidFill>
-                  <a:schemeClr val="tx1"/>
-                </a:solidFill>
-                <a:latin typeface="Arial" panose="020B0604020202020204" pitchFamily="34" charset="0"/>
-                <a:cs typeface="Arial" panose="020B0604020202020204" pitchFamily="34" charset="0"/>
-              </a:rPr>
-              <a:t>Soil moisture</a:t>
-            </a:r>
-            <a:endParaRPr lang="en-US" sz="2400" b="1" dirty="0">
-              <a:solidFill>
-                <a:schemeClr val="tx1"/>
-              </a:solidFill>
-              <a:latin typeface="Arial" panose="020B0604020202020204" pitchFamily="34" charset="0"/>
-              <a:cs typeface="Arial" panose="020B0604020202020204" pitchFamily="34" charset="0"/>
-            </a:endParaRPr>
-          </a:p>
-        </p:txBody>
-      </p:sp>
-      <p:sp>
-        <p:nvSpPr>
-          <p:cNvPr id="135" name="TextBox 134">
-            <a:extLst>
-              <a:ext uri="{FF2B5EF4-FFF2-40B4-BE49-F238E27FC236}">
-                <a16:creationId xmlns:a16="http://schemas.microsoft.com/office/drawing/2014/main" id="{96C78DFC-34B8-605C-0129-B4367D564AF6}"/>
-              </a:ext>
-            </a:extLst>
-          </p:cNvPr>
-          <p:cNvSpPr txBox="1"/>
-          <p:nvPr/>
-        </p:nvSpPr>
-        <p:spPr>
-          <a:xfrm>
-            <a:off x="10582516" y="5320541"/>
+            <a:off x="13533413" y="5103628"/>
             <a:ext cx="479618" cy="369332"/>
           </a:xfrm>
           <a:prstGeom prst="rect">
@@ -21457,7 +22453,9 @@
           </a:solidFill>
           <a:ln w="28575">
             <a:solidFill>
-              <a:srgbClr val="C00000"/>
+              <a:schemeClr val="accent1">
+                <a:lumMod val="75000"/>
+              </a:schemeClr>
             </a:solidFill>
           </a:ln>
         </p:spPr>
@@ -21472,17 +22470,17 @@
                 <a:latin typeface="Arial" panose="020B0604020202020204" pitchFamily="34" charset="0"/>
                 <a:cs typeface="Arial" panose="020B0604020202020204" pitchFamily="34" charset="0"/>
               </a:rPr>
-              <a:t>H1</a:t>
+              <a:t>H2</a:t>
             </a:r>
           </a:p>
         </p:txBody>
       </p:sp>
       <p:sp>
         <p:nvSpPr>
-          <p:cNvPr id="136" name="TextBox 135">
-            <a:extLst>
-              <a:ext uri="{FF2B5EF4-FFF2-40B4-BE49-F238E27FC236}">
-                <a16:creationId xmlns:a16="http://schemas.microsoft.com/office/drawing/2014/main" id="{A61646C8-1A2D-2C32-5F90-82021DB95D40}"/>
+          <p:cNvPr id="174" name="TextBox 173">
+            <a:extLst>
+              <a:ext uri="{FF2B5EF4-FFF2-40B4-BE49-F238E27FC236}">
+                <a16:creationId xmlns:a16="http://schemas.microsoft.com/office/drawing/2014/main" id="{83CEF593-BD18-779C-EA16-3FF4A84134EF}"/>
               </a:ext>
             </a:extLst>
           </p:cNvPr>
@@ -21491,7 +22489,7 @@
         </p:nvSpPr>
         <p:spPr>
           <a:xfrm>
-            <a:off x="12288354" y="4070823"/>
+            <a:off x="10561029" y="4840933"/>
             <a:ext cx="479618" cy="369332"/>
           </a:xfrm>
           <a:prstGeom prst="rect">
@@ -21502,7 +22500,9 @@
           </a:solidFill>
           <a:ln w="28575">
             <a:solidFill>
-              <a:srgbClr val="C00000"/>
+              <a:schemeClr val="accent1">
+                <a:lumMod val="75000"/>
+              </a:schemeClr>
             </a:solidFill>
           </a:ln>
         </p:spPr>
@@ -21524,10 +22524,10 @@
       </p:sp>
       <p:sp>
         <p:nvSpPr>
-          <p:cNvPr id="137" name="TextBox 136">
-            <a:extLst>
-              <a:ext uri="{FF2B5EF4-FFF2-40B4-BE49-F238E27FC236}">
-                <a16:creationId xmlns:a16="http://schemas.microsoft.com/office/drawing/2014/main" id="{86CF5AAA-FDF5-26FE-58EC-373A7BD9125F}"/>
+          <p:cNvPr id="175" name="TextBox 174">
+            <a:extLst>
+              <a:ext uri="{FF2B5EF4-FFF2-40B4-BE49-F238E27FC236}">
+                <a16:creationId xmlns:a16="http://schemas.microsoft.com/office/drawing/2014/main" id="{356640CB-1F0A-0103-3E61-714ADB8612EE}"/>
               </a:ext>
             </a:extLst>
           </p:cNvPr>
@@ -21536,7 +22536,7 @@
         </p:nvSpPr>
         <p:spPr>
           <a:xfrm>
-            <a:off x="13533413" y="5103628"/>
+            <a:off x="18864725" y="3404862"/>
             <a:ext cx="479618" cy="369332"/>
           </a:xfrm>
           <a:prstGeom prst="rect">
@@ -21564,17 +22564,17 @@
                 <a:latin typeface="Arial" panose="020B0604020202020204" pitchFamily="34" charset="0"/>
                 <a:cs typeface="Arial" panose="020B0604020202020204" pitchFamily="34" charset="0"/>
               </a:rPr>
-              <a:t>H2</a:t>
+              <a:t>H3</a:t>
             </a:r>
           </a:p>
         </p:txBody>
       </p:sp>
       <p:sp>
         <p:nvSpPr>
-          <p:cNvPr id="139" name="TextBox 138">
-            <a:extLst>
-              <a:ext uri="{FF2B5EF4-FFF2-40B4-BE49-F238E27FC236}">
-                <a16:creationId xmlns:a16="http://schemas.microsoft.com/office/drawing/2014/main" id="{98186FAE-EF23-21EC-0CCB-D03CAD71095C}"/>
+          <p:cNvPr id="176" name="TextBox 175">
+            <a:extLst>
+              <a:ext uri="{FF2B5EF4-FFF2-40B4-BE49-F238E27FC236}">
+                <a16:creationId xmlns:a16="http://schemas.microsoft.com/office/drawing/2014/main" id="{979A7756-3595-6AD3-4FC1-B0DFEF1D96A6}"/>
               </a:ext>
             </a:extLst>
           </p:cNvPr>
@@ -21583,7 +22583,7 @@
         </p:nvSpPr>
         <p:spPr>
           <a:xfrm>
-            <a:off x="14497924" y="4070823"/>
+            <a:off x="18864725" y="6845597"/>
             <a:ext cx="479618" cy="369332"/>
           </a:xfrm>
           <a:prstGeom prst="rect">
@@ -21594,7 +22594,9 @@
           </a:solidFill>
           <a:ln w="28575">
             <a:solidFill>
-              <a:srgbClr val="C00000"/>
+              <a:schemeClr val="accent1">
+                <a:lumMod val="75000"/>
+              </a:schemeClr>
             </a:solidFill>
           </a:ln>
         </p:spPr>
@@ -21609,369 +22611,17 @@
                 <a:latin typeface="Arial" panose="020B0604020202020204" pitchFamily="34" charset="0"/>
                 <a:cs typeface="Arial" panose="020B0604020202020204" pitchFamily="34" charset="0"/>
               </a:rPr>
-              <a:t>H2</a:t>
-            </a:r>
-          </a:p>
-        </p:txBody>
-      </p:sp>
-      <p:sp>
-        <p:nvSpPr>
-          <p:cNvPr id="141" name="TextBox 140">
-            <a:extLst>
-              <a:ext uri="{FF2B5EF4-FFF2-40B4-BE49-F238E27FC236}">
-                <a16:creationId xmlns:a16="http://schemas.microsoft.com/office/drawing/2014/main" id="{28768F57-8B2B-8D86-DDA0-6963206DCDB4}"/>
-              </a:ext>
-            </a:extLst>
-          </p:cNvPr>
-          <p:cNvSpPr txBox="1"/>
-          <p:nvPr/>
-        </p:nvSpPr>
-        <p:spPr>
-          <a:xfrm>
-            <a:off x="15682024" y="4070823"/>
-            <a:ext cx="479618" cy="369332"/>
-          </a:xfrm>
-          <a:prstGeom prst="rect">
-            <a:avLst/>
-          </a:prstGeom>
-          <a:solidFill>
-            <a:schemeClr val="bg1"/>
-          </a:solidFill>
-          <a:ln w="28575">
-            <a:solidFill>
-              <a:srgbClr val="C00000"/>
-            </a:solidFill>
-          </a:ln>
-        </p:spPr>
-        <p:txBody>
-          <a:bodyPr wrap="none" rtlCol="0">
-            <a:spAutoFit/>
-          </a:bodyPr>
-          <a:lstStyle/>
-          <a:p>
-            <a:r>
-              <a:rPr lang="en-US" b="1" dirty="0">
-                <a:latin typeface="Arial" panose="020B0604020202020204" pitchFamily="34" charset="0"/>
-                <a:cs typeface="Arial" panose="020B0604020202020204" pitchFamily="34" charset="0"/>
-              </a:rPr>
               <a:t>H3</a:t>
-            </a:r>
-          </a:p>
-        </p:txBody>
-      </p:sp>
-      <p:sp>
-        <p:nvSpPr>
-          <p:cNvPr id="143" name="TextBox 142">
-            <a:extLst>
-              <a:ext uri="{FF2B5EF4-FFF2-40B4-BE49-F238E27FC236}">
-                <a16:creationId xmlns:a16="http://schemas.microsoft.com/office/drawing/2014/main" id="{FFAB9832-7D9C-F5F9-16D7-9D155076C833}"/>
-              </a:ext>
-            </a:extLst>
-          </p:cNvPr>
-          <p:cNvSpPr txBox="1"/>
-          <p:nvPr/>
-        </p:nvSpPr>
-        <p:spPr>
-          <a:xfrm>
-            <a:off x="15682024" y="6173881"/>
-            <a:ext cx="479618" cy="369332"/>
-          </a:xfrm>
-          <a:prstGeom prst="rect">
-            <a:avLst/>
-          </a:prstGeom>
-          <a:solidFill>
-            <a:schemeClr val="bg1"/>
-          </a:solidFill>
-          <a:ln w="28575">
-            <a:solidFill>
-              <a:srgbClr val="C00000"/>
-            </a:solidFill>
-          </a:ln>
-        </p:spPr>
-        <p:txBody>
-          <a:bodyPr wrap="none" rtlCol="0">
-            <a:spAutoFit/>
-          </a:bodyPr>
-          <a:lstStyle/>
-          <a:p>
-            <a:r>
-              <a:rPr lang="en-US" b="1" dirty="0">
-                <a:latin typeface="Arial" panose="020B0604020202020204" pitchFamily="34" charset="0"/>
-                <a:cs typeface="Arial" panose="020B0604020202020204" pitchFamily="34" charset="0"/>
-              </a:rPr>
-              <a:t>H3</a:t>
-            </a:r>
-          </a:p>
-        </p:txBody>
-      </p:sp>
-      <p:sp>
-        <p:nvSpPr>
-          <p:cNvPr id="144" name="TextBox 143">
-            <a:extLst>
-              <a:ext uri="{FF2B5EF4-FFF2-40B4-BE49-F238E27FC236}">
-                <a16:creationId xmlns:a16="http://schemas.microsoft.com/office/drawing/2014/main" id="{71AC475B-C838-37A8-E0A9-2BED6CB22CCF}"/>
-              </a:ext>
-            </a:extLst>
-          </p:cNvPr>
-          <p:cNvSpPr txBox="1"/>
-          <p:nvPr/>
-        </p:nvSpPr>
-        <p:spPr>
-          <a:xfrm>
-            <a:off x="10581651" y="4876825"/>
-            <a:ext cx="479618" cy="369332"/>
-          </a:xfrm>
-          <a:prstGeom prst="rect">
-            <a:avLst/>
-          </a:prstGeom>
-          <a:solidFill>
-            <a:schemeClr val="bg1"/>
-          </a:solidFill>
-          <a:ln w="28575">
-            <a:solidFill>
-              <a:schemeClr val="accent1">
-                <a:lumMod val="75000"/>
-              </a:schemeClr>
-            </a:solidFill>
-          </a:ln>
-        </p:spPr>
-        <p:txBody>
-          <a:bodyPr wrap="none" rtlCol="0">
-            <a:spAutoFit/>
-          </a:bodyPr>
-          <a:lstStyle/>
-          <a:p>
-            <a:r>
-              <a:rPr lang="en-US" b="1" dirty="0">
-                <a:latin typeface="Arial" panose="020B0604020202020204" pitchFamily="34" charset="0"/>
-                <a:cs typeface="Arial" panose="020B0604020202020204" pitchFamily="34" charset="0"/>
-              </a:rPr>
-              <a:t>H1</a:t>
-            </a:r>
-          </a:p>
-        </p:txBody>
-      </p:sp>
-      <p:sp>
-        <p:nvSpPr>
-          <p:cNvPr id="145" name="TextBox 144">
-            <a:extLst>
-              <a:ext uri="{FF2B5EF4-FFF2-40B4-BE49-F238E27FC236}">
-                <a16:creationId xmlns:a16="http://schemas.microsoft.com/office/drawing/2014/main" id="{F68FF02E-DFE4-2B16-F73C-064E2DFE0FF9}"/>
-              </a:ext>
-            </a:extLst>
-          </p:cNvPr>
-          <p:cNvSpPr txBox="1"/>
-          <p:nvPr/>
-        </p:nvSpPr>
-        <p:spPr>
-          <a:xfrm>
-            <a:off x="12288354" y="6172178"/>
-            <a:ext cx="479618" cy="369332"/>
-          </a:xfrm>
-          <a:prstGeom prst="rect">
-            <a:avLst/>
-          </a:prstGeom>
-          <a:solidFill>
-            <a:schemeClr val="bg1"/>
-          </a:solidFill>
-          <a:ln w="28575">
-            <a:solidFill>
-              <a:srgbClr val="C00000"/>
-            </a:solidFill>
-          </a:ln>
-        </p:spPr>
-        <p:txBody>
-          <a:bodyPr wrap="none" rtlCol="0">
-            <a:spAutoFit/>
-          </a:bodyPr>
-          <a:lstStyle/>
-          <a:p>
-            <a:r>
-              <a:rPr lang="en-US" b="1" dirty="0">
-                <a:latin typeface="Arial" panose="020B0604020202020204" pitchFamily="34" charset="0"/>
-                <a:cs typeface="Arial" panose="020B0604020202020204" pitchFamily="34" charset="0"/>
-              </a:rPr>
-              <a:t>H1</a:t>
-            </a:r>
-          </a:p>
-        </p:txBody>
-      </p:sp>
-      <p:sp>
-        <p:nvSpPr>
-          <p:cNvPr id="146" name="TextBox 145">
-            <a:extLst>
-              <a:ext uri="{FF2B5EF4-FFF2-40B4-BE49-F238E27FC236}">
-                <a16:creationId xmlns:a16="http://schemas.microsoft.com/office/drawing/2014/main" id="{4B2EF288-2533-330B-F289-11D3DF53A9E3}"/>
-              </a:ext>
-            </a:extLst>
-          </p:cNvPr>
-          <p:cNvSpPr txBox="1"/>
-          <p:nvPr/>
-        </p:nvSpPr>
-        <p:spPr>
-          <a:xfrm>
-            <a:off x="18804055" y="3969660"/>
-            <a:ext cx="479618" cy="369332"/>
-          </a:xfrm>
-          <a:prstGeom prst="rect">
-            <a:avLst/>
-          </a:prstGeom>
-          <a:solidFill>
-            <a:schemeClr val="bg1"/>
-          </a:solidFill>
-          <a:ln w="28575">
-            <a:solidFill>
-              <a:schemeClr val="accent1">
-                <a:lumMod val="75000"/>
-              </a:schemeClr>
-            </a:solidFill>
-          </a:ln>
-        </p:spPr>
-        <p:txBody>
-          <a:bodyPr wrap="none" rtlCol="0">
-            <a:spAutoFit/>
-          </a:bodyPr>
-          <a:lstStyle/>
-          <a:p>
-            <a:r>
-              <a:rPr lang="en-US" b="1" dirty="0">
-                <a:latin typeface="Arial" panose="020B0604020202020204" pitchFamily="34" charset="0"/>
-                <a:cs typeface="Arial" panose="020B0604020202020204" pitchFamily="34" charset="0"/>
-              </a:rPr>
-              <a:t>H3</a:t>
-            </a:r>
-          </a:p>
-        </p:txBody>
-      </p:sp>
-      <p:sp>
-        <p:nvSpPr>
-          <p:cNvPr id="147" name="TextBox 146">
-            <a:extLst>
-              <a:ext uri="{FF2B5EF4-FFF2-40B4-BE49-F238E27FC236}">
-                <a16:creationId xmlns:a16="http://schemas.microsoft.com/office/drawing/2014/main" id="{A14A4B19-A9E7-ABD1-65B4-BCC6D4C86AE2}"/>
-              </a:ext>
-            </a:extLst>
-          </p:cNvPr>
-          <p:cNvSpPr txBox="1"/>
-          <p:nvPr/>
-        </p:nvSpPr>
-        <p:spPr>
-          <a:xfrm>
-            <a:off x="18804055" y="6232473"/>
-            <a:ext cx="479618" cy="369332"/>
-          </a:xfrm>
-          <a:prstGeom prst="rect">
-            <a:avLst/>
-          </a:prstGeom>
-          <a:solidFill>
-            <a:schemeClr val="bg1"/>
-          </a:solidFill>
-          <a:ln w="28575">
-            <a:solidFill>
-              <a:schemeClr val="accent1">
-                <a:lumMod val="75000"/>
-              </a:schemeClr>
-            </a:solidFill>
-          </a:ln>
-        </p:spPr>
-        <p:txBody>
-          <a:bodyPr wrap="none" rtlCol="0">
-            <a:spAutoFit/>
-          </a:bodyPr>
-          <a:lstStyle/>
-          <a:p>
-            <a:r>
-              <a:rPr lang="en-US" b="1" dirty="0">
-                <a:latin typeface="Arial" panose="020B0604020202020204" pitchFamily="34" charset="0"/>
-                <a:cs typeface="Arial" panose="020B0604020202020204" pitchFamily="34" charset="0"/>
-              </a:rPr>
-              <a:t>H3</a:t>
-            </a:r>
-          </a:p>
-        </p:txBody>
-      </p:sp>
-      <p:sp>
-        <p:nvSpPr>
-          <p:cNvPr id="149" name="TextBox 148">
-            <a:extLst>
-              <a:ext uri="{FF2B5EF4-FFF2-40B4-BE49-F238E27FC236}">
-                <a16:creationId xmlns:a16="http://schemas.microsoft.com/office/drawing/2014/main" id="{D8D6FF3E-9BC1-6885-3818-081674D7A9BB}"/>
-              </a:ext>
-            </a:extLst>
-          </p:cNvPr>
-          <p:cNvSpPr txBox="1"/>
-          <p:nvPr/>
-        </p:nvSpPr>
-        <p:spPr>
-          <a:xfrm>
-            <a:off x="6821334" y="1362220"/>
-            <a:ext cx="813043" cy="707886"/>
-          </a:xfrm>
-          <a:prstGeom prst="rect">
-            <a:avLst/>
-          </a:prstGeom>
-          <a:noFill/>
-        </p:spPr>
-        <p:txBody>
-          <a:bodyPr wrap="none" rtlCol="0">
-            <a:spAutoFit/>
-          </a:bodyPr>
-          <a:lstStyle/>
-          <a:p>
-            <a:r>
-              <a:rPr lang="en-US" sz="4000" dirty="0">
-                <a:latin typeface="Arial" panose="020B0604020202020204" pitchFamily="34" charset="0"/>
-                <a:cs typeface="Arial" panose="020B0604020202020204" pitchFamily="34" charset="0"/>
-              </a:rPr>
-              <a:t>(a)</a:t>
-            </a:r>
-          </a:p>
-        </p:txBody>
-      </p:sp>
-      <p:sp>
-        <p:nvSpPr>
-          <p:cNvPr id="151" name="TextBox 150">
-            <a:extLst>
-              <a:ext uri="{FF2B5EF4-FFF2-40B4-BE49-F238E27FC236}">
-                <a16:creationId xmlns:a16="http://schemas.microsoft.com/office/drawing/2014/main" id="{A3BBA8C7-956C-159A-EBA5-AB354F4F9504}"/>
-              </a:ext>
-            </a:extLst>
-          </p:cNvPr>
-          <p:cNvSpPr txBox="1"/>
-          <p:nvPr/>
-        </p:nvSpPr>
-        <p:spPr>
-          <a:xfrm>
-            <a:off x="6821334" y="8194814"/>
-            <a:ext cx="813043" cy="707886"/>
-          </a:xfrm>
-          <a:prstGeom prst="rect">
-            <a:avLst/>
-          </a:prstGeom>
-          <a:noFill/>
-        </p:spPr>
-        <p:txBody>
-          <a:bodyPr wrap="none" rtlCol="0">
-            <a:spAutoFit/>
-          </a:bodyPr>
-          <a:lstStyle/>
-          <a:p>
-            <a:r>
-              <a:rPr lang="en-US" sz="4000" dirty="0">
-                <a:latin typeface="Arial" panose="020B0604020202020204" pitchFamily="34" charset="0"/>
-                <a:cs typeface="Arial" panose="020B0604020202020204" pitchFamily="34" charset="0"/>
-              </a:rPr>
-              <a:t>(b)</a:t>
             </a:r>
           </a:p>
         </p:txBody>
       </p:sp>
       <p:grpSp>
         <p:nvGrpSpPr>
-          <p:cNvPr id="30" name="Group 29">
-            <a:extLst>
-              <a:ext uri="{FF2B5EF4-FFF2-40B4-BE49-F238E27FC236}">
-                <a16:creationId xmlns:a16="http://schemas.microsoft.com/office/drawing/2014/main" id="{93C33AF3-CBA8-7C36-3976-1D7F61EA9A8E}"/>
+          <p:cNvPr id="177" name="Group 176">
+            <a:extLst>
+              <a:ext uri="{FF2B5EF4-FFF2-40B4-BE49-F238E27FC236}">
+                <a16:creationId xmlns:a16="http://schemas.microsoft.com/office/drawing/2014/main" id="{50A2EFEC-1F00-282F-EF57-E586F4E4A6C5}"/>
               </a:ext>
             </a:extLst>
           </p:cNvPr>
@@ -21980,7 +22630,7 @@
         </p:nvGrpSpPr>
         <p:grpSpPr>
           <a:xfrm>
-            <a:off x="13961975" y="7200077"/>
+            <a:off x="14248407" y="7053509"/>
             <a:ext cx="2561532" cy="853440"/>
             <a:chOff x="14336889" y="10167639"/>
             <a:chExt cx="2561532" cy="853440"/>
@@ -21988,10 +22638,10 @@
         </p:grpSpPr>
         <p:cxnSp>
           <p:nvCxnSpPr>
-            <p:cNvPr id="128" name="Straight Arrow Connector 127">
+            <p:cNvPr id="178" name="Straight Arrow Connector 177">
               <a:extLst>
                 <a:ext uri="{FF2B5EF4-FFF2-40B4-BE49-F238E27FC236}">
-                  <a16:creationId xmlns:a16="http://schemas.microsoft.com/office/drawing/2014/main" id="{5BC5ECCF-1D36-3A07-3254-880CF2C608FB}"/>
+                  <a16:creationId xmlns:a16="http://schemas.microsoft.com/office/drawing/2014/main" id="{706B4CB6-85CC-D8B1-8A08-FD03090C5E51}"/>
                 </a:ext>
               </a:extLst>
             </p:cNvPr>
@@ -22032,10 +22682,10 @@
         </p:cxnSp>
         <p:sp>
           <p:nvSpPr>
-            <p:cNvPr id="130" name="TextBox 129">
+            <p:cNvPr id="179" name="TextBox 178">
               <a:extLst>
                 <a:ext uri="{FF2B5EF4-FFF2-40B4-BE49-F238E27FC236}">
-                  <a16:creationId xmlns:a16="http://schemas.microsoft.com/office/drawing/2014/main" id="{31C83831-0446-0835-8397-8EFDF52FC991}"/>
+                  <a16:creationId xmlns:a16="http://schemas.microsoft.com/office/drawing/2014/main" id="{82617127-1DE6-B2EC-ADA5-33AA0094252A}"/>
                 </a:ext>
               </a:extLst>
             </p:cNvPr>
@@ -22070,10 +22720,10 @@
         </p:sp>
         <p:cxnSp>
           <p:nvCxnSpPr>
-            <p:cNvPr id="131" name="Straight Arrow Connector 130">
+            <p:cNvPr id="180" name="Straight Arrow Connector 179">
               <a:extLst>
                 <a:ext uri="{FF2B5EF4-FFF2-40B4-BE49-F238E27FC236}">
-                  <a16:creationId xmlns:a16="http://schemas.microsoft.com/office/drawing/2014/main" id="{68C4E9B3-A6D4-4357-6E1A-B9C2F9852D42}"/>
+                  <a16:creationId xmlns:a16="http://schemas.microsoft.com/office/drawing/2014/main" id="{4F5B8043-2A97-CDCE-E82D-3DDB1283DC8A}"/>
                 </a:ext>
               </a:extLst>
             </p:cNvPr>
@@ -22092,7 +22742,8 @@
               <a:solidFill>
                 <a:srgbClr val="C00000"/>
               </a:solidFill>
-              <a:tailEnd type="triangle"/>
+              <a:headEnd type="oval" w="med" len="med"/>
+              <a:tailEnd type="triangle" w="med" len="med"/>
             </a:ln>
           </p:spPr>
           <p:style>
@@ -22112,10 +22763,10 @@
         </p:cxnSp>
         <p:sp>
           <p:nvSpPr>
-            <p:cNvPr id="132" name="TextBox 131">
+            <p:cNvPr id="181" name="TextBox 180">
               <a:extLst>
                 <a:ext uri="{FF2B5EF4-FFF2-40B4-BE49-F238E27FC236}">
-                  <a16:creationId xmlns:a16="http://schemas.microsoft.com/office/drawing/2014/main" id="{88580F84-16DB-9D98-C76F-354460E28EA1}"/>
+                  <a16:creationId xmlns:a16="http://schemas.microsoft.com/office/drawing/2014/main" id="{2FEBB8C8-1F20-D8A9-5126-685ACE0C390F}"/>
                 </a:ext>
               </a:extLst>
             </p:cNvPr>
@@ -22150,10 +22801,10 @@
         </p:sp>
         <p:sp>
           <p:nvSpPr>
-            <p:cNvPr id="133" name="Rectangle 132">
+            <p:cNvPr id="182" name="Rectangle 181">
               <a:extLst>
                 <a:ext uri="{FF2B5EF4-FFF2-40B4-BE49-F238E27FC236}">
-                  <a16:creationId xmlns:a16="http://schemas.microsoft.com/office/drawing/2014/main" id="{EF25A1EB-5BC4-E0B7-1C89-07CAA4C653A3}"/>
+                  <a16:creationId xmlns:a16="http://schemas.microsoft.com/office/drawing/2014/main" id="{31E9E510-78F9-3CCA-8BC5-DC2CA3162347}"/>
                 </a:ext>
               </a:extLst>
             </p:cNvPr>
@@ -22201,12 +22852,624 @@
           </p:txBody>
         </p:sp>
       </p:grpSp>
+      <p:sp>
+        <p:nvSpPr>
+          <p:cNvPr id="183" name="Oval 182">
+            <a:extLst>
+              <a:ext uri="{FF2B5EF4-FFF2-40B4-BE49-F238E27FC236}">
+                <a16:creationId xmlns:a16="http://schemas.microsoft.com/office/drawing/2014/main" id="{47C42099-500A-2471-9107-7A329C928DF0}"/>
+              </a:ext>
+            </a:extLst>
+          </p:cNvPr>
+          <p:cNvSpPr>
+            <a:spLocks noChangeAspect="1"/>
+          </p:cNvSpPr>
+          <p:nvPr/>
+        </p:nvSpPr>
+        <p:spPr>
+          <a:xfrm>
+            <a:off x="12278782" y="4007318"/>
+            <a:ext cx="486059" cy="486059"/>
+          </a:xfrm>
+          <a:prstGeom prst="ellipse">
+            <a:avLst/>
+          </a:prstGeom>
+          <a:solidFill>
+            <a:schemeClr val="bg1"/>
+          </a:solidFill>
+          <a:ln w="28575">
+            <a:solidFill>
+              <a:srgbClr val="C00000"/>
+            </a:solidFill>
+          </a:ln>
+        </p:spPr>
+        <p:style>
+          <a:lnRef idx="2">
+            <a:schemeClr val="accent1">
+              <a:shade val="15000"/>
+            </a:schemeClr>
+          </a:lnRef>
+          <a:fillRef idx="1">
+            <a:schemeClr val="accent1"/>
+          </a:fillRef>
+          <a:effectRef idx="0">
+            <a:schemeClr val="accent1"/>
+          </a:effectRef>
+          <a:fontRef idx="minor">
+            <a:schemeClr val="lt1"/>
+          </a:fontRef>
+        </p:style>
+        <p:txBody>
+          <a:bodyPr rtlCol="0" anchor="ctr"/>
+          <a:lstStyle/>
+          <a:p>
+            <a:endParaRPr lang="en-US" b="1" dirty="0">
+              <a:solidFill>
+                <a:schemeClr val="tx1"/>
+              </a:solidFill>
+              <a:latin typeface="Arial" panose="020B0604020202020204" pitchFamily="34" charset="0"/>
+              <a:cs typeface="Arial" panose="020B0604020202020204" pitchFamily="34" charset="0"/>
+            </a:endParaRPr>
+          </a:p>
+        </p:txBody>
+      </p:sp>
+      <p:sp>
+        <p:nvSpPr>
+          <p:cNvPr id="184" name="TextBox 183">
+            <a:extLst>
+              <a:ext uri="{FF2B5EF4-FFF2-40B4-BE49-F238E27FC236}">
+                <a16:creationId xmlns:a16="http://schemas.microsoft.com/office/drawing/2014/main" id="{61E11CA4-C0EC-1507-5882-106FE5197985}"/>
+              </a:ext>
+            </a:extLst>
+          </p:cNvPr>
+          <p:cNvSpPr txBox="1"/>
+          <p:nvPr/>
+        </p:nvSpPr>
+        <p:spPr>
+          <a:xfrm>
+            <a:off x="12285223" y="4065681"/>
+            <a:ext cx="479618" cy="369332"/>
+          </a:xfrm>
+          <a:prstGeom prst="rect">
+            <a:avLst/>
+          </a:prstGeom>
+          <a:noFill/>
+          <a:ln w="28575">
+            <a:noFill/>
+          </a:ln>
+        </p:spPr>
+        <p:txBody>
+          <a:bodyPr wrap="none" rtlCol="0">
+            <a:spAutoFit/>
+          </a:bodyPr>
+          <a:lstStyle/>
+          <a:p>
+            <a:r>
+              <a:rPr lang="en-US" b="1" dirty="0">
+                <a:latin typeface="Arial" panose="020B0604020202020204" pitchFamily="34" charset="0"/>
+                <a:cs typeface="Arial" panose="020B0604020202020204" pitchFamily="34" charset="0"/>
+              </a:rPr>
+              <a:t>H1</a:t>
+            </a:r>
+          </a:p>
+        </p:txBody>
+      </p:sp>
+      <p:sp>
+        <p:nvSpPr>
+          <p:cNvPr id="185" name="Oval 184">
+            <a:extLst>
+              <a:ext uri="{FF2B5EF4-FFF2-40B4-BE49-F238E27FC236}">
+                <a16:creationId xmlns:a16="http://schemas.microsoft.com/office/drawing/2014/main" id="{7F7183B4-F0DA-CCB8-F6F2-CEF46D61B5E4}"/>
+              </a:ext>
+            </a:extLst>
+          </p:cNvPr>
+          <p:cNvSpPr>
+            <a:spLocks noChangeAspect="1"/>
+          </p:cNvSpPr>
+          <p:nvPr/>
+        </p:nvSpPr>
+        <p:spPr>
+          <a:xfrm>
+            <a:off x="10563250" y="5322602"/>
+            <a:ext cx="486059" cy="486059"/>
+          </a:xfrm>
+          <a:prstGeom prst="ellipse">
+            <a:avLst/>
+          </a:prstGeom>
+          <a:solidFill>
+            <a:schemeClr val="bg1"/>
+          </a:solidFill>
+          <a:ln w="28575">
+            <a:solidFill>
+              <a:srgbClr val="C00000"/>
+            </a:solidFill>
+          </a:ln>
+        </p:spPr>
+        <p:style>
+          <a:lnRef idx="2">
+            <a:schemeClr val="accent1">
+              <a:shade val="15000"/>
+            </a:schemeClr>
+          </a:lnRef>
+          <a:fillRef idx="1">
+            <a:schemeClr val="accent1"/>
+          </a:fillRef>
+          <a:effectRef idx="0">
+            <a:schemeClr val="accent1"/>
+          </a:effectRef>
+          <a:fontRef idx="minor">
+            <a:schemeClr val="lt1"/>
+          </a:fontRef>
+        </p:style>
+        <p:txBody>
+          <a:bodyPr rtlCol="0" anchor="ctr"/>
+          <a:lstStyle/>
+          <a:p>
+            <a:endParaRPr lang="en-US" b="1" dirty="0">
+              <a:solidFill>
+                <a:schemeClr val="tx1"/>
+              </a:solidFill>
+              <a:latin typeface="Arial" panose="020B0604020202020204" pitchFamily="34" charset="0"/>
+              <a:cs typeface="Arial" panose="020B0604020202020204" pitchFamily="34" charset="0"/>
+            </a:endParaRPr>
+          </a:p>
+        </p:txBody>
+      </p:sp>
+      <p:sp>
+        <p:nvSpPr>
+          <p:cNvPr id="186" name="TextBox 185">
+            <a:extLst>
+              <a:ext uri="{FF2B5EF4-FFF2-40B4-BE49-F238E27FC236}">
+                <a16:creationId xmlns:a16="http://schemas.microsoft.com/office/drawing/2014/main" id="{E8BB0001-B044-E332-C992-5BD5B39CCCD7}"/>
+              </a:ext>
+            </a:extLst>
+          </p:cNvPr>
+          <p:cNvSpPr txBox="1"/>
+          <p:nvPr/>
+        </p:nvSpPr>
+        <p:spPr>
+          <a:xfrm>
+            <a:off x="10566742" y="5380965"/>
+            <a:ext cx="479618" cy="369332"/>
+          </a:xfrm>
+          <a:prstGeom prst="rect">
+            <a:avLst/>
+          </a:prstGeom>
+          <a:noFill/>
+          <a:ln w="28575">
+            <a:noFill/>
+          </a:ln>
+        </p:spPr>
+        <p:txBody>
+          <a:bodyPr wrap="none" rtlCol="0">
+            <a:spAutoFit/>
+          </a:bodyPr>
+          <a:lstStyle/>
+          <a:p>
+            <a:r>
+              <a:rPr lang="en-US" b="1" dirty="0">
+                <a:latin typeface="Arial" panose="020B0604020202020204" pitchFamily="34" charset="0"/>
+                <a:cs typeface="Arial" panose="020B0604020202020204" pitchFamily="34" charset="0"/>
+              </a:rPr>
+              <a:t>H1</a:t>
+            </a:r>
+          </a:p>
+        </p:txBody>
+      </p:sp>
+      <p:sp>
+        <p:nvSpPr>
+          <p:cNvPr id="187" name="Oval 186">
+            <a:extLst>
+              <a:ext uri="{FF2B5EF4-FFF2-40B4-BE49-F238E27FC236}">
+                <a16:creationId xmlns:a16="http://schemas.microsoft.com/office/drawing/2014/main" id="{038A42CC-9D71-75DF-8030-595C2B1C7536}"/>
+              </a:ext>
+            </a:extLst>
+          </p:cNvPr>
+          <p:cNvSpPr>
+            <a:spLocks noChangeAspect="1"/>
+          </p:cNvSpPr>
+          <p:nvPr/>
+        </p:nvSpPr>
+        <p:spPr>
+          <a:xfrm>
+            <a:off x="12275290" y="6077254"/>
+            <a:ext cx="486059" cy="486059"/>
+          </a:xfrm>
+          <a:prstGeom prst="ellipse">
+            <a:avLst/>
+          </a:prstGeom>
+          <a:solidFill>
+            <a:schemeClr val="bg1"/>
+          </a:solidFill>
+          <a:ln w="28575">
+            <a:solidFill>
+              <a:srgbClr val="C00000"/>
+            </a:solidFill>
+          </a:ln>
+        </p:spPr>
+        <p:style>
+          <a:lnRef idx="2">
+            <a:schemeClr val="accent1">
+              <a:shade val="15000"/>
+            </a:schemeClr>
+          </a:lnRef>
+          <a:fillRef idx="1">
+            <a:schemeClr val="accent1"/>
+          </a:fillRef>
+          <a:effectRef idx="0">
+            <a:schemeClr val="accent1"/>
+          </a:effectRef>
+          <a:fontRef idx="minor">
+            <a:schemeClr val="lt1"/>
+          </a:fontRef>
+        </p:style>
+        <p:txBody>
+          <a:bodyPr rtlCol="0" anchor="ctr"/>
+          <a:lstStyle/>
+          <a:p>
+            <a:endParaRPr lang="en-US" b="1" dirty="0">
+              <a:solidFill>
+                <a:schemeClr val="tx1"/>
+              </a:solidFill>
+              <a:latin typeface="Arial" panose="020B0604020202020204" pitchFamily="34" charset="0"/>
+              <a:cs typeface="Arial" panose="020B0604020202020204" pitchFamily="34" charset="0"/>
+            </a:endParaRPr>
+          </a:p>
+        </p:txBody>
+      </p:sp>
+      <p:sp>
+        <p:nvSpPr>
+          <p:cNvPr id="188" name="TextBox 187">
+            <a:extLst>
+              <a:ext uri="{FF2B5EF4-FFF2-40B4-BE49-F238E27FC236}">
+                <a16:creationId xmlns:a16="http://schemas.microsoft.com/office/drawing/2014/main" id="{7E92C635-679B-ABE6-8A67-9EEF43E56281}"/>
+              </a:ext>
+            </a:extLst>
+          </p:cNvPr>
+          <p:cNvSpPr txBox="1"/>
+          <p:nvPr/>
+        </p:nvSpPr>
+        <p:spPr>
+          <a:xfrm>
+            <a:off x="12278782" y="6135617"/>
+            <a:ext cx="479618" cy="369332"/>
+          </a:xfrm>
+          <a:prstGeom prst="rect">
+            <a:avLst/>
+          </a:prstGeom>
+          <a:noFill/>
+          <a:ln w="28575">
+            <a:noFill/>
+          </a:ln>
+        </p:spPr>
+        <p:txBody>
+          <a:bodyPr wrap="none" rtlCol="0">
+            <a:spAutoFit/>
+          </a:bodyPr>
+          <a:lstStyle/>
+          <a:p>
+            <a:r>
+              <a:rPr lang="en-US" b="1" dirty="0">
+                <a:latin typeface="Arial" panose="020B0604020202020204" pitchFamily="34" charset="0"/>
+                <a:cs typeface="Arial" panose="020B0604020202020204" pitchFamily="34" charset="0"/>
+              </a:rPr>
+              <a:t>H1</a:t>
+            </a:r>
+          </a:p>
+        </p:txBody>
+      </p:sp>
+      <p:sp>
+        <p:nvSpPr>
+          <p:cNvPr id="189" name="Oval 188">
+            <a:extLst>
+              <a:ext uri="{FF2B5EF4-FFF2-40B4-BE49-F238E27FC236}">
+                <a16:creationId xmlns:a16="http://schemas.microsoft.com/office/drawing/2014/main" id="{89D61A4C-7730-2089-4036-1D56AAECD389}"/>
+              </a:ext>
+            </a:extLst>
+          </p:cNvPr>
+          <p:cNvSpPr>
+            <a:spLocks noChangeAspect="1"/>
+          </p:cNvSpPr>
+          <p:nvPr/>
+        </p:nvSpPr>
+        <p:spPr>
+          <a:xfrm>
+            <a:off x="14515463" y="4007318"/>
+            <a:ext cx="486059" cy="486059"/>
+          </a:xfrm>
+          <a:prstGeom prst="ellipse">
+            <a:avLst/>
+          </a:prstGeom>
+          <a:solidFill>
+            <a:schemeClr val="bg1"/>
+          </a:solidFill>
+          <a:ln w="28575">
+            <a:solidFill>
+              <a:srgbClr val="C00000"/>
+            </a:solidFill>
+          </a:ln>
+        </p:spPr>
+        <p:style>
+          <a:lnRef idx="2">
+            <a:schemeClr val="accent1">
+              <a:shade val="15000"/>
+            </a:schemeClr>
+          </a:lnRef>
+          <a:fillRef idx="1">
+            <a:schemeClr val="accent1"/>
+          </a:fillRef>
+          <a:effectRef idx="0">
+            <a:schemeClr val="accent1"/>
+          </a:effectRef>
+          <a:fontRef idx="minor">
+            <a:schemeClr val="lt1"/>
+          </a:fontRef>
+        </p:style>
+        <p:txBody>
+          <a:bodyPr rtlCol="0" anchor="ctr"/>
+          <a:lstStyle/>
+          <a:p>
+            <a:endParaRPr lang="en-US" b="1" dirty="0">
+              <a:solidFill>
+                <a:schemeClr val="tx1"/>
+              </a:solidFill>
+              <a:latin typeface="Arial" panose="020B0604020202020204" pitchFamily="34" charset="0"/>
+              <a:cs typeface="Arial" panose="020B0604020202020204" pitchFamily="34" charset="0"/>
+            </a:endParaRPr>
+          </a:p>
+        </p:txBody>
+      </p:sp>
+      <p:sp>
+        <p:nvSpPr>
+          <p:cNvPr id="190" name="TextBox 189">
+            <a:extLst>
+              <a:ext uri="{FF2B5EF4-FFF2-40B4-BE49-F238E27FC236}">
+                <a16:creationId xmlns:a16="http://schemas.microsoft.com/office/drawing/2014/main" id="{3DB2B6AE-0B57-3839-0492-852F9192C13A}"/>
+              </a:ext>
+            </a:extLst>
+          </p:cNvPr>
+          <p:cNvSpPr txBox="1"/>
+          <p:nvPr/>
+        </p:nvSpPr>
+        <p:spPr>
+          <a:xfrm>
+            <a:off x="14518955" y="4065681"/>
+            <a:ext cx="479618" cy="369332"/>
+          </a:xfrm>
+          <a:prstGeom prst="rect">
+            <a:avLst/>
+          </a:prstGeom>
+          <a:noFill/>
+          <a:ln w="28575">
+            <a:noFill/>
+          </a:ln>
+        </p:spPr>
+        <p:txBody>
+          <a:bodyPr wrap="none" rtlCol="0">
+            <a:spAutoFit/>
+          </a:bodyPr>
+          <a:lstStyle/>
+          <a:p>
+            <a:r>
+              <a:rPr lang="en-US" b="1" dirty="0">
+                <a:latin typeface="Arial" panose="020B0604020202020204" pitchFamily="34" charset="0"/>
+                <a:cs typeface="Arial" panose="020B0604020202020204" pitchFamily="34" charset="0"/>
+              </a:rPr>
+              <a:t>H2</a:t>
+            </a:r>
+          </a:p>
+        </p:txBody>
+      </p:sp>
+      <p:sp>
+        <p:nvSpPr>
+          <p:cNvPr id="191" name="Oval 190">
+            <a:extLst>
+              <a:ext uri="{FF2B5EF4-FFF2-40B4-BE49-F238E27FC236}">
+                <a16:creationId xmlns:a16="http://schemas.microsoft.com/office/drawing/2014/main" id="{4D3C0917-54AC-502F-006B-EC94186BD315}"/>
+              </a:ext>
+            </a:extLst>
+          </p:cNvPr>
+          <p:cNvSpPr>
+            <a:spLocks noChangeAspect="1"/>
+          </p:cNvSpPr>
+          <p:nvPr/>
+        </p:nvSpPr>
+        <p:spPr>
+          <a:xfrm>
+            <a:off x="15720983" y="4006663"/>
+            <a:ext cx="486059" cy="486059"/>
+          </a:xfrm>
+          <a:prstGeom prst="ellipse">
+            <a:avLst/>
+          </a:prstGeom>
+          <a:solidFill>
+            <a:schemeClr val="bg1"/>
+          </a:solidFill>
+          <a:ln w="28575">
+            <a:solidFill>
+              <a:srgbClr val="C00000"/>
+            </a:solidFill>
+          </a:ln>
+        </p:spPr>
+        <p:style>
+          <a:lnRef idx="2">
+            <a:schemeClr val="accent1">
+              <a:shade val="15000"/>
+            </a:schemeClr>
+          </a:lnRef>
+          <a:fillRef idx="1">
+            <a:schemeClr val="accent1"/>
+          </a:fillRef>
+          <a:effectRef idx="0">
+            <a:schemeClr val="accent1"/>
+          </a:effectRef>
+          <a:fontRef idx="minor">
+            <a:schemeClr val="lt1"/>
+          </a:fontRef>
+        </p:style>
+        <p:txBody>
+          <a:bodyPr rtlCol="0" anchor="ctr"/>
+          <a:lstStyle/>
+          <a:p>
+            <a:endParaRPr lang="en-US" b="1" dirty="0">
+              <a:solidFill>
+                <a:schemeClr val="tx1"/>
+              </a:solidFill>
+              <a:latin typeface="Arial" panose="020B0604020202020204" pitchFamily="34" charset="0"/>
+              <a:cs typeface="Arial" panose="020B0604020202020204" pitchFamily="34" charset="0"/>
+            </a:endParaRPr>
+          </a:p>
+        </p:txBody>
+      </p:sp>
+      <p:sp>
+        <p:nvSpPr>
+          <p:cNvPr id="192" name="TextBox 191">
+            <a:extLst>
+              <a:ext uri="{FF2B5EF4-FFF2-40B4-BE49-F238E27FC236}">
+                <a16:creationId xmlns:a16="http://schemas.microsoft.com/office/drawing/2014/main" id="{3FC38C7F-30D2-7B34-629D-12B4020CBE36}"/>
+              </a:ext>
+            </a:extLst>
+          </p:cNvPr>
+          <p:cNvSpPr txBox="1"/>
+          <p:nvPr/>
+        </p:nvSpPr>
+        <p:spPr>
+          <a:xfrm>
+            <a:off x="15724475" y="4065026"/>
+            <a:ext cx="479618" cy="369332"/>
+          </a:xfrm>
+          <a:prstGeom prst="rect">
+            <a:avLst/>
+          </a:prstGeom>
+          <a:noFill/>
+          <a:ln w="28575">
+            <a:noFill/>
+          </a:ln>
+        </p:spPr>
+        <p:txBody>
+          <a:bodyPr wrap="none" rtlCol="0">
+            <a:spAutoFit/>
+          </a:bodyPr>
+          <a:lstStyle/>
+          <a:p>
+            <a:r>
+              <a:rPr lang="en-US" b="1" dirty="0">
+                <a:latin typeface="Arial" panose="020B0604020202020204" pitchFamily="34" charset="0"/>
+                <a:cs typeface="Arial" panose="020B0604020202020204" pitchFamily="34" charset="0"/>
+              </a:rPr>
+              <a:t>H3</a:t>
+            </a:r>
+          </a:p>
+        </p:txBody>
+      </p:sp>
+      <p:sp>
+        <p:nvSpPr>
+          <p:cNvPr id="193" name="Oval 192">
+            <a:extLst>
+              <a:ext uri="{FF2B5EF4-FFF2-40B4-BE49-F238E27FC236}">
+                <a16:creationId xmlns:a16="http://schemas.microsoft.com/office/drawing/2014/main" id="{666B9ECB-18F0-AAAF-7606-00E223125031}"/>
+              </a:ext>
+            </a:extLst>
+          </p:cNvPr>
+          <p:cNvSpPr>
+            <a:spLocks noChangeAspect="1"/>
+          </p:cNvSpPr>
+          <p:nvPr/>
+        </p:nvSpPr>
+        <p:spPr>
+          <a:xfrm>
+            <a:off x="15713980" y="6100307"/>
+            <a:ext cx="486059" cy="486059"/>
+          </a:xfrm>
+          <a:prstGeom prst="ellipse">
+            <a:avLst/>
+          </a:prstGeom>
+          <a:solidFill>
+            <a:schemeClr val="bg1"/>
+          </a:solidFill>
+          <a:ln w="28575">
+            <a:solidFill>
+              <a:srgbClr val="C00000"/>
+            </a:solidFill>
+          </a:ln>
+        </p:spPr>
+        <p:style>
+          <a:lnRef idx="2">
+            <a:schemeClr val="accent1">
+              <a:shade val="15000"/>
+            </a:schemeClr>
+          </a:lnRef>
+          <a:fillRef idx="1">
+            <a:schemeClr val="accent1"/>
+          </a:fillRef>
+          <a:effectRef idx="0">
+            <a:schemeClr val="accent1"/>
+          </a:effectRef>
+          <a:fontRef idx="minor">
+            <a:schemeClr val="lt1"/>
+          </a:fontRef>
+        </p:style>
+        <p:txBody>
+          <a:bodyPr rtlCol="0" anchor="ctr"/>
+          <a:lstStyle/>
+          <a:p>
+            <a:endParaRPr lang="en-US" b="1" dirty="0">
+              <a:solidFill>
+                <a:schemeClr val="tx1"/>
+              </a:solidFill>
+              <a:latin typeface="Arial" panose="020B0604020202020204" pitchFamily="34" charset="0"/>
+              <a:cs typeface="Arial" panose="020B0604020202020204" pitchFamily="34" charset="0"/>
+            </a:endParaRPr>
+          </a:p>
+        </p:txBody>
+      </p:sp>
+      <p:sp>
+        <p:nvSpPr>
+          <p:cNvPr id="194" name="TextBox 193">
+            <a:extLst>
+              <a:ext uri="{FF2B5EF4-FFF2-40B4-BE49-F238E27FC236}">
+                <a16:creationId xmlns:a16="http://schemas.microsoft.com/office/drawing/2014/main" id="{6D3A4488-32A5-CC14-6C03-CFC6E1696E96}"/>
+              </a:ext>
+            </a:extLst>
+          </p:cNvPr>
+          <p:cNvSpPr txBox="1"/>
+          <p:nvPr/>
+        </p:nvSpPr>
+        <p:spPr>
+          <a:xfrm>
+            <a:off x="15717472" y="6158670"/>
+            <a:ext cx="479618" cy="369332"/>
+          </a:xfrm>
+          <a:prstGeom prst="rect">
+            <a:avLst/>
+          </a:prstGeom>
+          <a:noFill/>
+          <a:ln w="28575">
+            <a:noFill/>
+          </a:ln>
+        </p:spPr>
+        <p:txBody>
+          <a:bodyPr wrap="none" rtlCol="0">
+            <a:spAutoFit/>
+          </a:bodyPr>
+          <a:lstStyle/>
+          <a:p>
+            <a:r>
+              <a:rPr lang="en-US" b="1" dirty="0">
+                <a:latin typeface="Arial" panose="020B0604020202020204" pitchFamily="34" charset="0"/>
+                <a:cs typeface="Arial" panose="020B0604020202020204" pitchFamily="34" charset="0"/>
+              </a:rPr>
+              <a:t>H3</a:t>
+            </a:r>
+          </a:p>
+        </p:txBody>
+      </p:sp>
       <p:cxnSp>
         <p:nvCxnSpPr>
-          <p:cNvPr id="31" name="Elbow Connector 30">
-            <a:extLst>
-              <a:ext uri="{FF2B5EF4-FFF2-40B4-BE49-F238E27FC236}">
-                <a16:creationId xmlns:a16="http://schemas.microsoft.com/office/drawing/2014/main" id="{C7EFE26F-7F6A-1C58-17DB-D9A4DE6DA6A4}"/>
+          <p:cNvPr id="210" name="Elbow Connector 209">
+            <a:extLst>
+              <a:ext uri="{FF2B5EF4-FFF2-40B4-BE49-F238E27FC236}">
+                <a16:creationId xmlns:a16="http://schemas.microsoft.com/office/drawing/2014/main" id="{581E0BD0-E020-D10C-A647-A9EF9EA1921F}"/>
               </a:ext>
             </a:extLst>
           </p:cNvPr>
@@ -22216,18 +23479,20 @@
           <p:nvPr/>
         </p:nvCxnSpPr>
         <p:spPr>
-          <a:xfrm rot="16200000" flipH="1">
-            <a:off x="10588195" y="10919370"/>
-            <a:ext cx="601182" cy="1459355"/>
-          </a:xfrm>
-          <a:prstGeom prst="bentConnector2">
-            <a:avLst/>
-          </a:prstGeom>
-          <a:ln w="18415">
-            <a:solidFill>
-              <a:schemeClr val="accent1">
-                <a:lumMod val="75000"/>
-              </a:schemeClr>
+          <a:xfrm rot="5400000" flipH="1" flipV="1">
+            <a:off x="15437298" y="12519460"/>
+            <a:ext cx="2700342" cy="874977"/>
+          </a:xfrm>
+          <a:prstGeom prst="bentConnector3">
+            <a:avLst>
+              <a:gd name="adj1" fmla="val 77396"/>
+            </a:avLst>
+          </a:prstGeom>
+          <a:ln w="79883">
+            <a:solidFill>
+              <a:srgbClr val="C00000">
+                <a:alpha val="50000"/>
+              </a:srgbClr>
             </a:solidFill>
             <a:tailEnd type="triangle"/>
           </a:ln>
@@ -22249,10 +23514,10 @@
       </p:cxnSp>
       <p:cxnSp>
         <p:nvCxnSpPr>
-          <p:cNvPr id="43" name="Straight Arrow Connector 42">
-            <a:extLst>
-              <a:ext uri="{FF2B5EF4-FFF2-40B4-BE49-F238E27FC236}">
-                <a16:creationId xmlns:a16="http://schemas.microsoft.com/office/drawing/2014/main" id="{6C8D84F6-E7F2-457E-C6CE-71B0F87335B1}"/>
+          <p:cNvPr id="214" name="Straight Connector 213">
+            <a:extLst>
+              <a:ext uri="{FF2B5EF4-FFF2-40B4-BE49-F238E27FC236}">
+                <a16:creationId xmlns:a16="http://schemas.microsoft.com/office/drawing/2014/main" id="{9CCF01B1-6210-06D7-A848-78EABA0376B4}"/>
               </a:ext>
             </a:extLst>
           </p:cNvPr>
@@ -22263,295 +23528,19 @@
         </p:nvCxnSpPr>
         <p:spPr>
           <a:xfrm>
-            <a:off x="13437862" y="12179286"/>
-            <a:ext cx="892510" cy="0"/>
-          </a:xfrm>
-          <a:prstGeom prst="straightConnector1">
+            <a:off x="13453156" y="14396227"/>
+            <a:ext cx="2939387" cy="0"/>
+          </a:xfrm>
+          <a:prstGeom prst="line">
             <a:avLst/>
           </a:prstGeom>
-          <a:ln w="68199">
-            <a:solidFill>
-              <a:schemeClr val="accent1">
-                <a:lumMod val="75000"/>
-              </a:schemeClr>
-            </a:solidFill>
-            <a:tailEnd type="triangle"/>
-          </a:ln>
-        </p:spPr>
-        <p:style>
-          <a:lnRef idx="1">
-            <a:schemeClr val="accent1"/>
-          </a:lnRef>
-          <a:fillRef idx="0">
-            <a:schemeClr val="accent1"/>
-          </a:fillRef>
-          <a:effectRef idx="0">
-            <a:schemeClr val="accent1"/>
-          </a:effectRef>
-          <a:fontRef idx="minor">
-            <a:schemeClr val="tx1"/>
-          </a:fontRef>
-        </p:style>
-      </p:cxnSp>
-      <p:cxnSp>
-        <p:nvCxnSpPr>
-          <p:cNvPr id="45" name="Straight Arrow Connector 44">
-            <a:extLst>
-              <a:ext uri="{FF2B5EF4-FFF2-40B4-BE49-F238E27FC236}">
-                <a16:creationId xmlns:a16="http://schemas.microsoft.com/office/drawing/2014/main" id="{6071B235-6C4D-6C35-571A-EA3AE9A92167}"/>
-              </a:ext>
-            </a:extLst>
-          </p:cNvPr>
-          <p:cNvCxnSpPr>
-            <a:cxnSpLocks/>
-          </p:cNvCxnSpPr>
-          <p:nvPr/>
-        </p:nvCxnSpPr>
-        <p:spPr>
-          <a:xfrm>
-            <a:off x="14752676" y="10642604"/>
-            <a:ext cx="0" cy="1098071"/>
-          </a:xfrm>
-          <a:prstGeom prst="straightConnector1">
-            <a:avLst/>
-          </a:prstGeom>
-          <a:ln w="19939">
-            <a:solidFill>
-              <a:srgbClr val="C00000"/>
-            </a:solidFill>
-            <a:tailEnd type="triangle"/>
-          </a:ln>
-        </p:spPr>
-        <p:style>
-          <a:lnRef idx="1">
-            <a:schemeClr val="accent1"/>
-          </a:lnRef>
-          <a:fillRef idx="0">
-            <a:schemeClr val="accent1"/>
-          </a:fillRef>
-          <a:effectRef idx="0">
-            <a:schemeClr val="accent1"/>
-          </a:effectRef>
-          <a:fontRef idx="minor">
-            <a:schemeClr val="tx1"/>
-          </a:fontRef>
-        </p:style>
-      </p:cxnSp>
-      <p:cxnSp>
-        <p:nvCxnSpPr>
-          <p:cNvPr id="50" name="Elbow Connector 49">
-            <a:extLst>
-              <a:ext uri="{FF2B5EF4-FFF2-40B4-BE49-F238E27FC236}">
-                <a16:creationId xmlns:a16="http://schemas.microsoft.com/office/drawing/2014/main" id="{1A91E203-0108-68AF-3E35-4118D6B6B8BA}"/>
-              </a:ext>
-            </a:extLst>
-          </p:cNvPr>
-          <p:cNvCxnSpPr>
-            <a:stCxn id="24" idx="0"/>
-            <a:endCxn id="20" idx="1"/>
-          </p:cNvCxnSpPr>
-          <p:nvPr/>
-        </p:nvCxnSpPr>
-        <p:spPr>
-          <a:xfrm rot="5400000" flipH="1" flipV="1">
-            <a:off x="15708645" y="10693420"/>
-            <a:ext cx="589520" cy="1504991"/>
-          </a:xfrm>
-          <a:prstGeom prst="bentConnector2">
-            <a:avLst/>
-          </a:prstGeom>
-          <a:ln w="42418">
-            <a:solidFill>
-              <a:schemeClr val="bg1">
-                <a:lumMod val="50000"/>
-              </a:schemeClr>
-            </a:solidFill>
-            <a:prstDash val="sysDash"/>
-            <a:tailEnd type="triangle"/>
-          </a:ln>
-        </p:spPr>
-        <p:style>
-          <a:lnRef idx="1">
-            <a:schemeClr val="accent1"/>
-          </a:lnRef>
-          <a:fillRef idx="0">
-            <a:schemeClr val="accent1"/>
-          </a:fillRef>
-          <a:effectRef idx="0">
-            <a:schemeClr val="accent1"/>
-          </a:effectRef>
-          <a:fontRef idx="minor">
-            <a:schemeClr val="tx1"/>
-          </a:fontRef>
-        </p:style>
-      </p:cxnSp>
-      <p:cxnSp>
-        <p:nvCxnSpPr>
-          <p:cNvPr id="51" name="Elbow Connector 50">
-            <a:extLst>
-              <a:ext uri="{FF2B5EF4-FFF2-40B4-BE49-F238E27FC236}">
-                <a16:creationId xmlns:a16="http://schemas.microsoft.com/office/drawing/2014/main" id="{4B9A6050-891E-DD21-BF59-4A2C98309D21}"/>
-              </a:ext>
-            </a:extLst>
-          </p:cNvPr>
-          <p:cNvCxnSpPr>
-            <a:cxnSpLocks/>
-          </p:cNvCxnSpPr>
-          <p:nvPr/>
-        </p:nvCxnSpPr>
-        <p:spPr>
-          <a:xfrm rot="16200000" flipH="1">
-            <a:off x="15665108" y="12182679"/>
-            <a:ext cx="634555" cy="1504991"/>
-          </a:xfrm>
-          <a:prstGeom prst="bentConnector2">
-            <a:avLst/>
-          </a:prstGeom>
-          <a:ln w="63119">
-            <a:solidFill>
-              <a:srgbClr val="C00000"/>
-            </a:solidFill>
-            <a:tailEnd type="triangle"/>
-          </a:ln>
-        </p:spPr>
-        <p:style>
-          <a:lnRef idx="1">
-            <a:schemeClr val="accent1"/>
-          </a:lnRef>
-          <a:fillRef idx="0">
-            <a:schemeClr val="accent1"/>
-          </a:fillRef>
-          <a:effectRef idx="0">
-            <a:schemeClr val="accent1"/>
-          </a:effectRef>
-          <a:fontRef idx="minor">
-            <a:schemeClr val="tx1"/>
-          </a:fontRef>
-        </p:style>
-      </p:cxnSp>
-      <p:cxnSp>
-        <p:nvCxnSpPr>
-          <p:cNvPr id="57" name="Elbow Connector 56">
-            <a:extLst>
-              <a:ext uri="{FF2B5EF4-FFF2-40B4-BE49-F238E27FC236}">
-                <a16:creationId xmlns:a16="http://schemas.microsoft.com/office/drawing/2014/main" id="{C692133E-2952-0ECD-87D3-B8F051B6F346}"/>
-              </a:ext>
-            </a:extLst>
-          </p:cNvPr>
-          <p:cNvCxnSpPr>
-            <a:cxnSpLocks/>
-          </p:cNvCxnSpPr>
-          <p:nvPr/>
-        </p:nvCxnSpPr>
-        <p:spPr>
-          <a:xfrm rot="16200000" flipH="1">
-            <a:off x="17842760" y="10524872"/>
-            <a:ext cx="1040309" cy="1394631"/>
-          </a:xfrm>
-          <a:prstGeom prst="bentConnector3">
-            <a:avLst>
-              <a:gd name="adj1" fmla="val -21974"/>
-            </a:avLst>
-          </a:prstGeom>
-          <a:ln w="187198">
-            <a:solidFill>
-              <a:schemeClr val="accent1">
-                <a:lumMod val="75000"/>
-              </a:schemeClr>
-            </a:solidFill>
-            <a:tailEnd type="triangle"/>
-          </a:ln>
-        </p:spPr>
-        <p:style>
-          <a:lnRef idx="1">
-            <a:schemeClr val="accent1"/>
-          </a:lnRef>
-          <a:fillRef idx="0">
-            <a:schemeClr val="accent1"/>
-          </a:fillRef>
-          <a:effectRef idx="0">
-            <a:schemeClr val="accent1"/>
-          </a:effectRef>
-          <a:fontRef idx="minor">
-            <a:schemeClr val="tx1"/>
-          </a:fontRef>
-        </p:style>
-      </p:cxnSp>
-      <p:cxnSp>
-        <p:nvCxnSpPr>
-          <p:cNvPr id="58" name="Elbow Connector 57">
-            <a:extLst>
-              <a:ext uri="{FF2B5EF4-FFF2-40B4-BE49-F238E27FC236}">
-                <a16:creationId xmlns:a16="http://schemas.microsoft.com/office/drawing/2014/main" id="{2A6C5F73-DA31-2131-4A22-7E2D5FC27865}"/>
-              </a:ext>
-            </a:extLst>
-          </p:cNvPr>
-          <p:cNvCxnSpPr>
-            <a:cxnSpLocks/>
-          </p:cNvCxnSpPr>
-          <p:nvPr/>
-        </p:nvCxnSpPr>
-        <p:spPr>
-          <a:xfrm rot="5400000" flipH="1" flipV="1">
-            <a:off x="17832420" y="12479019"/>
-            <a:ext cx="1060989" cy="1394631"/>
-          </a:xfrm>
-          <a:prstGeom prst="bentConnector3">
-            <a:avLst>
-              <a:gd name="adj1" fmla="val -21546"/>
-            </a:avLst>
-          </a:prstGeom>
-          <a:ln w="164719">
-            <a:solidFill>
-              <a:schemeClr val="accent1">
-                <a:lumMod val="75000"/>
-              </a:schemeClr>
-            </a:solidFill>
-            <a:tailEnd type="triangle"/>
-          </a:ln>
-        </p:spPr>
-        <p:style>
-          <a:lnRef idx="1">
-            <a:schemeClr val="accent1"/>
-          </a:lnRef>
-          <a:fillRef idx="0">
-            <a:schemeClr val="accent1"/>
-          </a:fillRef>
-          <a:effectRef idx="0">
-            <a:schemeClr val="accent1"/>
-          </a:effectRef>
-          <a:fontRef idx="minor">
-            <a:schemeClr val="tx1"/>
-          </a:fontRef>
-        </p:style>
-      </p:cxnSp>
-      <p:cxnSp>
-        <p:nvCxnSpPr>
-          <p:cNvPr id="160" name="Straight Arrow Connector 159">
-            <a:extLst>
-              <a:ext uri="{FF2B5EF4-FFF2-40B4-BE49-F238E27FC236}">
-                <a16:creationId xmlns:a16="http://schemas.microsoft.com/office/drawing/2014/main" id="{B7BC32FF-CA01-6112-27E7-E36B0ED38566}"/>
-              </a:ext>
-            </a:extLst>
-          </p:cNvPr>
-          <p:cNvCxnSpPr>
-            <a:cxnSpLocks/>
-          </p:cNvCxnSpPr>
-          <p:nvPr/>
-        </p:nvCxnSpPr>
-        <p:spPr>
-          <a:xfrm flipV="1">
-            <a:off x="12521813" y="12644341"/>
-            <a:ext cx="6350" cy="1079290"/>
-          </a:xfrm>
-          <a:prstGeom prst="straightConnector1">
-            <a:avLst/>
-          </a:prstGeom>
-          <a:ln w="174752">
-            <a:solidFill>
-              <a:srgbClr val="C00000"/>
-            </a:solidFill>
-            <a:tailEnd type="triangle"/>
+          <a:ln w="79883">
+            <a:solidFill>
+              <a:srgbClr val="C00000">
+                <a:alpha val="50000"/>
+              </a:srgbClr>
+            </a:solidFill>
+            <a:headEnd type="oval"/>
           </a:ln>
         </p:spPr>
         <p:style>
@@ -22571,10 +23560,10 @@
       </p:cxnSp>
       <p:sp>
         <p:nvSpPr>
-          <p:cNvPr id="23" name="Rectangle 22">
-            <a:extLst>
-              <a:ext uri="{FF2B5EF4-FFF2-40B4-BE49-F238E27FC236}">
-                <a16:creationId xmlns:a16="http://schemas.microsoft.com/office/drawing/2014/main" id="{C3510981-FE55-509B-F5B4-9D8C4012346D}"/>
+          <p:cNvPr id="12" name="Rectangle 11">
+            <a:extLst>
+              <a:ext uri="{FF2B5EF4-FFF2-40B4-BE49-F238E27FC236}">
+                <a16:creationId xmlns:a16="http://schemas.microsoft.com/office/drawing/2014/main" id="{80931944-38F4-9378-6003-83D1DE15C050}"/>
               </a:ext>
             </a:extLst>
           </p:cNvPr>
@@ -22583,7 +23572,7 @@
         </p:nvSpPr>
         <p:spPr>
           <a:xfrm>
-            <a:off x="11618464" y="11751353"/>
+            <a:off x="11612114" y="13707866"/>
             <a:ext cx="1819398" cy="877223"/>
           </a:xfrm>
           <a:prstGeom prst="rect">
@@ -22620,396 +23609,6 @@
           <a:p>
             <a:pPr algn="ctr"/>
             <a:r>
-              <a:rPr lang="el-GR" sz="2400" b="1" i="1" dirty="0">
-                <a:solidFill>
-                  <a:schemeClr val="tx1"/>
-                </a:solidFill>
-                <a:latin typeface="Arial" panose="020B0604020202020204" pitchFamily="34" charset="0"/>
-                <a:cs typeface="Arial" panose="020B0604020202020204" pitchFamily="34" charset="0"/>
-              </a:rPr>
-              <a:t>β</a:t>
-            </a:r>
-            <a:endParaRPr lang="en-US" sz="2400" b="1" i="1" dirty="0">
-              <a:solidFill>
-                <a:schemeClr val="tx1"/>
-              </a:solidFill>
-              <a:latin typeface="Arial" panose="020B0604020202020204" pitchFamily="34" charset="0"/>
-              <a:cs typeface="Arial" panose="020B0604020202020204" pitchFamily="34" charset="0"/>
-            </a:endParaRPr>
-          </a:p>
-        </p:txBody>
-      </p:sp>
-      <p:sp>
-        <p:nvSpPr>
-          <p:cNvPr id="28" name="Rectangle 27">
-            <a:extLst>
-              <a:ext uri="{FF2B5EF4-FFF2-40B4-BE49-F238E27FC236}">
-                <a16:creationId xmlns:a16="http://schemas.microsoft.com/office/drawing/2014/main" id="{F9845BF1-920A-DFA4-A428-9653A04CD2C8}"/>
-              </a:ext>
-            </a:extLst>
-          </p:cNvPr>
-          <p:cNvSpPr/>
-          <p:nvPr/>
-        </p:nvSpPr>
-        <p:spPr>
-          <a:xfrm>
-            <a:off x="11618464" y="9774814"/>
-            <a:ext cx="1819398" cy="877223"/>
-          </a:xfrm>
-          <a:prstGeom prst="rect">
-            <a:avLst/>
-          </a:prstGeom>
-          <a:solidFill>
-            <a:schemeClr val="bg1"/>
-          </a:solidFill>
-          <a:ln w="38100">
-            <a:solidFill>
-              <a:schemeClr val="tx1"/>
-            </a:solidFill>
-          </a:ln>
-        </p:spPr>
-        <p:style>
-          <a:lnRef idx="2">
-            <a:schemeClr val="accent1">
-              <a:shade val="50000"/>
-            </a:schemeClr>
-          </a:lnRef>
-          <a:fillRef idx="1">
-            <a:schemeClr val="accent1"/>
-          </a:fillRef>
-          <a:effectRef idx="0">
-            <a:schemeClr val="accent1"/>
-          </a:effectRef>
-          <a:fontRef idx="minor">
-            <a:schemeClr val="lt1"/>
-          </a:fontRef>
-        </p:style>
-        <p:txBody>
-          <a:bodyPr rtlCol="0" anchor="ctr"/>
-          <a:lstStyle/>
-          <a:p>
-            <a:pPr algn="ctr"/>
-            <a:r>
-              <a:rPr lang="en-US" sz="2400" b="1" i="1" dirty="0">
-                <a:solidFill>
-                  <a:schemeClr val="tx1"/>
-                </a:solidFill>
-                <a:latin typeface="Arial" panose="020B0604020202020204" pitchFamily="34" charset="0"/>
-                <a:cs typeface="Arial" panose="020B0604020202020204" pitchFamily="34" charset="0"/>
-              </a:rPr>
-              <a:t>N</a:t>
-            </a:r>
-            <a:r>
-              <a:rPr lang="en-US" sz="2400" b="1" baseline="-25000" dirty="0">
-                <a:solidFill>
-                  <a:schemeClr val="tx1"/>
-                </a:solidFill>
-                <a:latin typeface="Arial" panose="020B0604020202020204" pitchFamily="34" charset="0"/>
-                <a:cs typeface="Arial" panose="020B0604020202020204" pitchFamily="34" charset="0"/>
-              </a:rPr>
-              <a:t>fixation</a:t>
-            </a:r>
-            <a:endParaRPr lang="en-US" sz="2400" i="1" dirty="0">
-              <a:solidFill>
-                <a:schemeClr val="tx1"/>
-              </a:solidFill>
-              <a:latin typeface="Arial" panose="020B0604020202020204" pitchFamily="34" charset="0"/>
-              <a:cs typeface="Arial" panose="020B0604020202020204" pitchFamily="34" charset="0"/>
-            </a:endParaRPr>
-          </a:p>
-        </p:txBody>
-      </p:sp>
-      <p:sp>
-        <p:nvSpPr>
-          <p:cNvPr id="11" name="Rectangle 10">
-            <a:extLst>
-              <a:ext uri="{FF2B5EF4-FFF2-40B4-BE49-F238E27FC236}">
-                <a16:creationId xmlns:a16="http://schemas.microsoft.com/office/drawing/2014/main" id="{612EA15D-68B8-4207-39F2-1F2B218F4B4D}"/>
-              </a:ext>
-            </a:extLst>
-          </p:cNvPr>
-          <p:cNvSpPr/>
-          <p:nvPr/>
-        </p:nvSpPr>
-        <p:spPr>
-          <a:xfrm>
-            <a:off x="18150532" y="11752852"/>
-            <a:ext cx="1819398" cy="877223"/>
-          </a:xfrm>
-          <a:prstGeom prst="rect">
-            <a:avLst/>
-          </a:prstGeom>
-          <a:solidFill>
-            <a:schemeClr val="bg1"/>
-          </a:solidFill>
-          <a:ln w="38100">
-            <a:solidFill>
-              <a:schemeClr val="tx1"/>
-            </a:solidFill>
-          </a:ln>
-        </p:spPr>
-        <p:style>
-          <a:lnRef idx="2">
-            <a:schemeClr val="accent1">
-              <a:shade val="50000"/>
-            </a:schemeClr>
-          </a:lnRef>
-          <a:fillRef idx="1">
-            <a:schemeClr val="accent1"/>
-          </a:fillRef>
-          <a:effectRef idx="0">
-            <a:schemeClr val="accent1"/>
-          </a:effectRef>
-          <a:fontRef idx="minor">
-            <a:schemeClr val="lt1"/>
-          </a:fontRef>
-        </p:style>
-        <p:txBody>
-          <a:bodyPr rtlCol="0" anchor="ctr"/>
-          <a:lstStyle/>
-          <a:p>
-            <a:pPr algn="ctr"/>
-            <a:r>
-              <a:rPr lang="el-GR" sz="2400" b="1" i="1" dirty="0">
-                <a:solidFill>
-                  <a:schemeClr val="tx1"/>
-                </a:solidFill>
-                <a:latin typeface="Arial" panose="020B0604020202020204" pitchFamily="34" charset="0"/>
-                <a:cs typeface="Arial" panose="020B0604020202020204" pitchFamily="34" charset="0"/>
-              </a:rPr>
-              <a:t>Ν</a:t>
-            </a:r>
-            <a:r>
-              <a:rPr lang="en-US" sz="2400" b="1" baseline="-25000" dirty="0">
-                <a:solidFill>
-                  <a:schemeClr val="tx1"/>
-                </a:solidFill>
-                <a:latin typeface="Arial" panose="020B0604020202020204" pitchFamily="34" charset="0"/>
-                <a:cs typeface="Arial" panose="020B0604020202020204" pitchFamily="34" charset="0"/>
-              </a:rPr>
-              <a:t>area</a:t>
-            </a:r>
-            <a:endParaRPr lang="en-US" sz="2400" b="1" i="1" dirty="0">
-              <a:solidFill>
-                <a:schemeClr val="tx1"/>
-              </a:solidFill>
-              <a:latin typeface="Arial" panose="020B0604020202020204" pitchFamily="34" charset="0"/>
-              <a:cs typeface="Arial" panose="020B0604020202020204" pitchFamily="34" charset="0"/>
-            </a:endParaRPr>
-          </a:p>
-        </p:txBody>
-      </p:sp>
-      <p:sp>
-        <p:nvSpPr>
-          <p:cNvPr id="17" name="Rectangle 16">
-            <a:extLst>
-              <a:ext uri="{FF2B5EF4-FFF2-40B4-BE49-F238E27FC236}">
-                <a16:creationId xmlns:a16="http://schemas.microsoft.com/office/drawing/2014/main" id="{5CF0D2AF-8598-6EDA-181B-6A30A35A32CE}"/>
-              </a:ext>
-            </a:extLst>
-          </p:cNvPr>
-          <p:cNvSpPr/>
-          <p:nvPr/>
-        </p:nvSpPr>
-        <p:spPr>
-          <a:xfrm>
-            <a:off x="16755901" y="12813841"/>
-            <a:ext cx="1819398" cy="877223"/>
-          </a:xfrm>
-          <a:prstGeom prst="rect">
-            <a:avLst/>
-          </a:prstGeom>
-          <a:solidFill>
-            <a:schemeClr val="bg1"/>
-          </a:solidFill>
-          <a:ln w="38100">
-            <a:solidFill>
-              <a:schemeClr val="tx1"/>
-            </a:solidFill>
-          </a:ln>
-        </p:spPr>
-        <p:style>
-          <a:lnRef idx="2">
-            <a:schemeClr val="accent1">
-              <a:shade val="50000"/>
-            </a:schemeClr>
-          </a:lnRef>
-          <a:fillRef idx="1">
-            <a:schemeClr val="accent1"/>
-          </a:fillRef>
-          <a:effectRef idx="0">
-            <a:schemeClr val="accent1"/>
-          </a:effectRef>
-          <a:fontRef idx="minor">
-            <a:schemeClr val="lt1"/>
-          </a:fontRef>
-        </p:style>
-        <p:txBody>
-          <a:bodyPr rtlCol="0" anchor="ctr"/>
-          <a:lstStyle/>
-          <a:p>
-            <a:pPr algn="ctr"/>
-            <a:r>
-              <a:rPr lang="en-US" sz="2400" b="1" i="1" dirty="0">
-                <a:solidFill>
-                  <a:schemeClr val="tx1"/>
-                </a:solidFill>
-                <a:latin typeface="Arial" panose="020B0604020202020204" pitchFamily="34" charset="0"/>
-                <a:cs typeface="Arial" panose="020B0604020202020204" pitchFamily="34" charset="0"/>
-              </a:rPr>
-              <a:t>M</a:t>
-            </a:r>
-            <a:r>
-              <a:rPr lang="en-US" sz="2400" b="1" baseline="-25000" dirty="0">
-                <a:solidFill>
-                  <a:schemeClr val="tx1"/>
-                </a:solidFill>
-                <a:latin typeface="Arial" panose="020B0604020202020204" pitchFamily="34" charset="0"/>
-                <a:cs typeface="Arial" panose="020B0604020202020204" pitchFamily="34" charset="0"/>
-              </a:rPr>
-              <a:t>area</a:t>
-            </a:r>
-            <a:endParaRPr lang="en-US" sz="2400" b="1" i="1" dirty="0">
-              <a:solidFill>
-                <a:schemeClr val="tx1"/>
-              </a:solidFill>
-              <a:latin typeface="Arial" panose="020B0604020202020204" pitchFamily="34" charset="0"/>
-              <a:cs typeface="Arial" panose="020B0604020202020204" pitchFamily="34" charset="0"/>
-            </a:endParaRPr>
-          </a:p>
-        </p:txBody>
-      </p:sp>
-      <p:sp>
-        <p:nvSpPr>
-          <p:cNvPr id="20" name="Rectangle 19">
-            <a:extLst>
-              <a:ext uri="{FF2B5EF4-FFF2-40B4-BE49-F238E27FC236}">
-                <a16:creationId xmlns:a16="http://schemas.microsoft.com/office/drawing/2014/main" id="{27FC6D2D-F10F-B106-3C23-5AEBE11DFAC5}"/>
-              </a:ext>
-            </a:extLst>
-          </p:cNvPr>
-          <p:cNvSpPr/>
-          <p:nvPr/>
-        </p:nvSpPr>
-        <p:spPr>
-          <a:xfrm>
-            <a:off x="16755901" y="10712543"/>
-            <a:ext cx="1819398" cy="877223"/>
-          </a:xfrm>
-          <a:prstGeom prst="rect">
-            <a:avLst/>
-          </a:prstGeom>
-          <a:solidFill>
-            <a:schemeClr val="bg1"/>
-          </a:solidFill>
-          <a:ln w="38100">
-            <a:solidFill>
-              <a:schemeClr val="tx1"/>
-            </a:solidFill>
-          </a:ln>
-        </p:spPr>
-        <p:style>
-          <a:lnRef idx="2">
-            <a:schemeClr val="accent1">
-              <a:shade val="50000"/>
-            </a:schemeClr>
-          </a:lnRef>
-          <a:fillRef idx="1">
-            <a:schemeClr val="accent1"/>
-          </a:fillRef>
-          <a:effectRef idx="0">
-            <a:schemeClr val="accent1"/>
-          </a:effectRef>
-          <a:fontRef idx="minor">
-            <a:schemeClr val="lt1"/>
-          </a:fontRef>
-        </p:style>
-        <p:txBody>
-          <a:bodyPr rtlCol="0" anchor="ctr"/>
-          <a:lstStyle/>
-          <a:p>
-            <a:pPr algn="ctr"/>
-            <a:r>
-              <a:rPr lang="en-US" sz="2400" b="1" i="1" dirty="0">
-                <a:solidFill>
-                  <a:schemeClr val="tx1"/>
-                </a:solidFill>
-                <a:latin typeface="Arial" panose="020B0604020202020204" pitchFamily="34" charset="0"/>
-                <a:cs typeface="Arial" panose="020B0604020202020204" pitchFamily="34" charset="0"/>
-              </a:rPr>
-              <a:t>N</a:t>
-            </a:r>
-            <a:r>
-              <a:rPr lang="en-US" sz="2400" b="1" baseline="-25000" dirty="0">
-                <a:solidFill>
-                  <a:schemeClr val="tx1"/>
-                </a:solidFill>
-                <a:latin typeface="Arial" panose="020B0604020202020204" pitchFamily="34" charset="0"/>
-                <a:cs typeface="Arial" panose="020B0604020202020204" pitchFamily="34" charset="0"/>
-              </a:rPr>
-              <a:t>mass</a:t>
-            </a:r>
-            <a:endParaRPr lang="en-US" sz="2400" b="1" i="1" dirty="0">
-              <a:solidFill>
-                <a:schemeClr val="tx1"/>
-              </a:solidFill>
-              <a:latin typeface="Arial" panose="020B0604020202020204" pitchFamily="34" charset="0"/>
-              <a:cs typeface="Arial" panose="020B0604020202020204" pitchFamily="34" charset="0"/>
-            </a:endParaRPr>
-          </a:p>
-        </p:txBody>
-      </p:sp>
-      <p:sp>
-        <p:nvSpPr>
-          <p:cNvPr id="24" name="Rectangle 23">
-            <a:extLst>
-              <a:ext uri="{FF2B5EF4-FFF2-40B4-BE49-F238E27FC236}">
-                <a16:creationId xmlns:a16="http://schemas.microsoft.com/office/drawing/2014/main" id="{B27ADCE2-63D0-A5FF-CAAC-360272DBA0BD}"/>
-              </a:ext>
-            </a:extLst>
-          </p:cNvPr>
-          <p:cNvSpPr/>
-          <p:nvPr/>
-        </p:nvSpPr>
-        <p:spPr>
-          <a:xfrm>
-            <a:off x="14341211" y="11740675"/>
-            <a:ext cx="1819398" cy="877223"/>
-          </a:xfrm>
-          <a:prstGeom prst="rect">
-            <a:avLst/>
-          </a:prstGeom>
-          <a:solidFill>
-            <a:schemeClr val="bg1"/>
-          </a:solidFill>
-          <a:ln w="38100">
-            <a:solidFill>
-              <a:schemeClr val="tx1"/>
-            </a:solidFill>
-          </a:ln>
-        </p:spPr>
-        <p:style>
-          <a:lnRef idx="2">
-            <a:schemeClr val="accent1">
-              <a:shade val="50000"/>
-            </a:schemeClr>
-          </a:lnRef>
-          <a:fillRef idx="1">
-            <a:schemeClr val="accent1"/>
-          </a:fillRef>
-          <a:effectRef idx="0">
-            <a:schemeClr val="accent1"/>
-          </a:effectRef>
-          <a:fontRef idx="minor">
-            <a:schemeClr val="lt1"/>
-          </a:fontRef>
-        </p:style>
-        <p:txBody>
-          <a:bodyPr rtlCol="0" anchor="ctr"/>
-          <a:lstStyle/>
-          <a:p>
-            <a:pPr algn="ctr"/>
-            <a:r>
               <a:rPr lang="en-US" sz="2400" b="1" i="1" dirty="0">
                 <a:solidFill>
                   <a:schemeClr val="tx1"/>
@@ -23020,169 +23619,6 @@
               <a:t>C</a:t>
             </a:r>
             <a:r>
-              <a:rPr lang="en-US" sz="2400" b="1" baseline="-25000" dirty="0">
-                <a:solidFill>
-                  <a:schemeClr val="tx1"/>
-                </a:solidFill>
-                <a:latin typeface="Arial" panose="020B0604020202020204" pitchFamily="34" charset="0"/>
-                <a:cs typeface="Arial" panose="020B0604020202020204" pitchFamily="34" charset="0"/>
-              </a:rPr>
-              <a:t>i</a:t>
-            </a:r>
-            <a:r>
-              <a:rPr lang="en-US" sz="2400" b="1" i="1" dirty="0">
-                <a:solidFill>
-                  <a:schemeClr val="tx1"/>
-                </a:solidFill>
-                <a:latin typeface="Arial" panose="020B0604020202020204" pitchFamily="34" charset="0"/>
-                <a:cs typeface="Arial" panose="020B0604020202020204" pitchFamily="34" charset="0"/>
-              </a:rPr>
-              <a:t>:C</a:t>
-            </a:r>
-            <a:r>
-              <a:rPr lang="en-US" sz="2400" b="1" baseline="-25000" dirty="0">
-                <a:solidFill>
-                  <a:schemeClr val="tx1"/>
-                </a:solidFill>
-                <a:latin typeface="Arial" panose="020B0604020202020204" pitchFamily="34" charset="0"/>
-                <a:cs typeface="Arial" panose="020B0604020202020204" pitchFamily="34" charset="0"/>
-              </a:rPr>
-              <a:t>a</a:t>
-            </a:r>
-          </a:p>
-        </p:txBody>
-      </p:sp>
-      <p:sp>
-        <p:nvSpPr>
-          <p:cNvPr id="27" name="Rectangle 26">
-            <a:extLst>
-              <a:ext uri="{FF2B5EF4-FFF2-40B4-BE49-F238E27FC236}">
-                <a16:creationId xmlns:a16="http://schemas.microsoft.com/office/drawing/2014/main" id="{66815A72-A478-F607-8624-6D6512D0A23A}"/>
-              </a:ext>
-            </a:extLst>
-          </p:cNvPr>
-          <p:cNvSpPr/>
-          <p:nvPr/>
-        </p:nvSpPr>
-        <p:spPr>
-          <a:xfrm>
-            <a:off x="9153401" y="12824519"/>
-            <a:ext cx="2011416" cy="877223"/>
-          </a:xfrm>
-          <a:prstGeom prst="rect">
-            <a:avLst/>
-          </a:prstGeom>
-          <a:solidFill>
-            <a:schemeClr val="bg1"/>
-          </a:solidFill>
-          <a:ln w="38100">
-            <a:solidFill>
-              <a:schemeClr val="tx1"/>
-            </a:solidFill>
-          </a:ln>
-        </p:spPr>
-        <p:style>
-          <a:lnRef idx="2">
-            <a:schemeClr val="accent1">
-              <a:shade val="50000"/>
-            </a:schemeClr>
-          </a:lnRef>
-          <a:fillRef idx="1">
-            <a:schemeClr val="accent1"/>
-          </a:fillRef>
-          <a:effectRef idx="0">
-            <a:schemeClr val="accent1"/>
-          </a:effectRef>
-          <a:fontRef idx="minor">
-            <a:schemeClr val="lt1"/>
-          </a:fontRef>
-        </p:style>
-        <p:txBody>
-          <a:bodyPr rtlCol="0" anchor="ctr"/>
-          <a:lstStyle/>
-          <a:p>
-            <a:pPr algn="ctr"/>
-            <a:r>
-              <a:rPr lang="en-US" sz="2400" b="1" i="1" dirty="0">
-                <a:solidFill>
-                  <a:schemeClr val="tx1"/>
-                </a:solidFill>
-                <a:latin typeface="Arial" panose="020B0604020202020204" pitchFamily="34" charset="0"/>
-                <a:cs typeface="Arial" panose="020B0604020202020204" pitchFamily="34" charset="0"/>
-              </a:rPr>
-              <a:t>N availability</a:t>
-            </a:r>
-            <a:endParaRPr lang="en-US" sz="2400" b="1" dirty="0">
-              <a:solidFill>
-                <a:schemeClr val="tx1"/>
-              </a:solidFill>
-              <a:latin typeface="Arial" panose="020B0604020202020204" pitchFamily="34" charset="0"/>
-              <a:cs typeface="Arial" panose="020B0604020202020204" pitchFamily="34" charset="0"/>
-            </a:endParaRPr>
-          </a:p>
-        </p:txBody>
-      </p:sp>
-      <p:sp>
-        <p:nvSpPr>
-          <p:cNvPr id="12" name="Rectangle 11">
-            <a:extLst>
-              <a:ext uri="{FF2B5EF4-FFF2-40B4-BE49-F238E27FC236}">
-                <a16:creationId xmlns:a16="http://schemas.microsoft.com/office/drawing/2014/main" id="{80931944-38F4-9378-6003-83D1DE15C050}"/>
-              </a:ext>
-            </a:extLst>
-          </p:cNvPr>
-          <p:cNvSpPr/>
-          <p:nvPr/>
-        </p:nvSpPr>
-        <p:spPr>
-          <a:xfrm>
-            <a:off x="11612114" y="13707866"/>
-            <a:ext cx="1819398" cy="877223"/>
-          </a:xfrm>
-          <a:prstGeom prst="rect">
-            <a:avLst/>
-          </a:prstGeom>
-          <a:solidFill>
-            <a:schemeClr val="bg1"/>
-          </a:solidFill>
-          <a:ln w="38100">
-            <a:solidFill>
-              <a:schemeClr val="tx1"/>
-            </a:solidFill>
-          </a:ln>
-        </p:spPr>
-        <p:style>
-          <a:lnRef idx="2">
-            <a:schemeClr val="accent1">
-              <a:shade val="50000"/>
-            </a:schemeClr>
-          </a:lnRef>
-          <a:fillRef idx="1">
-            <a:schemeClr val="accent1"/>
-          </a:fillRef>
-          <a:effectRef idx="0">
-            <a:schemeClr val="accent1"/>
-          </a:effectRef>
-          <a:fontRef idx="minor">
-            <a:schemeClr val="lt1"/>
-          </a:fontRef>
-        </p:style>
-        <p:txBody>
-          <a:bodyPr rtlCol="0" anchor="ctr"/>
-          <a:lstStyle/>
-          <a:p>
-            <a:pPr algn="ctr"/>
-            <a:r>
-              <a:rPr lang="en-US" sz="2400" b="1" i="1" dirty="0">
-                <a:solidFill>
-                  <a:schemeClr val="tx1"/>
-                </a:solidFill>
-                <a:latin typeface="Arial" panose="020B0604020202020204" pitchFamily="34" charset="0"/>
-                <a:cs typeface="Arial" panose="020B0604020202020204" pitchFamily="34" charset="0"/>
-              </a:rPr>
-              <a:t>C</a:t>
-            </a:r>
-            <a:r>
               <a:rPr lang="en-US" sz="2400" b="1" i="1" baseline="-25000" dirty="0">
                 <a:solidFill>
                   <a:schemeClr val="tx1"/>
@@ -23215,146 +23651,6 @@
             <a:endParaRPr lang="en-US" sz="2400" b="1" dirty="0">
               <a:solidFill>
                 <a:srgbClr val="C00000"/>
-              </a:solidFill>
-              <a:latin typeface="Arial" panose="020B0604020202020204" pitchFamily="34" charset="0"/>
-              <a:cs typeface="Arial" panose="020B0604020202020204" pitchFamily="34" charset="0"/>
-            </a:endParaRPr>
-          </a:p>
-        </p:txBody>
-      </p:sp>
-      <p:sp>
-        <p:nvSpPr>
-          <p:cNvPr id="29" name="Rectangle 28">
-            <a:extLst>
-              <a:ext uri="{FF2B5EF4-FFF2-40B4-BE49-F238E27FC236}">
-                <a16:creationId xmlns:a16="http://schemas.microsoft.com/office/drawing/2014/main" id="{32327FC8-D9F4-D197-4681-DC89C3E206D2}"/>
-              </a:ext>
-            </a:extLst>
-          </p:cNvPr>
-          <p:cNvSpPr/>
-          <p:nvPr/>
-        </p:nvSpPr>
-        <p:spPr>
-          <a:xfrm>
-            <a:off x="9249410" y="10711560"/>
-            <a:ext cx="1819398" cy="877223"/>
-          </a:xfrm>
-          <a:prstGeom prst="rect">
-            <a:avLst/>
-          </a:prstGeom>
-          <a:solidFill>
-            <a:schemeClr val="bg1"/>
-          </a:solidFill>
-          <a:ln w="38100">
-            <a:solidFill>
-              <a:schemeClr val="tx1"/>
-            </a:solidFill>
-          </a:ln>
-        </p:spPr>
-        <p:style>
-          <a:lnRef idx="2">
-            <a:schemeClr val="accent1">
-              <a:shade val="50000"/>
-            </a:schemeClr>
-          </a:lnRef>
-          <a:fillRef idx="1">
-            <a:schemeClr val="accent1"/>
-          </a:fillRef>
-          <a:effectRef idx="0">
-            <a:schemeClr val="accent1"/>
-          </a:effectRef>
-          <a:fontRef idx="minor">
-            <a:schemeClr val="lt1"/>
-          </a:fontRef>
-        </p:style>
-        <p:txBody>
-          <a:bodyPr rtlCol="0" anchor="ctr"/>
-          <a:lstStyle/>
-          <a:p>
-            <a:pPr algn="ctr"/>
-            <a:r>
-              <a:rPr lang="en-US" sz="2400" b="1" i="1" dirty="0">
-                <a:solidFill>
-                  <a:schemeClr val="tx1"/>
-                </a:solidFill>
-                <a:latin typeface="Arial" panose="020B0604020202020204" pitchFamily="34" charset="0"/>
-                <a:cs typeface="Arial" panose="020B0604020202020204" pitchFamily="34" charset="0"/>
-              </a:rPr>
-              <a:t>Soil moisture</a:t>
-            </a:r>
-            <a:endParaRPr lang="en-US" sz="2400" b="1" dirty="0">
-              <a:solidFill>
-                <a:schemeClr val="tx1"/>
-              </a:solidFill>
-              <a:latin typeface="Arial" panose="020B0604020202020204" pitchFamily="34" charset="0"/>
-              <a:cs typeface="Arial" panose="020B0604020202020204" pitchFamily="34" charset="0"/>
-            </a:endParaRPr>
-          </a:p>
-        </p:txBody>
-      </p:sp>
-      <p:sp>
-        <p:nvSpPr>
-          <p:cNvPr id="22" name="Rectangle 21">
-            <a:extLst>
-              <a:ext uri="{FF2B5EF4-FFF2-40B4-BE49-F238E27FC236}">
-                <a16:creationId xmlns:a16="http://schemas.microsoft.com/office/drawing/2014/main" id="{A80C041E-0131-071A-4799-F8F798234F95}"/>
-              </a:ext>
-            </a:extLst>
-          </p:cNvPr>
-          <p:cNvSpPr/>
-          <p:nvPr/>
-        </p:nvSpPr>
-        <p:spPr>
-          <a:xfrm>
-            <a:off x="13842977" y="9774814"/>
-            <a:ext cx="1819398" cy="877223"/>
-          </a:xfrm>
-          <a:prstGeom prst="rect">
-            <a:avLst/>
-          </a:prstGeom>
-          <a:solidFill>
-            <a:schemeClr val="bg1"/>
-          </a:solidFill>
-          <a:ln w="38100">
-            <a:solidFill>
-              <a:schemeClr val="tx1"/>
-            </a:solidFill>
-          </a:ln>
-        </p:spPr>
-        <p:style>
-          <a:lnRef idx="2">
-            <a:schemeClr val="accent1">
-              <a:shade val="50000"/>
-            </a:schemeClr>
-          </a:lnRef>
-          <a:fillRef idx="1">
-            <a:schemeClr val="accent1"/>
-          </a:fillRef>
-          <a:effectRef idx="0">
-            <a:schemeClr val="accent1"/>
-          </a:effectRef>
-          <a:fontRef idx="minor">
-            <a:schemeClr val="lt1"/>
-          </a:fontRef>
-        </p:style>
-        <p:txBody>
-          <a:bodyPr rtlCol="0" anchor="ctr"/>
-          <a:lstStyle/>
-          <a:p>
-            <a:pPr algn="ctr"/>
-            <a:r>
-              <a:rPr lang="en-US" sz="2400" b="1" i="1" dirty="0">
-                <a:solidFill>
-                  <a:schemeClr val="tx1"/>
-                </a:solidFill>
-                <a:latin typeface="Arial" panose="020B0604020202020204" pitchFamily="34" charset="0"/>
-                <a:cs typeface="Arial" panose="020B0604020202020204" pitchFamily="34" charset="0"/>
-              </a:rPr>
-              <a:t>VPD</a:t>
-            </a:r>
-            <a:endParaRPr lang="en-US" sz="2400" b="1" dirty="0">
-              <a:solidFill>
-                <a:schemeClr val="tx1"/>
               </a:solidFill>
               <a:latin typeface="Arial" panose="020B0604020202020204" pitchFamily="34" charset="0"/>
               <a:cs typeface="Arial" panose="020B0604020202020204" pitchFamily="34" charset="0"/>

</xml_diff>

<commit_message>
move tables to supplement, start working on fig for pSEM separating out C3 and C4 species
</commit_message>
<xml_diff>
--- a/working_drafts/figs/TXeco_fig6_SEM.pptx
+++ b/working_drafts/figs/TXeco_fig6_SEM.pptx
@@ -5,7 +5,7 @@
     <p:sldMasterId id="2147483708" r:id="rId1"/>
   </p:sldMasterIdLst>
   <p:notesMasterIdLst>
-    <p:notesMasterId r:id="rId8"/>
+    <p:notesMasterId r:id="rId9"/>
   </p:notesMasterIdLst>
   <p:sldIdLst>
     <p:sldId id="276" r:id="rId2"/>
@@ -14,6 +14,7 @@
     <p:sldId id="283" r:id="rId5"/>
     <p:sldId id="284" r:id="rId6"/>
     <p:sldId id="285" r:id="rId7"/>
+    <p:sldId id="286" r:id="rId8"/>
   </p:sldIdLst>
   <p:sldSz cx="27432000" cy="18288000"/>
   <p:notesSz cx="6858000" cy="9144000"/>
@@ -202,7 +203,7 @@
           <a:p>
             <a:fld id="{9C8338E3-F40D-F146-8D3B-4726E84D5200}" type="datetimeFigureOut">
               <a:rPr lang="en-US" smtClean="0"/>
-              <a:t>10/18/23</a:t>
+              <a:t>2/20/24</a:t>
             </a:fld>
             <a:endParaRPr lang="en-US"/>
           </a:p>
@@ -1109,7 +1110,7 @@
           <a:p>
             <a:fld id="{D3A28AA4-801E-B147-9E5C-6E6DBA6E23D1}" type="datetimeFigureOut">
               <a:rPr lang="en-US" smtClean="0"/>
-              <a:t>10/18/23</a:t>
+              <a:t>2/20/24</a:t>
             </a:fld>
             <a:endParaRPr lang="en-US"/>
           </a:p>
@@ -1279,7 +1280,7 @@
           <a:p>
             <a:fld id="{D3A28AA4-801E-B147-9E5C-6E6DBA6E23D1}" type="datetimeFigureOut">
               <a:rPr lang="en-US" smtClean="0"/>
-              <a:t>10/18/23</a:t>
+              <a:t>2/20/24</a:t>
             </a:fld>
             <a:endParaRPr lang="en-US"/>
           </a:p>
@@ -1459,7 +1460,7 @@
           <a:p>
             <a:fld id="{D3A28AA4-801E-B147-9E5C-6E6DBA6E23D1}" type="datetimeFigureOut">
               <a:rPr lang="en-US" smtClean="0"/>
-              <a:t>10/18/23</a:t>
+              <a:t>2/20/24</a:t>
             </a:fld>
             <a:endParaRPr lang="en-US"/>
           </a:p>
@@ -1629,7 +1630,7 @@
           <a:p>
             <a:fld id="{D3A28AA4-801E-B147-9E5C-6E6DBA6E23D1}" type="datetimeFigureOut">
               <a:rPr lang="en-US" smtClean="0"/>
-              <a:t>10/18/23</a:t>
+              <a:t>2/20/24</a:t>
             </a:fld>
             <a:endParaRPr lang="en-US"/>
           </a:p>
@@ -1873,7 +1874,7 @@
           <a:p>
             <a:fld id="{D3A28AA4-801E-B147-9E5C-6E6DBA6E23D1}" type="datetimeFigureOut">
               <a:rPr lang="en-US" smtClean="0"/>
-              <a:t>10/18/23</a:t>
+              <a:t>2/20/24</a:t>
             </a:fld>
             <a:endParaRPr lang="en-US"/>
           </a:p>
@@ -2105,7 +2106,7 @@
           <a:p>
             <a:fld id="{D3A28AA4-801E-B147-9E5C-6E6DBA6E23D1}" type="datetimeFigureOut">
               <a:rPr lang="en-US" smtClean="0"/>
-              <a:t>10/18/23</a:t>
+              <a:t>2/20/24</a:t>
             </a:fld>
             <a:endParaRPr lang="en-US"/>
           </a:p>
@@ -2472,7 +2473,7 @@
           <a:p>
             <a:fld id="{D3A28AA4-801E-B147-9E5C-6E6DBA6E23D1}" type="datetimeFigureOut">
               <a:rPr lang="en-US" smtClean="0"/>
-              <a:t>10/18/23</a:t>
+              <a:t>2/20/24</a:t>
             </a:fld>
             <a:endParaRPr lang="en-US"/>
           </a:p>
@@ -2590,7 +2591,7 @@
           <a:p>
             <a:fld id="{D3A28AA4-801E-B147-9E5C-6E6DBA6E23D1}" type="datetimeFigureOut">
               <a:rPr lang="en-US" smtClean="0"/>
-              <a:t>10/18/23</a:t>
+              <a:t>2/20/24</a:t>
             </a:fld>
             <a:endParaRPr lang="en-US"/>
           </a:p>
@@ -2685,7 +2686,7 @@
           <a:p>
             <a:fld id="{D3A28AA4-801E-B147-9E5C-6E6DBA6E23D1}" type="datetimeFigureOut">
               <a:rPr lang="en-US" smtClean="0"/>
-              <a:t>10/18/23</a:t>
+              <a:t>2/20/24</a:t>
             </a:fld>
             <a:endParaRPr lang="en-US"/>
           </a:p>
@@ -2962,7 +2963,7 @@
           <a:p>
             <a:fld id="{D3A28AA4-801E-B147-9E5C-6E6DBA6E23D1}" type="datetimeFigureOut">
               <a:rPr lang="en-US" smtClean="0"/>
-              <a:t>10/18/23</a:t>
+              <a:t>2/20/24</a:t>
             </a:fld>
             <a:endParaRPr lang="en-US"/>
           </a:p>
@@ -3219,7 +3220,7 @@
           <a:p>
             <a:fld id="{D3A28AA4-801E-B147-9E5C-6E6DBA6E23D1}" type="datetimeFigureOut">
               <a:rPr lang="en-US" smtClean="0"/>
-              <a:t>10/18/23</a:t>
+              <a:t>2/20/24</a:t>
             </a:fld>
             <a:endParaRPr lang="en-US"/>
           </a:p>
@@ -3432,7 +3433,7 @@
           <a:p>
             <a:fld id="{D3A28AA4-801E-B147-9E5C-6E6DBA6E23D1}" type="datetimeFigureOut">
               <a:rPr lang="en-US" smtClean="0"/>
-              <a:t>10/18/23</a:t>
+              <a:t>2/20/24</a:t>
             </a:fld>
             <a:endParaRPr lang="en-US"/>
           </a:p>
@@ -11929,6 +11930,7 @@
             </a:extLst>
           </p:cNvPr>
           <p:cNvCxnSpPr>
+            <a:cxnSpLocks/>
             <a:stCxn id="12" idx="0"/>
             <a:endCxn id="23" idx="2"/>
           </p:cNvCxnSpPr>
@@ -23658,10 +23660,3879 @@
           </a:p>
         </p:txBody>
       </p:sp>
+      <p:sp>
+        <p:nvSpPr>
+          <p:cNvPr id="30" name="Rectangle 29">
+            <a:extLst>
+              <a:ext uri="{FF2B5EF4-FFF2-40B4-BE49-F238E27FC236}">
+                <a16:creationId xmlns:a16="http://schemas.microsoft.com/office/drawing/2014/main" id="{E97EA6A1-86BE-24F6-42D0-3C22C3C5C7AA}"/>
+              </a:ext>
+            </a:extLst>
+          </p:cNvPr>
+          <p:cNvSpPr/>
+          <p:nvPr/>
+        </p:nvSpPr>
+        <p:spPr>
+          <a:xfrm>
+            <a:off x="9153401" y="5932611"/>
+            <a:ext cx="2011416" cy="877223"/>
+          </a:xfrm>
+          <a:prstGeom prst="rect">
+            <a:avLst/>
+          </a:prstGeom>
+          <a:solidFill>
+            <a:schemeClr val="bg1"/>
+          </a:solidFill>
+          <a:ln w="38100">
+            <a:solidFill>
+              <a:schemeClr val="tx1"/>
+            </a:solidFill>
+          </a:ln>
+        </p:spPr>
+        <p:style>
+          <a:lnRef idx="2">
+            <a:schemeClr val="accent1">
+              <a:shade val="50000"/>
+            </a:schemeClr>
+          </a:lnRef>
+          <a:fillRef idx="1">
+            <a:schemeClr val="accent1"/>
+          </a:fillRef>
+          <a:effectRef idx="0">
+            <a:schemeClr val="accent1"/>
+          </a:effectRef>
+          <a:fontRef idx="minor">
+            <a:schemeClr val="lt1"/>
+          </a:fontRef>
+        </p:style>
+        <p:txBody>
+          <a:bodyPr rtlCol="0" anchor="ctr"/>
+          <a:lstStyle/>
+          <a:p>
+            <a:pPr algn="ctr"/>
+            <a:r>
+              <a:rPr lang="en-US" sz="2400" b="1" i="1" dirty="0">
+                <a:solidFill>
+                  <a:schemeClr val="tx1"/>
+                </a:solidFill>
+                <a:latin typeface="Arial" panose="020B0604020202020204" pitchFamily="34" charset="0"/>
+                <a:cs typeface="Arial" panose="020B0604020202020204" pitchFamily="34" charset="0"/>
+              </a:rPr>
+              <a:t>N availability</a:t>
+            </a:r>
+            <a:endParaRPr lang="en-US" sz="2400" b="1" dirty="0">
+              <a:solidFill>
+                <a:schemeClr val="tx1"/>
+              </a:solidFill>
+              <a:latin typeface="Arial" panose="020B0604020202020204" pitchFamily="34" charset="0"/>
+              <a:cs typeface="Arial" panose="020B0604020202020204" pitchFamily="34" charset="0"/>
+            </a:endParaRPr>
+          </a:p>
+        </p:txBody>
+      </p:sp>
     </p:spTree>
     <p:extLst>
       <p:ext uri="{BB962C8B-B14F-4D97-AF65-F5344CB8AC3E}">
         <p14:creationId xmlns:p14="http://schemas.microsoft.com/office/powerpoint/2010/main" val="993560995"/>
+      </p:ext>
+    </p:extLst>
+  </p:cSld>
+  <p:clrMapOvr>
+    <a:masterClrMapping/>
+  </p:clrMapOvr>
+</p:sld>
+</file>
+
+<file path=ppt/slides/slide7.xml><?xml version="1.0" encoding="utf-8"?>
+<p:sld xmlns:a="http://schemas.openxmlformats.org/drawingml/2006/main" xmlns:r="http://schemas.openxmlformats.org/officeDocument/2006/relationships" xmlns:p="http://schemas.openxmlformats.org/presentationml/2006/main">
+  <p:cSld>
+    <p:spTree>
+      <p:nvGrpSpPr>
+        <p:cNvPr id="1" name=""/>
+        <p:cNvGrpSpPr/>
+        <p:nvPr/>
+      </p:nvGrpSpPr>
+      <p:grpSpPr>
+        <a:xfrm>
+          <a:off x="0" y="0"/>
+          <a:ext cx="0" cy="0"/>
+          <a:chOff x="0" y="0"/>
+          <a:chExt cx="0" cy="0"/>
+        </a:xfrm>
+      </p:grpSpPr>
+      <p:cxnSp>
+        <p:nvCxnSpPr>
+          <p:cNvPr id="4" name="Straight Arrow Connector 3">
+            <a:extLst>
+              <a:ext uri="{FF2B5EF4-FFF2-40B4-BE49-F238E27FC236}">
+                <a16:creationId xmlns:a16="http://schemas.microsoft.com/office/drawing/2014/main" id="{471004E9-F254-2103-9390-C3C07480068F}"/>
+              </a:ext>
+            </a:extLst>
+          </p:cNvPr>
+          <p:cNvCxnSpPr/>
+          <p:nvPr/>
+        </p:nvCxnSpPr>
+        <p:spPr>
+          <a:xfrm>
+            <a:off x="11253585" y="5249121"/>
+            <a:ext cx="5556606" cy="0"/>
+          </a:xfrm>
+          <a:prstGeom prst="straightConnector1">
+            <a:avLst/>
+          </a:prstGeom>
+          <a:ln w="53848">
+            <a:solidFill>
+              <a:srgbClr val="C00000">
+                <a:alpha val="50000"/>
+              </a:srgbClr>
+            </a:solidFill>
+            <a:headEnd type="oval" w="med" len="med"/>
+            <a:tailEnd type="triangle" w="med" len="med"/>
+          </a:ln>
+        </p:spPr>
+        <p:style>
+          <a:lnRef idx="1">
+            <a:schemeClr val="accent1"/>
+          </a:lnRef>
+          <a:fillRef idx="0">
+            <a:schemeClr val="accent1"/>
+          </a:fillRef>
+          <a:effectRef idx="0">
+            <a:schemeClr val="accent1"/>
+          </a:effectRef>
+          <a:fontRef idx="minor">
+            <a:schemeClr val="tx1"/>
+          </a:fontRef>
+        </p:style>
+      </p:cxnSp>
+      <p:cxnSp>
+        <p:nvCxnSpPr>
+          <p:cNvPr id="5" name="Elbow Connector 4">
+            <a:extLst>
+              <a:ext uri="{FF2B5EF4-FFF2-40B4-BE49-F238E27FC236}">
+                <a16:creationId xmlns:a16="http://schemas.microsoft.com/office/drawing/2014/main" id="{6485AEDD-BDD7-0A7D-42FE-D804788BB428}"/>
+              </a:ext>
+            </a:extLst>
+          </p:cNvPr>
+          <p:cNvCxnSpPr>
+            <a:cxnSpLocks/>
+          </p:cNvCxnSpPr>
+          <p:nvPr/>
+        </p:nvCxnSpPr>
+        <p:spPr>
+          <a:xfrm flipV="1">
+            <a:off x="12970482" y="3257839"/>
+            <a:ext cx="3864664" cy="264294"/>
+          </a:xfrm>
+          <a:prstGeom prst="bentConnector3">
+            <a:avLst>
+              <a:gd name="adj1" fmla="val 50"/>
+            </a:avLst>
+          </a:prstGeom>
+          <a:ln w="36195">
+            <a:solidFill>
+              <a:srgbClr val="C00000">
+                <a:alpha val="50000"/>
+              </a:srgbClr>
+            </a:solidFill>
+            <a:headEnd type="oval" w="med" len="med"/>
+            <a:tailEnd type="triangle" w="med" len="med"/>
+          </a:ln>
+        </p:spPr>
+        <p:style>
+          <a:lnRef idx="1">
+            <a:schemeClr val="accent1"/>
+          </a:lnRef>
+          <a:fillRef idx="0">
+            <a:schemeClr val="accent1"/>
+          </a:fillRef>
+          <a:effectRef idx="0">
+            <a:schemeClr val="accent1"/>
+          </a:effectRef>
+          <a:fontRef idx="minor">
+            <a:schemeClr val="tx1"/>
+          </a:fontRef>
+        </p:style>
+      </p:cxnSp>
+      <p:cxnSp>
+        <p:nvCxnSpPr>
+          <p:cNvPr id="6" name="Elbow Connector 5">
+            <a:extLst>
+              <a:ext uri="{FF2B5EF4-FFF2-40B4-BE49-F238E27FC236}">
+                <a16:creationId xmlns:a16="http://schemas.microsoft.com/office/drawing/2014/main" id="{1FF98F5B-3722-85BA-CFA6-84F89DF95AF7}"/>
+              </a:ext>
+            </a:extLst>
+          </p:cNvPr>
+          <p:cNvCxnSpPr>
+            <a:cxnSpLocks/>
+          </p:cNvCxnSpPr>
+          <p:nvPr/>
+        </p:nvCxnSpPr>
+        <p:spPr>
+          <a:xfrm rot="5400000" flipH="1" flipV="1">
+            <a:off x="10741609" y="3636705"/>
+            <a:ext cx="452840" cy="1459354"/>
+          </a:xfrm>
+          <a:prstGeom prst="bentConnector2">
+            <a:avLst/>
+          </a:prstGeom>
+          <a:ln w="18161">
+            <a:solidFill>
+              <a:srgbClr val="C00000"/>
+            </a:solidFill>
+            <a:headEnd type="oval" w="med" len="med"/>
+            <a:tailEnd type="triangle" w="med" len="med"/>
+          </a:ln>
+        </p:spPr>
+        <p:style>
+          <a:lnRef idx="1">
+            <a:schemeClr val="accent1"/>
+          </a:lnRef>
+          <a:fillRef idx="0">
+            <a:schemeClr val="accent1"/>
+          </a:fillRef>
+          <a:effectRef idx="0">
+            <a:schemeClr val="accent1"/>
+          </a:effectRef>
+          <a:fontRef idx="minor">
+            <a:schemeClr val="tx1"/>
+          </a:fontRef>
+        </p:style>
+      </p:cxnSp>
+      <p:cxnSp>
+        <p:nvCxnSpPr>
+          <p:cNvPr id="7" name="Straight Arrow Connector 6">
+            <a:extLst>
+              <a:ext uri="{FF2B5EF4-FFF2-40B4-BE49-F238E27FC236}">
+                <a16:creationId xmlns:a16="http://schemas.microsoft.com/office/drawing/2014/main" id="{7B8C9CC3-563E-D3F5-5921-57DADDA51E07}"/>
+              </a:ext>
+            </a:extLst>
+          </p:cNvPr>
+          <p:cNvCxnSpPr>
+            <a:stCxn id="42" idx="2"/>
+            <a:endCxn id="41" idx="0"/>
+          </p:cNvCxnSpPr>
+          <p:nvPr/>
+        </p:nvCxnSpPr>
+        <p:spPr>
+          <a:xfrm>
+            <a:off x="12607406" y="2439370"/>
+            <a:ext cx="0" cy="1099316"/>
+          </a:xfrm>
+          <a:prstGeom prst="straightConnector1">
+            <a:avLst/>
+          </a:prstGeom>
+          <a:ln w="24130">
+            <a:solidFill>
+              <a:schemeClr val="bg1">
+                <a:lumMod val="50000"/>
+              </a:schemeClr>
+            </a:solidFill>
+            <a:prstDash val="sysDash"/>
+            <a:tailEnd type="triangle"/>
+          </a:ln>
+        </p:spPr>
+        <p:style>
+          <a:lnRef idx="1">
+            <a:schemeClr val="accent1"/>
+          </a:lnRef>
+          <a:fillRef idx="0">
+            <a:schemeClr val="accent1"/>
+          </a:fillRef>
+          <a:effectRef idx="0">
+            <a:schemeClr val="accent1"/>
+          </a:effectRef>
+          <a:fontRef idx="minor">
+            <a:schemeClr val="tx1"/>
+          </a:fontRef>
+        </p:style>
+      </p:cxnSp>
+      <p:cxnSp>
+        <p:nvCxnSpPr>
+          <p:cNvPr id="8" name="Elbow Connector 7">
+            <a:extLst>
+              <a:ext uri="{FF2B5EF4-FFF2-40B4-BE49-F238E27FC236}">
+                <a16:creationId xmlns:a16="http://schemas.microsoft.com/office/drawing/2014/main" id="{E1F9DD60-41FB-0227-B79C-E301B845EDFF}"/>
+              </a:ext>
+            </a:extLst>
+          </p:cNvPr>
+          <p:cNvCxnSpPr>
+            <a:cxnSpLocks/>
+          </p:cNvCxnSpPr>
+          <p:nvPr/>
+        </p:nvCxnSpPr>
+        <p:spPr>
+          <a:xfrm flipV="1">
+            <a:off x="10191426" y="2499876"/>
+            <a:ext cx="7049147" cy="2539909"/>
+          </a:xfrm>
+          <a:prstGeom prst="bentConnector4">
+            <a:avLst>
+              <a:gd name="adj1" fmla="val -15739"/>
+              <a:gd name="adj2" fmla="val 146522"/>
+            </a:avLst>
+          </a:prstGeom>
+          <a:ln w="35052">
+            <a:solidFill>
+              <a:schemeClr val="accent1">
+                <a:lumMod val="75000"/>
+                <a:alpha val="50000"/>
+              </a:schemeClr>
+            </a:solidFill>
+            <a:tailEnd type="triangle"/>
+          </a:ln>
+        </p:spPr>
+        <p:style>
+          <a:lnRef idx="1">
+            <a:schemeClr val="accent1"/>
+          </a:lnRef>
+          <a:fillRef idx="0">
+            <a:schemeClr val="accent1"/>
+          </a:fillRef>
+          <a:effectRef idx="0">
+            <a:schemeClr val="accent1"/>
+          </a:effectRef>
+          <a:fontRef idx="minor">
+            <a:schemeClr val="tx1"/>
+          </a:fontRef>
+        </p:style>
+      </p:cxnSp>
+      <p:cxnSp>
+        <p:nvCxnSpPr>
+          <p:cNvPr id="9" name="Straight Arrow Connector 8">
+            <a:extLst>
+              <a:ext uri="{FF2B5EF4-FFF2-40B4-BE49-F238E27FC236}">
+                <a16:creationId xmlns:a16="http://schemas.microsoft.com/office/drawing/2014/main" id="{89A4B439-3312-A6C1-6152-930E8CC223EF}"/>
+              </a:ext>
+            </a:extLst>
+          </p:cNvPr>
+          <p:cNvCxnSpPr>
+            <a:stCxn id="44" idx="0"/>
+            <a:endCxn id="45" idx="2"/>
+          </p:cNvCxnSpPr>
+          <p:nvPr/>
+        </p:nvCxnSpPr>
+        <p:spPr>
+          <a:xfrm flipV="1">
+            <a:off x="17744843" y="3377099"/>
+            <a:ext cx="0" cy="1224075"/>
+          </a:xfrm>
+          <a:prstGeom prst="straightConnector1">
+            <a:avLst/>
+          </a:prstGeom>
+          <a:ln w="78994">
+            <a:solidFill>
+              <a:srgbClr val="C00000">
+                <a:alpha val="50000"/>
+              </a:srgbClr>
+            </a:solidFill>
+            <a:headEnd type="oval" w="med" len="med"/>
+            <a:tailEnd type="triangle" w="med" len="med"/>
+          </a:ln>
+        </p:spPr>
+        <p:style>
+          <a:lnRef idx="1">
+            <a:schemeClr val="accent1"/>
+          </a:lnRef>
+          <a:fillRef idx="0">
+            <a:schemeClr val="accent1"/>
+          </a:fillRef>
+          <a:effectRef idx="0">
+            <a:schemeClr val="accent1"/>
+          </a:effectRef>
+          <a:fontRef idx="minor">
+            <a:schemeClr val="tx1"/>
+          </a:fontRef>
+        </p:style>
+      </p:cxnSp>
+      <p:cxnSp>
+        <p:nvCxnSpPr>
+          <p:cNvPr id="10" name="Elbow Connector 9">
+            <a:extLst>
+              <a:ext uri="{FF2B5EF4-FFF2-40B4-BE49-F238E27FC236}">
+                <a16:creationId xmlns:a16="http://schemas.microsoft.com/office/drawing/2014/main" id="{65E85A8E-36A8-6F5B-68B6-490BC144C642}"/>
+              </a:ext>
+            </a:extLst>
+          </p:cNvPr>
+          <p:cNvCxnSpPr>
+            <a:cxnSpLocks/>
+          </p:cNvCxnSpPr>
+          <p:nvPr/>
+        </p:nvCxnSpPr>
+        <p:spPr>
+          <a:xfrm rot="16200000" flipH="1">
+            <a:off x="14764893" y="644959"/>
+            <a:ext cx="241362" cy="3830184"/>
+          </a:xfrm>
+          <a:prstGeom prst="bentConnector2">
+            <a:avLst/>
+          </a:prstGeom>
+          <a:ln w="60960">
+            <a:solidFill>
+              <a:schemeClr val="accent1">
+                <a:lumMod val="75000"/>
+                <a:alpha val="50000"/>
+              </a:schemeClr>
+            </a:solidFill>
+            <a:tailEnd type="triangle"/>
+          </a:ln>
+        </p:spPr>
+        <p:style>
+          <a:lnRef idx="1">
+            <a:schemeClr val="accent1"/>
+          </a:lnRef>
+          <a:fillRef idx="0">
+            <a:schemeClr val="accent1"/>
+          </a:fillRef>
+          <a:effectRef idx="0">
+            <a:schemeClr val="accent1"/>
+          </a:effectRef>
+          <a:fontRef idx="minor">
+            <a:schemeClr val="tx1"/>
+          </a:fontRef>
+        </p:style>
+      </p:cxnSp>
+      <p:cxnSp>
+        <p:nvCxnSpPr>
+          <p:cNvPr id="13" name="Elbow Connector 12">
+            <a:extLst>
+              <a:ext uri="{FF2B5EF4-FFF2-40B4-BE49-F238E27FC236}">
+                <a16:creationId xmlns:a16="http://schemas.microsoft.com/office/drawing/2014/main" id="{CE3869F9-DEE4-1E9F-DC1A-34BC178E5062}"/>
+              </a:ext>
+            </a:extLst>
+          </p:cNvPr>
+          <p:cNvCxnSpPr>
+            <a:cxnSpLocks/>
+          </p:cNvCxnSpPr>
+          <p:nvPr/>
+        </p:nvCxnSpPr>
+        <p:spPr>
+          <a:xfrm>
+            <a:off x="11165335" y="2782358"/>
+            <a:ext cx="3922766" cy="729775"/>
+          </a:xfrm>
+          <a:prstGeom prst="bentConnector3">
+            <a:avLst>
+              <a:gd name="adj1" fmla="val 100020"/>
+            </a:avLst>
+          </a:prstGeom>
+          <a:ln w="14731">
+            <a:solidFill>
+              <a:srgbClr val="C00000">
+                <a:alpha val="50000"/>
+              </a:srgbClr>
+            </a:solidFill>
+            <a:headEnd type="oval" w="med" len="med"/>
+            <a:tailEnd type="triangle" w="med" len="med"/>
+          </a:ln>
+        </p:spPr>
+        <p:style>
+          <a:lnRef idx="1">
+            <a:schemeClr val="accent1"/>
+          </a:lnRef>
+          <a:fillRef idx="0">
+            <a:schemeClr val="accent1"/>
+          </a:fillRef>
+          <a:effectRef idx="0">
+            <a:schemeClr val="accent1"/>
+          </a:effectRef>
+          <a:fontRef idx="minor">
+            <a:schemeClr val="tx1"/>
+          </a:fontRef>
+        </p:style>
+      </p:cxnSp>
+      <p:cxnSp>
+        <p:nvCxnSpPr>
+          <p:cNvPr id="14" name="Straight Arrow Connector 13">
+            <a:extLst>
+              <a:ext uri="{FF2B5EF4-FFF2-40B4-BE49-F238E27FC236}">
+                <a16:creationId xmlns:a16="http://schemas.microsoft.com/office/drawing/2014/main" id="{509C7D75-3648-13FC-460B-270C67EF60E3}"/>
+              </a:ext>
+            </a:extLst>
+          </p:cNvPr>
+          <p:cNvCxnSpPr>
+            <a:cxnSpLocks/>
+          </p:cNvCxnSpPr>
+          <p:nvPr/>
+        </p:nvCxnSpPr>
+        <p:spPr>
+          <a:xfrm>
+            <a:off x="9687156" y="3392574"/>
+            <a:ext cx="0" cy="1200465"/>
+          </a:xfrm>
+          <a:prstGeom prst="straightConnector1">
+            <a:avLst/>
+          </a:prstGeom>
+          <a:ln w="41910">
+            <a:solidFill>
+              <a:srgbClr val="C00000">
+                <a:alpha val="50000"/>
+              </a:srgbClr>
+            </a:solidFill>
+            <a:headEnd type="oval" w="med" len="med"/>
+            <a:tailEnd type="triangle" w="med" len="med"/>
+          </a:ln>
+        </p:spPr>
+        <p:style>
+          <a:lnRef idx="1">
+            <a:schemeClr val="accent1"/>
+          </a:lnRef>
+          <a:fillRef idx="0">
+            <a:schemeClr val="accent1"/>
+          </a:fillRef>
+          <a:effectRef idx="0">
+            <a:schemeClr val="accent1"/>
+          </a:effectRef>
+          <a:fontRef idx="minor">
+            <a:schemeClr val="tx1"/>
+          </a:fontRef>
+        </p:style>
+      </p:cxnSp>
+      <p:cxnSp>
+        <p:nvCxnSpPr>
+          <p:cNvPr id="15" name="Elbow Connector 14">
+            <a:extLst>
+              <a:ext uri="{FF2B5EF4-FFF2-40B4-BE49-F238E27FC236}">
+                <a16:creationId xmlns:a16="http://schemas.microsoft.com/office/drawing/2014/main" id="{F3007708-2ADA-6094-2AA5-C9D8BA8B20D4}"/>
+              </a:ext>
+            </a:extLst>
+          </p:cNvPr>
+          <p:cNvCxnSpPr>
+            <a:cxnSpLocks/>
+          </p:cNvCxnSpPr>
+          <p:nvPr/>
+        </p:nvCxnSpPr>
+        <p:spPr>
+          <a:xfrm rot="10800000" flipV="1">
+            <a:off x="11165336" y="2429874"/>
+            <a:ext cx="3199099" cy="650028"/>
+          </a:xfrm>
+          <a:prstGeom prst="bentConnector3">
+            <a:avLst>
+              <a:gd name="adj1" fmla="val 97"/>
+            </a:avLst>
+          </a:prstGeom>
+          <a:ln w="142875">
+            <a:solidFill>
+              <a:srgbClr val="C00000">
+                <a:alpha val="50000"/>
+              </a:srgbClr>
+            </a:solidFill>
+            <a:headEnd type="oval" w="med" len="med"/>
+            <a:tailEnd type="triangle" w="med" len="med"/>
+          </a:ln>
+        </p:spPr>
+        <p:style>
+          <a:lnRef idx="1">
+            <a:schemeClr val="accent1"/>
+          </a:lnRef>
+          <a:fillRef idx="0">
+            <a:schemeClr val="accent1"/>
+          </a:fillRef>
+          <a:effectRef idx="0">
+            <a:schemeClr val="accent1"/>
+          </a:effectRef>
+          <a:fontRef idx="minor">
+            <a:schemeClr val="tx1"/>
+          </a:fontRef>
+        </p:style>
+      </p:cxnSp>
+      <p:grpSp>
+        <p:nvGrpSpPr>
+          <p:cNvPr id="16" name="Group 15">
+            <a:extLst>
+              <a:ext uri="{FF2B5EF4-FFF2-40B4-BE49-F238E27FC236}">
+                <a16:creationId xmlns:a16="http://schemas.microsoft.com/office/drawing/2014/main" id="{618A1F0C-E8DB-3C74-8B76-DE562361D010}"/>
+              </a:ext>
+            </a:extLst>
+          </p:cNvPr>
+          <p:cNvGrpSpPr/>
+          <p:nvPr/>
+        </p:nvGrpSpPr>
+        <p:grpSpPr>
+          <a:xfrm>
+            <a:off x="10805203" y="16725853"/>
+            <a:ext cx="7208824" cy="1332351"/>
+            <a:chOff x="9836749" y="13266385"/>
+            <a:chExt cx="7208824" cy="1332351"/>
+          </a:xfrm>
+        </p:grpSpPr>
+        <p:cxnSp>
+          <p:nvCxnSpPr>
+            <p:cNvPr id="17" name="Straight Connector 16">
+              <a:extLst>
+                <a:ext uri="{FF2B5EF4-FFF2-40B4-BE49-F238E27FC236}">
+                  <a16:creationId xmlns:a16="http://schemas.microsoft.com/office/drawing/2014/main" id="{B0ADB8D6-9A76-5BEB-AB37-B67557703AF8}"/>
+                </a:ext>
+              </a:extLst>
+            </p:cNvPr>
+            <p:cNvCxnSpPr>
+              <a:cxnSpLocks/>
+            </p:cNvCxnSpPr>
+            <p:nvPr/>
+          </p:nvCxnSpPr>
+          <p:spPr>
+            <a:xfrm>
+              <a:off x="11510490" y="13425953"/>
+              <a:ext cx="951115" cy="0"/>
+            </a:xfrm>
+            <a:prstGeom prst="line">
+              <a:avLst/>
+            </a:prstGeom>
+            <a:ln w="95250">
+              <a:solidFill>
+                <a:srgbClr val="C00000"/>
+              </a:solidFill>
+            </a:ln>
+          </p:spPr>
+          <p:style>
+            <a:lnRef idx="1">
+              <a:schemeClr val="accent1"/>
+            </a:lnRef>
+            <a:fillRef idx="0">
+              <a:schemeClr val="accent1"/>
+            </a:fillRef>
+            <a:effectRef idx="0">
+              <a:schemeClr val="accent1"/>
+            </a:effectRef>
+            <a:fontRef idx="minor">
+              <a:schemeClr val="tx1"/>
+            </a:fontRef>
+          </p:style>
+        </p:cxnSp>
+        <p:cxnSp>
+          <p:nvCxnSpPr>
+            <p:cNvPr id="18" name="Straight Connector 17">
+              <a:extLst>
+                <a:ext uri="{FF2B5EF4-FFF2-40B4-BE49-F238E27FC236}">
+                  <a16:creationId xmlns:a16="http://schemas.microsoft.com/office/drawing/2014/main" id="{71C47D4A-253D-2150-21DD-F106CEB5DCB9}"/>
+                </a:ext>
+              </a:extLst>
+            </p:cNvPr>
+            <p:cNvCxnSpPr>
+              <a:cxnSpLocks/>
+            </p:cNvCxnSpPr>
+            <p:nvPr/>
+          </p:nvCxnSpPr>
+          <p:spPr>
+            <a:xfrm>
+              <a:off x="10577418" y="13446974"/>
+              <a:ext cx="951115" cy="0"/>
+            </a:xfrm>
+            <a:prstGeom prst="line">
+              <a:avLst/>
+            </a:prstGeom>
+            <a:ln w="47625">
+              <a:solidFill>
+                <a:srgbClr val="C00000"/>
+              </a:solidFill>
+            </a:ln>
+          </p:spPr>
+          <p:style>
+            <a:lnRef idx="1">
+              <a:schemeClr val="accent1"/>
+            </a:lnRef>
+            <a:fillRef idx="0">
+              <a:schemeClr val="accent1"/>
+            </a:fillRef>
+            <a:effectRef idx="0">
+              <a:schemeClr val="accent1"/>
+            </a:effectRef>
+            <a:fontRef idx="minor">
+              <a:schemeClr val="tx1"/>
+            </a:fontRef>
+          </p:style>
+        </p:cxnSp>
+        <p:cxnSp>
+          <p:nvCxnSpPr>
+            <p:cNvPr id="19" name="Straight Connector 18">
+              <a:extLst>
+                <a:ext uri="{FF2B5EF4-FFF2-40B4-BE49-F238E27FC236}">
+                  <a16:creationId xmlns:a16="http://schemas.microsoft.com/office/drawing/2014/main" id="{95746896-6CE9-E3F9-171E-4C4E4DBA9614}"/>
+                </a:ext>
+              </a:extLst>
+            </p:cNvPr>
+            <p:cNvCxnSpPr>
+              <a:cxnSpLocks/>
+            </p:cNvCxnSpPr>
+            <p:nvPr/>
+          </p:nvCxnSpPr>
+          <p:spPr>
+            <a:xfrm>
+              <a:off x="14349853" y="13429128"/>
+              <a:ext cx="951115" cy="0"/>
+            </a:xfrm>
+            <a:prstGeom prst="line">
+              <a:avLst/>
+            </a:prstGeom>
+            <a:ln w="95250">
+              <a:solidFill>
+                <a:schemeClr val="accent1">
+                  <a:lumMod val="75000"/>
+                </a:schemeClr>
+              </a:solidFill>
+            </a:ln>
+          </p:spPr>
+          <p:style>
+            <a:lnRef idx="1">
+              <a:schemeClr val="accent1"/>
+            </a:lnRef>
+            <a:fillRef idx="0">
+              <a:schemeClr val="accent1"/>
+            </a:fillRef>
+            <a:effectRef idx="0">
+              <a:schemeClr val="accent1"/>
+            </a:effectRef>
+            <a:fontRef idx="minor">
+              <a:schemeClr val="tx1"/>
+            </a:fontRef>
+          </p:style>
+        </p:cxnSp>
+        <p:cxnSp>
+          <p:nvCxnSpPr>
+            <p:cNvPr id="20" name="Straight Connector 19">
+              <a:extLst>
+                <a:ext uri="{FF2B5EF4-FFF2-40B4-BE49-F238E27FC236}">
+                  <a16:creationId xmlns:a16="http://schemas.microsoft.com/office/drawing/2014/main" id="{78799202-DA54-CB64-4F23-3B1AF7A30833}"/>
+                </a:ext>
+              </a:extLst>
+            </p:cNvPr>
+            <p:cNvCxnSpPr>
+              <a:cxnSpLocks/>
+            </p:cNvCxnSpPr>
+            <p:nvPr/>
+          </p:nvCxnSpPr>
+          <p:spPr>
+            <a:xfrm>
+              <a:off x="15297410" y="13451128"/>
+              <a:ext cx="951115" cy="0"/>
+            </a:xfrm>
+            <a:prstGeom prst="line">
+              <a:avLst/>
+            </a:prstGeom>
+            <a:ln w="47625">
+              <a:solidFill>
+                <a:schemeClr val="accent1">
+                  <a:lumMod val="75000"/>
+                </a:schemeClr>
+              </a:solidFill>
+            </a:ln>
+          </p:spPr>
+          <p:style>
+            <a:lnRef idx="1">
+              <a:schemeClr val="accent1"/>
+            </a:lnRef>
+            <a:fillRef idx="0">
+              <a:schemeClr val="accent1"/>
+            </a:fillRef>
+            <a:effectRef idx="0">
+              <a:schemeClr val="accent1"/>
+            </a:effectRef>
+            <a:fontRef idx="minor">
+              <a:schemeClr val="tx1"/>
+            </a:fontRef>
+          </p:style>
+        </p:cxnSp>
+        <p:sp>
+          <p:nvSpPr>
+            <p:cNvPr id="21" name="TextBox 20">
+              <a:extLst>
+                <a:ext uri="{FF2B5EF4-FFF2-40B4-BE49-F238E27FC236}">
+                  <a16:creationId xmlns:a16="http://schemas.microsoft.com/office/drawing/2014/main" id="{C154C1F4-10C9-DFB3-43BE-DC11D7ED6269}"/>
+                </a:ext>
+              </a:extLst>
+            </p:cNvPr>
+            <p:cNvSpPr txBox="1"/>
+            <p:nvPr/>
+          </p:nvSpPr>
+          <p:spPr>
+            <a:xfrm>
+              <a:off x="12533923" y="13433721"/>
+              <a:ext cx="790601" cy="553998"/>
+            </a:xfrm>
+            <a:prstGeom prst="rect">
+              <a:avLst/>
+            </a:prstGeom>
+            <a:noFill/>
+          </p:spPr>
+          <p:txBody>
+            <a:bodyPr wrap="none" rtlCol="0">
+              <a:spAutoFit/>
+            </a:bodyPr>
+            <a:lstStyle/>
+            <a:p>
+              <a:r>
+                <a:rPr lang="en-US" sz="3000" b="1" dirty="0">
+                  <a:latin typeface="Times New Roman" panose="02020603050405020304" pitchFamily="18" charset="0"/>
+                  <a:cs typeface="Times New Roman" panose="02020603050405020304" pitchFamily="18" charset="0"/>
+                </a:rPr>
+                <a:t>-0.9</a:t>
+              </a:r>
+            </a:p>
+          </p:txBody>
+        </p:sp>
+        <p:sp>
+          <p:nvSpPr>
+            <p:cNvPr id="22" name="TextBox 21">
+              <a:extLst>
+                <a:ext uri="{FF2B5EF4-FFF2-40B4-BE49-F238E27FC236}">
+                  <a16:creationId xmlns:a16="http://schemas.microsoft.com/office/drawing/2014/main" id="{DAC3FF37-68DE-B397-531A-6676FB013490}"/>
+                </a:ext>
+              </a:extLst>
+            </p:cNvPr>
+            <p:cNvSpPr txBox="1"/>
+            <p:nvPr/>
+          </p:nvSpPr>
+          <p:spPr>
+            <a:xfrm>
+              <a:off x="13540373" y="13440763"/>
+              <a:ext cx="665567" cy="553998"/>
+            </a:xfrm>
+            <a:prstGeom prst="rect">
+              <a:avLst/>
+            </a:prstGeom>
+            <a:noFill/>
+          </p:spPr>
+          <p:txBody>
+            <a:bodyPr wrap="none" rtlCol="0">
+              <a:spAutoFit/>
+            </a:bodyPr>
+            <a:lstStyle/>
+            <a:p>
+              <a:r>
+                <a:rPr lang="en-US" sz="3000" b="1" dirty="0">
+                  <a:latin typeface="Times New Roman" panose="02020603050405020304" pitchFamily="18" charset="0"/>
+                  <a:cs typeface="Times New Roman" panose="02020603050405020304" pitchFamily="18" charset="0"/>
+                </a:rPr>
+                <a:t>0.9</a:t>
+              </a:r>
+            </a:p>
+          </p:txBody>
+        </p:sp>
+        <p:sp>
+          <p:nvSpPr>
+            <p:cNvPr id="23" name="TextBox 22">
+              <a:extLst>
+                <a:ext uri="{FF2B5EF4-FFF2-40B4-BE49-F238E27FC236}">
+                  <a16:creationId xmlns:a16="http://schemas.microsoft.com/office/drawing/2014/main" id="{785DA07D-E6D5-7089-8174-49FA2E96D6E0}"/>
+                </a:ext>
+              </a:extLst>
+            </p:cNvPr>
+            <p:cNvSpPr txBox="1"/>
+            <p:nvPr/>
+          </p:nvSpPr>
+          <p:spPr>
+            <a:xfrm>
+              <a:off x="11590746" y="13440763"/>
+              <a:ext cx="793807" cy="553998"/>
+            </a:xfrm>
+            <a:prstGeom prst="rect">
+              <a:avLst/>
+            </a:prstGeom>
+            <a:noFill/>
+          </p:spPr>
+          <p:txBody>
+            <a:bodyPr wrap="none" rtlCol="0">
+              <a:spAutoFit/>
+            </a:bodyPr>
+            <a:lstStyle/>
+            <a:p>
+              <a:r>
+                <a:rPr lang="en-US" sz="3000" b="1" dirty="0">
+                  <a:latin typeface="Times New Roman" panose="02020603050405020304" pitchFamily="18" charset="0"/>
+                  <a:cs typeface="Times New Roman" panose="02020603050405020304" pitchFamily="18" charset="0"/>
+                </a:rPr>
+                <a:t>-0.6</a:t>
+              </a:r>
+            </a:p>
+          </p:txBody>
+        </p:sp>
+        <p:sp>
+          <p:nvSpPr>
+            <p:cNvPr id="24" name="TextBox 23">
+              <a:extLst>
+                <a:ext uri="{FF2B5EF4-FFF2-40B4-BE49-F238E27FC236}">
+                  <a16:creationId xmlns:a16="http://schemas.microsoft.com/office/drawing/2014/main" id="{DA1B4F94-0D6F-C5FE-3471-32160EE98FB1}"/>
+                </a:ext>
+              </a:extLst>
+            </p:cNvPr>
+            <p:cNvSpPr txBox="1"/>
+            <p:nvPr/>
+          </p:nvSpPr>
+          <p:spPr>
+            <a:xfrm>
+              <a:off x="14483550" y="13444216"/>
+              <a:ext cx="665567" cy="553998"/>
+            </a:xfrm>
+            <a:prstGeom prst="rect">
+              <a:avLst/>
+            </a:prstGeom>
+            <a:noFill/>
+          </p:spPr>
+          <p:txBody>
+            <a:bodyPr wrap="none" rtlCol="0">
+              <a:spAutoFit/>
+            </a:bodyPr>
+            <a:lstStyle/>
+            <a:p>
+              <a:r>
+                <a:rPr lang="en-US" sz="3000" b="1" dirty="0">
+                  <a:latin typeface="Times New Roman" panose="02020603050405020304" pitchFamily="18" charset="0"/>
+                  <a:cs typeface="Times New Roman" panose="02020603050405020304" pitchFamily="18" charset="0"/>
+                </a:rPr>
+                <a:t>0.6</a:t>
+              </a:r>
+            </a:p>
+          </p:txBody>
+        </p:sp>
+        <p:sp>
+          <p:nvSpPr>
+            <p:cNvPr id="25" name="TextBox 24">
+              <a:extLst>
+                <a:ext uri="{FF2B5EF4-FFF2-40B4-BE49-F238E27FC236}">
+                  <a16:creationId xmlns:a16="http://schemas.microsoft.com/office/drawing/2014/main" id="{E68E26F5-4DFB-E8EA-ACF0-7A567ECEEE84}"/>
+                </a:ext>
+              </a:extLst>
+            </p:cNvPr>
+            <p:cNvSpPr txBox="1"/>
+            <p:nvPr/>
+          </p:nvSpPr>
+          <p:spPr>
+            <a:xfrm>
+              <a:off x="15439734" y="13426392"/>
+              <a:ext cx="665567" cy="553998"/>
+            </a:xfrm>
+            <a:prstGeom prst="rect">
+              <a:avLst/>
+            </a:prstGeom>
+            <a:noFill/>
+          </p:spPr>
+          <p:txBody>
+            <a:bodyPr wrap="none" rtlCol="0">
+              <a:spAutoFit/>
+            </a:bodyPr>
+            <a:lstStyle/>
+            <a:p>
+              <a:r>
+                <a:rPr lang="en-US" sz="3000" b="1" dirty="0">
+                  <a:latin typeface="Times New Roman" panose="02020603050405020304" pitchFamily="18" charset="0"/>
+                  <a:cs typeface="Times New Roman" panose="02020603050405020304" pitchFamily="18" charset="0"/>
+                </a:rPr>
+                <a:t>0.3</a:t>
+              </a:r>
+            </a:p>
+          </p:txBody>
+        </p:sp>
+        <p:sp>
+          <p:nvSpPr>
+            <p:cNvPr id="26" name="TextBox 25">
+              <a:extLst>
+                <a:ext uri="{FF2B5EF4-FFF2-40B4-BE49-F238E27FC236}">
+                  <a16:creationId xmlns:a16="http://schemas.microsoft.com/office/drawing/2014/main" id="{72D62112-7482-FBE0-F16F-F7CDB895EE1C}"/>
+                </a:ext>
+              </a:extLst>
+            </p:cNvPr>
+            <p:cNvSpPr txBox="1"/>
+            <p:nvPr/>
+          </p:nvSpPr>
+          <p:spPr>
+            <a:xfrm>
+              <a:off x="10693986" y="13445817"/>
+              <a:ext cx="793807" cy="553998"/>
+            </a:xfrm>
+            <a:prstGeom prst="rect">
+              <a:avLst/>
+            </a:prstGeom>
+            <a:noFill/>
+          </p:spPr>
+          <p:txBody>
+            <a:bodyPr wrap="none" rtlCol="0">
+              <a:spAutoFit/>
+            </a:bodyPr>
+            <a:lstStyle/>
+            <a:p>
+              <a:r>
+                <a:rPr lang="en-US" sz="3000" b="1" dirty="0">
+                  <a:latin typeface="Times New Roman" panose="02020603050405020304" pitchFamily="18" charset="0"/>
+                  <a:cs typeface="Times New Roman" panose="02020603050405020304" pitchFamily="18" charset="0"/>
+                </a:rPr>
+                <a:t>-0.3</a:t>
+              </a:r>
+            </a:p>
+          </p:txBody>
+        </p:sp>
+        <p:sp>
+          <p:nvSpPr>
+            <p:cNvPr id="27" name="TextBox 26">
+              <a:extLst>
+                <a:ext uri="{FF2B5EF4-FFF2-40B4-BE49-F238E27FC236}">
+                  <a16:creationId xmlns:a16="http://schemas.microsoft.com/office/drawing/2014/main" id="{853E7AE9-CD48-6228-03F9-FDB1ADC63086}"/>
+                </a:ext>
+              </a:extLst>
+            </p:cNvPr>
+            <p:cNvSpPr txBox="1"/>
+            <p:nvPr/>
+          </p:nvSpPr>
+          <p:spPr>
+            <a:xfrm>
+              <a:off x="11276323" y="14044738"/>
+              <a:ext cx="4278735" cy="553998"/>
+            </a:xfrm>
+            <a:prstGeom prst="rect">
+              <a:avLst/>
+            </a:prstGeom>
+            <a:noFill/>
+          </p:spPr>
+          <p:txBody>
+            <a:bodyPr wrap="none" rtlCol="0">
+              <a:spAutoFit/>
+            </a:bodyPr>
+            <a:lstStyle/>
+            <a:p>
+              <a:r>
+                <a:rPr lang="en-US" sz="3000" b="1" dirty="0">
+                  <a:latin typeface="Times New Roman" panose="02020603050405020304" pitchFamily="18" charset="0"/>
+                  <a:cs typeface="Times New Roman" panose="02020603050405020304" pitchFamily="18" charset="0"/>
+                </a:rPr>
+                <a:t>Standardized Coefficient</a:t>
+              </a:r>
+            </a:p>
+          </p:txBody>
+        </p:sp>
+        <p:cxnSp>
+          <p:nvCxnSpPr>
+            <p:cNvPr id="28" name="Straight Connector 27">
+              <a:extLst>
+                <a:ext uri="{FF2B5EF4-FFF2-40B4-BE49-F238E27FC236}">
+                  <a16:creationId xmlns:a16="http://schemas.microsoft.com/office/drawing/2014/main" id="{E9A66EAA-56D7-37E4-314E-D659EED8F8A6}"/>
+                </a:ext>
+              </a:extLst>
+            </p:cNvPr>
+            <p:cNvCxnSpPr>
+              <a:cxnSpLocks/>
+            </p:cNvCxnSpPr>
+            <p:nvPr/>
+          </p:nvCxnSpPr>
+          <p:spPr>
+            <a:xfrm>
+              <a:off x="12453667" y="13380736"/>
+              <a:ext cx="951115" cy="0"/>
+            </a:xfrm>
+            <a:prstGeom prst="line">
+              <a:avLst/>
+            </a:prstGeom>
+            <a:ln w="190500">
+              <a:solidFill>
+                <a:srgbClr val="C00000"/>
+              </a:solidFill>
+            </a:ln>
+          </p:spPr>
+          <p:style>
+            <a:lnRef idx="1">
+              <a:schemeClr val="accent1"/>
+            </a:lnRef>
+            <a:fillRef idx="0">
+              <a:schemeClr val="accent1"/>
+            </a:fillRef>
+            <a:effectRef idx="0">
+              <a:schemeClr val="accent1"/>
+            </a:effectRef>
+            <a:fontRef idx="minor">
+              <a:schemeClr val="tx1"/>
+            </a:fontRef>
+          </p:style>
+        </p:cxnSp>
+        <p:cxnSp>
+          <p:nvCxnSpPr>
+            <p:cNvPr id="29" name="Straight Connector 28">
+              <a:extLst>
+                <a:ext uri="{FF2B5EF4-FFF2-40B4-BE49-F238E27FC236}">
+                  <a16:creationId xmlns:a16="http://schemas.microsoft.com/office/drawing/2014/main" id="{D49B4FFE-C6AC-FD7C-4BBE-FF6B60340C25}"/>
+                </a:ext>
+              </a:extLst>
+            </p:cNvPr>
+            <p:cNvCxnSpPr>
+              <a:cxnSpLocks/>
+            </p:cNvCxnSpPr>
+            <p:nvPr/>
+          </p:nvCxnSpPr>
+          <p:spPr>
+            <a:xfrm>
+              <a:off x="13401607" y="13379744"/>
+              <a:ext cx="951115" cy="0"/>
+            </a:xfrm>
+            <a:prstGeom prst="line">
+              <a:avLst/>
+            </a:prstGeom>
+            <a:ln w="190500">
+              <a:solidFill>
+                <a:schemeClr val="accent1">
+                  <a:lumMod val="75000"/>
+                </a:schemeClr>
+              </a:solidFill>
+            </a:ln>
+          </p:spPr>
+          <p:style>
+            <a:lnRef idx="1">
+              <a:schemeClr val="accent1"/>
+            </a:lnRef>
+            <a:fillRef idx="0">
+              <a:schemeClr val="accent1"/>
+            </a:fillRef>
+            <a:effectRef idx="0">
+              <a:schemeClr val="accent1"/>
+            </a:effectRef>
+            <a:fontRef idx="minor">
+              <a:schemeClr val="tx1"/>
+            </a:fontRef>
+          </p:style>
+        </p:cxnSp>
+        <p:sp>
+          <p:nvSpPr>
+            <p:cNvPr id="30" name="Rectangle 29">
+              <a:extLst>
+                <a:ext uri="{FF2B5EF4-FFF2-40B4-BE49-F238E27FC236}">
+                  <a16:creationId xmlns:a16="http://schemas.microsoft.com/office/drawing/2014/main" id="{E171DAEF-08C1-92AF-B56E-64423E7C0ABE}"/>
+                </a:ext>
+              </a:extLst>
+            </p:cNvPr>
+            <p:cNvSpPr/>
+            <p:nvPr/>
+          </p:nvSpPr>
+          <p:spPr>
+            <a:xfrm>
+              <a:off x="10539776" y="13475193"/>
+              <a:ext cx="5751830" cy="56852"/>
+            </a:xfrm>
+            <a:prstGeom prst="rect">
+              <a:avLst/>
+            </a:prstGeom>
+            <a:solidFill>
+              <a:schemeClr val="bg1"/>
+            </a:solidFill>
+            <a:ln>
+              <a:noFill/>
+            </a:ln>
+          </p:spPr>
+          <p:style>
+            <a:lnRef idx="2">
+              <a:schemeClr val="accent1">
+                <a:shade val="50000"/>
+              </a:schemeClr>
+            </a:lnRef>
+            <a:fillRef idx="1">
+              <a:schemeClr val="accent1"/>
+            </a:fillRef>
+            <a:effectRef idx="0">
+              <a:schemeClr val="accent1"/>
+            </a:effectRef>
+            <a:fontRef idx="minor">
+              <a:schemeClr val="lt1"/>
+            </a:fontRef>
+          </p:style>
+          <p:txBody>
+            <a:bodyPr rtlCol="0" anchor="ctr"/>
+            <a:lstStyle/>
+            <a:p>
+              <a:pPr algn="ctr"/>
+              <a:endParaRPr lang="en-US"/>
+            </a:p>
+          </p:txBody>
+        </p:sp>
+        <p:sp>
+          <p:nvSpPr>
+            <p:cNvPr id="31" name="Rectangle 30">
+              <a:extLst>
+                <a:ext uri="{FF2B5EF4-FFF2-40B4-BE49-F238E27FC236}">
+                  <a16:creationId xmlns:a16="http://schemas.microsoft.com/office/drawing/2014/main" id="{3F802C2A-C2B3-2907-154B-5AF90540910B}"/>
+                </a:ext>
+              </a:extLst>
+            </p:cNvPr>
+            <p:cNvSpPr/>
+            <p:nvPr/>
+          </p:nvSpPr>
+          <p:spPr>
+            <a:xfrm>
+              <a:off x="9836749" y="13470593"/>
+              <a:ext cx="7010400" cy="45719"/>
+            </a:xfrm>
+            <a:prstGeom prst="rect">
+              <a:avLst/>
+            </a:prstGeom>
+            <a:solidFill>
+              <a:schemeClr val="bg1"/>
+            </a:solidFill>
+            <a:ln>
+              <a:noFill/>
+            </a:ln>
+          </p:spPr>
+          <p:style>
+            <a:lnRef idx="2">
+              <a:schemeClr val="accent1">
+                <a:shade val="50000"/>
+              </a:schemeClr>
+            </a:lnRef>
+            <a:fillRef idx="1">
+              <a:schemeClr val="accent1"/>
+            </a:fillRef>
+            <a:effectRef idx="0">
+              <a:schemeClr val="accent1"/>
+            </a:effectRef>
+            <a:fontRef idx="minor">
+              <a:schemeClr val="lt1"/>
+            </a:fontRef>
+          </p:style>
+          <p:txBody>
+            <a:bodyPr rtlCol="0" anchor="ctr"/>
+            <a:lstStyle/>
+            <a:p>
+              <a:pPr algn="ctr"/>
+              <a:endParaRPr lang="en-US"/>
+            </a:p>
+          </p:txBody>
+        </p:sp>
+        <p:sp>
+          <p:nvSpPr>
+            <p:cNvPr id="32" name="Rectangle 31">
+              <a:extLst>
+                <a:ext uri="{FF2B5EF4-FFF2-40B4-BE49-F238E27FC236}">
+                  <a16:creationId xmlns:a16="http://schemas.microsoft.com/office/drawing/2014/main" id="{5D082C1A-849B-475E-196C-143550021015}"/>
+                </a:ext>
+              </a:extLst>
+            </p:cNvPr>
+            <p:cNvSpPr/>
+            <p:nvPr/>
+          </p:nvSpPr>
+          <p:spPr>
+            <a:xfrm>
+              <a:off x="10035173" y="13266385"/>
+              <a:ext cx="7010400" cy="45719"/>
+            </a:xfrm>
+            <a:prstGeom prst="rect">
+              <a:avLst/>
+            </a:prstGeom>
+            <a:solidFill>
+              <a:schemeClr val="bg1"/>
+            </a:solidFill>
+            <a:ln>
+              <a:noFill/>
+            </a:ln>
+          </p:spPr>
+          <p:style>
+            <a:lnRef idx="2">
+              <a:schemeClr val="accent1">
+                <a:shade val="50000"/>
+              </a:schemeClr>
+            </a:lnRef>
+            <a:fillRef idx="1">
+              <a:schemeClr val="accent1"/>
+            </a:fillRef>
+            <a:effectRef idx="0">
+              <a:schemeClr val="accent1"/>
+            </a:effectRef>
+            <a:fontRef idx="minor">
+              <a:schemeClr val="lt1"/>
+            </a:fontRef>
+          </p:style>
+          <p:txBody>
+            <a:bodyPr rtlCol="0" anchor="ctr"/>
+            <a:lstStyle/>
+            <a:p>
+              <a:pPr algn="ctr"/>
+              <a:endParaRPr lang="en-US"/>
+            </a:p>
+          </p:txBody>
+        </p:sp>
+      </p:grpSp>
+      <p:cxnSp>
+        <p:nvCxnSpPr>
+          <p:cNvPr id="33" name="Elbow Connector 32">
+            <a:extLst>
+              <a:ext uri="{FF2B5EF4-FFF2-40B4-BE49-F238E27FC236}">
+                <a16:creationId xmlns:a16="http://schemas.microsoft.com/office/drawing/2014/main" id="{B9FB019A-B028-E114-0AB6-849317E77A73}"/>
+              </a:ext>
+            </a:extLst>
+          </p:cNvPr>
+          <p:cNvCxnSpPr>
+            <a:cxnSpLocks/>
+          </p:cNvCxnSpPr>
+          <p:nvPr/>
+        </p:nvCxnSpPr>
+        <p:spPr>
+          <a:xfrm rot="16200000" flipH="1">
+            <a:off x="10667438" y="2697178"/>
+            <a:ext cx="601182" cy="1459355"/>
+          </a:xfrm>
+          <a:prstGeom prst="bentConnector2">
+            <a:avLst/>
+          </a:prstGeom>
+          <a:ln w="19177">
+            <a:solidFill>
+              <a:schemeClr val="accent1">
+                <a:lumMod val="75000"/>
+              </a:schemeClr>
+            </a:solidFill>
+            <a:tailEnd type="triangle"/>
+          </a:ln>
+        </p:spPr>
+        <p:style>
+          <a:lnRef idx="1">
+            <a:schemeClr val="accent1"/>
+          </a:lnRef>
+          <a:fillRef idx="0">
+            <a:schemeClr val="accent1"/>
+          </a:fillRef>
+          <a:effectRef idx="0">
+            <a:schemeClr val="accent1"/>
+          </a:effectRef>
+          <a:fontRef idx="minor">
+            <a:schemeClr val="tx1"/>
+          </a:fontRef>
+        </p:style>
+      </p:cxnSp>
+      <p:cxnSp>
+        <p:nvCxnSpPr>
+          <p:cNvPr id="34" name="Straight Arrow Connector 33">
+            <a:extLst>
+              <a:ext uri="{FF2B5EF4-FFF2-40B4-BE49-F238E27FC236}">
+                <a16:creationId xmlns:a16="http://schemas.microsoft.com/office/drawing/2014/main" id="{8707E69E-36A5-506B-BA0F-9ACCBD861AD1}"/>
+              </a:ext>
+            </a:extLst>
+          </p:cNvPr>
+          <p:cNvCxnSpPr>
+            <a:cxnSpLocks/>
+          </p:cNvCxnSpPr>
+          <p:nvPr/>
+        </p:nvCxnSpPr>
+        <p:spPr>
+          <a:xfrm>
+            <a:off x="13517105" y="3966619"/>
+            <a:ext cx="892510" cy="0"/>
+          </a:xfrm>
+          <a:prstGeom prst="straightConnector1">
+            <a:avLst/>
+          </a:prstGeom>
+          <a:ln w="66802">
+            <a:solidFill>
+              <a:schemeClr val="accent1">
+                <a:lumMod val="75000"/>
+              </a:schemeClr>
+            </a:solidFill>
+            <a:tailEnd type="triangle"/>
+          </a:ln>
+        </p:spPr>
+        <p:style>
+          <a:lnRef idx="1">
+            <a:schemeClr val="accent1"/>
+          </a:lnRef>
+          <a:fillRef idx="0">
+            <a:schemeClr val="accent1"/>
+          </a:fillRef>
+          <a:effectRef idx="0">
+            <a:schemeClr val="accent1"/>
+          </a:effectRef>
+          <a:fontRef idx="minor">
+            <a:schemeClr val="tx1"/>
+          </a:fontRef>
+        </p:style>
+      </p:cxnSp>
+      <p:cxnSp>
+        <p:nvCxnSpPr>
+          <p:cNvPr id="35" name="Straight Arrow Connector 34">
+            <a:extLst>
+              <a:ext uri="{FF2B5EF4-FFF2-40B4-BE49-F238E27FC236}">
+                <a16:creationId xmlns:a16="http://schemas.microsoft.com/office/drawing/2014/main" id="{EAECFEAE-1B9A-C7E4-6668-81066C556210}"/>
+              </a:ext>
+            </a:extLst>
+          </p:cNvPr>
+          <p:cNvCxnSpPr>
+            <a:cxnSpLocks/>
+          </p:cNvCxnSpPr>
+          <p:nvPr/>
+        </p:nvCxnSpPr>
+        <p:spPr>
+          <a:xfrm>
+            <a:off x="14829441" y="2465016"/>
+            <a:ext cx="5843" cy="1050299"/>
+          </a:xfrm>
+          <a:prstGeom prst="straightConnector1">
+            <a:avLst/>
+          </a:prstGeom>
+          <a:ln w="20193">
+            <a:solidFill>
+              <a:srgbClr val="C00000"/>
+            </a:solidFill>
+            <a:headEnd type="oval"/>
+            <a:tailEnd type="triangle"/>
+          </a:ln>
+        </p:spPr>
+        <p:style>
+          <a:lnRef idx="1">
+            <a:schemeClr val="accent1"/>
+          </a:lnRef>
+          <a:fillRef idx="0">
+            <a:schemeClr val="accent1"/>
+          </a:fillRef>
+          <a:effectRef idx="0">
+            <a:schemeClr val="accent1"/>
+          </a:effectRef>
+          <a:fontRef idx="minor">
+            <a:schemeClr val="tx1"/>
+          </a:fontRef>
+        </p:style>
+      </p:cxnSp>
+      <p:cxnSp>
+        <p:nvCxnSpPr>
+          <p:cNvPr id="36" name="Elbow Connector 35">
+            <a:extLst>
+              <a:ext uri="{FF2B5EF4-FFF2-40B4-BE49-F238E27FC236}">
+                <a16:creationId xmlns:a16="http://schemas.microsoft.com/office/drawing/2014/main" id="{D8B8E071-3D94-32C9-2BE0-BAB249AE2059}"/>
+              </a:ext>
+            </a:extLst>
+          </p:cNvPr>
+          <p:cNvCxnSpPr>
+            <a:stCxn id="46" idx="0"/>
+            <a:endCxn id="45" idx="1"/>
+          </p:cNvCxnSpPr>
+          <p:nvPr/>
+        </p:nvCxnSpPr>
+        <p:spPr>
+          <a:xfrm rot="5400000" flipH="1" flipV="1">
+            <a:off x="15787888" y="2480753"/>
+            <a:ext cx="589520" cy="1504991"/>
+          </a:xfrm>
+          <a:prstGeom prst="bentConnector2">
+            <a:avLst/>
+          </a:prstGeom>
+          <a:ln w="39116">
+            <a:solidFill>
+              <a:schemeClr val="bg1">
+                <a:lumMod val="50000"/>
+              </a:schemeClr>
+            </a:solidFill>
+            <a:prstDash val="sysDash"/>
+            <a:tailEnd type="triangle"/>
+          </a:ln>
+        </p:spPr>
+        <p:style>
+          <a:lnRef idx="1">
+            <a:schemeClr val="accent1"/>
+          </a:lnRef>
+          <a:fillRef idx="0">
+            <a:schemeClr val="accent1"/>
+          </a:fillRef>
+          <a:effectRef idx="0">
+            <a:schemeClr val="accent1"/>
+          </a:effectRef>
+          <a:fontRef idx="minor">
+            <a:schemeClr val="tx1"/>
+          </a:fontRef>
+        </p:style>
+      </p:cxnSp>
+      <p:cxnSp>
+        <p:nvCxnSpPr>
+          <p:cNvPr id="37" name="Elbow Connector 36">
+            <a:extLst>
+              <a:ext uri="{FF2B5EF4-FFF2-40B4-BE49-F238E27FC236}">
+                <a16:creationId xmlns:a16="http://schemas.microsoft.com/office/drawing/2014/main" id="{441F152D-67AB-A6D8-25C1-91D6B5302090}"/>
+              </a:ext>
+            </a:extLst>
+          </p:cNvPr>
+          <p:cNvCxnSpPr>
+            <a:cxnSpLocks/>
+          </p:cNvCxnSpPr>
+          <p:nvPr/>
+        </p:nvCxnSpPr>
+        <p:spPr>
+          <a:xfrm rot="16200000" flipH="1">
+            <a:off x="15744351" y="3970012"/>
+            <a:ext cx="634555" cy="1504991"/>
+          </a:xfrm>
+          <a:prstGeom prst="bentConnector2">
+            <a:avLst/>
+          </a:prstGeom>
+          <a:ln w="65532">
+            <a:solidFill>
+              <a:srgbClr val="C00000"/>
+            </a:solidFill>
+            <a:headEnd type="oval" w="med" len="med"/>
+            <a:tailEnd type="triangle" w="med" len="med"/>
+          </a:ln>
+        </p:spPr>
+        <p:style>
+          <a:lnRef idx="1">
+            <a:schemeClr val="accent1"/>
+          </a:lnRef>
+          <a:fillRef idx="0">
+            <a:schemeClr val="accent1"/>
+          </a:fillRef>
+          <a:effectRef idx="0">
+            <a:schemeClr val="accent1"/>
+          </a:effectRef>
+          <a:fontRef idx="minor">
+            <a:schemeClr val="tx1"/>
+          </a:fontRef>
+        </p:style>
+      </p:cxnSp>
+      <p:cxnSp>
+        <p:nvCxnSpPr>
+          <p:cNvPr id="38" name="Elbow Connector 37">
+            <a:extLst>
+              <a:ext uri="{FF2B5EF4-FFF2-40B4-BE49-F238E27FC236}">
+                <a16:creationId xmlns:a16="http://schemas.microsoft.com/office/drawing/2014/main" id="{EEBFBB35-94B9-8A1C-6A5E-A7F8D3F81855}"/>
+              </a:ext>
+            </a:extLst>
+          </p:cNvPr>
+          <p:cNvCxnSpPr>
+            <a:cxnSpLocks/>
+          </p:cNvCxnSpPr>
+          <p:nvPr/>
+        </p:nvCxnSpPr>
+        <p:spPr>
+          <a:xfrm rot="16200000" flipH="1">
+            <a:off x="17922003" y="2312205"/>
+            <a:ext cx="1040309" cy="1394631"/>
+          </a:xfrm>
+          <a:prstGeom prst="bentConnector3">
+            <a:avLst>
+              <a:gd name="adj1" fmla="val -21974"/>
+            </a:avLst>
+          </a:prstGeom>
+          <a:ln w="190246">
+            <a:solidFill>
+              <a:schemeClr val="accent1">
+                <a:lumMod val="75000"/>
+              </a:schemeClr>
+            </a:solidFill>
+            <a:tailEnd type="triangle"/>
+          </a:ln>
+        </p:spPr>
+        <p:style>
+          <a:lnRef idx="1">
+            <a:schemeClr val="accent1"/>
+          </a:lnRef>
+          <a:fillRef idx="0">
+            <a:schemeClr val="accent1"/>
+          </a:fillRef>
+          <a:effectRef idx="0">
+            <a:schemeClr val="accent1"/>
+          </a:effectRef>
+          <a:fontRef idx="minor">
+            <a:schemeClr val="tx1"/>
+          </a:fontRef>
+        </p:style>
+      </p:cxnSp>
+      <p:cxnSp>
+        <p:nvCxnSpPr>
+          <p:cNvPr id="39" name="Elbow Connector 38">
+            <a:extLst>
+              <a:ext uri="{FF2B5EF4-FFF2-40B4-BE49-F238E27FC236}">
+                <a16:creationId xmlns:a16="http://schemas.microsoft.com/office/drawing/2014/main" id="{FD09418F-3BFB-8A52-8E6A-0B8829ACDBF4}"/>
+              </a:ext>
+            </a:extLst>
+          </p:cNvPr>
+          <p:cNvCxnSpPr>
+            <a:cxnSpLocks/>
+          </p:cNvCxnSpPr>
+          <p:nvPr/>
+        </p:nvCxnSpPr>
+        <p:spPr>
+          <a:xfrm rot="5400000" flipH="1" flipV="1">
+            <a:off x="17911663" y="4266352"/>
+            <a:ext cx="1060989" cy="1394631"/>
+          </a:xfrm>
+          <a:prstGeom prst="bentConnector3">
+            <a:avLst>
+              <a:gd name="adj1" fmla="val -21546"/>
+            </a:avLst>
+          </a:prstGeom>
+          <a:ln w="173990">
+            <a:solidFill>
+              <a:schemeClr val="accent1">
+                <a:lumMod val="75000"/>
+              </a:schemeClr>
+            </a:solidFill>
+            <a:tailEnd type="triangle"/>
+          </a:ln>
+        </p:spPr>
+        <p:style>
+          <a:lnRef idx="1">
+            <a:schemeClr val="accent1"/>
+          </a:lnRef>
+          <a:fillRef idx="0">
+            <a:schemeClr val="accent1"/>
+          </a:fillRef>
+          <a:effectRef idx="0">
+            <a:schemeClr val="accent1"/>
+          </a:effectRef>
+          <a:fontRef idx="minor">
+            <a:schemeClr val="tx1"/>
+          </a:fontRef>
+        </p:style>
+      </p:cxnSp>
+      <p:sp>
+        <p:nvSpPr>
+          <p:cNvPr id="41" name="Rectangle 40">
+            <a:extLst>
+              <a:ext uri="{FF2B5EF4-FFF2-40B4-BE49-F238E27FC236}">
+                <a16:creationId xmlns:a16="http://schemas.microsoft.com/office/drawing/2014/main" id="{94946E1E-98AF-4CD2-4E18-4F875F9D228D}"/>
+              </a:ext>
+            </a:extLst>
+          </p:cNvPr>
+          <p:cNvSpPr/>
+          <p:nvPr/>
+        </p:nvSpPr>
+        <p:spPr>
+          <a:xfrm>
+            <a:off x="11697707" y="3538686"/>
+            <a:ext cx="1819398" cy="877223"/>
+          </a:xfrm>
+          <a:prstGeom prst="rect">
+            <a:avLst/>
+          </a:prstGeom>
+          <a:solidFill>
+            <a:schemeClr val="bg1"/>
+          </a:solidFill>
+          <a:ln w="38100">
+            <a:solidFill>
+              <a:schemeClr val="tx1"/>
+            </a:solidFill>
+          </a:ln>
+        </p:spPr>
+        <p:style>
+          <a:lnRef idx="2">
+            <a:schemeClr val="accent1">
+              <a:shade val="50000"/>
+            </a:schemeClr>
+          </a:lnRef>
+          <a:fillRef idx="1">
+            <a:schemeClr val="accent1"/>
+          </a:fillRef>
+          <a:effectRef idx="0">
+            <a:schemeClr val="accent1"/>
+          </a:effectRef>
+          <a:fontRef idx="minor">
+            <a:schemeClr val="lt1"/>
+          </a:fontRef>
+        </p:style>
+        <p:txBody>
+          <a:bodyPr rtlCol="0" anchor="ctr"/>
+          <a:lstStyle/>
+          <a:p>
+            <a:pPr algn="ctr"/>
+            <a:r>
+              <a:rPr lang="el-GR" sz="2400" b="1" i="1" dirty="0">
+                <a:solidFill>
+                  <a:schemeClr val="tx1"/>
+                </a:solidFill>
+                <a:latin typeface="Arial" panose="020B0604020202020204" pitchFamily="34" charset="0"/>
+                <a:cs typeface="Arial" panose="020B0604020202020204" pitchFamily="34" charset="0"/>
+              </a:rPr>
+              <a:t>β</a:t>
+            </a:r>
+            <a:endParaRPr lang="en-US" sz="2400" b="1" i="1" dirty="0">
+              <a:solidFill>
+                <a:schemeClr val="tx1"/>
+              </a:solidFill>
+              <a:latin typeface="Arial" panose="020B0604020202020204" pitchFamily="34" charset="0"/>
+              <a:cs typeface="Arial" panose="020B0604020202020204" pitchFamily="34" charset="0"/>
+            </a:endParaRPr>
+          </a:p>
+        </p:txBody>
+      </p:sp>
+      <p:sp>
+        <p:nvSpPr>
+          <p:cNvPr id="42" name="Rectangle 41">
+            <a:extLst>
+              <a:ext uri="{FF2B5EF4-FFF2-40B4-BE49-F238E27FC236}">
+                <a16:creationId xmlns:a16="http://schemas.microsoft.com/office/drawing/2014/main" id="{28320FCB-D166-F0A2-1D72-681CD97EAE48}"/>
+              </a:ext>
+            </a:extLst>
+          </p:cNvPr>
+          <p:cNvSpPr/>
+          <p:nvPr/>
+        </p:nvSpPr>
+        <p:spPr>
+          <a:xfrm>
+            <a:off x="11697707" y="1562147"/>
+            <a:ext cx="1819398" cy="877223"/>
+          </a:xfrm>
+          <a:prstGeom prst="rect">
+            <a:avLst/>
+          </a:prstGeom>
+          <a:solidFill>
+            <a:schemeClr val="bg1"/>
+          </a:solidFill>
+          <a:ln w="38100">
+            <a:solidFill>
+              <a:schemeClr val="tx1"/>
+            </a:solidFill>
+          </a:ln>
+        </p:spPr>
+        <p:style>
+          <a:lnRef idx="2">
+            <a:schemeClr val="accent1">
+              <a:shade val="50000"/>
+            </a:schemeClr>
+          </a:lnRef>
+          <a:fillRef idx="1">
+            <a:schemeClr val="accent1"/>
+          </a:fillRef>
+          <a:effectRef idx="0">
+            <a:schemeClr val="accent1"/>
+          </a:effectRef>
+          <a:fontRef idx="minor">
+            <a:schemeClr val="lt1"/>
+          </a:fontRef>
+        </p:style>
+        <p:txBody>
+          <a:bodyPr rtlCol="0" anchor="ctr"/>
+          <a:lstStyle/>
+          <a:p>
+            <a:pPr algn="ctr"/>
+            <a:r>
+              <a:rPr lang="en-US" sz="2400" b="1" i="1" dirty="0">
+                <a:solidFill>
+                  <a:schemeClr val="tx1"/>
+                </a:solidFill>
+                <a:latin typeface="Arial" panose="020B0604020202020204" pitchFamily="34" charset="0"/>
+                <a:cs typeface="Arial" panose="020B0604020202020204" pitchFamily="34" charset="0"/>
+              </a:rPr>
+              <a:t>N</a:t>
+            </a:r>
+            <a:r>
+              <a:rPr lang="en-US" sz="2400" b="1" baseline="-25000" dirty="0">
+                <a:solidFill>
+                  <a:schemeClr val="tx1"/>
+                </a:solidFill>
+                <a:latin typeface="Arial" panose="020B0604020202020204" pitchFamily="34" charset="0"/>
+                <a:cs typeface="Arial" panose="020B0604020202020204" pitchFamily="34" charset="0"/>
+              </a:rPr>
+              <a:t>fixation</a:t>
+            </a:r>
+            <a:endParaRPr lang="en-US" sz="2400" i="1" dirty="0">
+              <a:solidFill>
+                <a:schemeClr val="tx1"/>
+              </a:solidFill>
+              <a:latin typeface="Arial" panose="020B0604020202020204" pitchFamily="34" charset="0"/>
+              <a:cs typeface="Arial" panose="020B0604020202020204" pitchFamily="34" charset="0"/>
+            </a:endParaRPr>
+          </a:p>
+        </p:txBody>
+      </p:sp>
+      <p:sp>
+        <p:nvSpPr>
+          <p:cNvPr id="43" name="Rectangle 42">
+            <a:extLst>
+              <a:ext uri="{FF2B5EF4-FFF2-40B4-BE49-F238E27FC236}">
+                <a16:creationId xmlns:a16="http://schemas.microsoft.com/office/drawing/2014/main" id="{7B159EFC-27EC-FE45-F2C6-24C857E8F7D8}"/>
+              </a:ext>
+            </a:extLst>
+          </p:cNvPr>
+          <p:cNvSpPr/>
+          <p:nvPr/>
+        </p:nvSpPr>
+        <p:spPr>
+          <a:xfrm>
+            <a:off x="18229775" y="3540185"/>
+            <a:ext cx="1819398" cy="877223"/>
+          </a:xfrm>
+          <a:prstGeom prst="rect">
+            <a:avLst/>
+          </a:prstGeom>
+          <a:solidFill>
+            <a:schemeClr val="bg1"/>
+          </a:solidFill>
+          <a:ln w="38100">
+            <a:solidFill>
+              <a:schemeClr val="tx1"/>
+            </a:solidFill>
+          </a:ln>
+        </p:spPr>
+        <p:style>
+          <a:lnRef idx="2">
+            <a:schemeClr val="accent1">
+              <a:shade val="50000"/>
+            </a:schemeClr>
+          </a:lnRef>
+          <a:fillRef idx="1">
+            <a:schemeClr val="accent1"/>
+          </a:fillRef>
+          <a:effectRef idx="0">
+            <a:schemeClr val="accent1"/>
+          </a:effectRef>
+          <a:fontRef idx="minor">
+            <a:schemeClr val="lt1"/>
+          </a:fontRef>
+        </p:style>
+        <p:txBody>
+          <a:bodyPr rtlCol="0" anchor="ctr"/>
+          <a:lstStyle/>
+          <a:p>
+            <a:pPr algn="ctr"/>
+            <a:r>
+              <a:rPr lang="el-GR" sz="2400" b="1" i="1" dirty="0">
+                <a:solidFill>
+                  <a:schemeClr val="tx1"/>
+                </a:solidFill>
+                <a:latin typeface="Arial" panose="020B0604020202020204" pitchFamily="34" charset="0"/>
+                <a:cs typeface="Arial" panose="020B0604020202020204" pitchFamily="34" charset="0"/>
+              </a:rPr>
+              <a:t>Ν</a:t>
+            </a:r>
+            <a:r>
+              <a:rPr lang="en-US" sz="2400" b="1" baseline="-25000" dirty="0">
+                <a:solidFill>
+                  <a:schemeClr val="tx1"/>
+                </a:solidFill>
+                <a:latin typeface="Arial" panose="020B0604020202020204" pitchFamily="34" charset="0"/>
+                <a:cs typeface="Arial" panose="020B0604020202020204" pitchFamily="34" charset="0"/>
+              </a:rPr>
+              <a:t>area</a:t>
+            </a:r>
+            <a:endParaRPr lang="en-US" sz="2400" b="1" i="1" dirty="0">
+              <a:solidFill>
+                <a:schemeClr val="tx1"/>
+              </a:solidFill>
+              <a:latin typeface="Arial" panose="020B0604020202020204" pitchFamily="34" charset="0"/>
+              <a:cs typeface="Arial" panose="020B0604020202020204" pitchFamily="34" charset="0"/>
+            </a:endParaRPr>
+          </a:p>
+        </p:txBody>
+      </p:sp>
+      <p:sp>
+        <p:nvSpPr>
+          <p:cNvPr id="44" name="Rectangle 43">
+            <a:extLst>
+              <a:ext uri="{FF2B5EF4-FFF2-40B4-BE49-F238E27FC236}">
+                <a16:creationId xmlns:a16="http://schemas.microsoft.com/office/drawing/2014/main" id="{6BF891DE-DFE2-9D13-3FB5-FD745634B557}"/>
+              </a:ext>
+            </a:extLst>
+          </p:cNvPr>
+          <p:cNvSpPr/>
+          <p:nvPr/>
+        </p:nvSpPr>
+        <p:spPr>
+          <a:xfrm>
+            <a:off x="16835144" y="4601174"/>
+            <a:ext cx="1819398" cy="877223"/>
+          </a:xfrm>
+          <a:prstGeom prst="rect">
+            <a:avLst/>
+          </a:prstGeom>
+          <a:solidFill>
+            <a:schemeClr val="bg1"/>
+          </a:solidFill>
+          <a:ln w="38100">
+            <a:solidFill>
+              <a:schemeClr val="tx1"/>
+            </a:solidFill>
+          </a:ln>
+        </p:spPr>
+        <p:style>
+          <a:lnRef idx="2">
+            <a:schemeClr val="accent1">
+              <a:shade val="50000"/>
+            </a:schemeClr>
+          </a:lnRef>
+          <a:fillRef idx="1">
+            <a:schemeClr val="accent1"/>
+          </a:fillRef>
+          <a:effectRef idx="0">
+            <a:schemeClr val="accent1"/>
+          </a:effectRef>
+          <a:fontRef idx="minor">
+            <a:schemeClr val="lt1"/>
+          </a:fontRef>
+        </p:style>
+        <p:txBody>
+          <a:bodyPr rtlCol="0" anchor="ctr"/>
+          <a:lstStyle/>
+          <a:p>
+            <a:pPr algn="ctr"/>
+            <a:r>
+              <a:rPr lang="en-US" sz="2400" b="1" i="1" dirty="0">
+                <a:solidFill>
+                  <a:schemeClr val="tx1"/>
+                </a:solidFill>
+                <a:latin typeface="Arial" panose="020B0604020202020204" pitchFamily="34" charset="0"/>
+                <a:cs typeface="Arial" panose="020B0604020202020204" pitchFamily="34" charset="0"/>
+              </a:rPr>
+              <a:t>M</a:t>
+            </a:r>
+            <a:r>
+              <a:rPr lang="en-US" sz="2400" b="1" baseline="-25000" dirty="0">
+                <a:solidFill>
+                  <a:schemeClr val="tx1"/>
+                </a:solidFill>
+                <a:latin typeface="Arial" panose="020B0604020202020204" pitchFamily="34" charset="0"/>
+                <a:cs typeface="Arial" panose="020B0604020202020204" pitchFamily="34" charset="0"/>
+              </a:rPr>
+              <a:t>area</a:t>
+            </a:r>
+            <a:endParaRPr lang="en-US" sz="2400" b="1" i="1" dirty="0">
+              <a:solidFill>
+                <a:schemeClr val="tx1"/>
+              </a:solidFill>
+              <a:latin typeface="Arial" panose="020B0604020202020204" pitchFamily="34" charset="0"/>
+              <a:cs typeface="Arial" panose="020B0604020202020204" pitchFamily="34" charset="0"/>
+            </a:endParaRPr>
+          </a:p>
+        </p:txBody>
+      </p:sp>
+      <p:sp>
+        <p:nvSpPr>
+          <p:cNvPr id="45" name="Rectangle 44">
+            <a:extLst>
+              <a:ext uri="{FF2B5EF4-FFF2-40B4-BE49-F238E27FC236}">
+                <a16:creationId xmlns:a16="http://schemas.microsoft.com/office/drawing/2014/main" id="{7D5F5F62-F0A6-3AB2-F4A8-2F5FA217E2FE}"/>
+              </a:ext>
+            </a:extLst>
+          </p:cNvPr>
+          <p:cNvSpPr/>
+          <p:nvPr/>
+        </p:nvSpPr>
+        <p:spPr>
+          <a:xfrm>
+            <a:off x="16835144" y="2499876"/>
+            <a:ext cx="1819398" cy="877223"/>
+          </a:xfrm>
+          <a:prstGeom prst="rect">
+            <a:avLst/>
+          </a:prstGeom>
+          <a:solidFill>
+            <a:schemeClr val="bg1"/>
+          </a:solidFill>
+          <a:ln w="38100">
+            <a:solidFill>
+              <a:schemeClr val="tx1"/>
+            </a:solidFill>
+          </a:ln>
+        </p:spPr>
+        <p:style>
+          <a:lnRef idx="2">
+            <a:schemeClr val="accent1">
+              <a:shade val="50000"/>
+            </a:schemeClr>
+          </a:lnRef>
+          <a:fillRef idx="1">
+            <a:schemeClr val="accent1"/>
+          </a:fillRef>
+          <a:effectRef idx="0">
+            <a:schemeClr val="accent1"/>
+          </a:effectRef>
+          <a:fontRef idx="minor">
+            <a:schemeClr val="lt1"/>
+          </a:fontRef>
+        </p:style>
+        <p:txBody>
+          <a:bodyPr rtlCol="0" anchor="ctr"/>
+          <a:lstStyle/>
+          <a:p>
+            <a:pPr algn="ctr"/>
+            <a:r>
+              <a:rPr lang="en-US" sz="2400" b="1" i="1" dirty="0">
+                <a:solidFill>
+                  <a:schemeClr val="tx1"/>
+                </a:solidFill>
+                <a:latin typeface="Arial" panose="020B0604020202020204" pitchFamily="34" charset="0"/>
+                <a:cs typeface="Arial" panose="020B0604020202020204" pitchFamily="34" charset="0"/>
+              </a:rPr>
+              <a:t>N</a:t>
+            </a:r>
+            <a:r>
+              <a:rPr lang="en-US" sz="2400" b="1" baseline="-25000" dirty="0">
+                <a:solidFill>
+                  <a:schemeClr val="tx1"/>
+                </a:solidFill>
+                <a:latin typeface="Arial" panose="020B0604020202020204" pitchFamily="34" charset="0"/>
+                <a:cs typeface="Arial" panose="020B0604020202020204" pitchFamily="34" charset="0"/>
+              </a:rPr>
+              <a:t>mass</a:t>
+            </a:r>
+            <a:endParaRPr lang="en-US" sz="2400" b="1" i="1" dirty="0">
+              <a:solidFill>
+                <a:schemeClr val="tx1"/>
+              </a:solidFill>
+              <a:latin typeface="Arial" panose="020B0604020202020204" pitchFamily="34" charset="0"/>
+              <a:cs typeface="Arial" panose="020B0604020202020204" pitchFamily="34" charset="0"/>
+            </a:endParaRPr>
+          </a:p>
+        </p:txBody>
+      </p:sp>
+      <p:sp>
+        <p:nvSpPr>
+          <p:cNvPr id="46" name="Rectangle 45">
+            <a:extLst>
+              <a:ext uri="{FF2B5EF4-FFF2-40B4-BE49-F238E27FC236}">
+                <a16:creationId xmlns:a16="http://schemas.microsoft.com/office/drawing/2014/main" id="{701E9487-AEE9-AF08-375A-4CE5F60C6D54}"/>
+              </a:ext>
+            </a:extLst>
+          </p:cNvPr>
+          <p:cNvSpPr/>
+          <p:nvPr/>
+        </p:nvSpPr>
+        <p:spPr>
+          <a:xfrm>
+            <a:off x="14420454" y="3528008"/>
+            <a:ext cx="1819398" cy="877223"/>
+          </a:xfrm>
+          <a:prstGeom prst="rect">
+            <a:avLst/>
+          </a:prstGeom>
+          <a:solidFill>
+            <a:schemeClr val="bg1"/>
+          </a:solidFill>
+          <a:ln w="38100">
+            <a:solidFill>
+              <a:schemeClr val="tx1"/>
+            </a:solidFill>
+          </a:ln>
+        </p:spPr>
+        <p:style>
+          <a:lnRef idx="2">
+            <a:schemeClr val="accent1">
+              <a:shade val="50000"/>
+            </a:schemeClr>
+          </a:lnRef>
+          <a:fillRef idx="1">
+            <a:schemeClr val="accent1"/>
+          </a:fillRef>
+          <a:effectRef idx="0">
+            <a:schemeClr val="accent1"/>
+          </a:effectRef>
+          <a:fontRef idx="minor">
+            <a:schemeClr val="lt1"/>
+          </a:fontRef>
+        </p:style>
+        <p:txBody>
+          <a:bodyPr rtlCol="0" anchor="ctr"/>
+          <a:lstStyle/>
+          <a:p>
+            <a:pPr algn="ctr"/>
+            <a:r>
+              <a:rPr lang="en-US" sz="2400" b="1" i="1" dirty="0">
+                <a:solidFill>
+                  <a:schemeClr val="tx1"/>
+                </a:solidFill>
+                <a:latin typeface="Arial" panose="020B0604020202020204" pitchFamily="34" charset="0"/>
+                <a:cs typeface="Arial" panose="020B0604020202020204" pitchFamily="34" charset="0"/>
+              </a:rPr>
+              <a:t>C</a:t>
+            </a:r>
+            <a:r>
+              <a:rPr lang="en-US" sz="2400" b="1" baseline="-25000" dirty="0">
+                <a:solidFill>
+                  <a:schemeClr val="tx1"/>
+                </a:solidFill>
+                <a:latin typeface="Arial" panose="020B0604020202020204" pitchFamily="34" charset="0"/>
+                <a:cs typeface="Arial" panose="020B0604020202020204" pitchFamily="34" charset="0"/>
+              </a:rPr>
+              <a:t>i</a:t>
+            </a:r>
+            <a:r>
+              <a:rPr lang="en-US" sz="2400" b="1" i="1" dirty="0">
+                <a:solidFill>
+                  <a:schemeClr val="tx1"/>
+                </a:solidFill>
+                <a:latin typeface="Arial" panose="020B0604020202020204" pitchFamily="34" charset="0"/>
+                <a:cs typeface="Arial" panose="020B0604020202020204" pitchFamily="34" charset="0"/>
+              </a:rPr>
+              <a:t>:C</a:t>
+            </a:r>
+            <a:r>
+              <a:rPr lang="en-US" sz="2400" b="1" baseline="-25000" dirty="0">
+                <a:solidFill>
+                  <a:schemeClr val="tx1"/>
+                </a:solidFill>
+                <a:latin typeface="Arial" panose="020B0604020202020204" pitchFamily="34" charset="0"/>
+                <a:cs typeface="Arial" panose="020B0604020202020204" pitchFamily="34" charset="0"/>
+              </a:rPr>
+              <a:t>a</a:t>
+            </a:r>
+          </a:p>
+        </p:txBody>
+      </p:sp>
+      <p:sp>
+        <p:nvSpPr>
+          <p:cNvPr id="47" name="Rectangle 46">
+            <a:extLst>
+              <a:ext uri="{FF2B5EF4-FFF2-40B4-BE49-F238E27FC236}">
+                <a16:creationId xmlns:a16="http://schemas.microsoft.com/office/drawing/2014/main" id="{73D63AA8-E472-4E56-6A4D-456922FB7EE4}"/>
+              </a:ext>
+            </a:extLst>
+          </p:cNvPr>
+          <p:cNvSpPr/>
+          <p:nvPr/>
+        </p:nvSpPr>
+        <p:spPr>
+          <a:xfrm>
+            <a:off x="9232644" y="4611852"/>
+            <a:ext cx="2011416" cy="877223"/>
+          </a:xfrm>
+          <a:prstGeom prst="rect">
+            <a:avLst/>
+          </a:prstGeom>
+          <a:solidFill>
+            <a:schemeClr val="bg1"/>
+          </a:solidFill>
+          <a:ln w="38100">
+            <a:solidFill>
+              <a:schemeClr val="tx1"/>
+            </a:solidFill>
+          </a:ln>
+        </p:spPr>
+        <p:style>
+          <a:lnRef idx="2">
+            <a:schemeClr val="accent1">
+              <a:shade val="50000"/>
+            </a:schemeClr>
+          </a:lnRef>
+          <a:fillRef idx="1">
+            <a:schemeClr val="accent1"/>
+          </a:fillRef>
+          <a:effectRef idx="0">
+            <a:schemeClr val="accent1"/>
+          </a:effectRef>
+          <a:fontRef idx="minor">
+            <a:schemeClr val="lt1"/>
+          </a:fontRef>
+        </p:style>
+        <p:txBody>
+          <a:bodyPr rtlCol="0" anchor="ctr"/>
+          <a:lstStyle/>
+          <a:p>
+            <a:pPr algn="ctr"/>
+            <a:r>
+              <a:rPr lang="en-US" sz="2400" b="1" i="1" dirty="0">
+                <a:solidFill>
+                  <a:schemeClr val="tx1"/>
+                </a:solidFill>
+                <a:latin typeface="Arial" panose="020B0604020202020204" pitchFamily="34" charset="0"/>
+                <a:cs typeface="Arial" panose="020B0604020202020204" pitchFamily="34" charset="0"/>
+              </a:rPr>
+              <a:t>N availability</a:t>
+            </a:r>
+            <a:endParaRPr lang="en-US" sz="2400" b="1" dirty="0">
+              <a:solidFill>
+                <a:schemeClr val="tx1"/>
+              </a:solidFill>
+              <a:latin typeface="Arial" panose="020B0604020202020204" pitchFamily="34" charset="0"/>
+              <a:cs typeface="Arial" panose="020B0604020202020204" pitchFamily="34" charset="0"/>
+            </a:endParaRPr>
+          </a:p>
+        </p:txBody>
+      </p:sp>
+      <p:sp>
+        <p:nvSpPr>
+          <p:cNvPr id="48" name="Rectangle 47">
+            <a:extLst>
+              <a:ext uri="{FF2B5EF4-FFF2-40B4-BE49-F238E27FC236}">
+                <a16:creationId xmlns:a16="http://schemas.microsoft.com/office/drawing/2014/main" id="{EFCFB132-3FB5-72D8-6C47-6B0E44401C93}"/>
+              </a:ext>
+            </a:extLst>
+          </p:cNvPr>
+          <p:cNvSpPr/>
+          <p:nvPr/>
+        </p:nvSpPr>
+        <p:spPr>
+          <a:xfrm>
+            <a:off x="9328653" y="2498893"/>
+            <a:ext cx="1819398" cy="877223"/>
+          </a:xfrm>
+          <a:prstGeom prst="rect">
+            <a:avLst/>
+          </a:prstGeom>
+          <a:solidFill>
+            <a:schemeClr val="bg1"/>
+          </a:solidFill>
+          <a:ln w="38100">
+            <a:solidFill>
+              <a:schemeClr val="tx1"/>
+            </a:solidFill>
+          </a:ln>
+        </p:spPr>
+        <p:style>
+          <a:lnRef idx="2">
+            <a:schemeClr val="accent1">
+              <a:shade val="50000"/>
+            </a:schemeClr>
+          </a:lnRef>
+          <a:fillRef idx="1">
+            <a:schemeClr val="accent1"/>
+          </a:fillRef>
+          <a:effectRef idx="0">
+            <a:schemeClr val="accent1"/>
+          </a:effectRef>
+          <a:fontRef idx="minor">
+            <a:schemeClr val="lt1"/>
+          </a:fontRef>
+        </p:style>
+        <p:txBody>
+          <a:bodyPr rtlCol="0" anchor="ctr"/>
+          <a:lstStyle/>
+          <a:p>
+            <a:pPr algn="ctr"/>
+            <a:r>
+              <a:rPr lang="en-US" sz="2400" b="1" i="1" dirty="0">
+                <a:solidFill>
+                  <a:schemeClr val="tx1"/>
+                </a:solidFill>
+                <a:latin typeface="Arial" panose="020B0604020202020204" pitchFamily="34" charset="0"/>
+                <a:cs typeface="Arial" panose="020B0604020202020204" pitchFamily="34" charset="0"/>
+              </a:rPr>
+              <a:t>Soil moisture</a:t>
+            </a:r>
+            <a:endParaRPr lang="en-US" sz="2400" b="1" dirty="0">
+              <a:solidFill>
+                <a:schemeClr val="tx1"/>
+              </a:solidFill>
+              <a:latin typeface="Arial" panose="020B0604020202020204" pitchFamily="34" charset="0"/>
+              <a:cs typeface="Arial" panose="020B0604020202020204" pitchFamily="34" charset="0"/>
+            </a:endParaRPr>
+          </a:p>
+        </p:txBody>
+      </p:sp>
+      <p:sp>
+        <p:nvSpPr>
+          <p:cNvPr id="49" name="Rectangle 48">
+            <a:extLst>
+              <a:ext uri="{FF2B5EF4-FFF2-40B4-BE49-F238E27FC236}">
+                <a16:creationId xmlns:a16="http://schemas.microsoft.com/office/drawing/2014/main" id="{B52FD14F-6F73-8B8C-21A4-795130C7132B}"/>
+              </a:ext>
+            </a:extLst>
+          </p:cNvPr>
+          <p:cNvSpPr/>
+          <p:nvPr/>
+        </p:nvSpPr>
+        <p:spPr>
+          <a:xfrm>
+            <a:off x="13922220" y="1562147"/>
+            <a:ext cx="1819398" cy="877223"/>
+          </a:xfrm>
+          <a:prstGeom prst="rect">
+            <a:avLst/>
+          </a:prstGeom>
+          <a:solidFill>
+            <a:schemeClr val="bg1"/>
+          </a:solidFill>
+          <a:ln w="38100">
+            <a:solidFill>
+              <a:schemeClr val="tx1"/>
+            </a:solidFill>
+          </a:ln>
+        </p:spPr>
+        <p:style>
+          <a:lnRef idx="2">
+            <a:schemeClr val="accent1">
+              <a:shade val="50000"/>
+            </a:schemeClr>
+          </a:lnRef>
+          <a:fillRef idx="1">
+            <a:schemeClr val="accent1"/>
+          </a:fillRef>
+          <a:effectRef idx="0">
+            <a:schemeClr val="accent1"/>
+          </a:effectRef>
+          <a:fontRef idx="minor">
+            <a:schemeClr val="lt1"/>
+          </a:fontRef>
+        </p:style>
+        <p:txBody>
+          <a:bodyPr rtlCol="0" anchor="ctr"/>
+          <a:lstStyle/>
+          <a:p>
+            <a:pPr algn="ctr"/>
+            <a:r>
+              <a:rPr lang="en-US" sz="2400" b="1" i="1" dirty="0">
+                <a:solidFill>
+                  <a:schemeClr val="tx1"/>
+                </a:solidFill>
+                <a:latin typeface="Arial" panose="020B0604020202020204" pitchFamily="34" charset="0"/>
+                <a:cs typeface="Arial" panose="020B0604020202020204" pitchFamily="34" charset="0"/>
+              </a:rPr>
+              <a:t>VPD</a:t>
+            </a:r>
+            <a:endParaRPr lang="en-US" sz="2400" b="1" dirty="0">
+              <a:solidFill>
+                <a:schemeClr val="tx1"/>
+              </a:solidFill>
+              <a:latin typeface="Arial" panose="020B0604020202020204" pitchFamily="34" charset="0"/>
+              <a:cs typeface="Arial" panose="020B0604020202020204" pitchFamily="34" charset="0"/>
+            </a:endParaRPr>
+          </a:p>
+        </p:txBody>
+      </p:sp>
+      <p:cxnSp>
+        <p:nvCxnSpPr>
+          <p:cNvPr id="53" name="Straight Arrow Connector 52">
+            <a:extLst>
+              <a:ext uri="{FF2B5EF4-FFF2-40B4-BE49-F238E27FC236}">
+                <a16:creationId xmlns:a16="http://schemas.microsoft.com/office/drawing/2014/main" id="{9E1E3C21-AED1-2DA9-FC9F-68C67EBA3B77}"/>
+              </a:ext>
+            </a:extLst>
+          </p:cNvPr>
+          <p:cNvCxnSpPr/>
+          <p:nvPr/>
+        </p:nvCxnSpPr>
+        <p:spPr>
+          <a:xfrm>
+            <a:off x="11211729" y="12213921"/>
+            <a:ext cx="5556606" cy="0"/>
+          </a:xfrm>
+          <a:prstGeom prst="straightConnector1">
+            <a:avLst/>
+          </a:prstGeom>
+          <a:ln w="53848">
+            <a:solidFill>
+              <a:srgbClr val="C00000">
+                <a:alpha val="50000"/>
+              </a:srgbClr>
+            </a:solidFill>
+            <a:headEnd type="oval" w="med" len="med"/>
+            <a:tailEnd type="triangle" w="med" len="med"/>
+          </a:ln>
+        </p:spPr>
+        <p:style>
+          <a:lnRef idx="1">
+            <a:schemeClr val="accent1"/>
+          </a:lnRef>
+          <a:fillRef idx="0">
+            <a:schemeClr val="accent1"/>
+          </a:fillRef>
+          <a:effectRef idx="0">
+            <a:schemeClr val="accent1"/>
+          </a:effectRef>
+          <a:fontRef idx="minor">
+            <a:schemeClr val="tx1"/>
+          </a:fontRef>
+        </p:style>
+      </p:cxnSp>
+      <p:cxnSp>
+        <p:nvCxnSpPr>
+          <p:cNvPr id="54" name="Elbow Connector 53">
+            <a:extLst>
+              <a:ext uri="{FF2B5EF4-FFF2-40B4-BE49-F238E27FC236}">
+                <a16:creationId xmlns:a16="http://schemas.microsoft.com/office/drawing/2014/main" id="{F58ED126-7DD4-3369-A686-D333008245AB}"/>
+              </a:ext>
+            </a:extLst>
+          </p:cNvPr>
+          <p:cNvCxnSpPr>
+            <a:cxnSpLocks/>
+          </p:cNvCxnSpPr>
+          <p:nvPr/>
+        </p:nvCxnSpPr>
+        <p:spPr>
+          <a:xfrm flipV="1">
+            <a:off x="12928626" y="10222639"/>
+            <a:ext cx="3864664" cy="264294"/>
+          </a:xfrm>
+          <a:prstGeom prst="bentConnector3">
+            <a:avLst>
+              <a:gd name="adj1" fmla="val 50"/>
+            </a:avLst>
+          </a:prstGeom>
+          <a:ln w="36195">
+            <a:solidFill>
+              <a:srgbClr val="C00000">
+                <a:alpha val="50000"/>
+              </a:srgbClr>
+            </a:solidFill>
+            <a:headEnd type="oval" w="med" len="med"/>
+            <a:tailEnd type="triangle" w="med" len="med"/>
+          </a:ln>
+        </p:spPr>
+        <p:style>
+          <a:lnRef idx="1">
+            <a:schemeClr val="accent1"/>
+          </a:lnRef>
+          <a:fillRef idx="0">
+            <a:schemeClr val="accent1"/>
+          </a:fillRef>
+          <a:effectRef idx="0">
+            <a:schemeClr val="accent1"/>
+          </a:effectRef>
+          <a:fontRef idx="minor">
+            <a:schemeClr val="tx1"/>
+          </a:fontRef>
+        </p:style>
+      </p:cxnSp>
+      <p:cxnSp>
+        <p:nvCxnSpPr>
+          <p:cNvPr id="55" name="Elbow Connector 54">
+            <a:extLst>
+              <a:ext uri="{FF2B5EF4-FFF2-40B4-BE49-F238E27FC236}">
+                <a16:creationId xmlns:a16="http://schemas.microsoft.com/office/drawing/2014/main" id="{F24F7257-3949-B91E-7804-80AC937BB514}"/>
+              </a:ext>
+            </a:extLst>
+          </p:cNvPr>
+          <p:cNvCxnSpPr>
+            <a:cxnSpLocks/>
+          </p:cNvCxnSpPr>
+          <p:nvPr/>
+        </p:nvCxnSpPr>
+        <p:spPr>
+          <a:xfrm rot="5400000" flipH="1" flipV="1">
+            <a:off x="10699753" y="10601505"/>
+            <a:ext cx="452840" cy="1459354"/>
+          </a:xfrm>
+          <a:prstGeom prst="bentConnector2">
+            <a:avLst/>
+          </a:prstGeom>
+          <a:ln w="18161">
+            <a:solidFill>
+              <a:srgbClr val="C00000"/>
+            </a:solidFill>
+            <a:headEnd type="oval" w="med" len="med"/>
+            <a:tailEnd type="triangle" w="med" len="med"/>
+          </a:ln>
+        </p:spPr>
+        <p:style>
+          <a:lnRef idx="1">
+            <a:schemeClr val="accent1"/>
+          </a:lnRef>
+          <a:fillRef idx="0">
+            <a:schemeClr val="accent1"/>
+          </a:fillRef>
+          <a:effectRef idx="0">
+            <a:schemeClr val="accent1"/>
+          </a:effectRef>
+          <a:fontRef idx="minor">
+            <a:schemeClr val="tx1"/>
+          </a:fontRef>
+        </p:style>
+      </p:cxnSp>
+      <p:cxnSp>
+        <p:nvCxnSpPr>
+          <p:cNvPr id="56" name="Straight Arrow Connector 55">
+            <a:extLst>
+              <a:ext uri="{FF2B5EF4-FFF2-40B4-BE49-F238E27FC236}">
+                <a16:creationId xmlns:a16="http://schemas.microsoft.com/office/drawing/2014/main" id="{142FB3DE-CA9F-D588-7C55-6DEFBD578529}"/>
+              </a:ext>
+            </a:extLst>
+          </p:cNvPr>
+          <p:cNvCxnSpPr>
+            <a:stCxn id="74" idx="2"/>
+            <a:endCxn id="73" idx="0"/>
+          </p:cNvCxnSpPr>
+          <p:nvPr/>
+        </p:nvCxnSpPr>
+        <p:spPr>
+          <a:xfrm>
+            <a:off x="12565550" y="9404170"/>
+            <a:ext cx="0" cy="1099316"/>
+          </a:xfrm>
+          <a:prstGeom prst="straightConnector1">
+            <a:avLst/>
+          </a:prstGeom>
+          <a:ln w="24130">
+            <a:solidFill>
+              <a:schemeClr val="bg1">
+                <a:lumMod val="50000"/>
+              </a:schemeClr>
+            </a:solidFill>
+            <a:prstDash val="sysDash"/>
+            <a:tailEnd type="triangle"/>
+          </a:ln>
+        </p:spPr>
+        <p:style>
+          <a:lnRef idx="1">
+            <a:schemeClr val="accent1"/>
+          </a:lnRef>
+          <a:fillRef idx="0">
+            <a:schemeClr val="accent1"/>
+          </a:fillRef>
+          <a:effectRef idx="0">
+            <a:schemeClr val="accent1"/>
+          </a:effectRef>
+          <a:fontRef idx="minor">
+            <a:schemeClr val="tx1"/>
+          </a:fontRef>
+        </p:style>
+      </p:cxnSp>
+      <p:cxnSp>
+        <p:nvCxnSpPr>
+          <p:cNvPr id="57" name="Elbow Connector 56">
+            <a:extLst>
+              <a:ext uri="{FF2B5EF4-FFF2-40B4-BE49-F238E27FC236}">
+                <a16:creationId xmlns:a16="http://schemas.microsoft.com/office/drawing/2014/main" id="{B3FA17EC-6FFB-E863-C38F-119116D7D946}"/>
+              </a:ext>
+            </a:extLst>
+          </p:cNvPr>
+          <p:cNvCxnSpPr>
+            <a:cxnSpLocks/>
+          </p:cNvCxnSpPr>
+          <p:nvPr/>
+        </p:nvCxnSpPr>
+        <p:spPr>
+          <a:xfrm flipV="1">
+            <a:off x="10149570" y="9464676"/>
+            <a:ext cx="7049147" cy="2539909"/>
+          </a:xfrm>
+          <a:prstGeom prst="bentConnector4">
+            <a:avLst>
+              <a:gd name="adj1" fmla="val -15739"/>
+              <a:gd name="adj2" fmla="val 146522"/>
+            </a:avLst>
+          </a:prstGeom>
+          <a:ln w="35052">
+            <a:solidFill>
+              <a:schemeClr val="accent1">
+                <a:lumMod val="75000"/>
+                <a:alpha val="50000"/>
+              </a:schemeClr>
+            </a:solidFill>
+            <a:tailEnd type="triangle"/>
+          </a:ln>
+        </p:spPr>
+        <p:style>
+          <a:lnRef idx="1">
+            <a:schemeClr val="accent1"/>
+          </a:lnRef>
+          <a:fillRef idx="0">
+            <a:schemeClr val="accent1"/>
+          </a:fillRef>
+          <a:effectRef idx="0">
+            <a:schemeClr val="accent1"/>
+          </a:effectRef>
+          <a:fontRef idx="minor">
+            <a:schemeClr val="tx1"/>
+          </a:fontRef>
+        </p:style>
+      </p:cxnSp>
+      <p:cxnSp>
+        <p:nvCxnSpPr>
+          <p:cNvPr id="58" name="Straight Arrow Connector 57">
+            <a:extLst>
+              <a:ext uri="{FF2B5EF4-FFF2-40B4-BE49-F238E27FC236}">
+                <a16:creationId xmlns:a16="http://schemas.microsoft.com/office/drawing/2014/main" id="{9DA5E375-F10C-41D8-AE55-D8F6B0CA9618}"/>
+              </a:ext>
+            </a:extLst>
+          </p:cNvPr>
+          <p:cNvCxnSpPr>
+            <a:stCxn id="76" idx="0"/>
+            <a:endCxn id="77" idx="2"/>
+          </p:cNvCxnSpPr>
+          <p:nvPr/>
+        </p:nvCxnSpPr>
+        <p:spPr>
+          <a:xfrm flipV="1">
+            <a:off x="17702987" y="10341899"/>
+            <a:ext cx="0" cy="1224075"/>
+          </a:xfrm>
+          <a:prstGeom prst="straightConnector1">
+            <a:avLst/>
+          </a:prstGeom>
+          <a:ln w="78994">
+            <a:solidFill>
+              <a:srgbClr val="C00000">
+                <a:alpha val="50000"/>
+              </a:srgbClr>
+            </a:solidFill>
+            <a:headEnd type="oval" w="med" len="med"/>
+            <a:tailEnd type="triangle" w="med" len="med"/>
+          </a:ln>
+        </p:spPr>
+        <p:style>
+          <a:lnRef idx="1">
+            <a:schemeClr val="accent1"/>
+          </a:lnRef>
+          <a:fillRef idx="0">
+            <a:schemeClr val="accent1"/>
+          </a:fillRef>
+          <a:effectRef idx="0">
+            <a:schemeClr val="accent1"/>
+          </a:effectRef>
+          <a:fontRef idx="minor">
+            <a:schemeClr val="tx1"/>
+          </a:fontRef>
+        </p:style>
+      </p:cxnSp>
+      <p:cxnSp>
+        <p:nvCxnSpPr>
+          <p:cNvPr id="59" name="Elbow Connector 58">
+            <a:extLst>
+              <a:ext uri="{FF2B5EF4-FFF2-40B4-BE49-F238E27FC236}">
+                <a16:creationId xmlns:a16="http://schemas.microsoft.com/office/drawing/2014/main" id="{D809BA5C-DD3C-034C-82DA-7E6A71C3727A}"/>
+              </a:ext>
+            </a:extLst>
+          </p:cNvPr>
+          <p:cNvCxnSpPr>
+            <a:cxnSpLocks/>
+          </p:cNvCxnSpPr>
+          <p:nvPr/>
+        </p:nvCxnSpPr>
+        <p:spPr>
+          <a:xfrm rot="16200000" flipH="1">
+            <a:off x="14723037" y="7609759"/>
+            <a:ext cx="241362" cy="3830184"/>
+          </a:xfrm>
+          <a:prstGeom prst="bentConnector2">
+            <a:avLst/>
+          </a:prstGeom>
+          <a:ln w="60960">
+            <a:solidFill>
+              <a:schemeClr val="accent1">
+                <a:lumMod val="75000"/>
+                <a:alpha val="50000"/>
+              </a:schemeClr>
+            </a:solidFill>
+            <a:tailEnd type="triangle"/>
+          </a:ln>
+        </p:spPr>
+        <p:style>
+          <a:lnRef idx="1">
+            <a:schemeClr val="accent1"/>
+          </a:lnRef>
+          <a:fillRef idx="0">
+            <a:schemeClr val="accent1"/>
+          </a:fillRef>
+          <a:effectRef idx="0">
+            <a:schemeClr val="accent1"/>
+          </a:effectRef>
+          <a:fontRef idx="minor">
+            <a:schemeClr val="tx1"/>
+          </a:fontRef>
+        </p:style>
+      </p:cxnSp>
+      <p:cxnSp>
+        <p:nvCxnSpPr>
+          <p:cNvPr id="62" name="Elbow Connector 61">
+            <a:extLst>
+              <a:ext uri="{FF2B5EF4-FFF2-40B4-BE49-F238E27FC236}">
+                <a16:creationId xmlns:a16="http://schemas.microsoft.com/office/drawing/2014/main" id="{1D959147-3D46-8C6F-3373-C29B4F93176E}"/>
+              </a:ext>
+            </a:extLst>
+          </p:cNvPr>
+          <p:cNvCxnSpPr>
+            <a:cxnSpLocks/>
+          </p:cNvCxnSpPr>
+          <p:nvPr/>
+        </p:nvCxnSpPr>
+        <p:spPr>
+          <a:xfrm>
+            <a:off x="11123479" y="9747158"/>
+            <a:ext cx="3922766" cy="729775"/>
+          </a:xfrm>
+          <a:prstGeom prst="bentConnector3">
+            <a:avLst>
+              <a:gd name="adj1" fmla="val 100020"/>
+            </a:avLst>
+          </a:prstGeom>
+          <a:ln w="14731">
+            <a:solidFill>
+              <a:srgbClr val="C00000">
+                <a:alpha val="50000"/>
+              </a:srgbClr>
+            </a:solidFill>
+            <a:headEnd type="oval" w="med" len="med"/>
+            <a:tailEnd type="triangle" w="med" len="med"/>
+          </a:ln>
+        </p:spPr>
+        <p:style>
+          <a:lnRef idx="1">
+            <a:schemeClr val="accent1"/>
+          </a:lnRef>
+          <a:fillRef idx="0">
+            <a:schemeClr val="accent1"/>
+          </a:fillRef>
+          <a:effectRef idx="0">
+            <a:schemeClr val="accent1"/>
+          </a:effectRef>
+          <a:fontRef idx="minor">
+            <a:schemeClr val="tx1"/>
+          </a:fontRef>
+        </p:style>
+      </p:cxnSp>
+      <p:cxnSp>
+        <p:nvCxnSpPr>
+          <p:cNvPr id="63" name="Straight Arrow Connector 62">
+            <a:extLst>
+              <a:ext uri="{FF2B5EF4-FFF2-40B4-BE49-F238E27FC236}">
+                <a16:creationId xmlns:a16="http://schemas.microsoft.com/office/drawing/2014/main" id="{75CD2F80-75C2-1E2B-4E98-A467EBBEF8A4}"/>
+              </a:ext>
+            </a:extLst>
+          </p:cNvPr>
+          <p:cNvCxnSpPr>
+            <a:cxnSpLocks/>
+          </p:cNvCxnSpPr>
+          <p:nvPr/>
+        </p:nvCxnSpPr>
+        <p:spPr>
+          <a:xfrm>
+            <a:off x="9645300" y="10357374"/>
+            <a:ext cx="0" cy="1200465"/>
+          </a:xfrm>
+          <a:prstGeom prst="straightConnector1">
+            <a:avLst/>
+          </a:prstGeom>
+          <a:ln w="41910">
+            <a:solidFill>
+              <a:srgbClr val="C00000">
+                <a:alpha val="50000"/>
+              </a:srgbClr>
+            </a:solidFill>
+            <a:headEnd type="oval" w="med" len="med"/>
+            <a:tailEnd type="triangle" w="med" len="med"/>
+          </a:ln>
+        </p:spPr>
+        <p:style>
+          <a:lnRef idx="1">
+            <a:schemeClr val="accent1"/>
+          </a:lnRef>
+          <a:fillRef idx="0">
+            <a:schemeClr val="accent1"/>
+          </a:fillRef>
+          <a:effectRef idx="0">
+            <a:schemeClr val="accent1"/>
+          </a:effectRef>
+          <a:fontRef idx="minor">
+            <a:schemeClr val="tx1"/>
+          </a:fontRef>
+        </p:style>
+      </p:cxnSp>
+      <p:cxnSp>
+        <p:nvCxnSpPr>
+          <p:cNvPr id="64" name="Elbow Connector 63">
+            <a:extLst>
+              <a:ext uri="{FF2B5EF4-FFF2-40B4-BE49-F238E27FC236}">
+                <a16:creationId xmlns:a16="http://schemas.microsoft.com/office/drawing/2014/main" id="{F120BA14-DB94-690C-A88A-7F7B968525C3}"/>
+              </a:ext>
+            </a:extLst>
+          </p:cNvPr>
+          <p:cNvCxnSpPr>
+            <a:cxnSpLocks/>
+          </p:cNvCxnSpPr>
+          <p:nvPr/>
+        </p:nvCxnSpPr>
+        <p:spPr>
+          <a:xfrm rot="10800000" flipV="1">
+            <a:off x="11123480" y="9394674"/>
+            <a:ext cx="3199099" cy="650028"/>
+          </a:xfrm>
+          <a:prstGeom prst="bentConnector3">
+            <a:avLst>
+              <a:gd name="adj1" fmla="val 97"/>
+            </a:avLst>
+          </a:prstGeom>
+          <a:ln w="142875">
+            <a:solidFill>
+              <a:srgbClr val="C00000">
+                <a:alpha val="50000"/>
+              </a:srgbClr>
+            </a:solidFill>
+            <a:headEnd type="oval" w="med" len="med"/>
+            <a:tailEnd type="triangle" w="med" len="med"/>
+          </a:ln>
+        </p:spPr>
+        <p:style>
+          <a:lnRef idx="1">
+            <a:schemeClr val="accent1"/>
+          </a:lnRef>
+          <a:fillRef idx="0">
+            <a:schemeClr val="accent1"/>
+          </a:fillRef>
+          <a:effectRef idx="0">
+            <a:schemeClr val="accent1"/>
+          </a:effectRef>
+          <a:fontRef idx="minor">
+            <a:schemeClr val="tx1"/>
+          </a:fontRef>
+        </p:style>
+      </p:cxnSp>
+      <p:cxnSp>
+        <p:nvCxnSpPr>
+          <p:cNvPr id="65" name="Elbow Connector 64">
+            <a:extLst>
+              <a:ext uri="{FF2B5EF4-FFF2-40B4-BE49-F238E27FC236}">
+                <a16:creationId xmlns:a16="http://schemas.microsoft.com/office/drawing/2014/main" id="{13B23709-0B52-4175-8B21-FFA6A49AE86F}"/>
+              </a:ext>
+            </a:extLst>
+          </p:cNvPr>
+          <p:cNvCxnSpPr>
+            <a:cxnSpLocks/>
+          </p:cNvCxnSpPr>
+          <p:nvPr/>
+        </p:nvCxnSpPr>
+        <p:spPr>
+          <a:xfrm rot="16200000" flipH="1">
+            <a:off x="10625582" y="9661978"/>
+            <a:ext cx="601182" cy="1459355"/>
+          </a:xfrm>
+          <a:prstGeom prst="bentConnector2">
+            <a:avLst/>
+          </a:prstGeom>
+          <a:ln w="19177">
+            <a:solidFill>
+              <a:schemeClr val="accent1">
+                <a:lumMod val="75000"/>
+              </a:schemeClr>
+            </a:solidFill>
+            <a:tailEnd type="triangle"/>
+          </a:ln>
+        </p:spPr>
+        <p:style>
+          <a:lnRef idx="1">
+            <a:schemeClr val="accent1"/>
+          </a:lnRef>
+          <a:fillRef idx="0">
+            <a:schemeClr val="accent1"/>
+          </a:fillRef>
+          <a:effectRef idx="0">
+            <a:schemeClr val="accent1"/>
+          </a:effectRef>
+          <a:fontRef idx="minor">
+            <a:schemeClr val="tx1"/>
+          </a:fontRef>
+        </p:style>
+      </p:cxnSp>
+      <p:cxnSp>
+        <p:nvCxnSpPr>
+          <p:cNvPr id="66" name="Straight Arrow Connector 65">
+            <a:extLst>
+              <a:ext uri="{FF2B5EF4-FFF2-40B4-BE49-F238E27FC236}">
+                <a16:creationId xmlns:a16="http://schemas.microsoft.com/office/drawing/2014/main" id="{1160F1F7-7D61-ECFA-7464-2DB12E637AC2}"/>
+              </a:ext>
+            </a:extLst>
+          </p:cNvPr>
+          <p:cNvCxnSpPr>
+            <a:cxnSpLocks/>
+          </p:cNvCxnSpPr>
+          <p:nvPr/>
+        </p:nvCxnSpPr>
+        <p:spPr>
+          <a:xfrm>
+            <a:off x="13475249" y="10931419"/>
+            <a:ext cx="892510" cy="0"/>
+          </a:xfrm>
+          <a:prstGeom prst="straightConnector1">
+            <a:avLst/>
+          </a:prstGeom>
+          <a:ln w="66802">
+            <a:solidFill>
+              <a:schemeClr val="accent1">
+                <a:lumMod val="75000"/>
+              </a:schemeClr>
+            </a:solidFill>
+            <a:tailEnd type="triangle"/>
+          </a:ln>
+        </p:spPr>
+        <p:style>
+          <a:lnRef idx="1">
+            <a:schemeClr val="accent1"/>
+          </a:lnRef>
+          <a:fillRef idx="0">
+            <a:schemeClr val="accent1"/>
+          </a:fillRef>
+          <a:effectRef idx="0">
+            <a:schemeClr val="accent1"/>
+          </a:effectRef>
+          <a:fontRef idx="minor">
+            <a:schemeClr val="tx1"/>
+          </a:fontRef>
+        </p:style>
+      </p:cxnSp>
+      <p:cxnSp>
+        <p:nvCxnSpPr>
+          <p:cNvPr id="67" name="Straight Arrow Connector 66">
+            <a:extLst>
+              <a:ext uri="{FF2B5EF4-FFF2-40B4-BE49-F238E27FC236}">
+                <a16:creationId xmlns:a16="http://schemas.microsoft.com/office/drawing/2014/main" id="{8431E736-75D3-EE50-12CB-B1EAC0FEF0CF}"/>
+              </a:ext>
+            </a:extLst>
+          </p:cNvPr>
+          <p:cNvCxnSpPr>
+            <a:cxnSpLocks/>
+          </p:cNvCxnSpPr>
+          <p:nvPr/>
+        </p:nvCxnSpPr>
+        <p:spPr>
+          <a:xfrm>
+            <a:off x="14787585" y="9429816"/>
+            <a:ext cx="5843" cy="1050299"/>
+          </a:xfrm>
+          <a:prstGeom prst="straightConnector1">
+            <a:avLst/>
+          </a:prstGeom>
+          <a:ln w="20193">
+            <a:solidFill>
+              <a:srgbClr val="C00000"/>
+            </a:solidFill>
+            <a:headEnd type="oval"/>
+            <a:tailEnd type="triangle"/>
+          </a:ln>
+        </p:spPr>
+        <p:style>
+          <a:lnRef idx="1">
+            <a:schemeClr val="accent1"/>
+          </a:lnRef>
+          <a:fillRef idx="0">
+            <a:schemeClr val="accent1"/>
+          </a:fillRef>
+          <a:effectRef idx="0">
+            <a:schemeClr val="accent1"/>
+          </a:effectRef>
+          <a:fontRef idx="minor">
+            <a:schemeClr val="tx1"/>
+          </a:fontRef>
+        </p:style>
+      </p:cxnSp>
+      <p:cxnSp>
+        <p:nvCxnSpPr>
+          <p:cNvPr id="68" name="Elbow Connector 67">
+            <a:extLst>
+              <a:ext uri="{FF2B5EF4-FFF2-40B4-BE49-F238E27FC236}">
+                <a16:creationId xmlns:a16="http://schemas.microsoft.com/office/drawing/2014/main" id="{36B0EDF3-3D7C-D7B5-7B86-DBC6C0C895C6}"/>
+              </a:ext>
+            </a:extLst>
+          </p:cNvPr>
+          <p:cNvCxnSpPr>
+            <a:stCxn id="78" idx="0"/>
+            <a:endCxn id="77" idx="1"/>
+          </p:cNvCxnSpPr>
+          <p:nvPr/>
+        </p:nvCxnSpPr>
+        <p:spPr>
+          <a:xfrm rot="5400000" flipH="1" flipV="1">
+            <a:off x="15746032" y="9445553"/>
+            <a:ext cx="589520" cy="1504991"/>
+          </a:xfrm>
+          <a:prstGeom prst="bentConnector2">
+            <a:avLst/>
+          </a:prstGeom>
+          <a:ln w="39116">
+            <a:solidFill>
+              <a:schemeClr val="bg1">
+                <a:lumMod val="50000"/>
+              </a:schemeClr>
+            </a:solidFill>
+            <a:prstDash val="sysDash"/>
+            <a:tailEnd type="triangle"/>
+          </a:ln>
+        </p:spPr>
+        <p:style>
+          <a:lnRef idx="1">
+            <a:schemeClr val="accent1"/>
+          </a:lnRef>
+          <a:fillRef idx="0">
+            <a:schemeClr val="accent1"/>
+          </a:fillRef>
+          <a:effectRef idx="0">
+            <a:schemeClr val="accent1"/>
+          </a:effectRef>
+          <a:fontRef idx="minor">
+            <a:schemeClr val="tx1"/>
+          </a:fontRef>
+        </p:style>
+      </p:cxnSp>
+      <p:cxnSp>
+        <p:nvCxnSpPr>
+          <p:cNvPr id="69" name="Elbow Connector 68">
+            <a:extLst>
+              <a:ext uri="{FF2B5EF4-FFF2-40B4-BE49-F238E27FC236}">
+                <a16:creationId xmlns:a16="http://schemas.microsoft.com/office/drawing/2014/main" id="{CF39511F-3FCE-9E6B-BD59-EC513272F050}"/>
+              </a:ext>
+            </a:extLst>
+          </p:cNvPr>
+          <p:cNvCxnSpPr>
+            <a:cxnSpLocks/>
+          </p:cNvCxnSpPr>
+          <p:nvPr/>
+        </p:nvCxnSpPr>
+        <p:spPr>
+          <a:xfrm rot="16200000" flipH="1">
+            <a:off x="15702495" y="10934812"/>
+            <a:ext cx="634555" cy="1504991"/>
+          </a:xfrm>
+          <a:prstGeom prst="bentConnector2">
+            <a:avLst/>
+          </a:prstGeom>
+          <a:ln w="65532">
+            <a:solidFill>
+              <a:srgbClr val="C00000"/>
+            </a:solidFill>
+            <a:headEnd type="oval" w="med" len="med"/>
+            <a:tailEnd type="triangle" w="med" len="med"/>
+          </a:ln>
+        </p:spPr>
+        <p:style>
+          <a:lnRef idx="1">
+            <a:schemeClr val="accent1"/>
+          </a:lnRef>
+          <a:fillRef idx="0">
+            <a:schemeClr val="accent1"/>
+          </a:fillRef>
+          <a:effectRef idx="0">
+            <a:schemeClr val="accent1"/>
+          </a:effectRef>
+          <a:fontRef idx="minor">
+            <a:schemeClr val="tx1"/>
+          </a:fontRef>
+        </p:style>
+      </p:cxnSp>
+      <p:cxnSp>
+        <p:nvCxnSpPr>
+          <p:cNvPr id="70" name="Elbow Connector 69">
+            <a:extLst>
+              <a:ext uri="{FF2B5EF4-FFF2-40B4-BE49-F238E27FC236}">
+                <a16:creationId xmlns:a16="http://schemas.microsoft.com/office/drawing/2014/main" id="{7167AA64-90C9-75E1-2796-5EB306C9D1B8}"/>
+              </a:ext>
+            </a:extLst>
+          </p:cNvPr>
+          <p:cNvCxnSpPr>
+            <a:cxnSpLocks/>
+          </p:cNvCxnSpPr>
+          <p:nvPr/>
+        </p:nvCxnSpPr>
+        <p:spPr>
+          <a:xfrm rot="16200000" flipH="1">
+            <a:off x="17880147" y="9277005"/>
+            <a:ext cx="1040309" cy="1394631"/>
+          </a:xfrm>
+          <a:prstGeom prst="bentConnector3">
+            <a:avLst>
+              <a:gd name="adj1" fmla="val -21974"/>
+            </a:avLst>
+          </a:prstGeom>
+          <a:ln w="190246">
+            <a:solidFill>
+              <a:schemeClr val="accent1">
+                <a:lumMod val="75000"/>
+              </a:schemeClr>
+            </a:solidFill>
+            <a:tailEnd type="triangle"/>
+          </a:ln>
+        </p:spPr>
+        <p:style>
+          <a:lnRef idx="1">
+            <a:schemeClr val="accent1"/>
+          </a:lnRef>
+          <a:fillRef idx="0">
+            <a:schemeClr val="accent1"/>
+          </a:fillRef>
+          <a:effectRef idx="0">
+            <a:schemeClr val="accent1"/>
+          </a:effectRef>
+          <a:fontRef idx="minor">
+            <a:schemeClr val="tx1"/>
+          </a:fontRef>
+        </p:style>
+      </p:cxnSp>
+      <p:cxnSp>
+        <p:nvCxnSpPr>
+          <p:cNvPr id="71" name="Elbow Connector 70">
+            <a:extLst>
+              <a:ext uri="{FF2B5EF4-FFF2-40B4-BE49-F238E27FC236}">
+                <a16:creationId xmlns:a16="http://schemas.microsoft.com/office/drawing/2014/main" id="{BDCFC548-4344-371B-2C31-60C6AA77B1C9}"/>
+              </a:ext>
+            </a:extLst>
+          </p:cNvPr>
+          <p:cNvCxnSpPr>
+            <a:cxnSpLocks/>
+          </p:cNvCxnSpPr>
+          <p:nvPr/>
+        </p:nvCxnSpPr>
+        <p:spPr>
+          <a:xfrm rot="5400000" flipH="1" flipV="1">
+            <a:off x="17869807" y="11231152"/>
+            <a:ext cx="1060989" cy="1394631"/>
+          </a:xfrm>
+          <a:prstGeom prst="bentConnector3">
+            <a:avLst>
+              <a:gd name="adj1" fmla="val -21546"/>
+            </a:avLst>
+          </a:prstGeom>
+          <a:ln w="173990">
+            <a:solidFill>
+              <a:schemeClr val="accent1">
+                <a:lumMod val="75000"/>
+              </a:schemeClr>
+            </a:solidFill>
+            <a:tailEnd type="triangle"/>
+          </a:ln>
+        </p:spPr>
+        <p:style>
+          <a:lnRef idx="1">
+            <a:schemeClr val="accent1"/>
+          </a:lnRef>
+          <a:fillRef idx="0">
+            <a:schemeClr val="accent1"/>
+          </a:fillRef>
+          <a:effectRef idx="0">
+            <a:schemeClr val="accent1"/>
+          </a:effectRef>
+          <a:fontRef idx="minor">
+            <a:schemeClr val="tx1"/>
+          </a:fontRef>
+        </p:style>
+      </p:cxnSp>
+      <p:sp>
+        <p:nvSpPr>
+          <p:cNvPr id="73" name="Rectangle 72">
+            <a:extLst>
+              <a:ext uri="{FF2B5EF4-FFF2-40B4-BE49-F238E27FC236}">
+                <a16:creationId xmlns:a16="http://schemas.microsoft.com/office/drawing/2014/main" id="{BA637BC2-E627-C4B8-EEC0-E438F2CBE441}"/>
+              </a:ext>
+            </a:extLst>
+          </p:cNvPr>
+          <p:cNvSpPr/>
+          <p:nvPr/>
+        </p:nvSpPr>
+        <p:spPr>
+          <a:xfrm>
+            <a:off x="11655851" y="10503486"/>
+            <a:ext cx="1819398" cy="877223"/>
+          </a:xfrm>
+          <a:prstGeom prst="rect">
+            <a:avLst/>
+          </a:prstGeom>
+          <a:solidFill>
+            <a:schemeClr val="bg1"/>
+          </a:solidFill>
+          <a:ln w="38100">
+            <a:solidFill>
+              <a:schemeClr val="tx1"/>
+            </a:solidFill>
+          </a:ln>
+        </p:spPr>
+        <p:style>
+          <a:lnRef idx="2">
+            <a:schemeClr val="accent1">
+              <a:shade val="50000"/>
+            </a:schemeClr>
+          </a:lnRef>
+          <a:fillRef idx="1">
+            <a:schemeClr val="accent1"/>
+          </a:fillRef>
+          <a:effectRef idx="0">
+            <a:schemeClr val="accent1"/>
+          </a:effectRef>
+          <a:fontRef idx="minor">
+            <a:schemeClr val="lt1"/>
+          </a:fontRef>
+        </p:style>
+        <p:txBody>
+          <a:bodyPr rtlCol="0" anchor="ctr"/>
+          <a:lstStyle/>
+          <a:p>
+            <a:pPr algn="ctr"/>
+            <a:r>
+              <a:rPr lang="el-GR" sz="2400" b="1" i="1" dirty="0">
+                <a:solidFill>
+                  <a:schemeClr val="tx1"/>
+                </a:solidFill>
+                <a:latin typeface="Arial" panose="020B0604020202020204" pitchFamily="34" charset="0"/>
+                <a:cs typeface="Arial" panose="020B0604020202020204" pitchFamily="34" charset="0"/>
+              </a:rPr>
+              <a:t>β</a:t>
+            </a:r>
+            <a:endParaRPr lang="en-US" sz="2400" b="1" i="1" dirty="0">
+              <a:solidFill>
+                <a:schemeClr val="tx1"/>
+              </a:solidFill>
+              <a:latin typeface="Arial" panose="020B0604020202020204" pitchFamily="34" charset="0"/>
+              <a:cs typeface="Arial" panose="020B0604020202020204" pitchFamily="34" charset="0"/>
+            </a:endParaRPr>
+          </a:p>
+        </p:txBody>
+      </p:sp>
+      <p:sp>
+        <p:nvSpPr>
+          <p:cNvPr id="74" name="Rectangle 73">
+            <a:extLst>
+              <a:ext uri="{FF2B5EF4-FFF2-40B4-BE49-F238E27FC236}">
+                <a16:creationId xmlns:a16="http://schemas.microsoft.com/office/drawing/2014/main" id="{98AF7FF1-A7B6-C08B-149F-9B2D6BF93B7E}"/>
+              </a:ext>
+            </a:extLst>
+          </p:cNvPr>
+          <p:cNvSpPr/>
+          <p:nvPr/>
+        </p:nvSpPr>
+        <p:spPr>
+          <a:xfrm>
+            <a:off x="11655851" y="8526947"/>
+            <a:ext cx="1819398" cy="877223"/>
+          </a:xfrm>
+          <a:prstGeom prst="rect">
+            <a:avLst/>
+          </a:prstGeom>
+          <a:solidFill>
+            <a:schemeClr val="bg1"/>
+          </a:solidFill>
+          <a:ln w="38100">
+            <a:solidFill>
+              <a:schemeClr val="tx1"/>
+            </a:solidFill>
+          </a:ln>
+        </p:spPr>
+        <p:style>
+          <a:lnRef idx="2">
+            <a:schemeClr val="accent1">
+              <a:shade val="50000"/>
+            </a:schemeClr>
+          </a:lnRef>
+          <a:fillRef idx="1">
+            <a:schemeClr val="accent1"/>
+          </a:fillRef>
+          <a:effectRef idx="0">
+            <a:schemeClr val="accent1"/>
+          </a:effectRef>
+          <a:fontRef idx="minor">
+            <a:schemeClr val="lt1"/>
+          </a:fontRef>
+        </p:style>
+        <p:txBody>
+          <a:bodyPr rtlCol="0" anchor="ctr"/>
+          <a:lstStyle/>
+          <a:p>
+            <a:pPr algn="ctr"/>
+            <a:r>
+              <a:rPr lang="en-US" sz="2400" b="1" i="1" dirty="0">
+                <a:solidFill>
+                  <a:schemeClr val="tx1"/>
+                </a:solidFill>
+                <a:latin typeface="Arial" panose="020B0604020202020204" pitchFamily="34" charset="0"/>
+                <a:cs typeface="Arial" panose="020B0604020202020204" pitchFamily="34" charset="0"/>
+              </a:rPr>
+              <a:t>N</a:t>
+            </a:r>
+            <a:r>
+              <a:rPr lang="en-US" sz="2400" b="1" baseline="-25000" dirty="0">
+                <a:solidFill>
+                  <a:schemeClr val="tx1"/>
+                </a:solidFill>
+                <a:latin typeface="Arial" panose="020B0604020202020204" pitchFamily="34" charset="0"/>
+                <a:cs typeface="Arial" panose="020B0604020202020204" pitchFamily="34" charset="0"/>
+              </a:rPr>
+              <a:t>fixation</a:t>
+            </a:r>
+            <a:endParaRPr lang="en-US" sz="2400" i="1" dirty="0">
+              <a:solidFill>
+                <a:schemeClr val="tx1"/>
+              </a:solidFill>
+              <a:latin typeface="Arial" panose="020B0604020202020204" pitchFamily="34" charset="0"/>
+              <a:cs typeface="Arial" panose="020B0604020202020204" pitchFamily="34" charset="0"/>
+            </a:endParaRPr>
+          </a:p>
+        </p:txBody>
+      </p:sp>
+      <p:sp>
+        <p:nvSpPr>
+          <p:cNvPr id="75" name="Rectangle 74">
+            <a:extLst>
+              <a:ext uri="{FF2B5EF4-FFF2-40B4-BE49-F238E27FC236}">
+                <a16:creationId xmlns:a16="http://schemas.microsoft.com/office/drawing/2014/main" id="{E4F1E8DC-FD3C-B8B1-7FE7-B87B7BA16C9A}"/>
+              </a:ext>
+            </a:extLst>
+          </p:cNvPr>
+          <p:cNvSpPr/>
+          <p:nvPr/>
+        </p:nvSpPr>
+        <p:spPr>
+          <a:xfrm>
+            <a:off x="18187919" y="10504985"/>
+            <a:ext cx="1819398" cy="877223"/>
+          </a:xfrm>
+          <a:prstGeom prst="rect">
+            <a:avLst/>
+          </a:prstGeom>
+          <a:solidFill>
+            <a:schemeClr val="bg1"/>
+          </a:solidFill>
+          <a:ln w="38100">
+            <a:solidFill>
+              <a:schemeClr val="tx1"/>
+            </a:solidFill>
+          </a:ln>
+        </p:spPr>
+        <p:style>
+          <a:lnRef idx="2">
+            <a:schemeClr val="accent1">
+              <a:shade val="50000"/>
+            </a:schemeClr>
+          </a:lnRef>
+          <a:fillRef idx="1">
+            <a:schemeClr val="accent1"/>
+          </a:fillRef>
+          <a:effectRef idx="0">
+            <a:schemeClr val="accent1"/>
+          </a:effectRef>
+          <a:fontRef idx="minor">
+            <a:schemeClr val="lt1"/>
+          </a:fontRef>
+        </p:style>
+        <p:txBody>
+          <a:bodyPr rtlCol="0" anchor="ctr"/>
+          <a:lstStyle/>
+          <a:p>
+            <a:pPr algn="ctr"/>
+            <a:r>
+              <a:rPr lang="el-GR" sz="2400" b="1" i="1" dirty="0">
+                <a:solidFill>
+                  <a:schemeClr val="tx1"/>
+                </a:solidFill>
+                <a:latin typeface="Arial" panose="020B0604020202020204" pitchFamily="34" charset="0"/>
+                <a:cs typeface="Arial" panose="020B0604020202020204" pitchFamily="34" charset="0"/>
+              </a:rPr>
+              <a:t>Ν</a:t>
+            </a:r>
+            <a:r>
+              <a:rPr lang="en-US" sz="2400" b="1" baseline="-25000" dirty="0">
+                <a:solidFill>
+                  <a:schemeClr val="tx1"/>
+                </a:solidFill>
+                <a:latin typeface="Arial" panose="020B0604020202020204" pitchFamily="34" charset="0"/>
+                <a:cs typeface="Arial" panose="020B0604020202020204" pitchFamily="34" charset="0"/>
+              </a:rPr>
+              <a:t>area</a:t>
+            </a:r>
+            <a:endParaRPr lang="en-US" sz="2400" b="1" i="1" dirty="0">
+              <a:solidFill>
+                <a:schemeClr val="tx1"/>
+              </a:solidFill>
+              <a:latin typeface="Arial" panose="020B0604020202020204" pitchFamily="34" charset="0"/>
+              <a:cs typeface="Arial" panose="020B0604020202020204" pitchFamily="34" charset="0"/>
+            </a:endParaRPr>
+          </a:p>
+        </p:txBody>
+      </p:sp>
+      <p:sp>
+        <p:nvSpPr>
+          <p:cNvPr id="76" name="Rectangle 75">
+            <a:extLst>
+              <a:ext uri="{FF2B5EF4-FFF2-40B4-BE49-F238E27FC236}">
+                <a16:creationId xmlns:a16="http://schemas.microsoft.com/office/drawing/2014/main" id="{777B9E07-94A1-162F-5691-81A421B68E23}"/>
+              </a:ext>
+            </a:extLst>
+          </p:cNvPr>
+          <p:cNvSpPr/>
+          <p:nvPr/>
+        </p:nvSpPr>
+        <p:spPr>
+          <a:xfrm>
+            <a:off x="16793288" y="11565974"/>
+            <a:ext cx="1819398" cy="877223"/>
+          </a:xfrm>
+          <a:prstGeom prst="rect">
+            <a:avLst/>
+          </a:prstGeom>
+          <a:solidFill>
+            <a:schemeClr val="bg1"/>
+          </a:solidFill>
+          <a:ln w="38100">
+            <a:solidFill>
+              <a:schemeClr val="tx1"/>
+            </a:solidFill>
+          </a:ln>
+        </p:spPr>
+        <p:style>
+          <a:lnRef idx="2">
+            <a:schemeClr val="accent1">
+              <a:shade val="50000"/>
+            </a:schemeClr>
+          </a:lnRef>
+          <a:fillRef idx="1">
+            <a:schemeClr val="accent1"/>
+          </a:fillRef>
+          <a:effectRef idx="0">
+            <a:schemeClr val="accent1"/>
+          </a:effectRef>
+          <a:fontRef idx="minor">
+            <a:schemeClr val="lt1"/>
+          </a:fontRef>
+        </p:style>
+        <p:txBody>
+          <a:bodyPr rtlCol="0" anchor="ctr"/>
+          <a:lstStyle/>
+          <a:p>
+            <a:pPr algn="ctr"/>
+            <a:r>
+              <a:rPr lang="en-US" sz="2400" b="1" i="1" dirty="0">
+                <a:solidFill>
+                  <a:schemeClr val="tx1"/>
+                </a:solidFill>
+                <a:latin typeface="Arial" panose="020B0604020202020204" pitchFamily="34" charset="0"/>
+                <a:cs typeface="Arial" panose="020B0604020202020204" pitchFamily="34" charset="0"/>
+              </a:rPr>
+              <a:t>M</a:t>
+            </a:r>
+            <a:r>
+              <a:rPr lang="en-US" sz="2400" b="1" baseline="-25000" dirty="0">
+                <a:solidFill>
+                  <a:schemeClr val="tx1"/>
+                </a:solidFill>
+                <a:latin typeface="Arial" panose="020B0604020202020204" pitchFamily="34" charset="0"/>
+                <a:cs typeface="Arial" panose="020B0604020202020204" pitchFamily="34" charset="0"/>
+              </a:rPr>
+              <a:t>area</a:t>
+            </a:r>
+            <a:endParaRPr lang="en-US" sz="2400" b="1" i="1" dirty="0">
+              <a:solidFill>
+                <a:schemeClr val="tx1"/>
+              </a:solidFill>
+              <a:latin typeface="Arial" panose="020B0604020202020204" pitchFamily="34" charset="0"/>
+              <a:cs typeface="Arial" panose="020B0604020202020204" pitchFamily="34" charset="0"/>
+            </a:endParaRPr>
+          </a:p>
+        </p:txBody>
+      </p:sp>
+      <p:sp>
+        <p:nvSpPr>
+          <p:cNvPr id="77" name="Rectangle 76">
+            <a:extLst>
+              <a:ext uri="{FF2B5EF4-FFF2-40B4-BE49-F238E27FC236}">
+                <a16:creationId xmlns:a16="http://schemas.microsoft.com/office/drawing/2014/main" id="{A5445E8E-E0B7-968C-76C1-5E89862C2117}"/>
+              </a:ext>
+            </a:extLst>
+          </p:cNvPr>
+          <p:cNvSpPr/>
+          <p:nvPr/>
+        </p:nvSpPr>
+        <p:spPr>
+          <a:xfrm>
+            <a:off x="16793288" y="9464676"/>
+            <a:ext cx="1819398" cy="877223"/>
+          </a:xfrm>
+          <a:prstGeom prst="rect">
+            <a:avLst/>
+          </a:prstGeom>
+          <a:solidFill>
+            <a:schemeClr val="bg1"/>
+          </a:solidFill>
+          <a:ln w="38100">
+            <a:solidFill>
+              <a:schemeClr val="tx1"/>
+            </a:solidFill>
+          </a:ln>
+        </p:spPr>
+        <p:style>
+          <a:lnRef idx="2">
+            <a:schemeClr val="accent1">
+              <a:shade val="50000"/>
+            </a:schemeClr>
+          </a:lnRef>
+          <a:fillRef idx="1">
+            <a:schemeClr val="accent1"/>
+          </a:fillRef>
+          <a:effectRef idx="0">
+            <a:schemeClr val="accent1"/>
+          </a:effectRef>
+          <a:fontRef idx="minor">
+            <a:schemeClr val="lt1"/>
+          </a:fontRef>
+        </p:style>
+        <p:txBody>
+          <a:bodyPr rtlCol="0" anchor="ctr"/>
+          <a:lstStyle/>
+          <a:p>
+            <a:pPr algn="ctr"/>
+            <a:r>
+              <a:rPr lang="en-US" sz="2400" b="1" i="1" dirty="0">
+                <a:solidFill>
+                  <a:schemeClr val="tx1"/>
+                </a:solidFill>
+                <a:latin typeface="Arial" panose="020B0604020202020204" pitchFamily="34" charset="0"/>
+                <a:cs typeface="Arial" panose="020B0604020202020204" pitchFamily="34" charset="0"/>
+              </a:rPr>
+              <a:t>N</a:t>
+            </a:r>
+            <a:r>
+              <a:rPr lang="en-US" sz="2400" b="1" baseline="-25000" dirty="0">
+                <a:solidFill>
+                  <a:schemeClr val="tx1"/>
+                </a:solidFill>
+                <a:latin typeface="Arial" panose="020B0604020202020204" pitchFamily="34" charset="0"/>
+                <a:cs typeface="Arial" panose="020B0604020202020204" pitchFamily="34" charset="0"/>
+              </a:rPr>
+              <a:t>mass</a:t>
+            </a:r>
+            <a:endParaRPr lang="en-US" sz="2400" b="1" i="1" dirty="0">
+              <a:solidFill>
+                <a:schemeClr val="tx1"/>
+              </a:solidFill>
+              <a:latin typeface="Arial" panose="020B0604020202020204" pitchFamily="34" charset="0"/>
+              <a:cs typeface="Arial" panose="020B0604020202020204" pitchFamily="34" charset="0"/>
+            </a:endParaRPr>
+          </a:p>
+        </p:txBody>
+      </p:sp>
+      <p:sp>
+        <p:nvSpPr>
+          <p:cNvPr id="78" name="Rectangle 77">
+            <a:extLst>
+              <a:ext uri="{FF2B5EF4-FFF2-40B4-BE49-F238E27FC236}">
+                <a16:creationId xmlns:a16="http://schemas.microsoft.com/office/drawing/2014/main" id="{09CE9B19-A23F-08A7-B3F3-D4D2D6FC07AF}"/>
+              </a:ext>
+            </a:extLst>
+          </p:cNvPr>
+          <p:cNvSpPr/>
+          <p:nvPr/>
+        </p:nvSpPr>
+        <p:spPr>
+          <a:xfrm>
+            <a:off x="14378598" y="10492808"/>
+            <a:ext cx="1819398" cy="877223"/>
+          </a:xfrm>
+          <a:prstGeom prst="rect">
+            <a:avLst/>
+          </a:prstGeom>
+          <a:solidFill>
+            <a:schemeClr val="bg1"/>
+          </a:solidFill>
+          <a:ln w="38100">
+            <a:solidFill>
+              <a:schemeClr val="tx1"/>
+            </a:solidFill>
+          </a:ln>
+        </p:spPr>
+        <p:style>
+          <a:lnRef idx="2">
+            <a:schemeClr val="accent1">
+              <a:shade val="50000"/>
+            </a:schemeClr>
+          </a:lnRef>
+          <a:fillRef idx="1">
+            <a:schemeClr val="accent1"/>
+          </a:fillRef>
+          <a:effectRef idx="0">
+            <a:schemeClr val="accent1"/>
+          </a:effectRef>
+          <a:fontRef idx="minor">
+            <a:schemeClr val="lt1"/>
+          </a:fontRef>
+        </p:style>
+        <p:txBody>
+          <a:bodyPr rtlCol="0" anchor="ctr"/>
+          <a:lstStyle/>
+          <a:p>
+            <a:pPr algn="ctr"/>
+            <a:r>
+              <a:rPr lang="en-US" sz="2400" b="1" i="1" dirty="0">
+                <a:solidFill>
+                  <a:schemeClr val="tx1"/>
+                </a:solidFill>
+                <a:latin typeface="Arial" panose="020B0604020202020204" pitchFamily="34" charset="0"/>
+                <a:cs typeface="Arial" panose="020B0604020202020204" pitchFamily="34" charset="0"/>
+              </a:rPr>
+              <a:t>C</a:t>
+            </a:r>
+            <a:r>
+              <a:rPr lang="en-US" sz="2400" b="1" baseline="-25000" dirty="0">
+                <a:solidFill>
+                  <a:schemeClr val="tx1"/>
+                </a:solidFill>
+                <a:latin typeface="Arial" panose="020B0604020202020204" pitchFamily="34" charset="0"/>
+                <a:cs typeface="Arial" panose="020B0604020202020204" pitchFamily="34" charset="0"/>
+              </a:rPr>
+              <a:t>i</a:t>
+            </a:r>
+            <a:r>
+              <a:rPr lang="en-US" sz="2400" b="1" i="1" dirty="0">
+                <a:solidFill>
+                  <a:schemeClr val="tx1"/>
+                </a:solidFill>
+                <a:latin typeface="Arial" panose="020B0604020202020204" pitchFamily="34" charset="0"/>
+                <a:cs typeface="Arial" panose="020B0604020202020204" pitchFamily="34" charset="0"/>
+              </a:rPr>
+              <a:t>:C</a:t>
+            </a:r>
+            <a:r>
+              <a:rPr lang="en-US" sz="2400" b="1" baseline="-25000" dirty="0">
+                <a:solidFill>
+                  <a:schemeClr val="tx1"/>
+                </a:solidFill>
+                <a:latin typeface="Arial" panose="020B0604020202020204" pitchFamily="34" charset="0"/>
+                <a:cs typeface="Arial" panose="020B0604020202020204" pitchFamily="34" charset="0"/>
+              </a:rPr>
+              <a:t>a</a:t>
+            </a:r>
+          </a:p>
+        </p:txBody>
+      </p:sp>
+      <p:sp>
+        <p:nvSpPr>
+          <p:cNvPr id="79" name="Rectangle 78">
+            <a:extLst>
+              <a:ext uri="{FF2B5EF4-FFF2-40B4-BE49-F238E27FC236}">
+                <a16:creationId xmlns:a16="http://schemas.microsoft.com/office/drawing/2014/main" id="{91F39A0A-FE4E-85B4-6C6F-ECA1B4AF4593}"/>
+              </a:ext>
+            </a:extLst>
+          </p:cNvPr>
+          <p:cNvSpPr/>
+          <p:nvPr/>
+        </p:nvSpPr>
+        <p:spPr>
+          <a:xfrm>
+            <a:off x="9190788" y="11576652"/>
+            <a:ext cx="2011416" cy="877223"/>
+          </a:xfrm>
+          <a:prstGeom prst="rect">
+            <a:avLst/>
+          </a:prstGeom>
+          <a:solidFill>
+            <a:schemeClr val="bg1"/>
+          </a:solidFill>
+          <a:ln w="38100">
+            <a:solidFill>
+              <a:schemeClr val="tx1"/>
+            </a:solidFill>
+          </a:ln>
+        </p:spPr>
+        <p:style>
+          <a:lnRef idx="2">
+            <a:schemeClr val="accent1">
+              <a:shade val="50000"/>
+            </a:schemeClr>
+          </a:lnRef>
+          <a:fillRef idx="1">
+            <a:schemeClr val="accent1"/>
+          </a:fillRef>
+          <a:effectRef idx="0">
+            <a:schemeClr val="accent1"/>
+          </a:effectRef>
+          <a:fontRef idx="minor">
+            <a:schemeClr val="lt1"/>
+          </a:fontRef>
+        </p:style>
+        <p:txBody>
+          <a:bodyPr rtlCol="0" anchor="ctr"/>
+          <a:lstStyle/>
+          <a:p>
+            <a:pPr algn="ctr"/>
+            <a:r>
+              <a:rPr lang="en-US" sz="2400" b="1" i="1" dirty="0">
+                <a:solidFill>
+                  <a:schemeClr val="tx1"/>
+                </a:solidFill>
+                <a:latin typeface="Arial" panose="020B0604020202020204" pitchFamily="34" charset="0"/>
+                <a:cs typeface="Arial" panose="020B0604020202020204" pitchFamily="34" charset="0"/>
+              </a:rPr>
+              <a:t>N availability</a:t>
+            </a:r>
+            <a:endParaRPr lang="en-US" sz="2400" b="1" dirty="0">
+              <a:solidFill>
+                <a:schemeClr val="tx1"/>
+              </a:solidFill>
+              <a:latin typeface="Arial" panose="020B0604020202020204" pitchFamily="34" charset="0"/>
+              <a:cs typeface="Arial" panose="020B0604020202020204" pitchFamily="34" charset="0"/>
+            </a:endParaRPr>
+          </a:p>
+        </p:txBody>
+      </p:sp>
+      <p:sp>
+        <p:nvSpPr>
+          <p:cNvPr id="80" name="Rectangle 79">
+            <a:extLst>
+              <a:ext uri="{FF2B5EF4-FFF2-40B4-BE49-F238E27FC236}">
+                <a16:creationId xmlns:a16="http://schemas.microsoft.com/office/drawing/2014/main" id="{3F234256-4026-95FE-3912-C3701D5B2005}"/>
+              </a:ext>
+            </a:extLst>
+          </p:cNvPr>
+          <p:cNvSpPr/>
+          <p:nvPr/>
+        </p:nvSpPr>
+        <p:spPr>
+          <a:xfrm>
+            <a:off x="9286797" y="9463693"/>
+            <a:ext cx="1819398" cy="877223"/>
+          </a:xfrm>
+          <a:prstGeom prst="rect">
+            <a:avLst/>
+          </a:prstGeom>
+          <a:solidFill>
+            <a:schemeClr val="bg1"/>
+          </a:solidFill>
+          <a:ln w="38100">
+            <a:solidFill>
+              <a:schemeClr val="tx1"/>
+            </a:solidFill>
+          </a:ln>
+        </p:spPr>
+        <p:style>
+          <a:lnRef idx="2">
+            <a:schemeClr val="accent1">
+              <a:shade val="50000"/>
+            </a:schemeClr>
+          </a:lnRef>
+          <a:fillRef idx="1">
+            <a:schemeClr val="accent1"/>
+          </a:fillRef>
+          <a:effectRef idx="0">
+            <a:schemeClr val="accent1"/>
+          </a:effectRef>
+          <a:fontRef idx="minor">
+            <a:schemeClr val="lt1"/>
+          </a:fontRef>
+        </p:style>
+        <p:txBody>
+          <a:bodyPr rtlCol="0" anchor="ctr"/>
+          <a:lstStyle/>
+          <a:p>
+            <a:pPr algn="ctr"/>
+            <a:r>
+              <a:rPr lang="en-US" sz="2400" b="1" i="1" dirty="0">
+                <a:solidFill>
+                  <a:schemeClr val="tx1"/>
+                </a:solidFill>
+                <a:latin typeface="Arial" panose="020B0604020202020204" pitchFamily="34" charset="0"/>
+                <a:cs typeface="Arial" panose="020B0604020202020204" pitchFamily="34" charset="0"/>
+              </a:rPr>
+              <a:t>Soil moisture</a:t>
+            </a:r>
+            <a:endParaRPr lang="en-US" sz="2400" b="1" dirty="0">
+              <a:solidFill>
+                <a:schemeClr val="tx1"/>
+              </a:solidFill>
+              <a:latin typeface="Arial" panose="020B0604020202020204" pitchFamily="34" charset="0"/>
+              <a:cs typeface="Arial" panose="020B0604020202020204" pitchFamily="34" charset="0"/>
+            </a:endParaRPr>
+          </a:p>
+        </p:txBody>
+      </p:sp>
+      <p:sp>
+        <p:nvSpPr>
+          <p:cNvPr id="81" name="Rectangle 80">
+            <a:extLst>
+              <a:ext uri="{FF2B5EF4-FFF2-40B4-BE49-F238E27FC236}">
+                <a16:creationId xmlns:a16="http://schemas.microsoft.com/office/drawing/2014/main" id="{ABC55BFA-8E50-7DD9-E049-91EB3A70B0DA}"/>
+              </a:ext>
+            </a:extLst>
+          </p:cNvPr>
+          <p:cNvSpPr/>
+          <p:nvPr/>
+        </p:nvSpPr>
+        <p:spPr>
+          <a:xfrm>
+            <a:off x="13880364" y="8526947"/>
+            <a:ext cx="1819398" cy="877223"/>
+          </a:xfrm>
+          <a:prstGeom prst="rect">
+            <a:avLst/>
+          </a:prstGeom>
+          <a:solidFill>
+            <a:schemeClr val="bg1"/>
+          </a:solidFill>
+          <a:ln w="38100">
+            <a:solidFill>
+              <a:schemeClr val="tx1"/>
+            </a:solidFill>
+          </a:ln>
+        </p:spPr>
+        <p:style>
+          <a:lnRef idx="2">
+            <a:schemeClr val="accent1">
+              <a:shade val="50000"/>
+            </a:schemeClr>
+          </a:lnRef>
+          <a:fillRef idx="1">
+            <a:schemeClr val="accent1"/>
+          </a:fillRef>
+          <a:effectRef idx="0">
+            <a:schemeClr val="accent1"/>
+          </a:effectRef>
+          <a:fontRef idx="minor">
+            <a:schemeClr val="lt1"/>
+          </a:fontRef>
+        </p:style>
+        <p:txBody>
+          <a:bodyPr rtlCol="0" anchor="ctr"/>
+          <a:lstStyle/>
+          <a:p>
+            <a:pPr algn="ctr"/>
+            <a:r>
+              <a:rPr lang="en-US" sz="2400" b="1" i="1" dirty="0">
+                <a:solidFill>
+                  <a:schemeClr val="tx1"/>
+                </a:solidFill>
+                <a:latin typeface="Arial" panose="020B0604020202020204" pitchFamily="34" charset="0"/>
+                <a:cs typeface="Arial" panose="020B0604020202020204" pitchFamily="34" charset="0"/>
+              </a:rPr>
+              <a:t>VPD</a:t>
+            </a:r>
+            <a:endParaRPr lang="en-US" sz="2400" b="1" dirty="0">
+              <a:solidFill>
+                <a:schemeClr val="tx1"/>
+              </a:solidFill>
+              <a:latin typeface="Arial" panose="020B0604020202020204" pitchFamily="34" charset="0"/>
+              <a:cs typeface="Arial" panose="020B0604020202020204" pitchFamily="34" charset="0"/>
+            </a:endParaRPr>
+          </a:p>
+        </p:txBody>
+      </p:sp>
+      <p:sp>
+        <p:nvSpPr>
+          <p:cNvPr id="85" name="TextBox 84">
+            <a:extLst>
+              <a:ext uri="{FF2B5EF4-FFF2-40B4-BE49-F238E27FC236}">
+                <a16:creationId xmlns:a16="http://schemas.microsoft.com/office/drawing/2014/main" id="{B2ECBE36-DF98-9F62-11B0-19AFDCDF2939}"/>
+              </a:ext>
+            </a:extLst>
+          </p:cNvPr>
+          <p:cNvSpPr txBox="1"/>
+          <p:nvPr/>
+        </p:nvSpPr>
+        <p:spPr>
+          <a:xfrm>
+            <a:off x="2760133" y="10041467"/>
+            <a:ext cx="425116" cy="369332"/>
+          </a:xfrm>
+          <a:prstGeom prst="rect">
+            <a:avLst/>
+          </a:prstGeom>
+          <a:noFill/>
+        </p:spPr>
+        <p:txBody>
+          <a:bodyPr wrap="none" rtlCol="0">
+            <a:spAutoFit/>
+          </a:bodyPr>
+          <a:lstStyle/>
+          <a:p>
+            <a:r>
+              <a:rPr lang="en-US" dirty="0"/>
+              <a:t>C4</a:t>
+            </a:r>
+          </a:p>
+        </p:txBody>
+      </p:sp>
+      <p:sp>
+        <p:nvSpPr>
+          <p:cNvPr id="86" name="TextBox 85">
+            <a:extLst>
+              <a:ext uri="{FF2B5EF4-FFF2-40B4-BE49-F238E27FC236}">
+                <a16:creationId xmlns:a16="http://schemas.microsoft.com/office/drawing/2014/main" id="{099D7460-DD5F-D5B8-21F6-B72E725715C6}"/>
+              </a:ext>
+            </a:extLst>
+          </p:cNvPr>
+          <p:cNvSpPr txBox="1"/>
+          <p:nvPr/>
+        </p:nvSpPr>
+        <p:spPr>
+          <a:xfrm>
+            <a:off x="2980267" y="2573867"/>
+            <a:ext cx="425116" cy="369332"/>
+          </a:xfrm>
+          <a:prstGeom prst="rect">
+            <a:avLst/>
+          </a:prstGeom>
+          <a:noFill/>
+        </p:spPr>
+        <p:txBody>
+          <a:bodyPr wrap="none" rtlCol="0">
+            <a:spAutoFit/>
+          </a:bodyPr>
+          <a:lstStyle/>
+          <a:p>
+            <a:r>
+              <a:rPr lang="en-US" dirty="0"/>
+              <a:t>C3</a:t>
+            </a:r>
+          </a:p>
+        </p:txBody>
+      </p:sp>
+    </p:spTree>
+    <p:extLst>
+      <p:ext uri="{BB962C8B-B14F-4D97-AF65-F5344CB8AC3E}">
+        <p14:creationId xmlns:p14="http://schemas.microsoft.com/office/powerpoint/2010/main" val="282211013"/>
       </p:ext>
     </p:extLst>
   </p:cSld>

</xml_diff>

<commit_message>
correct pSEM figure and include in manuscript. still need to fix analysis results (currently includes PRGL2
</commit_message>
<xml_diff>
--- a/working_drafts/figs/TXeco_fig6_SEM.pptx
+++ b/working_drafts/figs/TXeco_fig6_SEM.pptx
@@ -14,7 +14,7 @@
     <p:sldId id="283" r:id="rId5"/>
     <p:sldId id="284" r:id="rId6"/>
     <p:sldId id="285" r:id="rId7"/>
-    <p:sldId id="286" r:id="rId8"/>
+    <p:sldId id="287" r:id="rId8"/>
   </p:sldIdLst>
   <p:sldSz cx="27432000" cy="18288000"/>
   <p:notesSz cx="6858000" cy="9144000"/>
@@ -203,7 +203,7 @@
           <a:p>
             <a:fld id="{9C8338E3-F40D-F146-8D3B-4726E84D5200}" type="datetimeFigureOut">
               <a:rPr lang="en-US" smtClean="0"/>
-              <a:t>2/20/24</a:t>
+              <a:t>2/21/24</a:t>
             </a:fld>
             <a:endParaRPr lang="en-US"/>
           </a:p>
@@ -979,6 +979,90 @@
 </p:notes>
 </file>
 
+<file path=ppt/notesSlides/notesSlide7.xml><?xml version="1.0" encoding="utf-8"?>
+<p:notes xmlns:a="http://schemas.openxmlformats.org/drawingml/2006/main" xmlns:r="http://schemas.openxmlformats.org/officeDocument/2006/relationships" xmlns:p="http://schemas.openxmlformats.org/presentationml/2006/main">
+  <p:cSld>
+    <p:spTree>
+      <p:nvGrpSpPr>
+        <p:cNvPr id="1" name=""/>
+        <p:cNvGrpSpPr/>
+        <p:nvPr/>
+      </p:nvGrpSpPr>
+      <p:grpSpPr>
+        <a:xfrm>
+          <a:off x="0" y="0"/>
+          <a:ext cx="0" cy="0"/>
+          <a:chOff x="0" y="0"/>
+          <a:chExt cx="0" cy="0"/>
+        </a:xfrm>
+      </p:grpSpPr>
+      <p:sp>
+        <p:nvSpPr>
+          <p:cNvPr id="2" name="Slide Image Placeholder 1"/>
+          <p:cNvSpPr>
+            <a:spLocks noGrp="1" noRot="1" noChangeAspect="1"/>
+          </p:cNvSpPr>
+          <p:nvPr>
+            <p:ph type="sldImg"/>
+          </p:nvPr>
+        </p:nvSpPr>
+        <p:spPr/>
+      </p:sp>
+      <p:sp>
+        <p:nvSpPr>
+          <p:cNvPr id="3" name="Notes Placeholder 2"/>
+          <p:cNvSpPr>
+            <a:spLocks noGrp="1"/>
+          </p:cNvSpPr>
+          <p:nvPr>
+            <p:ph type="body" idx="1"/>
+          </p:nvPr>
+        </p:nvSpPr>
+        <p:spPr/>
+        <p:txBody>
+          <a:bodyPr/>
+          <a:lstStyle/>
+          <a:p>
+            <a:endParaRPr lang="en-US" dirty="0"/>
+          </a:p>
+        </p:txBody>
+      </p:sp>
+      <p:sp>
+        <p:nvSpPr>
+          <p:cNvPr id="4" name="Slide Number Placeholder 3"/>
+          <p:cNvSpPr>
+            <a:spLocks noGrp="1"/>
+          </p:cNvSpPr>
+          <p:nvPr>
+            <p:ph type="sldNum" sz="quarter" idx="5"/>
+          </p:nvPr>
+        </p:nvSpPr>
+        <p:spPr/>
+        <p:txBody>
+          <a:bodyPr/>
+          <a:lstStyle/>
+          <a:p>
+            <a:fld id="{C2800238-33D2-A44F-8135-A0F534DB873D}" type="slidenum">
+              <a:rPr lang="en-US" smtClean="0"/>
+              <a:t>7</a:t>
+            </a:fld>
+            <a:endParaRPr lang="en-US"/>
+          </a:p>
+        </p:txBody>
+      </p:sp>
+    </p:spTree>
+    <p:extLst>
+      <p:ext uri="{BB962C8B-B14F-4D97-AF65-F5344CB8AC3E}">
+        <p14:creationId xmlns:p14="http://schemas.microsoft.com/office/powerpoint/2010/main" val="3957286990"/>
+      </p:ext>
+    </p:extLst>
+  </p:cSld>
+  <p:clrMapOvr>
+    <a:masterClrMapping/>
+  </p:clrMapOvr>
+</p:notes>
+</file>
+
 <file path=ppt/slideLayouts/slideLayout1.xml><?xml version="1.0" encoding="utf-8"?>
 <p:sldLayout xmlns:a="http://schemas.openxmlformats.org/drawingml/2006/main" xmlns:r="http://schemas.openxmlformats.org/officeDocument/2006/relationships" xmlns:p="http://schemas.openxmlformats.org/presentationml/2006/main" type="title" preserve="1">
   <p:cSld name="Title Slide">
@@ -1110,7 +1194,7 @@
           <a:p>
             <a:fld id="{D3A28AA4-801E-B147-9E5C-6E6DBA6E23D1}" type="datetimeFigureOut">
               <a:rPr lang="en-US" smtClean="0"/>
-              <a:t>2/20/24</a:t>
+              <a:t>2/21/24</a:t>
             </a:fld>
             <a:endParaRPr lang="en-US"/>
           </a:p>
@@ -1280,7 +1364,7 @@
           <a:p>
             <a:fld id="{D3A28AA4-801E-B147-9E5C-6E6DBA6E23D1}" type="datetimeFigureOut">
               <a:rPr lang="en-US" smtClean="0"/>
-              <a:t>2/20/24</a:t>
+              <a:t>2/21/24</a:t>
             </a:fld>
             <a:endParaRPr lang="en-US"/>
           </a:p>
@@ -1460,7 +1544,7 @@
           <a:p>
             <a:fld id="{D3A28AA4-801E-B147-9E5C-6E6DBA6E23D1}" type="datetimeFigureOut">
               <a:rPr lang="en-US" smtClean="0"/>
-              <a:t>2/20/24</a:t>
+              <a:t>2/21/24</a:t>
             </a:fld>
             <a:endParaRPr lang="en-US"/>
           </a:p>
@@ -1630,7 +1714,7 @@
           <a:p>
             <a:fld id="{D3A28AA4-801E-B147-9E5C-6E6DBA6E23D1}" type="datetimeFigureOut">
               <a:rPr lang="en-US" smtClean="0"/>
-              <a:t>2/20/24</a:t>
+              <a:t>2/21/24</a:t>
             </a:fld>
             <a:endParaRPr lang="en-US"/>
           </a:p>
@@ -1874,7 +1958,7 @@
           <a:p>
             <a:fld id="{D3A28AA4-801E-B147-9E5C-6E6DBA6E23D1}" type="datetimeFigureOut">
               <a:rPr lang="en-US" smtClean="0"/>
-              <a:t>2/20/24</a:t>
+              <a:t>2/21/24</a:t>
             </a:fld>
             <a:endParaRPr lang="en-US"/>
           </a:p>
@@ -2106,7 +2190,7 @@
           <a:p>
             <a:fld id="{D3A28AA4-801E-B147-9E5C-6E6DBA6E23D1}" type="datetimeFigureOut">
               <a:rPr lang="en-US" smtClean="0"/>
-              <a:t>2/20/24</a:t>
+              <a:t>2/21/24</a:t>
             </a:fld>
             <a:endParaRPr lang="en-US"/>
           </a:p>
@@ -2473,7 +2557,7 @@
           <a:p>
             <a:fld id="{D3A28AA4-801E-B147-9E5C-6E6DBA6E23D1}" type="datetimeFigureOut">
               <a:rPr lang="en-US" smtClean="0"/>
-              <a:t>2/20/24</a:t>
+              <a:t>2/21/24</a:t>
             </a:fld>
             <a:endParaRPr lang="en-US"/>
           </a:p>
@@ -2591,7 +2675,7 @@
           <a:p>
             <a:fld id="{D3A28AA4-801E-B147-9E5C-6E6DBA6E23D1}" type="datetimeFigureOut">
               <a:rPr lang="en-US" smtClean="0"/>
-              <a:t>2/20/24</a:t>
+              <a:t>2/21/24</a:t>
             </a:fld>
             <a:endParaRPr lang="en-US"/>
           </a:p>
@@ -2686,7 +2770,7 @@
           <a:p>
             <a:fld id="{D3A28AA4-801E-B147-9E5C-6E6DBA6E23D1}" type="datetimeFigureOut">
               <a:rPr lang="en-US" smtClean="0"/>
-              <a:t>2/20/24</a:t>
+              <a:t>2/21/24</a:t>
             </a:fld>
             <a:endParaRPr lang="en-US"/>
           </a:p>
@@ -2963,7 +3047,7 @@
           <a:p>
             <a:fld id="{D3A28AA4-801E-B147-9E5C-6E6DBA6E23D1}" type="datetimeFigureOut">
               <a:rPr lang="en-US" smtClean="0"/>
-              <a:t>2/20/24</a:t>
+              <a:t>2/21/24</a:t>
             </a:fld>
             <a:endParaRPr lang="en-US"/>
           </a:p>
@@ -3220,7 +3304,7 @@
           <a:p>
             <a:fld id="{D3A28AA4-801E-B147-9E5C-6E6DBA6E23D1}" type="datetimeFigureOut">
               <a:rPr lang="en-US" smtClean="0"/>
-              <a:t>2/20/24</a:t>
+              <a:t>2/21/24</a:t>
             </a:fld>
             <a:endParaRPr lang="en-US"/>
           </a:p>
@@ -3433,7 +3517,7 @@
           <a:p>
             <a:fld id="{D3A28AA4-801E-B147-9E5C-6E6DBA6E23D1}" type="datetimeFigureOut">
               <a:rPr lang="en-US" smtClean="0"/>
-              <a:t>2/20/24</a:t>
+              <a:t>2/21/24</a:t>
             </a:fld>
             <a:endParaRPr lang="en-US"/>
           </a:p>
@@ -23760,34 +23844,94 @@
           <a:chExt cx="0" cy="0"/>
         </a:xfrm>
       </p:grpSpPr>
+      <p:sp>
+        <p:nvSpPr>
+          <p:cNvPr id="109" name="Rectangle 108">
+            <a:extLst>
+              <a:ext uri="{FF2B5EF4-FFF2-40B4-BE49-F238E27FC236}">
+                <a16:creationId xmlns:a16="http://schemas.microsoft.com/office/drawing/2014/main" id="{329F035C-4D18-5580-A433-91BE2A587572}"/>
+              </a:ext>
+            </a:extLst>
+          </p:cNvPr>
+          <p:cNvSpPr/>
+          <p:nvPr/>
+        </p:nvSpPr>
+        <p:spPr>
+          <a:xfrm>
+            <a:off x="6986016" y="1298448"/>
+            <a:ext cx="14356080" cy="6638544"/>
+          </a:xfrm>
+          <a:prstGeom prst="rect">
+            <a:avLst/>
+          </a:prstGeom>
+          <a:solidFill>
+            <a:schemeClr val="bg1">
+              <a:lumMod val="95000"/>
+            </a:schemeClr>
+          </a:solidFill>
+          <a:ln w="57150">
+            <a:solidFill>
+              <a:schemeClr val="bg1">
+                <a:lumMod val="50000"/>
+              </a:schemeClr>
+            </a:solidFill>
+          </a:ln>
+        </p:spPr>
+        <p:style>
+          <a:lnRef idx="2">
+            <a:schemeClr val="accent1">
+              <a:shade val="15000"/>
+            </a:schemeClr>
+          </a:lnRef>
+          <a:fillRef idx="1">
+            <a:schemeClr val="accent1"/>
+          </a:fillRef>
+          <a:effectRef idx="0">
+            <a:schemeClr val="accent1"/>
+          </a:effectRef>
+          <a:fontRef idx="minor">
+            <a:schemeClr val="lt1"/>
+          </a:fontRef>
+        </p:style>
+        <p:txBody>
+          <a:bodyPr rtlCol="0" anchor="ctr"/>
+          <a:lstStyle/>
+          <a:p>
+            <a:pPr algn="ctr"/>
+            <a:endParaRPr lang="en-US"/>
+          </a:p>
+        </p:txBody>
+      </p:sp>
       <p:cxnSp>
         <p:nvCxnSpPr>
-          <p:cNvPr id="4" name="Straight Arrow Connector 3">
-            <a:extLst>
-              <a:ext uri="{FF2B5EF4-FFF2-40B4-BE49-F238E27FC236}">
-                <a16:creationId xmlns:a16="http://schemas.microsoft.com/office/drawing/2014/main" id="{471004E9-F254-2103-9390-C3C07480068F}"/>
-              </a:ext>
-            </a:extLst>
-          </p:cNvPr>
-          <p:cNvCxnSpPr/>
+          <p:cNvPr id="4" name="Elbow Connector 3">
+            <a:extLst>
+              <a:ext uri="{FF2B5EF4-FFF2-40B4-BE49-F238E27FC236}">
+                <a16:creationId xmlns:a16="http://schemas.microsoft.com/office/drawing/2014/main" id="{6ADF0306-F108-2AAE-AD46-6D70C882A78F}"/>
+              </a:ext>
+            </a:extLst>
+          </p:cNvPr>
+          <p:cNvCxnSpPr>
+            <a:cxnSpLocks/>
+            <a:stCxn id="23" idx="2"/>
+          </p:cNvCxnSpPr>
           <p:nvPr/>
         </p:nvCxnSpPr>
         <p:spPr>
-          <a:xfrm>
-            <a:off x="11253585" y="5249121"/>
-            <a:ext cx="5556606" cy="0"/>
-          </a:xfrm>
-          <a:prstGeom prst="straightConnector1">
-            <a:avLst/>
-          </a:prstGeom>
-          <a:ln w="53848">
-            <a:solidFill>
-              <a:srgbClr val="C00000">
-                <a:alpha val="50000"/>
-              </a:srgbClr>
-            </a:solidFill>
-            <a:headEnd type="oval" w="med" len="med"/>
-            <a:tailEnd type="triangle" w="med" len="med"/>
+          <a:xfrm rot="16200000" flipH="1">
+            <a:off x="10556974" y="4024864"/>
+            <a:ext cx="360856" cy="1459354"/>
+          </a:xfrm>
+          <a:prstGeom prst="bentConnector2">
+            <a:avLst/>
+          </a:prstGeom>
+          <a:ln w="23749">
+            <a:solidFill>
+              <a:schemeClr val="accent1">
+                <a:lumMod val="75000"/>
+              </a:schemeClr>
+            </a:solidFill>
+            <a:tailEnd type="triangle"/>
           </a:ln>
         </p:spPr>
         <p:style>
@@ -23810,7 +23954,7 @@
           <p:cNvPr id="5" name="Elbow Connector 4">
             <a:extLst>
               <a:ext uri="{FF2B5EF4-FFF2-40B4-BE49-F238E27FC236}">
-                <a16:creationId xmlns:a16="http://schemas.microsoft.com/office/drawing/2014/main" id="{6485AEDD-BDD7-0A7D-42FE-D804788BB428}"/>
+                <a16:creationId xmlns:a16="http://schemas.microsoft.com/office/drawing/2014/main" id="{0FAB126E-B012-272D-07D0-F42A896DBEA0}"/>
               </a:ext>
             </a:extLst>
           </p:cNvPr>
@@ -23821,22 +23965,20 @@
         </p:nvCxnSpPr>
         <p:spPr>
           <a:xfrm flipV="1">
-            <a:off x="12970482" y="3257839"/>
-            <a:ext cx="3864664" cy="264294"/>
+            <a:off x="10007724" y="5357009"/>
+            <a:ext cx="1459355" cy="430652"/>
           </a:xfrm>
           <a:prstGeom prst="bentConnector3">
             <a:avLst>
-              <a:gd name="adj1" fmla="val 50"/>
+              <a:gd name="adj1" fmla="val -11"/>
             </a:avLst>
           </a:prstGeom>
-          <a:ln w="36195">
-            <a:solidFill>
-              <a:srgbClr val="C00000">
-                <a:alpha val="50000"/>
-              </a:srgbClr>
-            </a:solidFill>
-            <a:headEnd type="oval" w="med" len="med"/>
-            <a:tailEnd type="triangle" w="med" len="med"/>
+          <a:ln w="23241">
+            <a:solidFill>
+              <a:srgbClr val="C00000"/>
+            </a:solidFill>
+            <a:headEnd type="oval"/>
+            <a:tailEnd type="triangle"/>
           </a:ln>
         </p:spPr>
         <p:style>
@@ -23856,10 +23998,10 @@
       </p:cxnSp>
       <p:cxnSp>
         <p:nvCxnSpPr>
-          <p:cNvPr id="6" name="Elbow Connector 5">
-            <a:extLst>
-              <a:ext uri="{FF2B5EF4-FFF2-40B4-BE49-F238E27FC236}">
-                <a16:creationId xmlns:a16="http://schemas.microsoft.com/office/drawing/2014/main" id="{1FF98F5B-3722-85BA-CFA6-84F89DF95AF7}"/>
+          <p:cNvPr id="6" name="Straight Arrow Connector 5">
+            <a:extLst>
+              <a:ext uri="{FF2B5EF4-FFF2-40B4-BE49-F238E27FC236}">
+                <a16:creationId xmlns:a16="http://schemas.microsoft.com/office/drawing/2014/main" id="{C9FDF41D-BCF1-213D-5397-9DD4D2C197AB}"/>
               </a:ext>
             </a:extLst>
           </p:cNvPr>
@@ -23869,66 +24011,19 @@
           <p:nvPr/>
         </p:nvCxnSpPr>
         <p:spPr>
-          <a:xfrm rot="5400000" flipH="1" flipV="1">
-            <a:off x="10741609" y="3636705"/>
-            <a:ext cx="452840" cy="1459354"/>
-          </a:xfrm>
-          <a:prstGeom prst="bentConnector2">
-            <a:avLst/>
-          </a:prstGeom>
-          <a:ln w="18161">
-            <a:solidFill>
-              <a:srgbClr val="C00000"/>
-            </a:solidFill>
-            <a:headEnd type="oval" w="med" len="med"/>
-            <a:tailEnd type="triangle" w="med" len="med"/>
-          </a:ln>
-        </p:spPr>
-        <p:style>
-          <a:lnRef idx="1">
-            <a:schemeClr val="accent1"/>
-          </a:lnRef>
-          <a:fillRef idx="0">
-            <a:schemeClr val="accent1"/>
-          </a:fillRef>
-          <a:effectRef idx="0">
-            <a:schemeClr val="accent1"/>
-          </a:effectRef>
-          <a:fontRef idx="minor">
-            <a:schemeClr val="tx1"/>
-          </a:fontRef>
-        </p:style>
-      </p:cxnSp>
-      <p:cxnSp>
-        <p:nvCxnSpPr>
-          <p:cNvPr id="7" name="Straight Arrow Connector 6">
-            <a:extLst>
-              <a:ext uri="{FF2B5EF4-FFF2-40B4-BE49-F238E27FC236}">
-                <a16:creationId xmlns:a16="http://schemas.microsoft.com/office/drawing/2014/main" id="{7B8C9CC3-563E-D3F5-5921-57DADDA51E07}"/>
-              </a:ext>
-            </a:extLst>
-          </p:cNvPr>
-          <p:cNvCxnSpPr>
-            <a:stCxn id="42" idx="2"/>
-            <a:endCxn id="41" idx="0"/>
-          </p:cNvCxnSpPr>
-          <p:nvPr/>
-        </p:nvCxnSpPr>
-        <p:spPr>
           <a:xfrm>
-            <a:off x="12607406" y="2439370"/>
-            <a:ext cx="0" cy="1099316"/>
+            <a:off x="13286478" y="5164616"/>
+            <a:ext cx="892510" cy="0"/>
           </a:xfrm>
           <a:prstGeom prst="straightConnector1">
             <a:avLst/>
           </a:prstGeom>
-          <a:ln w="24130">
-            <a:solidFill>
-              <a:schemeClr val="bg1">
-                <a:lumMod val="50000"/>
+          <a:ln w="153416">
+            <a:solidFill>
+              <a:schemeClr val="accent1">
+                <a:lumMod val="75000"/>
               </a:schemeClr>
             </a:solidFill>
-            <a:prstDash val="sysDash"/>
             <a:tailEnd type="triangle"/>
           </a:ln>
         </p:spPr>
@@ -23952,7 +24047,7 @@
           <p:cNvPr id="8" name="Elbow Connector 7">
             <a:extLst>
               <a:ext uri="{FF2B5EF4-FFF2-40B4-BE49-F238E27FC236}">
-                <a16:creationId xmlns:a16="http://schemas.microsoft.com/office/drawing/2014/main" id="{E1F9DD60-41FB-0227-B79C-E301B845EDFF}"/>
+                <a16:creationId xmlns:a16="http://schemas.microsoft.com/office/drawing/2014/main" id="{C696923E-50EB-BA53-D891-C250948F0304}"/>
               </a:ext>
             </a:extLst>
           </p:cNvPr>
@@ -23962,23 +24057,18 @@
           <p:nvPr/>
         </p:nvCxnSpPr>
         <p:spPr>
-          <a:xfrm flipV="1">
-            <a:off x="10191426" y="2499876"/>
-            <a:ext cx="7049147" cy="2539909"/>
-          </a:xfrm>
-          <a:prstGeom prst="bentConnector4">
-            <a:avLst>
-              <a:gd name="adj1" fmla="val -15739"/>
-              <a:gd name="adj2" fmla="val 146522"/>
-            </a:avLst>
-          </a:prstGeom>
-          <a:ln w="35052">
-            <a:solidFill>
-              <a:schemeClr val="accent1">
-                <a:lumMod val="75000"/>
-                <a:alpha val="50000"/>
-              </a:schemeClr>
-            </a:solidFill>
+          <a:xfrm rot="5400000" flipH="1" flipV="1">
+            <a:off x="15557261" y="3661974"/>
+            <a:ext cx="589520" cy="1504991"/>
+          </a:xfrm>
+          <a:prstGeom prst="bentConnector2">
+            <a:avLst/>
+          </a:prstGeom>
+          <a:ln w="25273">
+            <a:solidFill>
+              <a:srgbClr val="C00000"/>
+            </a:solidFill>
+            <a:headEnd type="oval"/>
             <a:tailEnd type="triangle"/>
           </a:ln>
         </p:spPr>
@@ -23999,35 +24089,34 @@
       </p:cxnSp>
       <p:cxnSp>
         <p:nvCxnSpPr>
-          <p:cNvPr id="9" name="Straight Arrow Connector 8">
-            <a:extLst>
-              <a:ext uri="{FF2B5EF4-FFF2-40B4-BE49-F238E27FC236}">
-                <a16:creationId xmlns:a16="http://schemas.microsoft.com/office/drawing/2014/main" id="{89A4B439-3312-A6C1-6152-930E8CC223EF}"/>
+          <p:cNvPr id="9" name="Elbow Connector 8">
+            <a:extLst>
+              <a:ext uri="{FF2B5EF4-FFF2-40B4-BE49-F238E27FC236}">
+                <a16:creationId xmlns:a16="http://schemas.microsoft.com/office/drawing/2014/main" id="{FD849C8A-3D38-3899-BD16-F597B831ABF1}"/>
               </a:ext>
             </a:extLst>
           </p:cNvPr>
           <p:cNvCxnSpPr>
-            <a:stCxn id="44" idx="0"/>
-            <a:endCxn id="45" idx="2"/>
+            <a:cxnSpLocks/>
+            <a:stCxn id="21" idx="2"/>
+            <a:endCxn id="18" idx="1"/>
           </p:cNvCxnSpPr>
           <p:nvPr/>
         </p:nvCxnSpPr>
         <p:spPr>
-          <a:xfrm flipV="1">
-            <a:off x="17744843" y="3377099"/>
-            <a:ext cx="0" cy="1224075"/>
-          </a:xfrm>
-          <a:prstGeom prst="straightConnector1">
-            <a:avLst/>
-          </a:prstGeom>
-          <a:ln w="78994">
-            <a:solidFill>
-              <a:srgbClr val="C00000">
-                <a:alpha val="50000"/>
-              </a:srgbClr>
-            </a:solidFill>
-            <a:headEnd type="oval" w="med" len="med"/>
-            <a:tailEnd type="triangle" w="med" len="med"/>
+          <a:xfrm rot="16200000" flipH="1">
+            <a:off x="15534744" y="5168009"/>
+            <a:ext cx="634555" cy="1504991"/>
+          </a:xfrm>
+          <a:prstGeom prst="bentConnector2">
+            <a:avLst/>
+          </a:prstGeom>
+          <a:ln w="44450">
+            <a:solidFill>
+              <a:srgbClr val="C00000"/>
+            </a:solidFill>
+            <a:headEnd type="oval"/>
+            <a:tailEnd type="triangle"/>
           </a:ln>
         </p:spPr>
         <p:style>
@@ -24050,7 +24139,500 @@
           <p:cNvPr id="10" name="Elbow Connector 9">
             <a:extLst>
               <a:ext uri="{FF2B5EF4-FFF2-40B4-BE49-F238E27FC236}">
-                <a16:creationId xmlns:a16="http://schemas.microsoft.com/office/drawing/2014/main" id="{65E85A8E-36A8-6F5B-68B6-490BC144C642}"/>
+                <a16:creationId xmlns:a16="http://schemas.microsoft.com/office/drawing/2014/main" id="{073E3213-F187-8E8D-5545-71CA2A9BD654}"/>
+              </a:ext>
+            </a:extLst>
+          </p:cNvPr>
+          <p:cNvCxnSpPr>
+            <a:cxnSpLocks/>
+            <a:stCxn id="19" idx="0"/>
+            <a:endCxn id="17" idx="0"/>
+          </p:cNvCxnSpPr>
+          <p:nvPr/>
+        </p:nvCxnSpPr>
+        <p:spPr>
+          <a:xfrm rot="16200000" flipH="1">
+            <a:off x="18122024" y="3090064"/>
+            <a:ext cx="1061295" cy="2276912"/>
+          </a:xfrm>
+          <a:prstGeom prst="bentConnector3">
+            <a:avLst>
+              <a:gd name="adj1" fmla="val -21540"/>
+            </a:avLst>
+          </a:prstGeom>
+          <a:ln w="197866">
+            <a:solidFill>
+              <a:schemeClr val="accent1">
+                <a:lumMod val="75000"/>
+              </a:schemeClr>
+            </a:solidFill>
+            <a:tailEnd type="triangle"/>
+          </a:ln>
+        </p:spPr>
+        <p:style>
+          <a:lnRef idx="1">
+            <a:schemeClr val="accent1"/>
+          </a:lnRef>
+          <a:fillRef idx="0">
+            <a:schemeClr val="accent1"/>
+          </a:fillRef>
+          <a:effectRef idx="0">
+            <a:schemeClr val="accent1"/>
+          </a:effectRef>
+          <a:fontRef idx="minor">
+            <a:schemeClr val="tx1"/>
+          </a:fontRef>
+        </p:style>
+      </p:cxnSp>
+      <p:cxnSp>
+        <p:nvCxnSpPr>
+          <p:cNvPr id="11" name="Elbow Connector 10">
+            <a:extLst>
+              <a:ext uri="{FF2B5EF4-FFF2-40B4-BE49-F238E27FC236}">
+                <a16:creationId xmlns:a16="http://schemas.microsoft.com/office/drawing/2014/main" id="{B822710A-1E72-1FC2-A223-51CD781B9BAA}"/>
+              </a:ext>
+            </a:extLst>
+          </p:cNvPr>
+          <p:cNvCxnSpPr>
+            <a:cxnSpLocks/>
+            <a:stCxn id="18" idx="2"/>
+            <a:endCxn id="17" idx="2"/>
+          </p:cNvCxnSpPr>
+          <p:nvPr/>
+        </p:nvCxnSpPr>
+        <p:spPr>
+          <a:xfrm rot="5400000" flipH="1" flipV="1">
+            <a:off x="18132670" y="5017937"/>
+            <a:ext cx="1040003" cy="2276912"/>
+          </a:xfrm>
+          <a:prstGeom prst="bentConnector3">
+            <a:avLst>
+              <a:gd name="adj1" fmla="val -21981"/>
+            </a:avLst>
+          </a:prstGeom>
+          <a:ln w="200152">
+            <a:solidFill>
+              <a:schemeClr val="accent1">
+                <a:lumMod val="75000"/>
+              </a:schemeClr>
+            </a:solidFill>
+            <a:tailEnd type="triangle"/>
+          </a:ln>
+        </p:spPr>
+        <p:style>
+          <a:lnRef idx="1">
+            <a:schemeClr val="accent1"/>
+          </a:lnRef>
+          <a:fillRef idx="0">
+            <a:schemeClr val="accent1"/>
+          </a:fillRef>
+          <a:effectRef idx="0">
+            <a:schemeClr val="accent1"/>
+          </a:effectRef>
+          <a:fontRef idx="minor">
+            <a:schemeClr val="tx1"/>
+          </a:fontRef>
+        </p:style>
+      </p:cxnSp>
+      <p:sp>
+        <p:nvSpPr>
+          <p:cNvPr id="15" name="Rectangle 14">
+            <a:extLst>
+              <a:ext uri="{FF2B5EF4-FFF2-40B4-BE49-F238E27FC236}">
+                <a16:creationId xmlns:a16="http://schemas.microsoft.com/office/drawing/2014/main" id="{0D5D5B44-B633-6071-2B98-38E36FCBF868}"/>
+              </a:ext>
+            </a:extLst>
+          </p:cNvPr>
+          <p:cNvSpPr/>
+          <p:nvPr/>
+        </p:nvSpPr>
+        <p:spPr>
+          <a:xfrm>
+            <a:off x="11467080" y="4736683"/>
+            <a:ext cx="1819398" cy="877223"/>
+          </a:xfrm>
+          <a:prstGeom prst="rect">
+            <a:avLst/>
+          </a:prstGeom>
+          <a:solidFill>
+            <a:schemeClr val="bg1"/>
+          </a:solidFill>
+          <a:ln w="38100">
+            <a:solidFill>
+              <a:schemeClr val="tx1"/>
+            </a:solidFill>
+          </a:ln>
+        </p:spPr>
+        <p:style>
+          <a:lnRef idx="2">
+            <a:schemeClr val="accent1">
+              <a:shade val="50000"/>
+            </a:schemeClr>
+          </a:lnRef>
+          <a:fillRef idx="1">
+            <a:schemeClr val="accent1"/>
+          </a:fillRef>
+          <a:effectRef idx="0">
+            <a:schemeClr val="accent1"/>
+          </a:effectRef>
+          <a:fontRef idx="minor">
+            <a:schemeClr val="lt1"/>
+          </a:fontRef>
+        </p:style>
+        <p:txBody>
+          <a:bodyPr rtlCol="0" anchor="ctr"/>
+          <a:lstStyle/>
+          <a:p>
+            <a:pPr algn="ctr"/>
+            <a:r>
+              <a:rPr lang="el-GR" sz="2400" b="1" i="1" dirty="0">
+                <a:solidFill>
+                  <a:schemeClr val="tx1"/>
+                </a:solidFill>
+                <a:latin typeface="Arial" panose="020B0604020202020204" pitchFamily="34" charset="0"/>
+                <a:cs typeface="Arial" panose="020B0604020202020204" pitchFamily="34" charset="0"/>
+              </a:rPr>
+              <a:t>β</a:t>
+            </a:r>
+            <a:endParaRPr lang="en-US" sz="2400" b="1" i="1" dirty="0">
+              <a:solidFill>
+                <a:schemeClr val="tx1"/>
+              </a:solidFill>
+              <a:latin typeface="Arial" panose="020B0604020202020204" pitchFamily="34" charset="0"/>
+              <a:cs typeface="Arial" panose="020B0604020202020204" pitchFamily="34" charset="0"/>
+            </a:endParaRPr>
+          </a:p>
+        </p:txBody>
+      </p:sp>
+      <p:sp>
+        <p:nvSpPr>
+          <p:cNvPr id="17" name="Rectangle 16">
+            <a:extLst>
+              <a:ext uri="{FF2B5EF4-FFF2-40B4-BE49-F238E27FC236}">
+                <a16:creationId xmlns:a16="http://schemas.microsoft.com/office/drawing/2014/main" id="{9E3070DD-32AC-E55E-527E-1AB717A872FF}"/>
+              </a:ext>
+            </a:extLst>
+          </p:cNvPr>
+          <p:cNvSpPr/>
+          <p:nvPr/>
+        </p:nvSpPr>
+        <p:spPr>
+          <a:xfrm>
+            <a:off x="18881429" y="4759168"/>
+            <a:ext cx="1819398" cy="877223"/>
+          </a:xfrm>
+          <a:prstGeom prst="rect">
+            <a:avLst/>
+          </a:prstGeom>
+          <a:solidFill>
+            <a:schemeClr val="bg1"/>
+          </a:solidFill>
+          <a:ln w="38100">
+            <a:solidFill>
+              <a:schemeClr val="tx1"/>
+            </a:solidFill>
+          </a:ln>
+        </p:spPr>
+        <p:style>
+          <a:lnRef idx="2">
+            <a:schemeClr val="accent1">
+              <a:shade val="50000"/>
+            </a:schemeClr>
+          </a:lnRef>
+          <a:fillRef idx="1">
+            <a:schemeClr val="accent1"/>
+          </a:fillRef>
+          <a:effectRef idx="0">
+            <a:schemeClr val="accent1"/>
+          </a:effectRef>
+          <a:fontRef idx="minor">
+            <a:schemeClr val="lt1"/>
+          </a:fontRef>
+        </p:style>
+        <p:txBody>
+          <a:bodyPr rtlCol="0" anchor="ctr"/>
+          <a:lstStyle/>
+          <a:p>
+            <a:pPr algn="ctr"/>
+            <a:r>
+              <a:rPr lang="el-GR" sz="2400" b="1" i="1" dirty="0">
+                <a:solidFill>
+                  <a:schemeClr val="tx1"/>
+                </a:solidFill>
+                <a:latin typeface="Arial" panose="020B0604020202020204" pitchFamily="34" charset="0"/>
+                <a:cs typeface="Arial" panose="020B0604020202020204" pitchFamily="34" charset="0"/>
+              </a:rPr>
+              <a:t>Ν</a:t>
+            </a:r>
+            <a:r>
+              <a:rPr lang="en-US" sz="2400" b="1" baseline="-25000" dirty="0">
+                <a:solidFill>
+                  <a:schemeClr val="tx1"/>
+                </a:solidFill>
+                <a:latin typeface="Arial" panose="020B0604020202020204" pitchFamily="34" charset="0"/>
+                <a:cs typeface="Arial" panose="020B0604020202020204" pitchFamily="34" charset="0"/>
+              </a:rPr>
+              <a:t>area</a:t>
+            </a:r>
+            <a:endParaRPr lang="en-US" sz="2400" b="1" i="1" dirty="0">
+              <a:solidFill>
+                <a:schemeClr val="tx1"/>
+              </a:solidFill>
+              <a:latin typeface="Arial" panose="020B0604020202020204" pitchFamily="34" charset="0"/>
+              <a:cs typeface="Arial" panose="020B0604020202020204" pitchFamily="34" charset="0"/>
+            </a:endParaRPr>
+          </a:p>
+        </p:txBody>
+      </p:sp>
+      <p:sp>
+        <p:nvSpPr>
+          <p:cNvPr id="19" name="Rectangle 18">
+            <a:extLst>
+              <a:ext uri="{FF2B5EF4-FFF2-40B4-BE49-F238E27FC236}">
+                <a16:creationId xmlns:a16="http://schemas.microsoft.com/office/drawing/2014/main" id="{BFD7E968-8F81-887D-0BC6-8F6001755390}"/>
+              </a:ext>
+            </a:extLst>
+          </p:cNvPr>
+          <p:cNvSpPr/>
+          <p:nvPr/>
+        </p:nvSpPr>
+        <p:spPr>
+          <a:xfrm>
+            <a:off x="16604517" y="3697873"/>
+            <a:ext cx="1819398" cy="877223"/>
+          </a:xfrm>
+          <a:prstGeom prst="rect">
+            <a:avLst/>
+          </a:prstGeom>
+          <a:solidFill>
+            <a:schemeClr val="bg1"/>
+          </a:solidFill>
+          <a:ln w="38100">
+            <a:solidFill>
+              <a:schemeClr val="tx1"/>
+            </a:solidFill>
+          </a:ln>
+        </p:spPr>
+        <p:style>
+          <a:lnRef idx="2">
+            <a:schemeClr val="accent1">
+              <a:shade val="50000"/>
+            </a:schemeClr>
+          </a:lnRef>
+          <a:fillRef idx="1">
+            <a:schemeClr val="accent1"/>
+          </a:fillRef>
+          <a:effectRef idx="0">
+            <a:schemeClr val="accent1"/>
+          </a:effectRef>
+          <a:fontRef idx="minor">
+            <a:schemeClr val="lt1"/>
+          </a:fontRef>
+        </p:style>
+        <p:txBody>
+          <a:bodyPr rtlCol="0" anchor="ctr"/>
+          <a:lstStyle/>
+          <a:p>
+            <a:pPr algn="ctr"/>
+            <a:r>
+              <a:rPr lang="en-US" sz="2400" b="1" i="1" dirty="0">
+                <a:solidFill>
+                  <a:schemeClr val="tx1"/>
+                </a:solidFill>
+                <a:latin typeface="Arial" panose="020B0604020202020204" pitchFamily="34" charset="0"/>
+                <a:cs typeface="Arial" panose="020B0604020202020204" pitchFamily="34" charset="0"/>
+              </a:rPr>
+              <a:t>N</a:t>
+            </a:r>
+            <a:r>
+              <a:rPr lang="en-US" sz="2400" b="1" baseline="-25000" dirty="0">
+                <a:solidFill>
+                  <a:schemeClr val="tx1"/>
+                </a:solidFill>
+                <a:latin typeface="Arial" panose="020B0604020202020204" pitchFamily="34" charset="0"/>
+                <a:cs typeface="Arial" panose="020B0604020202020204" pitchFamily="34" charset="0"/>
+              </a:rPr>
+              <a:t>mass</a:t>
+            </a:r>
+            <a:endParaRPr lang="en-US" sz="2400" b="1" i="1" dirty="0">
+              <a:solidFill>
+                <a:schemeClr val="tx1"/>
+              </a:solidFill>
+              <a:latin typeface="Arial" panose="020B0604020202020204" pitchFamily="34" charset="0"/>
+              <a:cs typeface="Arial" panose="020B0604020202020204" pitchFamily="34" charset="0"/>
+            </a:endParaRPr>
+          </a:p>
+        </p:txBody>
+      </p:sp>
+      <p:sp>
+        <p:nvSpPr>
+          <p:cNvPr id="21" name="Rectangle 20">
+            <a:extLst>
+              <a:ext uri="{FF2B5EF4-FFF2-40B4-BE49-F238E27FC236}">
+                <a16:creationId xmlns:a16="http://schemas.microsoft.com/office/drawing/2014/main" id="{162D8A45-A317-DFD4-7949-E7194DB40F11}"/>
+              </a:ext>
+            </a:extLst>
+          </p:cNvPr>
+          <p:cNvSpPr/>
+          <p:nvPr/>
+        </p:nvSpPr>
+        <p:spPr>
+          <a:xfrm>
+            <a:off x="14189827" y="4726005"/>
+            <a:ext cx="1819398" cy="877223"/>
+          </a:xfrm>
+          <a:prstGeom prst="rect">
+            <a:avLst/>
+          </a:prstGeom>
+          <a:solidFill>
+            <a:schemeClr val="bg1"/>
+          </a:solidFill>
+          <a:ln w="38100">
+            <a:solidFill>
+              <a:schemeClr val="tx1"/>
+            </a:solidFill>
+          </a:ln>
+        </p:spPr>
+        <p:style>
+          <a:lnRef idx="2">
+            <a:schemeClr val="accent1">
+              <a:shade val="50000"/>
+            </a:schemeClr>
+          </a:lnRef>
+          <a:fillRef idx="1">
+            <a:schemeClr val="accent1"/>
+          </a:fillRef>
+          <a:effectRef idx="0">
+            <a:schemeClr val="accent1"/>
+          </a:effectRef>
+          <a:fontRef idx="minor">
+            <a:schemeClr val="lt1"/>
+          </a:fontRef>
+        </p:style>
+        <p:txBody>
+          <a:bodyPr rtlCol="0" anchor="ctr"/>
+          <a:lstStyle/>
+          <a:p>
+            <a:pPr algn="ctr"/>
+            <a:r>
+              <a:rPr lang="en-US" sz="2400" b="1" i="1" dirty="0">
+                <a:solidFill>
+                  <a:schemeClr val="tx1"/>
+                </a:solidFill>
+                <a:latin typeface="Arial" panose="020B0604020202020204" pitchFamily="34" charset="0"/>
+                <a:cs typeface="Arial" panose="020B0604020202020204" pitchFamily="34" charset="0"/>
+              </a:rPr>
+              <a:t>C</a:t>
+            </a:r>
+            <a:r>
+              <a:rPr lang="en-US" sz="2400" b="1" baseline="-25000" dirty="0">
+                <a:solidFill>
+                  <a:schemeClr val="tx1"/>
+                </a:solidFill>
+                <a:latin typeface="Arial" panose="020B0604020202020204" pitchFamily="34" charset="0"/>
+                <a:cs typeface="Arial" panose="020B0604020202020204" pitchFamily="34" charset="0"/>
+              </a:rPr>
+              <a:t>i</a:t>
+            </a:r>
+            <a:r>
+              <a:rPr lang="en-US" sz="2400" b="1" i="1" dirty="0">
+                <a:solidFill>
+                  <a:schemeClr val="tx1"/>
+                </a:solidFill>
+                <a:latin typeface="Arial" panose="020B0604020202020204" pitchFamily="34" charset="0"/>
+                <a:cs typeface="Arial" panose="020B0604020202020204" pitchFamily="34" charset="0"/>
+              </a:rPr>
+              <a:t>:C</a:t>
+            </a:r>
+            <a:r>
+              <a:rPr lang="en-US" sz="2400" b="1" baseline="-25000" dirty="0">
+                <a:solidFill>
+                  <a:schemeClr val="tx1"/>
+                </a:solidFill>
+                <a:latin typeface="Arial" panose="020B0604020202020204" pitchFamily="34" charset="0"/>
+                <a:cs typeface="Arial" panose="020B0604020202020204" pitchFamily="34" charset="0"/>
+              </a:rPr>
+              <a:t>a</a:t>
+            </a:r>
+          </a:p>
+        </p:txBody>
+      </p:sp>
+      <p:sp>
+        <p:nvSpPr>
+          <p:cNvPr id="23" name="Rectangle 22">
+            <a:extLst>
+              <a:ext uri="{FF2B5EF4-FFF2-40B4-BE49-F238E27FC236}">
+                <a16:creationId xmlns:a16="http://schemas.microsoft.com/office/drawing/2014/main" id="{3AAD1016-970D-A63E-5FF8-0CE765630A13}"/>
+              </a:ext>
+            </a:extLst>
+          </p:cNvPr>
+          <p:cNvSpPr/>
+          <p:nvPr/>
+        </p:nvSpPr>
+        <p:spPr>
+          <a:xfrm>
+            <a:off x="9098026" y="3696890"/>
+            <a:ext cx="1819398" cy="877223"/>
+          </a:xfrm>
+          <a:prstGeom prst="rect">
+            <a:avLst/>
+          </a:prstGeom>
+          <a:solidFill>
+            <a:schemeClr val="bg1"/>
+          </a:solidFill>
+          <a:ln w="38100">
+            <a:solidFill>
+              <a:schemeClr val="tx1"/>
+            </a:solidFill>
+          </a:ln>
+        </p:spPr>
+        <p:style>
+          <a:lnRef idx="2">
+            <a:schemeClr val="accent1">
+              <a:shade val="50000"/>
+            </a:schemeClr>
+          </a:lnRef>
+          <a:fillRef idx="1">
+            <a:schemeClr val="accent1"/>
+          </a:fillRef>
+          <a:effectRef idx="0">
+            <a:schemeClr val="accent1"/>
+          </a:effectRef>
+          <a:fontRef idx="minor">
+            <a:schemeClr val="lt1"/>
+          </a:fontRef>
+        </p:style>
+        <p:txBody>
+          <a:bodyPr rtlCol="0" anchor="ctr"/>
+          <a:lstStyle/>
+          <a:p>
+            <a:pPr algn="ctr"/>
+            <a:r>
+              <a:rPr lang="en-US" sz="2400" b="1" i="1" dirty="0">
+                <a:solidFill>
+                  <a:schemeClr val="tx1"/>
+                </a:solidFill>
+                <a:latin typeface="Arial" panose="020B0604020202020204" pitchFamily="34" charset="0"/>
+                <a:cs typeface="Arial" panose="020B0604020202020204" pitchFamily="34" charset="0"/>
+              </a:rPr>
+              <a:t>Soil moisture</a:t>
+            </a:r>
+            <a:endParaRPr lang="en-US" sz="2400" b="1" dirty="0">
+              <a:solidFill>
+                <a:schemeClr val="tx1"/>
+              </a:solidFill>
+              <a:latin typeface="Arial" panose="020B0604020202020204" pitchFamily="34" charset="0"/>
+              <a:cs typeface="Arial" panose="020B0604020202020204" pitchFamily="34" charset="0"/>
+            </a:endParaRPr>
+          </a:p>
+        </p:txBody>
+      </p:sp>
+      <p:cxnSp>
+        <p:nvCxnSpPr>
+          <p:cNvPr id="42" name="Elbow Connector 41">
+            <a:extLst>
+              <a:ext uri="{FF2B5EF4-FFF2-40B4-BE49-F238E27FC236}">
+                <a16:creationId xmlns:a16="http://schemas.microsoft.com/office/drawing/2014/main" id="{9524BD2F-9CC1-02FC-2D24-D4800C3A0075}"/>
               </a:ext>
             </a:extLst>
           </p:cNvPr>
@@ -24060,20 +24642,146 @@
           <p:nvPr/>
         </p:nvCxnSpPr>
         <p:spPr>
-          <a:xfrm rot="16200000" flipH="1">
-            <a:off x="14764893" y="644959"/>
-            <a:ext cx="241362" cy="3830184"/>
+          <a:xfrm>
+            <a:off x="15470371" y="3185534"/>
+            <a:ext cx="1503218" cy="512339"/>
           </a:xfrm>
           <a:prstGeom prst="bentConnector2">
             <a:avLst/>
           </a:prstGeom>
-          <a:ln w="60960">
+          <a:ln w="50673">
             <a:solidFill>
               <a:schemeClr val="accent1">
                 <a:lumMod val="75000"/>
-                <a:alpha val="50000"/>
               </a:schemeClr>
             </a:solidFill>
+            <a:tailEnd type="triangle"/>
+          </a:ln>
+        </p:spPr>
+        <p:style>
+          <a:lnRef idx="1">
+            <a:schemeClr val="accent1"/>
+          </a:lnRef>
+          <a:fillRef idx="0">
+            <a:schemeClr val="accent1"/>
+          </a:fillRef>
+          <a:effectRef idx="0">
+            <a:schemeClr val="accent1"/>
+          </a:effectRef>
+          <a:fontRef idx="minor">
+            <a:schemeClr val="tx1"/>
+          </a:fontRef>
+        </p:style>
+      </p:cxnSp>
+      <p:sp>
+        <p:nvSpPr>
+          <p:cNvPr id="16" name="Rectangle 15">
+            <a:extLst>
+              <a:ext uri="{FF2B5EF4-FFF2-40B4-BE49-F238E27FC236}">
+                <a16:creationId xmlns:a16="http://schemas.microsoft.com/office/drawing/2014/main" id="{B7D9FE12-5D57-A413-A8D6-DEA387C9FE56}"/>
+              </a:ext>
+            </a:extLst>
+          </p:cNvPr>
+          <p:cNvSpPr/>
+          <p:nvPr/>
+        </p:nvSpPr>
+        <p:spPr>
+          <a:xfrm>
+            <a:off x="14191600" y="2746922"/>
+            <a:ext cx="1819398" cy="877223"/>
+          </a:xfrm>
+          <a:prstGeom prst="rect">
+            <a:avLst/>
+          </a:prstGeom>
+          <a:solidFill>
+            <a:schemeClr val="bg1"/>
+          </a:solidFill>
+          <a:ln w="38100">
+            <a:solidFill>
+              <a:schemeClr val="tx1"/>
+            </a:solidFill>
+          </a:ln>
+        </p:spPr>
+        <p:style>
+          <a:lnRef idx="2">
+            <a:schemeClr val="accent1">
+              <a:shade val="50000"/>
+            </a:schemeClr>
+          </a:lnRef>
+          <a:fillRef idx="1">
+            <a:schemeClr val="accent1"/>
+          </a:fillRef>
+          <a:effectRef idx="0">
+            <a:schemeClr val="accent1"/>
+          </a:effectRef>
+          <a:fontRef idx="minor">
+            <a:schemeClr val="lt1"/>
+          </a:fontRef>
+        </p:style>
+        <p:txBody>
+          <a:bodyPr rtlCol="0" anchor="ctr"/>
+          <a:lstStyle/>
+          <a:p>
+            <a:pPr algn="ctr"/>
+            <a:r>
+              <a:rPr lang="en-US" sz="2400" b="1" i="1" dirty="0">
+                <a:solidFill>
+                  <a:schemeClr val="tx1"/>
+                </a:solidFill>
+                <a:latin typeface="Arial" panose="020B0604020202020204" pitchFamily="34" charset="0"/>
+                <a:cs typeface="Arial" panose="020B0604020202020204" pitchFamily="34" charset="0"/>
+              </a:rPr>
+              <a:t>N</a:t>
+            </a:r>
+            <a:r>
+              <a:rPr lang="en-US" sz="2400" b="1" baseline="-25000" dirty="0">
+                <a:solidFill>
+                  <a:schemeClr val="tx1"/>
+                </a:solidFill>
+                <a:latin typeface="Arial" panose="020B0604020202020204" pitchFamily="34" charset="0"/>
+                <a:cs typeface="Arial" panose="020B0604020202020204" pitchFamily="34" charset="0"/>
+              </a:rPr>
+              <a:t>fixation</a:t>
+            </a:r>
+            <a:endParaRPr lang="en-US" sz="2400" i="1" dirty="0">
+              <a:solidFill>
+                <a:schemeClr val="tx1"/>
+              </a:solidFill>
+              <a:latin typeface="Arial" panose="020B0604020202020204" pitchFamily="34" charset="0"/>
+              <a:cs typeface="Arial" panose="020B0604020202020204" pitchFamily="34" charset="0"/>
+            </a:endParaRPr>
+          </a:p>
+        </p:txBody>
+      </p:sp>
+      <p:cxnSp>
+        <p:nvCxnSpPr>
+          <p:cNvPr id="44" name="Elbow Connector 43">
+            <a:extLst>
+              <a:ext uri="{FF2B5EF4-FFF2-40B4-BE49-F238E27FC236}">
+                <a16:creationId xmlns:a16="http://schemas.microsoft.com/office/drawing/2014/main" id="{C356DB7C-DF9F-DB38-6B2D-5BB53512B12F}"/>
+              </a:ext>
+            </a:extLst>
+          </p:cNvPr>
+          <p:cNvCxnSpPr>
+            <a:cxnSpLocks/>
+            <a:stCxn id="20" idx="2"/>
+            <a:endCxn id="23" idx="3"/>
+          </p:cNvCxnSpPr>
+          <p:nvPr/>
+        </p:nvCxnSpPr>
+        <p:spPr>
+          <a:xfrm rot="5400000">
+            <a:off x="11389378" y="3154451"/>
+            <a:ext cx="509098" cy="1453005"/>
+          </a:xfrm>
+          <a:prstGeom prst="bentConnector2">
+            <a:avLst/>
+          </a:prstGeom>
+          <a:ln w="147193">
+            <a:solidFill>
+              <a:srgbClr val="C00000"/>
+            </a:solidFill>
+            <a:headEnd type="oval"/>
             <a:tailEnd type="triangle"/>
           </a:ln>
         </p:spPr>
@@ -24094,10 +24802,10 @@
       </p:cxnSp>
       <p:cxnSp>
         <p:nvCxnSpPr>
-          <p:cNvPr id="13" name="Elbow Connector 12">
-            <a:extLst>
-              <a:ext uri="{FF2B5EF4-FFF2-40B4-BE49-F238E27FC236}">
-                <a16:creationId xmlns:a16="http://schemas.microsoft.com/office/drawing/2014/main" id="{CE3869F9-DEE4-1E9F-DC1A-34BC178E5062}"/>
+          <p:cNvPr id="46" name="Straight Arrow Connector 45">
+            <a:extLst>
+              <a:ext uri="{FF2B5EF4-FFF2-40B4-BE49-F238E27FC236}">
+                <a16:creationId xmlns:a16="http://schemas.microsoft.com/office/drawing/2014/main" id="{6C0DBAA1-8F74-BC47-EC65-C7481BEF127E}"/>
               </a:ext>
             </a:extLst>
           </p:cNvPr>
@@ -24107,23 +24815,19 @@
           <p:nvPr/>
         </p:nvCxnSpPr>
         <p:spPr>
-          <a:xfrm>
-            <a:off x="11165335" y="2782358"/>
-            <a:ext cx="3922766" cy="729775"/>
-          </a:xfrm>
-          <a:prstGeom prst="bentConnector3">
-            <a:avLst>
-              <a:gd name="adj1" fmla="val 100020"/>
-            </a:avLst>
-          </a:prstGeom>
-          <a:ln w="14731">
-            <a:solidFill>
-              <a:srgbClr val="C00000">
-                <a:alpha val="50000"/>
-              </a:srgbClr>
-            </a:solidFill>
-            <a:headEnd type="oval" w="med" len="med"/>
-            <a:tailEnd type="triangle" w="med" len="med"/>
+          <a:xfrm flipV="1">
+            <a:off x="11013433" y="6511433"/>
+            <a:ext cx="5591084" cy="10678"/>
+          </a:xfrm>
+          <a:prstGeom prst="straightConnector1">
+            <a:avLst/>
+          </a:prstGeom>
+          <a:ln w="53721">
+            <a:solidFill>
+              <a:srgbClr val="C00000"/>
+            </a:solidFill>
+            <a:headEnd type="oval"/>
+            <a:tailEnd type="triangle"/>
           </a:ln>
         </p:spPr>
         <p:style>
@@ -24143,10 +24847,10 @@
       </p:cxnSp>
       <p:cxnSp>
         <p:nvCxnSpPr>
-          <p:cNvPr id="14" name="Straight Arrow Connector 13">
-            <a:extLst>
-              <a:ext uri="{FF2B5EF4-FFF2-40B4-BE49-F238E27FC236}">
-                <a16:creationId xmlns:a16="http://schemas.microsoft.com/office/drawing/2014/main" id="{509C7D75-3648-13FC-460B-270C67EF60E3}"/>
+          <p:cNvPr id="48" name="Elbow Connector 47">
+            <a:extLst>
+              <a:ext uri="{FF2B5EF4-FFF2-40B4-BE49-F238E27FC236}">
+                <a16:creationId xmlns:a16="http://schemas.microsoft.com/office/drawing/2014/main" id="{E083A1D3-A2EF-53DD-DC66-2677BF589808}"/>
               </a:ext>
             </a:extLst>
           </p:cNvPr>
@@ -24156,21 +24860,23 @@
           <p:nvPr/>
         </p:nvCxnSpPr>
         <p:spPr>
-          <a:xfrm>
-            <a:off x="9687156" y="3392574"/>
-            <a:ext cx="0" cy="1200465"/>
-          </a:xfrm>
-          <a:prstGeom prst="straightConnector1">
-            <a:avLst/>
-          </a:prstGeom>
-          <a:ln w="41910">
-            <a:solidFill>
-              <a:srgbClr val="C00000">
-                <a:alpha val="50000"/>
-              </a:srgbClr>
-            </a:solidFill>
-            <a:headEnd type="oval" w="med" len="med"/>
-            <a:tailEnd type="triangle" w="med" len="med"/>
+          <a:xfrm flipV="1">
+            <a:off x="9599070" y="3697873"/>
+            <a:ext cx="7654848" cy="2550587"/>
+          </a:xfrm>
+          <a:prstGeom prst="bentConnector4">
+            <a:avLst>
+              <a:gd name="adj1" fmla="val -15756"/>
+              <a:gd name="adj2" fmla="val 150047"/>
+            </a:avLst>
+          </a:prstGeom>
+          <a:ln w="52324">
+            <a:solidFill>
+              <a:schemeClr val="accent1">
+                <a:lumMod val="75000"/>
+              </a:schemeClr>
+            </a:solidFill>
+            <a:tailEnd type="triangle"/>
           </a:ln>
         </p:spPr>
         <p:style>
@@ -24190,10 +24896,56 @@
       </p:cxnSp>
       <p:cxnSp>
         <p:nvCxnSpPr>
-          <p:cNvPr id="15" name="Elbow Connector 14">
-            <a:extLst>
-              <a:ext uri="{FF2B5EF4-FFF2-40B4-BE49-F238E27FC236}">
-                <a16:creationId xmlns:a16="http://schemas.microsoft.com/office/drawing/2014/main" id="{F3007708-2ADA-6094-2AA5-C9D8BA8B20D4}"/>
+          <p:cNvPr id="54" name="Straight Arrow Connector 53">
+            <a:extLst>
+              <a:ext uri="{FF2B5EF4-FFF2-40B4-BE49-F238E27FC236}">
+                <a16:creationId xmlns:a16="http://schemas.microsoft.com/office/drawing/2014/main" id="{33628077-500F-68E2-AC9C-F9037DEC9D52}"/>
+              </a:ext>
+            </a:extLst>
+          </p:cNvPr>
+          <p:cNvCxnSpPr>
+            <a:stCxn id="18" idx="0"/>
+            <a:endCxn id="19" idx="2"/>
+          </p:cNvCxnSpPr>
+          <p:nvPr/>
+        </p:nvCxnSpPr>
+        <p:spPr>
+          <a:xfrm flipV="1">
+            <a:off x="17514216" y="4575096"/>
+            <a:ext cx="0" cy="1224075"/>
+          </a:xfrm>
+          <a:prstGeom prst="straightConnector1">
+            <a:avLst/>
+          </a:prstGeom>
+          <a:ln w="75311">
+            <a:solidFill>
+              <a:srgbClr val="C00000"/>
+            </a:solidFill>
+            <a:headEnd type="oval"/>
+            <a:tailEnd type="triangle"/>
+          </a:ln>
+        </p:spPr>
+        <p:style>
+          <a:lnRef idx="1">
+            <a:schemeClr val="accent1"/>
+          </a:lnRef>
+          <a:fillRef idx="0">
+            <a:schemeClr val="accent1"/>
+          </a:fillRef>
+          <a:effectRef idx="0">
+            <a:schemeClr val="accent1"/>
+          </a:effectRef>
+          <a:fontRef idx="minor">
+            <a:schemeClr val="tx1"/>
+          </a:fontRef>
+        </p:style>
+      </p:cxnSp>
+      <p:cxnSp>
+        <p:nvCxnSpPr>
+          <p:cNvPr id="58" name="Elbow Connector 57">
+            <a:extLst>
+              <a:ext uri="{FF2B5EF4-FFF2-40B4-BE49-F238E27FC236}">
+                <a16:creationId xmlns:a16="http://schemas.microsoft.com/office/drawing/2014/main" id="{00EE9840-85DD-B365-3780-41BF331756A5}"/>
               </a:ext>
             </a:extLst>
           </p:cNvPr>
@@ -24203,23 +24955,111 @@
           <p:nvPr/>
         </p:nvCxnSpPr>
         <p:spPr>
-          <a:xfrm rot="10800000" flipV="1">
-            <a:off x="11165336" y="2429874"/>
-            <a:ext cx="3199099" cy="650028"/>
+          <a:xfrm>
+            <a:off x="13704124" y="4154092"/>
+            <a:ext cx="955718" cy="570225"/>
           </a:xfrm>
           <a:prstGeom prst="bentConnector3">
             <a:avLst>
-              <a:gd name="adj1" fmla="val 97"/>
+              <a:gd name="adj1" fmla="val 100323"/>
             </a:avLst>
           </a:prstGeom>
-          <a:ln w="142875">
-            <a:solidFill>
-              <a:srgbClr val="C00000">
-                <a:alpha val="50000"/>
-              </a:srgbClr>
-            </a:solidFill>
-            <a:headEnd type="oval" w="med" len="med"/>
-            <a:tailEnd type="triangle" w="med" len="med"/>
+          <a:ln w="57911">
+            <a:solidFill>
+              <a:srgbClr val="C00000"/>
+            </a:solidFill>
+            <a:headEnd type="none"/>
+            <a:tailEnd type="triangle"/>
+          </a:ln>
+        </p:spPr>
+        <p:style>
+          <a:lnRef idx="1">
+            <a:schemeClr val="accent1"/>
+          </a:lnRef>
+          <a:fillRef idx="0">
+            <a:schemeClr val="accent1"/>
+          </a:fillRef>
+          <a:effectRef idx="0">
+            <a:schemeClr val="accent1"/>
+          </a:effectRef>
+          <a:fontRef idx="minor">
+            <a:schemeClr val="tx1"/>
+          </a:fontRef>
+        </p:style>
+      </p:cxnSp>
+      <p:cxnSp>
+        <p:nvCxnSpPr>
+          <p:cNvPr id="63" name="Straight Arrow Connector 62">
+            <a:extLst>
+              <a:ext uri="{FF2B5EF4-FFF2-40B4-BE49-F238E27FC236}">
+                <a16:creationId xmlns:a16="http://schemas.microsoft.com/office/drawing/2014/main" id="{B3050AC4-5FC4-1265-17CC-62671EFD71BF}"/>
+              </a:ext>
+            </a:extLst>
+          </p:cNvPr>
+          <p:cNvCxnSpPr>
+            <a:cxnSpLocks/>
+          </p:cNvCxnSpPr>
+          <p:nvPr/>
+        </p:nvCxnSpPr>
+        <p:spPr>
+          <a:xfrm flipH="1">
+            <a:off x="14946016" y="3624145"/>
+            <a:ext cx="1773" cy="1101860"/>
+          </a:xfrm>
+          <a:prstGeom prst="straightConnector1">
+            <a:avLst/>
+          </a:prstGeom>
+          <a:ln w="12700">
+            <a:solidFill>
+              <a:schemeClr val="tx1"/>
+            </a:solidFill>
+            <a:prstDash val="dash"/>
+            <a:tailEnd type="triangle"/>
+          </a:ln>
+        </p:spPr>
+        <p:style>
+          <a:lnRef idx="1">
+            <a:schemeClr val="accent1"/>
+          </a:lnRef>
+          <a:fillRef idx="0">
+            <a:schemeClr val="accent1"/>
+          </a:fillRef>
+          <a:effectRef idx="0">
+            <a:schemeClr val="accent1"/>
+          </a:effectRef>
+          <a:fontRef idx="minor">
+            <a:schemeClr val="tx1"/>
+          </a:fontRef>
+        </p:style>
+      </p:cxnSp>
+      <p:cxnSp>
+        <p:nvCxnSpPr>
+          <p:cNvPr id="65" name="Straight Arrow Connector 64">
+            <a:extLst>
+              <a:ext uri="{FF2B5EF4-FFF2-40B4-BE49-F238E27FC236}">
+                <a16:creationId xmlns:a16="http://schemas.microsoft.com/office/drawing/2014/main" id="{7E2748D0-8203-DF86-6E04-4DAB9A96476E}"/>
+              </a:ext>
+            </a:extLst>
+          </p:cNvPr>
+          <p:cNvCxnSpPr>
+            <a:cxnSpLocks/>
+          </p:cNvCxnSpPr>
+          <p:nvPr/>
+        </p:nvCxnSpPr>
+        <p:spPr>
+          <a:xfrm>
+            <a:off x="9458901" y="4574112"/>
+            <a:ext cx="0" cy="1225059"/>
+          </a:xfrm>
+          <a:prstGeom prst="straightConnector1">
+            <a:avLst/>
+          </a:prstGeom>
+          <a:ln w="31623">
+            <a:solidFill>
+              <a:srgbClr val="C00000"/>
+            </a:solidFill>
+            <a:headEnd type="oval"/>
+            <a:tailEnd type="triangle"/>
           </a:ln>
         </p:spPr>
         <p:style>
@@ -24239,10 +25079,10 @@
       </p:cxnSp>
       <p:grpSp>
         <p:nvGrpSpPr>
-          <p:cNvPr id="16" name="Group 15">
-            <a:extLst>
-              <a:ext uri="{FF2B5EF4-FFF2-40B4-BE49-F238E27FC236}">
-                <a16:creationId xmlns:a16="http://schemas.microsoft.com/office/drawing/2014/main" id="{618A1F0C-E8DB-3C74-8B76-DE562361D010}"/>
+          <p:cNvPr id="67" name="Group 66">
+            <a:extLst>
+              <a:ext uri="{FF2B5EF4-FFF2-40B4-BE49-F238E27FC236}">
+                <a16:creationId xmlns:a16="http://schemas.microsoft.com/office/drawing/2014/main" id="{669553A0-A0B6-DB67-BCB3-6341D4C75988}"/>
               </a:ext>
             </a:extLst>
           </p:cNvPr>
@@ -24251,7 +25091,7 @@
         </p:nvGrpSpPr>
         <p:grpSpPr>
           <a:xfrm>
-            <a:off x="10805203" y="16725853"/>
+            <a:off x="10559644" y="16560396"/>
             <a:ext cx="7208824" cy="1332351"/>
             <a:chOff x="9836749" y="13266385"/>
             <a:chExt cx="7208824" cy="1332351"/>
@@ -24259,10 +25099,10 @@
         </p:grpSpPr>
         <p:cxnSp>
           <p:nvCxnSpPr>
-            <p:cNvPr id="17" name="Straight Connector 16">
+            <p:cNvPr id="68" name="Straight Connector 67">
               <a:extLst>
                 <a:ext uri="{FF2B5EF4-FFF2-40B4-BE49-F238E27FC236}">
-                  <a16:creationId xmlns:a16="http://schemas.microsoft.com/office/drawing/2014/main" id="{B0ADB8D6-9A76-5BEB-AB37-B67557703AF8}"/>
+                  <a16:creationId xmlns:a16="http://schemas.microsoft.com/office/drawing/2014/main" id="{6293F274-92CF-FE6B-8189-016C186F03A8}"/>
                 </a:ext>
               </a:extLst>
             </p:cNvPr>
@@ -24302,10 +25142,10 @@
         </p:cxnSp>
         <p:cxnSp>
           <p:nvCxnSpPr>
-            <p:cNvPr id="18" name="Straight Connector 17">
+            <p:cNvPr id="69" name="Straight Connector 68">
               <a:extLst>
                 <a:ext uri="{FF2B5EF4-FFF2-40B4-BE49-F238E27FC236}">
-                  <a16:creationId xmlns:a16="http://schemas.microsoft.com/office/drawing/2014/main" id="{71C47D4A-253D-2150-21DD-F106CEB5DCB9}"/>
+                  <a16:creationId xmlns:a16="http://schemas.microsoft.com/office/drawing/2014/main" id="{CD7A520E-F3C1-CCDE-A595-82CA16F9AA39}"/>
                 </a:ext>
               </a:extLst>
             </p:cNvPr>
@@ -24345,10 +25185,10 @@
         </p:cxnSp>
         <p:cxnSp>
           <p:nvCxnSpPr>
-            <p:cNvPr id="19" name="Straight Connector 18">
+            <p:cNvPr id="70" name="Straight Connector 69">
               <a:extLst>
                 <a:ext uri="{FF2B5EF4-FFF2-40B4-BE49-F238E27FC236}">
-                  <a16:creationId xmlns:a16="http://schemas.microsoft.com/office/drawing/2014/main" id="{95746896-6CE9-E3F9-171E-4C4E4DBA9614}"/>
+                  <a16:creationId xmlns:a16="http://schemas.microsoft.com/office/drawing/2014/main" id="{E1A3ABE2-8C0F-4DEC-BFD9-EF74E5247785}"/>
                 </a:ext>
               </a:extLst>
             </p:cNvPr>
@@ -24390,10 +25230,10 @@
         </p:cxnSp>
         <p:cxnSp>
           <p:nvCxnSpPr>
-            <p:cNvPr id="20" name="Straight Connector 19">
+            <p:cNvPr id="71" name="Straight Connector 70">
               <a:extLst>
                 <a:ext uri="{FF2B5EF4-FFF2-40B4-BE49-F238E27FC236}">
-                  <a16:creationId xmlns:a16="http://schemas.microsoft.com/office/drawing/2014/main" id="{78799202-DA54-CB64-4F23-3B1AF7A30833}"/>
+                  <a16:creationId xmlns:a16="http://schemas.microsoft.com/office/drawing/2014/main" id="{EF4385D1-1A78-EDB2-F8B8-5060D8CFD2ED}"/>
                 </a:ext>
               </a:extLst>
             </p:cNvPr>
@@ -24435,10 +25275,10 @@
         </p:cxnSp>
         <p:sp>
           <p:nvSpPr>
-            <p:cNvPr id="21" name="TextBox 20">
+            <p:cNvPr id="72" name="TextBox 71">
               <a:extLst>
                 <a:ext uri="{FF2B5EF4-FFF2-40B4-BE49-F238E27FC236}">
-                  <a16:creationId xmlns:a16="http://schemas.microsoft.com/office/drawing/2014/main" id="{C154C1F4-10C9-DFB3-43BE-DC11D7ED6269}"/>
+                  <a16:creationId xmlns:a16="http://schemas.microsoft.com/office/drawing/2014/main" id="{C1237ADD-804E-BD5A-0C4D-045891C7FF79}"/>
                 </a:ext>
               </a:extLst>
             </p:cNvPr>
@@ -24473,10 +25313,10 @@
         </p:sp>
         <p:sp>
           <p:nvSpPr>
-            <p:cNvPr id="22" name="TextBox 21">
+            <p:cNvPr id="73" name="TextBox 72">
               <a:extLst>
                 <a:ext uri="{FF2B5EF4-FFF2-40B4-BE49-F238E27FC236}">
-                  <a16:creationId xmlns:a16="http://schemas.microsoft.com/office/drawing/2014/main" id="{DAC3FF37-68DE-B397-531A-6676FB013490}"/>
+                  <a16:creationId xmlns:a16="http://schemas.microsoft.com/office/drawing/2014/main" id="{D3FFF082-0445-1303-5D9C-E7D3A7814586}"/>
                 </a:ext>
               </a:extLst>
             </p:cNvPr>
@@ -24511,10 +25351,10 @@
         </p:sp>
         <p:sp>
           <p:nvSpPr>
-            <p:cNvPr id="23" name="TextBox 22">
+            <p:cNvPr id="74" name="TextBox 73">
               <a:extLst>
                 <a:ext uri="{FF2B5EF4-FFF2-40B4-BE49-F238E27FC236}">
-                  <a16:creationId xmlns:a16="http://schemas.microsoft.com/office/drawing/2014/main" id="{785DA07D-E6D5-7089-8174-49FA2E96D6E0}"/>
+                  <a16:creationId xmlns:a16="http://schemas.microsoft.com/office/drawing/2014/main" id="{ED013752-F16B-B3C0-C4C0-738E13742432}"/>
                 </a:ext>
               </a:extLst>
             </p:cNvPr>
@@ -24549,10 +25389,10 @@
         </p:sp>
         <p:sp>
           <p:nvSpPr>
-            <p:cNvPr id="24" name="TextBox 23">
+            <p:cNvPr id="75" name="TextBox 74">
               <a:extLst>
                 <a:ext uri="{FF2B5EF4-FFF2-40B4-BE49-F238E27FC236}">
-                  <a16:creationId xmlns:a16="http://schemas.microsoft.com/office/drawing/2014/main" id="{DA1B4F94-0D6F-C5FE-3471-32160EE98FB1}"/>
+                  <a16:creationId xmlns:a16="http://schemas.microsoft.com/office/drawing/2014/main" id="{C2932036-C0CD-0DC8-3A72-44FF40A83058}"/>
                 </a:ext>
               </a:extLst>
             </p:cNvPr>
@@ -24587,10 +25427,10 @@
         </p:sp>
         <p:sp>
           <p:nvSpPr>
-            <p:cNvPr id="25" name="TextBox 24">
+            <p:cNvPr id="76" name="TextBox 75">
               <a:extLst>
                 <a:ext uri="{FF2B5EF4-FFF2-40B4-BE49-F238E27FC236}">
-                  <a16:creationId xmlns:a16="http://schemas.microsoft.com/office/drawing/2014/main" id="{E68E26F5-4DFB-E8EA-ACF0-7A567ECEEE84}"/>
+                  <a16:creationId xmlns:a16="http://schemas.microsoft.com/office/drawing/2014/main" id="{D6BBEE57-3FAE-3AFE-2107-8E4414F115B1}"/>
                 </a:ext>
               </a:extLst>
             </p:cNvPr>
@@ -24625,10 +25465,10 @@
         </p:sp>
         <p:sp>
           <p:nvSpPr>
-            <p:cNvPr id="26" name="TextBox 25">
+            <p:cNvPr id="77" name="TextBox 76">
               <a:extLst>
                 <a:ext uri="{FF2B5EF4-FFF2-40B4-BE49-F238E27FC236}">
-                  <a16:creationId xmlns:a16="http://schemas.microsoft.com/office/drawing/2014/main" id="{72D62112-7482-FBE0-F16F-F7CDB895EE1C}"/>
+                  <a16:creationId xmlns:a16="http://schemas.microsoft.com/office/drawing/2014/main" id="{63193CE3-2969-4586-F929-3BCAD1A72676}"/>
                 </a:ext>
               </a:extLst>
             </p:cNvPr>
@@ -24663,10 +25503,10 @@
         </p:sp>
         <p:sp>
           <p:nvSpPr>
-            <p:cNvPr id="27" name="TextBox 26">
+            <p:cNvPr id="78" name="TextBox 77">
               <a:extLst>
                 <a:ext uri="{FF2B5EF4-FFF2-40B4-BE49-F238E27FC236}">
-                  <a16:creationId xmlns:a16="http://schemas.microsoft.com/office/drawing/2014/main" id="{853E7AE9-CD48-6228-03F9-FDB1ADC63086}"/>
+                  <a16:creationId xmlns:a16="http://schemas.microsoft.com/office/drawing/2014/main" id="{FDE0D79C-3283-54B8-1F07-D2BFD05F94A7}"/>
                 </a:ext>
               </a:extLst>
             </p:cNvPr>
@@ -24701,10 +25541,10 @@
         </p:sp>
         <p:cxnSp>
           <p:nvCxnSpPr>
-            <p:cNvPr id="28" name="Straight Connector 27">
+            <p:cNvPr id="79" name="Straight Connector 78">
               <a:extLst>
                 <a:ext uri="{FF2B5EF4-FFF2-40B4-BE49-F238E27FC236}">
-                  <a16:creationId xmlns:a16="http://schemas.microsoft.com/office/drawing/2014/main" id="{E9A66EAA-56D7-37E4-314E-D659EED8F8A6}"/>
+                  <a16:creationId xmlns:a16="http://schemas.microsoft.com/office/drawing/2014/main" id="{137FCBDC-8537-F856-0351-8BFA821779AB}"/>
                 </a:ext>
               </a:extLst>
             </p:cNvPr>
@@ -24744,10 +25584,10 @@
         </p:cxnSp>
         <p:cxnSp>
           <p:nvCxnSpPr>
-            <p:cNvPr id="29" name="Straight Connector 28">
+            <p:cNvPr id="80" name="Straight Connector 79">
               <a:extLst>
                 <a:ext uri="{FF2B5EF4-FFF2-40B4-BE49-F238E27FC236}">
-                  <a16:creationId xmlns:a16="http://schemas.microsoft.com/office/drawing/2014/main" id="{D49B4FFE-C6AC-FD7C-4BBE-FF6B60340C25}"/>
+                  <a16:creationId xmlns:a16="http://schemas.microsoft.com/office/drawing/2014/main" id="{6B52674F-DB9D-49BC-874E-A8A8F77EEC00}"/>
                 </a:ext>
               </a:extLst>
             </p:cNvPr>
@@ -24789,10 +25629,10 @@
         </p:cxnSp>
         <p:sp>
           <p:nvSpPr>
-            <p:cNvPr id="30" name="Rectangle 29">
+            <p:cNvPr id="81" name="Rectangle 80">
               <a:extLst>
                 <a:ext uri="{FF2B5EF4-FFF2-40B4-BE49-F238E27FC236}">
-                  <a16:creationId xmlns:a16="http://schemas.microsoft.com/office/drawing/2014/main" id="{E171DAEF-08C1-92AF-B56E-64423E7C0ABE}"/>
+                  <a16:creationId xmlns:a16="http://schemas.microsoft.com/office/drawing/2014/main" id="{6EE7D096-F04F-195B-3633-9072E5AE809A}"/>
                 </a:ext>
               </a:extLst>
             </p:cNvPr>
@@ -24841,10 +25681,10 @@
         </p:sp>
         <p:sp>
           <p:nvSpPr>
-            <p:cNvPr id="31" name="Rectangle 30">
+            <p:cNvPr id="82" name="Rectangle 81">
               <a:extLst>
                 <a:ext uri="{FF2B5EF4-FFF2-40B4-BE49-F238E27FC236}">
-                  <a16:creationId xmlns:a16="http://schemas.microsoft.com/office/drawing/2014/main" id="{3F802C2A-C2B3-2907-154B-5AF90540910B}"/>
+                  <a16:creationId xmlns:a16="http://schemas.microsoft.com/office/drawing/2014/main" id="{9F9C53B8-7D97-C77B-8EC2-95916E431FD7}"/>
                 </a:ext>
               </a:extLst>
             </p:cNvPr>
@@ -24893,10 +25733,10 @@
         </p:sp>
         <p:sp>
           <p:nvSpPr>
-            <p:cNvPr id="32" name="Rectangle 31">
+            <p:cNvPr id="83" name="Rectangle 82">
               <a:extLst>
                 <a:ext uri="{FF2B5EF4-FFF2-40B4-BE49-F238E27FC236}">
-                  <a16:creationId xmlns:a16="http://schemas.microsoft.com/office/drawing/2014/main" id="{5D082C1A-849B-475E-196C-143550021015}"/>
+                  <a16:creationId xmlns:a16="http://schemas.microsoft.com/office/drawing/2014/main" id="{E36B7C6E-083C-34FF-5B1E-51B7601E9BE7}"/>
                 </a:ext>
               </a:extLst>
             </p:cNvPr>
@@ -24944,12 +25784,70 @@
           </p:txBody>
         </p:sp>
       </p:grpSp>
+      <p:sp>
+        <p:nvSpPr>
+          <p:cNvPr id="111" name="Rectangle 110">
+            <a:extLst>
+              <a:ext uri="{FF2B5EF4-FFF2-40B4-BE49-F238E27FC236}">
+                <a16:creationId xmlns:a16="http://schemas.microsoft.com/office/drawing/2014/main" id="{4B064135-E29C-5F11-EDC1-2C66866FAB38}"/>
+              </a:ext>
+            </a:extLst>
+          </p:cNvPr>
+          <p:cNvSpPr/>
+          <p:nvPr/>
+        </p:nvSpPr>
+        <p:spPr>
+          <a:xfrm>
+            <a:off x="6986016" y="8963540"/>
+            <a:ext cx="14356080" cy="6638544"/>
+          </a:xfrm>
+          <a:prstGeom prst="rect">
+            <a:avLst/>
+          </a:prstGeom>
+          <a:solidFill>
+            <a:schemeClr val="bg1">
+              <a:lumMod val="95000"/>
+            </a:schemeClr>
+          </a:solidFill>
+          <a:ln w="57150">
+            <a:solidFill>
+              <a:schemeClr val="bg1">
+                <a:lumMod val="50000"/>
+              </a:schemeClr>
+            </a:solidFill>
+          </a:ln>
+        </p:spPr>
+        <p:style>
+          <a:lnRef idx="2">
+            <a:schemeClr val="accent1">
+              <a:shade val="15000"/>
+            </a:schemeClr>
+          </a:lnRef>
+          <a:fillRef idx="1">
+            <a:schemeClr val="accent1"/>
+          </a:fillRef>
+          <a:effectRef idx="0">
+            <a:schemeClr val="accent1"/>
+          </a:effectRef>
+          <a:fontRef idx="minor">
+            <a:schemeClr val="lt1"/>
+          </a:fontRef>
+        </p:style>
+        <p:txBody>
+          <a:bodyPr rtlCol="0" anchor="ctr"/>
+          <a:lstStyle/>
+          <a:p>
+            <a:pPr algn="ctr"/>
+            <a:endParaRPr lang="en-US"/>
+          </a:p>
+        </p:txBody>
+      </p:sp>
       <p:cxnSp>
         <p:nvCxnSpPr>
-          <p:cNvPr id="33" name="Elbow Connector 32">
-            <a:extLst>
-              <a:ext uri="{FF2B5EF4-FFF2-40B4-BE49-F238E27FC236}">
-                <a16:creationId xmlns:a16="http://schemas.microsoft.com/office/drawing/2014/main" id="{B9FB019A-B028-E114-0AB6-849317E77A73}"/>
+          <p:cNvPr id="112" name="Elbow Connector 111">
+            <a:extLst>
+              <a:ext uri="{FF2B5EF4-FFF2-40B4-BE49-F238E27FC236}">
+                <a16:creationId xmlns:a16="http://schemas.microsoft.com/office/drawing/2014/main" id="{EFD0C664-47E4-FB87-E5AF-FE7F8DAF223B}"/>
               </a:ext>
             </a:extLst>
           </p:cNvPr>
@@ -24960,13 +25858,13 @@
         </p:nvCxnSpPr>
         <p:spPr>
           <a:xfrm rot="16200000" flipH="1">
-            <a:off x="10667438" y="2697178"/>
+            <a:off x="10436811" y="11569792"/>
             <a:ext cx="601182" cy="1459355"/>
           </a:xfrm>
           <a:prstGeom prst="bentConnector2">
             <a:avLst/>
           </a:prstGeom>
-          <a:ln w="19177">
+          <a:ln w="48514">
             <a:solidFill>
               <a:schemeClr val="accent1">
                 <a:lumMod val="75000"/>
@@ -24992,10 +25890,10 @@
       </p:cxnSp>
       <p:cxnSp>
         <p:nvCxnSpPr>
-          <p:cNvPr id="34" name="Straight Arrow Connector 33">
-            <a:extLst>
-              <a:ext uri="{FF2B5EF4-FFF2-40B4-BE49-F238E27FC236}">
-                <a16:creationId xmlns:a16="http://schemas.microsoft.com/office/drawing/2014/main" id="{8707E69E-36A5-506B-BA0F-9ACCBD861AD1}"/>
+          <p:cNvPr id="113" name="Elbow Connector 112">
+            <a:extLst>
+              <a:ext uri="{FF2B5EF4-FFF2-40B4-BE49-F238E27FC236}">
+                <a16:creationId xmlns:a16="http://schemas.microsoft.com/office/drawing/2014/main" id="{8C09A945-AD88-C051-EDE8-7BAA58F7DB56}"/>
               </a:ext>
             </a:extLst>
           </p:cNvPr>
@@ -25005,14 +25903,59 @@
           <p:nvPr/>
         </p:nvCxnSpPr>
         <p:spPr>
+          <a:xfrm rot="5400000" flipH="1" flipV="1">
+            <a:off x="10510982" y="12505396"/>
+            <a:ext cx="452840" cy="1459354"/>
+          </a:xfrm>
+          <a:prstGeom prst="bentConnector2">
+            <a:avLst/>
+          </a:prstGeom>
+          <a:ln w="33401">
+            <a:solidFill>
+              <a:srgbClr val="C00000"/>
+            </a:solidFill>
+            <a:headEnd type="oval"/>
+            <a:tailEnd type="triangle"/>
+          </a:ln>
+        </p:spPr>
+        <p:style>
+          <a:lnRef idx="1">
+            <a:schemeClr val="accent1"/>
+          </a:lnRef>
+          <a:fillRef idx="0">
+            <a:schemeClr val="accent1"/>
+          </a:fillRef>
+          <a:effectRef idx="0">
+            <a:schemeClr val="accent1"/>
+          </a:effectRef>
+          <a:fontRef idx="minor">
+            <a:schemeClr val="tx1"/>
+          </a:fontRef>
+        </p:style>
+      </p:cxnSp>
+      <p:cxnSp>
+        <p:nvCxnSpPr>
+          <p:cNvPr id="114" name="Straight Arrow Connector 113">
+            <a:extLst>
+              <a:ext uri="{FF2B5EF4-FFF2-40B4-BE49-F238E27FC236}">
+                <a16:creationId xmlns:a16="http://schemas.microsoft.com/office/drawing/2014/main" id="{DBFF270C-A184-0FFC-DC71-45744B3E6232}"/>
+              </a:ext>
+            </a:extLst>
+          </p:cNvPr>
+          <p:cNvCxnSpPr>
+            <a:cxnSpLocks/>
+          </p:cNvCxnSpPr>
+          <p:nvPr/>
+        </p:nvCxnSpPr>
+        <p:spPr>
           <a:xfrm>
-            <a:off x="13517105" y="3966619"/>
+            <a:off x="13286478" y="12829708"/>
             <a:ext cx="892510" cy="0"/>
           </a:xfrm>
           <a:prstGeom prst="straightConnector1">
             <a:avLst/>
           </a:prstGeom>
-          <a:ln w="66802">
+          <a:ln w="173863">
             <a:solidFill>
               <a:schemeClr val="accent1">
                 <a:lumMod val="75000"/>
@@ -25038,31 +25981,32 @@
       </p:cxnSp>
       <p:cxnSp>
         <p:nvCxnSpPr>
-          <p:cNvPr id="35" name="Straight Arrow Connector 34">
-            <a:extLst>
-              <a:ext uri="{FF2B5EF4-FFF2-40B4-BE49-F238E27FC236}">
-                <a16:creationId xmlns:a16="http://schemas.microsoft.com/office/drawing/2014/main" id="{EAECFEAE-1B9A-C7E4-6668-81066C556210}"/>
+          <p:cNvPr id="115" name="Elbow Connector 114">
+            <a:extLst>
+              <a:ext uri="{FF2B5EF4-FFF2-40B4-BE49-F238E27FC236}">
+                <a16:creationId xmlns:a16="http://schemas.microsoft.com/office/drawing/2014/main" id="{2B816EFE-1CF3-2286-D032-99C3D857FE47}"/>
               </a:ext>
             </a:extLst>
           </p:cNvPr>
           <p:cNvCxnSpPr>
-            <a:cxnSpLocks/>
+            <a:stCxn id="124" idx="0"/>
+            <a:endCxn id="122" idx="1"/>
           </p:cNvCxnSpPr>
           <p:nvPr/>
         </p:nvCxnSpPr>
         <p:spPr>
-          <a:xfrm>
-            <a:off x="14829441" y="2465016"/>
-            <a:ext cx="5843" cy="1050299"/>
-          </a:xfrm>
-          <a:prstGeom prst="straightConnector1">
-            <a:avLst/>
-          </a:prstGeom>
-          <a:ln w="20193">
-            <a:solidFill>
-              <a:srgbClr val="C00000"/>
-            </a:solidFill>
-            <a:headEnd type="oval"/>
+          <a:xfrm rot="5400000" flipH="1" flipV="1">
+            <a:off x="15557261" y="11343842"/>
+            <a:ext cx="589520" cy="1504991"/>
+          </a:xfrm>
+          <a:prstGeom prst="bentConnector2">
+            <a:avLst/>
+          </a:prstGeom>
+          <a:ln w="12700">
+            <a:solidFill>
+              <a:schemeClr val="tx1"/>
+            </a:solidFill>
+            <a:prstDash val="dash"/>
             <a:tailEnd type="triangle"/>
           </a:ln>
         </p:spPr>
@@ -25083,34 +26027,33 @@
       </p:cxnSp>
       <p:cxnSp>
         <p:nvCxnSpPr>
-          <p:cNvPr id="36" name="Elbow Connector 35">
-            <a:extLst>
-              <a:ext uri="{FF2B5EF4-FFF2-40B4-BE49-F238E27FC236}">
-                <a16:creationId xmlns:a16="http://schemas.microsoft.com/office/drawing/2014/main" id="{D8B8E071-3D94-32C9-2BE0-BAB249AE2059}"/>
+          <p:cNvPr id="116" name="Elbow Connector 115">
+            <a:extLst>
+              <a:ext uri="{FF2B5EF4-FFF2-40B4-BE49-F238E27FC236}">
+                <a16:creationId xmlns:a16="http://schemas.microsoft.com/office/drawing/2014/main" id="{8DB5DDFE-D769-21E2-1569-302628673D5E}"/>
               </a:ext>
             </a:extLst>
           </p:cNvPr>
           <p:cNvCxnSpPr>
-            <a:stCxn id="46" idx="0"/>
-            <a:endCxn id="45" idx="1"/>
+            <a:cxnSpLocks/>
+            <a:stCxn id="124" idx="2"/>
+            <a:endCxn id="121" idx="1"/>
           </p:cNvCxnSpPr>
           <p:nvPr/>
         </p:nvCxnSpPr>
         <p:spPr>
-          <a:xfrm rot="5400000" flipH="1" flipV="1">
-            <a:off x="15787888" y="2480753"/>
-            <a:ext cx="589520" cy="1504991"/>
+          <a:xfrm rot="16200000" flipH="1">
+            <a:off x="15534744" y="12833101"/>
+            <a:ext cx="634555" cy="1504991"/>
           </a:xfrm>
           <a:prstGeom prst="bentConnector2">
             <a:avLst/>
           </a:prstGeom>
-          <a:ln w="39116">
-            <a:solidFill>
-              <a:schemeClr val="bg1">
-                <a:lumMod val="50000"/>
-              </a:schemeClr>
-            </a:solidFill>
-            <a:prstDash val="sysDash"/>
+          <a:ln w="12700">
+            <a:solidFill>
+              <a:schemeClr val="tx1"/>
+            </a:solidFill>
+            <a:prstDash val="dash"/>
             <a:tailEnd type="triangle"/>
           </a:ln>
         </p:spPr>
@@ -25131,32 +26074,37 @@
       </p:cxnSp>
       <p:cxnSp>
         <p:nvCxnSpPr>
-          <p:cNvPr id="37" name="Elbow Connector 36">
-            <a:extLst>
-              <a:ext uri="{FF2B5EF4-FFF2-40B4-BE49-F238E27FC236}">
-                <a16:creationId xmlns:a16="http://schemas.microsoft.com/office/drawing/2014/main" id="{441F152D-67AB-A6D8-25C1-91D6B5302090}"/>
+          <p:cNvPr id="117" name="Elbow Connector 116">
+            <a:extLst>
+              <a:ext uri="{FF2B5EF4-FFF2-40B4-BE49-F238E27FC236}">
+                <a16:creationId xmlns:a16="http://schemas.microsoft.com/office/drawing/2014/main" id="{3FF48B3F-0747-0C57-66BF-8C449C903BA2}"/>
               </a:ext>
             </a:extLst>
           </p:cNvPr>
           <p:cNvCxnSpPr>
             <a:cxnSpLocks/>
+            <a:stCxn id="122" idx="0"/>
+            <a:endCxn id="120" idx="0"/>
           </p:cNvCxnSpPr>
           <p:nvPr/>
         </p:nvCxnSpPr>
         <p:spPr>
           <a:xfrm rot="16200000" flipH="1">
-            <a:off x="15744351" y="3970012"/>
-            <a:ext cx="634555" cy="1504991"/>
-          </a:xfrm>
-          <a:prstGeom prst="bentConnector2">
-            <a:avLst/>
-          </a:prstGeom>
-          <a:ln w="65532">
-            <a:solidFill>
-              <a:srgbClr val="C00000"/>
-            </a:solidFill>
-            <a:headEnd type="oval" w="med" len="med"/>
-            <a:tailEnd type="triangle" w="med" len="med"/>
+            <a:off x="18122024" y="10755156"/>
+            <a:ext cx="1061295" cy="2276912"/>
+          </a:xfrm>
+          <a:prstGeom prst="bentConnector3">
+            <a:avLst>
+              <a:gd name="adj1" fmla="val -21540"/>
+            </a:avLst>
+          </a:prstGeom>
+          <a:ln w="196469">
+            <a:solidFill>
+              <a:schemeClr val="accent1">
+                <a:lumMod val="75000"/>
+              </a:schemeClr>
+            </a:solidFill>
+            <a:tailEnd type="triangle"/>
           </a:ln>
         </p:spPr>
         <p:style>
@@ -25176,29 +26124,31 @@
       </p:cxnSp>
       <p:cxnSp>
         <p:nvCxnSpPr>
-          <p:cNvPr id="38" name="Elbow Connector 37">
-            <a:extLst>
-              <a:ext uri="{FF2B5EF4-FFF2-40B4-BE49-F238E27FC236}">
-                <a16:creationId xmlns:a16="http://schemas.microsoft.com/office/drawing/2014/main" id="{EEBFBB35-94B9-8A1C-6A5E-A7F8D3F81855}"/>
+          <p:cNvPr id="118" name="Elbow Connector 117">
+            <a:extLst>
+              <a:ext uri="{FF2B5EF4-FFF2-40B4-BE49-F238E27FC236}">
+                <a16:creationId xmlns:a16="http://schemas.microsoft.com/office/drawing/2014/main" id="{741D2158-6629-E553-E1EC-C4E1756C408F}"/>
               </a:ext>
             </a:extLst>
           </p:cNvPr>
           <p:cNvCxnSpPr>
             <a:cxnSpLocks/>
+            <a:stCxn id="121" idx="2"/>
+            <a:endCxn id="120" idx="2"/>
           </p:cNvCxnSpPr>
           <p:nvPr/>
         </p:nvCxnSpPr>
         <p:spPr>
-          <a:xfrm rot="16200000" flipH="1">
-            <a:off x="17922003" y="2312205"/>
-            <a:ext cx="1040309" cy="1394631"/>
+          <a:xfrm rot="5400000" flipH="1" flipV="1">
+            <a:off x="18132670" y="12683029"/>
+            <a:ext cx="1040003" cy="2276912"/>
           </a:xfrm>
           <a:prstGeom prst="bentConnector3">
             <a:avLst>
-              <a:gd name="adj1" fmla="val -21974"/>
+              <a:gd name="adj1" fmla="val -21981"/>
             </a:avLst>
           </a:prstGeom>
-          <a:ln w="190246">
+          <a:ln w="195580">
             <a:solidFill>
               <a:schemeClr val="accent1">
                 <a:lumMod val="75000"/>
@@ -25222,60 +26172,12 @@
           </a:fontRef>
         </p:style>
       </p:cxnSp>
-      <p:cxnSp>
-        <p:nvCxnSpPr>
-          <p:cNvPr id="39" name="Elbow Connector 38">
-            <a:extLst>
-              <a:ext uri="{FF2B5EF4-FFF2-40B4-BE49-F238E27FC236}">
-                <a16:creationId xmlns:a16="http://schemas.microsoft.com/office/drawing/2014/main" id="{FD09418F-3BFB-8A52-8E6A-0B8829ACDBF4}"/>
-              </a:ext>
-            </a:extLst>
-          </p:cNvPr>
-          <p:cNvCxnSpPr>
-            <a:cxnSpLocks/>
-          </p:cNvCxnSpPr>
-          <p:nvPr/>
-        </p:nvCxnSpPr>
-        <p:spPr>
-          <a:xfrm rot="5400000" flipH="1" flipV="1">
-            <a:off x="17911663" y="4266352"/>
-            <a:ext cx="1060989" cy="1394631"/>
-          </a:xfrm>
-          <a:prstGeom prst="bentConnector3">
-            <a:avLst>
-              <a:gd name="adj1" fmla="val -21546"/>
-            </a:avLst>
-          </a:prstGeom>
-          <a:ln w="173990">
-            <a:solidFill>
-              <a:schemeClr val="accent1">
-                <a:lumMod val="75000"/>
-              </a:schemeClr>
-            </a:solidFill>
-            <a:tailEnd type="triangle"/>
-          </a:ln>
-        </p:spPr>
-        <p:style>
-          <a:lnRef idx="1">
-            <a:schemeClr val="accent1"/>
-          </a:lnRef>
-          <a:fillRef idx="0">
-            <a:schemeClr val="accent1"/>
-          </a:fillRef>
-          <a:effectRef idx="0">
-            <a:schemeClr val="accent1"/>
-          </a:effectRef>
-          <a:fontRef idx="minor">
-            <a:schemeClr val="tx1"/>
-          </a:fontRef>
-        </p:style>
-      </p:cxnSp>
       <p:sp>
         <p:nvSpPr>
-          <p:cNvPr id="41" name="Rectangle 40">
-            <a:extLst>
-              <a:ext uri="{FF2B5EF4-FFF2-40B4-BE49-F238E27FC236}">
-                <a16:creationId xmlns:a16="http://schemas.microsoft.com/office/drawing/2014/main" id="{94946E1E-98AF-4CD2-4E18-4F875F9D228D}"/>
+          <p:cNvPr id="119" name="Rectangle 118">
+            <a:extLst>
+              <a:ext uri="{FF2B5EF4-FFF2-40B4-BE49-F238E27FC236}">
+                <a16:creationId xmlns:a16="http://schemas.microsoft.com/office/drawing/2014/main" id="{07CD6061-38AF-E689-D1A1-915BA50A72DF}"/>
               </a:ext>
             </a:extLst>
           </p:cNvPr>
@@ -25284,7 +26186,7 @@
         </p:nvSpPr>
         <p:spPr>
           <a:xfrm>
-            <a:off x="11697707" y="3538686"/>
+            <a:off x="11467080" y="12401775"/>
             <a:ext cx="1819398" cy="877223"/>
           </a:xfrm>
           <a:prstGeom prst="rect">
@@ -25342,10 +26244,10 @@
       </p:sp>
       <p:sp>
         <p:nvSpPr>
-          <p:cNvPr id="42" name="Rectangle 41">
-            <a:extLst>
-              <a:ext uri="{FF2B5EF4-FFF2-40B4-BE49-F238E27FC236}">
-                <a16:creationId xmlns:a16="http://schemas.microsoft.com/office/drawing/2014/main" id="{28320FCB-D166-F0A2-1D72-681CD97EAE48}"/>
+          <p:cNvPr id="120" name="Rectangle 119">
+            <a:extLst>
+              <a:ext uri="{FF2B5EF4-FFF2-40B4-BE49-F238E27FC236}">
+                <a16:creationId xmlns:a16="http://schemas.microsoft.com/office/drawing/2014/main" id="{638534B9-D456-40E2-083E-6920B5E8A939}"/>
               </a:ext>
             </a:extLst>
           </p:cNvPr>
@@ -25354,7 +26256,87 @@
         </p:nvSpPr>
         <p:spPr>
           <a:xfrm>
-            <a:off x="11697707" y="1562147"/>
+            <a:off x="18881429" y="12424260"/>
+            <a:ext cx="1819398" cy="877223"/>
+          </a:xfrm>
+          <a:prstGeom prst="rect">
+            <a:avLst/>
+          </a:prstGeom>
+          <a:solidFill>
+            <a:schemeClr val="bg1"/>
+          </a:solidFill>
+          <a:ln w="38100">
+            <a:solidFill>
+              <a:schemeClr val="tx1"/>
+            </a:solidFill>
+          </a:ln>
+        </p:spPr>
+        <p:style>
+          <a:lnRef idx="2">
+            <a:schemeClr val="accent1">
+              <a:shade val="50000"/>
+            </a:schemeClr>
+          </a:lnRef>
+          <a:fillRef idx="1">
+            <a:schemeClr val="accent1"/>
+          </a:fillRef>
+          <a:effectRef idx="0">
+            <a:schemeClr val="accent1"/>
+          </a:effectRef>
+          <a:fontRef idx="minor">
+            <a:schemeClr val="lt1"/>
+          </a:fontRef>
+        </p:style>
+        <p:txBody>
+          <a:bodyPr rtlCol="0" anchor="ctr"/>
+          <a:lstStyle/>
+          <a:p>
+            <a:pPr algn="ctr"/>
+            <a:r>
+              <a:rPr lang="el-GR" sz="2400" b="1" i="1" dirty="0">
+                <a:solidFill>
+                  <a:schemeClr val="tx1"/>
+                </a:solidFill>
+                <a:latin typeface="Arial" panose="020B0604020202020204" pitchFamily="34" charset="0"/>
+                <a:cs typeface="Arial" panose="020B0604020202020204" pitchFamily="34" charset="0"/>
+              </a:rPr>
+              <a:t>Ν</a:t>
+            </a:r>
+            <a:r>
+              <a:rPr lang="en-US" sz="2400" b="1" baseline="-25000" dirty="0">
+                <a:solidFill>
+                  <a:schemeClr val="tx1"/>
+                </a:solidFill>
+                <a:latin typeface="Arial" panose="020B0604020202020204" pitchFamily="34" charset="0"/>
+                <a:cs typeface="Arial" panose="020B0604020202020204" pitchFamily="34" charset="0"/>
+              </a:rPr>
+              <a:t>area</a:t>
+            </a:r>
+            <a:endParaRPr lang="en-US" sz="2400" b="1" i="1" dirty="0">
+              <a:solidFill>
+                <a:schemeClr val="tx1"/>
+              </a:solidFill>
+              <a:latin typeface="Arial" panose="020B0604020202020204" pitchFamily="34" charset="0"/>
+              <a:cs typeface="Arial" panose="020B0604020202020204" pitchFamily="34" charset="0"/>
+            </a:endParaRPr>
+          </a:p>
+        </p:txBody>
+      </p:sp>
+      <p:sp>
+        <p:nvSpPr>
+          <p:cNvPr id="122" name="Rectangle 121">
+            <a:extLst>
+              <a:ext uri="{FF2B5EF4-FFF2-40B4-BE49-F238E27FC236}">
+                <a16:creationId xmlns:a16="http://schemas.microsoft.com/office/drawing/2014/main" id="{44E7514D-E322-67D6-FAAE-AD7D5D60FCE0}"/>
+              </a:ext>
+            </a:extLst>
+          </p:cNvPr>
+          <p:cNvSpPr/>
+          <p:nvPr/>
+        </p:nvSpPr>
+        <p:spPr>
+          <a:xfrm>
+            <a:off x="16604517" y="11362965"/>
             <a:ext cx="1819398" cy="877223"/>
           </a:xfrm>
           <a:prstGeom prst="rect">
@@ -25408,9 +26390,9 @@
                 <a:latin typeface="Arial" panose="020B0604020202020204" pitchFamily="34" charset="0"/>
                 <a:cs typeface="Arial" panose="020B0604020202020204" pitchFamily="34" charset="0"/>
               </a:rPr>
-              <a:t>fixation</a:t>
-            </a:r>
-            <a:endParaRPr lang="en-US" sz="2400" i="1" dirty="0">
+              <a:t>mass</a:t>
+            </a:r>
+            <a:endParaRPr lang="en-US" sz="2400" b="1" i="1" dirty="0">
               <a:solidFill>
                 <a:schemeClr val="tx1"/>
               </a:solidFill>
@@ -25422,10 +26404,10 @@
       </p:sp>
       <p:sp>
         <p:nvSpPr>
-          <p:cNvPr id="43" name="Rectangle 42">
-            <a:extLst>
-              <a:ext uri="{FF2B5EF4-FFF2-40B4-BE49-F238E27FC236}">
-                <a16:creationId xmlns:a16="http://schemas.microsoft.com/office/drawing/2014/main" id="{7B159EFC-27EC-FE45-F2C6-24C857E8F7D8}"/>
+          <p:cNvPr id="124" name="Rectangle 123">
+            <a:extLst>
+              <a:ext uri="{FF2B5EF4-FFF2-40B4-BE49-F238E27FC236}">
+                <a16:creationId xmlns:a16="http://schemas.microsoft.com/office/drawing/2014/main" id="{0B11CFA2-D363-9F33-2E4C-2A83DFC30D7F}"/>
               </a:ext>
             </a:extLst>
           </p:cNvPr>
@@ -25434,7 +26416,7 @@
         </p:nvSpPr>
         <p:spPr>
           <a:xfrm>
-            <a:off x="18229775" y="3540185"/>
+            <a:off x="14189827" y="12391097"/>
             <a:ext cx="1819398" cy="877223"/>
           </a:xfrm>
           <a:prstGeom prst="rect">
@@ -25471,14 +26453,619 @@
           <a:p>
             <a:pPr algn="ctr"/>
             <a:r>
-              <a:rPr lang="el-GR" sz="2400" b="1" i="1" dirty="0">
+              <a:rPr lang="en-US" sz="2400" b="1" i="1" dirty="0">
                 <a:solidFill>
                   <a:schemeClr val="tx1"/>
                 </a:solidFill>
                 <a:latin typeface="Arial" panose="020B0604020202020204" pitchFamily="34" charset="0"/>
                 <a:cs typeface="Arial" panose="020B0604020202020204" pitchFamily="34" charset="0"/>
               </a:rPr>
-              <a:t>Ν</a:t>
+              <a:t>C</a:t>
+            </a:r>
+            <a:r>
+              <a:rPr lang="en-US" sz="2400" b="1" baseline="-25000" dirty="0">
+                <a:solidFill>
+                  <a:schemeClr val="tx1"/>
+                </a:solidFill>
+                <a:latin typeface="Arial" panose="020B0604020202020204" pitchFamily="34" charset="0"/>
+                <a:cs typeface="Arial" panose="020B0604020202020204" pitchFamily="34" charset="0"/>
+              </a:rPr>
+              <a:t>i</a:t>
+            </a:r>
+            <a:r>
+              <a:rPr lang="en-US" sz="2400" b="1" i="1" dirty="0">
+                <a:solidFill>
+                  <a:schemeClr val="tx1"/>
+                </a:solidFill>
+                <a:latin typeface="Arial" panose="020B0604020202020204" pitchFamily="34" charset="0"/>
+                <a:cs typeface="Arial" panose="020B0604020202020204" pitchFamily="34" charset="0"/>
+              </a:rPr>
+              <a:t>:C</a:t>
+            </a:r>
+            <a:r>
+              <a:rPr lang="en-US" sz="2400" b="1" baseline="-25000" dirty="0">
+                <a:solidFill>
+                  <a:schemeClr val="tx1"/>
+                </a:solidFill>
+                <a:latin typeface="Arial" panose="020B0604020202020204" pitchFamily="34" charset="0"/>
+                <a:cs typeface="Arial" panose="020B0604020202020204" pitchFamily="34" charset="0"/>
+              </a:rPr>
+              <a:t>a</a:t>
+            </a:r>
+          </a:p>
+        </p:txBody>
+      </p:sp>
+      <p:cxnSp>
+        <p:nvCxnSpPr>
+          <p:cNvPr id="128" name="Elbow Connector 127">
+            <a:extLst>
+              <a:ext uri="{FF2B5EF4-FFF2-40B4-BE49-F238E27FC236}">
+                <a16:creationId xmlns:a16="http://schemas.microsoft.com/office/drawing/2014/main" id="{95AAB5E0-0ABA-EF78-5C9E-761D69E97560}"/>
+              </a:ext>
+            </a:extLst>
+          </p:cNvPr>
+          <p:cNvCxnSpPr>
+            <a:cxnSpLocks/>
+            <a:stCxn id="123" idx="2"/>
+            <a:endCxn id="125" idx="3"/>
+          </p:cNvCxnSpPr>
+          <p:nvPr/>
+        </p:nvCxnSpPr>
+        <p:spPr>
+          <a:xfrm rot="5400000">
+            <a:off x="11389378" y="10819543"/>
+            <a:ext cx="509098" cy="1453005"/>
+          </a:xfrm>
+          <a:prstGeom prst="bentConnector2">
+            <a:avLst/>
+          </a:prstGeom>
+          <a:ln w="157226">
+            <a:solidFill>
+              <a:srgbClr val="C00000"/>
+            </a:solidFill>
+            <a:headEnd type="oval"/>
+            <a:tailEnd type="triangle"/>
+          </a:ln>
+        </p:spPr>
+        <p:style>
+          <a:lnRef idx="1">
+            <a:schemeClr val="accent1"/>
+          </a:lnRef>
+          <a:fillRef idx="0">
+            <a:schemeClr val="accent1"/>
+          </a:fillRef>
+          <a:effectRef idx="0">
+            <a:schemeClr val="accent1"/>
+          </a:effectRef>
+          <a:fontRef idx="minor">
+            <a:schemeClr val="tx1"/>
+          </a:fontRef>
+        </p:style>
+      </p:cxnSp>
+      <p:cxnSp>
+        <p:nvCxnSpPr>
+          <p:cNvPr id="129" name="Straight Arrow Connector 128">
+            <a:extLst>
+              <a:ext uri="{FF2B5EF4-FFF2-40B4-BE49-F238E27FC236}">
+                <a16:creationId xmlns:a16="http://schemas.microsoft.com/office/drawing/2014/main" id="{CBEC996F-EFEE-1F81-54F0-C8A68684BB24}"/>
+              </a:ext>
+            </a:extLst>
+          </p:cNvPr>
+          <p:cNvCxnSpPr>
+            <a:cxnSpLocks/>
+          </p:cNvCxnSpPr>
+          <p:nvPr/>
+        </p:nvCxnSpPr>
+        <p:spPr>
+          <a:xfrm flipV="1">
+            <a:off x="11013433" y="14176525"/>
+            <a:ext cx="5591084" cy="10678"/>
+          </a:xfrm>
+          <a:prstGeom prst="straightConnector1">
+            <a:avLst/>
+          </a:prstGeom>
+          <a:ln w="52832">
+            <a:solidFill>
+              <a:srgbClr val="C00000"/>
+            </a:solidFill>
+            <a:headEnd type="oval"/>
+            <a:tailEnd type="triangle"/>
+          </a:ln>
+        </p:spPr>
+        <p:style>
+          <a:lnRef idx="1">
+            <a:schemeClr val="accent1"/>
+          </a:lnRef>
+          <a:fillRef idx="0">
+            <a:schemeClr val="accent1"/>
+          </a:fillRef>
+          <a:effectRef idx="0">
+            <a:schemeClr val="accent1"/>
+          </a:effectRef>
+          <a:fontRef idx="minor">
+            <a:schemeClr val="tx1"/>
+          </a:fontRef>
+        </p:style>
+      </p:cxnSp>
+      <p:cxnSp>
+        <p:nvCxnSpPr>
+          <p:cNvPr id="130" name="Elbow Connector 129">
+            <a:extLst>
+              <a:ext uri="{FF2B5EF4-FFF2-40B4-BE49-F238E27FC236}">
+                <a16:creationId xmlns:a16="http://schemas.microsoft.com/office/drawing/2014/main" id="{FFF72A87-448F-FD68-A800-8BC9B0BC1A7C}"/>
+              </a:ext>
+            </a:extLst>
+          </p:cNvPr>
+          <p:cNvCxnSpPr>
+            <a:cxnSpLocks/>
+          </p:cNvCxnSpPr>
+          <p:nvPr/>
+        </p:nvCxnSpPr>
+        <p:spPr>
+          <a:xfrm flipV="1">
+            <a:off x="9599070" y="11362965"/>
+            <a:ext cx="7654848" cy="2550587"/>
+          </a:xfrm>
+          <a:prstGeom prst="bentConnector4">
+            <a:avLst>
+              <a:gd name="adj1" fmla="val -15756"/>
+              <a:gd name="adj2" fmla="val 150047"/>
+            </a:avLst>
+          </a:prstGeom>
+          <a:ln w="53975">
+            <a:solidFill>
+              <a:schemeClr val="accent1">
+                <a:lumMod val="75000"/>
+              </a:schemeClr>
+            </a:solidFill>
+            <a:tailEnd type="triangle"/>
+          </a:ln>
+        </p:spPr>
+        <p:style>
+          <a:lnRef idx="1">
+            <a:schemeClr val="accent1"/>
+          </a:lnRef>
+          <a:fillRef idx="0">
+            <a:schemeClr val="accent1"/>
+          </a:fillRef>
+          <a:effectRef idx="0">
+            <a:schemeClr val="accent1"/>
+          </a:effectRef>
+          <a:fontRef idx="minor">
+            <a:schemeClr val="tx1"/>
+          </a:fontRef>
+        </p:style>
+      </p:cxnSp>
+      <p:cxnSp>
+        <p:nvCxnSpPr>
+          <p:cNvPr id="131" name="Straight Arrow Connector 130">
+            <a:extLst>
+              <a:ext uri="{FF2B5EF4-FFF2-40B4-BE49-F238E27FC236}">
+                <a16:creationId xmlns:a16="http://schemas.microsoft.com/office/drawing/2014/main" id="{21B350C3-6710-69C4-F14E-83A56268B101}"/>
+              </a:ext>
+            </a:extLst>
+          </p:cNvPr>
+          <p:cNvCxnSpPr>
+            <a:stCxn id="121" idx="0"/>
+            <a:endCxn id="122" idx="2"/>
+          </p:cNvCxnSpPr>
+          <p:nvPr/>
+        </p:nvCxnSpPr>
+        <p:spPr>
+          <a:xfrm flipV="1">
+            <a:off x="17514216" y="12240188"/>
+            <a:ext cx="0" cy="1224075"/>
+          </a:xfrm>
+          <a:prstGeom prst="straightConnector1">
+            <a:avLst/>
+          </a:prstGeom>
+          <a:ln w="105664">
+            <a:solidFill>
+              <a:srgbClr val="C00000"/>
+            </a:solidFill>
+            <a:headEnd type="oval"/>
+            <a:tailEnd type="triangle"/>
+          </a:ln>
+        </p:spPr>
+        <p:style>
+          <a:lnRef idx="1">
+            <a:schemeClr val="accent1"/>
+          </a:lnRef>
+          <a:fillRef idx="0">
+            <a:schemeClr val="accent1"/>
+          </a:fillRef>
+          <a:effectRef idx="0">
+            <a:schemeClr val="accent1"/>
+          </a:effectRef>
+          <a:fontRef idx="minor">
+            <a:schemeClr val="tx1"/>
+          </a:fontRef>
+        </p:style>
+      </p:cxnSp>
+      <p:sp>
+        <p:nvSpPr>
+          <p:cNvPr id="133" name="Rectangle 132">
+            <a:extLst>
+              <a:ext uri="{FF2B5EF4-FFF2-40B4-BE49-F238E27FC236}">
+                <a16:creationId xmlns:a16="http://schemas.microsoft.com/office/drawing/2014/main" id="{EDE6B700-7E4D-36F5-8019-D93207022D47}"/>
+              </a:ext>
+            </a:extLst>
+          </p:cNvPr>
+          <p:cNvSpPr/>
+          <p:nvPr/>
+        </p:nvSpPr>
+        <p:spPr>
+          <a:xfrm>
+            <a:off x="9002017" y="13474941"/>
+            <a:ext cx="2011416" cy="877223"/>
+          </a:xfrm>
+          <a:prstGeom prst="rect">
+            <a:avLst/>
+          </a:prstGeom>
+          <a:solidFill>
+            <a:schemeClr val="bg1"/>
+          </a:solidFill>
+          <a:ln w="38100">
+            <a:solidFill>
+              <a:schemeClr val="tx1"/>
+            </a:solidFill>
+          </a:ln>
+        </p:spPr>
+        <p:style>
+          <a:lnRef idx="2">
+            <a:schemeClr val="accent1">
+              <a:shade val="50000"/>
+            </a:schemeClr>
+          </a:lnRef>
+          <a:fillRef idx="1">
+            <a:schemeClr val="accent1"/>
+          </a:fillRef>
+          <a:effectRef idx="0">
+            <a:schemeClr val="accent1"/>
+          </a:effectRef>
+          <a:fontRef idx="minor">
+            <a:schemeClr val="lt1"/>
+          </a:fontRef>
+        </p:style>
+        <p:txBody>
+          <a:bodyPr rtlCol="0" anchor="ctr"/>
+          <a:lstStyle/>
+          <a:p>
+            <a:pPr algn="ctr"/>
+            <a:r>
+              <a:rPr lang="en-US" sz="2400" b="1" i="1" dirty="0">
+                <a:solidFill>
+                  <a:schemeClr val="tx1"/>
+                </a:solidFill>
+                <a:latin typeface="Arial" panose="020B0604020202020204" pitchFamily="34" charset="0"/>
+                <a:cs typeface="Arial" panose="020B0604020202020204" pitchFamily="34" charset="0"/>
+              </a:rPr>
+              <a:t>N availability</a:t>
+            </a:r>
+            <a:endParaRPr lang="en-US" sz="2400" b="1" dirty="0">
+              <a:solidFill>
+                <a:schemeClr val="tx1"/>
+              </a:solidFill>
+              <a:latin typeface="Arial" panose="020B0604020202020204" pitchFamily="34" charset="0"/>
+              <a:cs typeface="Arial" panose="020B0604020202020204" pitchFamily="34" charset="0"/>
+            </a:endParaRPr>
+          </a:p>
+        </p:txBody>
+      </p:sp>
+      <p:cxnSp>
+        <p:nvCxnSpPr>
+          <p:cNvPr id="134" name="Elbow Connector 133">
+            <a:extLst>
+              <a:ext uri="{FF2B5EF4-FFF2-40B4-BE49-F238E27FC236}">
+                <a16:creationId xmlns:a16="http://schemas.microsoft.com/office/drawing/2014/main" id="{7B7B7EC2-6038-BC27-4DFA-844D72777E06}"/>
+              </a:ext>
+            </a:extLst>
+          </p:cNvPr>
+          <p:cNvCxnSpPr>
+            <a:cxnSpLocks/>
+            <a:stCxn id="123" idx="3"/>
+          </p:cNvCxnSpPr>
+          <p:nvPr/>
+        </p:nvCxnSpPr>
+        <p:spPr>
+          <a:xfrm>
+            <a:off x="13280128" y="10852885"/>
+            <a:ext cx="1472331" cy="1538211"/>
+          </a:xfrm>
+          <a:prstGeom prst="bentConnector2">
+            <a:avLst/>
+          </a:prstGeom>
+          <a:ln w="12700">
+            <a:solidFill>
+              <a:schemeClr val="tx1"/>
+            </a:solidFill>
+            <a:prstDash val="dash"/>
+            <a:tailEnd type="triangle"/>
+          </a:ln>
+        </p:spPr>
+        <p:style>
+          <a:lnRef idx="1">
+            <a:schemeClr val="accent1"/>
+          </a:lnRef>
+          <a:fillRef idx="0">
+            <a:schemeClr val="accent1"/>
+          </a:fillRef>
+          <a:effectRef idx="0">
+            <a:schemeClr val="accent1"/>
+          </a:effectRef>
+          <a:fontRef idx="minor">
+            <a:schemeClr val="tx1"/>
+          </a:fontRef>
+        </p:style>
+      </p:cxnSp>
+      <p:cxnSp>
+        <p:nvCxnSpPr>
+          <p:cNvPr id="136" name="Straight Arrow Connector 135">
+            <a:extLst>
+              <a:ext uri="{FF2B5EF4-FFF2-40B4-BE49-F238E27FC236}">
+                <a16:creationId xmlns:a16="http://schemas.microsoft.com/office/drawing/2014/main" id="{98DA0952-81EA-B5E1-54CA-5815E4092406}"/>
+              </a:ext>
+            </a:extLst>
+          </p:cNvPr>
+          <p:cNvCxnSpPr/>
+          <p:nvPr/>
+        </p:nvCxnSpPr>
+        <p:spPr>
+          <a:xfrm>
+            <a:off x="9458901" y="12239205"/>
+            <a:ext cx="0" cy="1225058"/>
+          </a:xfrm>
+          <a:prstGeom prst="straightConnector1">
+            <a:avLst/>
+          </a:prstGeom>
+          <a:ln w="90805">
+            <a:solidFill>
+              <a:srgbClr val="C00000"/>
+            </a:solidFill>
+            <a:headEnd type="oval"/>
+            <a:tailEnd type="triangle"/>
+          </a:ln>
+        </p:spPr>
+        <p:style>
+          <a:lnRef idx="1">
+            <a:schemeClr val="accent1"/>
+          </a:lnRef>
+          <a:fillRef idx="0">
+            <a:schemeClr val="accent1"/>
+          </a:fillRef>
+          <a:effectRef idx="0">
+            <a:schemeClr val="accent1"/>
+          </a:effectRef>
+          <a:fontRef idx="minor">
+            <a:schemeClr val="tx1"/>
+          </a:fontRef>
+        </p:style>
+      </p:cxnSp>
+      <p:sp>
+        <p:nvSpPr>
+          <p:cNvPr id="137" name="Rectangle 136">
+            <a:extLst>
+              <a:ext uri="{FF2B5EF4-FFF2-40B4-BE49-F238E27FC236}">
+                <a16:creationId xmlns:a16="http://schemas.microsoft.com/office/drawing/2014/main" id="{4B544D35-CEF3-646F-9807-3EB20E72B471}"/>
+              </a:ext>
+            </a:extLst>
+          </p:cNvPr>
+          <p:cNvSpPr/>
+          <p:nvPr/>
+        </p:nvSpPr>
+        <p:spPr>
+          <a:xfrm>
+            <a:off x="7239918" y="793025"/>
+            <a:ext cx="2359152" cy="1005840"/>
+          </a:xfrm>
+          <a:prstGeom prst="rect">
+            <a:avLst/>
+          </a:prstGeom>
+          <a:solidFill>
+            <a:schemeClr val="bg1"/>
+          </a:solidFill>
+          <a:ln w="57150">
+            <a:solidFill>
+              <a:schemeClr val="tx1"/>
+            </a:solidFill>
+          </a:ln>
+        </p:spPr>
+        <p:style>
+          <a:lnRef idx="2">
+            <a:schemeClr val="accent1">
+              <a:shade val="15000"/>
+            </a:schemeClr>
+          </a:lnRef>
+          <a:fillRef idx="1">
+            <a:schemeClr val="accent1"/>
+          </a:fillRef>
+          <a:effectRef idx="0">
+            <a:schemeClr val="accent1"/>
+          </a:effectRef>
+          <a:fontRef idx="minor">
+            <a:schemeClr val="lt1"/>
+          </a:fontRef>
+        </p:style>
+        <p:txBody>
+          <a:bodyPr rtlCol="0" anchor="ctr"/>
+          <a:lstStyle/>
+          <a:p>
+            <a:pPr algn="ctr"/>
+            <a:r>
+              <a:rPr lang="en-US" sz="2800" b="1" dirty="0">
+                <a:solidFill>
+                  <a:schemeClr val="tx1"/>
+                </a:solidFill>
+                <a:latin typeface="Arial" panose="020B0604020202020204" pitchFamily="34" charset="0"/>
+                <a:cs typeface="Arial" panose="020B0604020202020204" pitchFamily="34" charset="0"/>
+              </a:rPr>
+              <a:t>C</a:t>
+            </a:r>
+            <a:r>
+              <a:rPr lang="en-US" sz="2800" b="1" baseline="-25000" dirty="0">
+                <a:solidFill>
+                  <a:schemeClr val="tx1"/>
+                </a:solidFill>
+                <a:latin typeface="Arial" panose="020B0604020202020204" pitchFamily="34" charset="0"/>
+                <a:cs typeface="Arial" panose="020B0604020202020204" pitchFamily="34" charset="0"/>
+              </a:rPr>
+              <a:t>3</a:t>
+            </a:r>
+            <a:r>
+              <a:rPr lang="en-US" sz="2800" b="1" dirty="0">
+                <a:solidFill>
+                  <a:schemeClr val="tx1"/>
+                </a:solidFill>
+                <a:latin typeface="Arial" panose="020B0604020202020204" pitchFamily="34" charset="0"/>
+                <a:cs typeface="Arial" panose="020B0604020202020204" pitchFamily="34" charset="0"/>
+              </a:rPr>
+              <a:t> species</a:t>
+            </a:r>
+          </a:p>
+        </p:txBody>
+      </p:sp>
+      <p:sp>
+        <p:nvSpPr>
+          <p:cNvPr id="138" name="Rectangle 137">
+            <a:extLst>
+              <a:ext uri="{FF2B5EF4-FFF2-40B4-BE49-F238E27FC236}">
+                <a16:creationId xmlns:a16="http://schemas.microsoft.com/office/drawing/2014/main" id="{1B74F84B-6587-1E93-0697-5F8D554EEAB2}"/>
+              </a:ext>
+            </a:extLst>
+          </p:cNvPr>
+          <p:cNvSpPr/>
+          <p:nvPr/>
+        </p:nvSpPr>
+        <p:spPr>
+          <a:xfrm>
+            <a:off x="7239918" y="8460620"/>
+            <a:ext cx="2359152" cy="1005840"/>
+          </a:xfrm>
+          <a:prstGeom prst="rect">
+            <a:avLst/>
+          </a:prstGeom>
+          <a:solidFill>
+            <a:schemeClr val="bg1"/>
+          </a:solidFill>
+          <a:ln w="57150">
+            <a:solidFill>
+              <a:schemeClr val="tx1"/>
+            </a:solidFill>
+          </a:ln>
+        </p:spPr>
+        <p:style>
+          <a:lnRef idx="2">
+            <a:schemeClr val="accent1">
+              <a:shade val="15000"/>
+            </a:schemeClr>
+          </a:lnRef>
+          <a:fillRef idx="1">
+            <a:schemeClr val="accent1"/>
+          </a:fillRef>
+          <a:effectRef idx="0">
+            <a:schemeClr val="accent1"/>
+          </a:effectRef>
+          <a:fontRef idx="minor">
+            <a:schemeClr val="lt1"/>
+          </a:fontRef>
+        </p:style>
+        <p:txBody>
+          <a:bodyPr rtlCol="0" anchor="ctr"/>
+          <a:lstStyle/>
+          <a:p>
+            <a:pPr algn="ctr"/>
+            <a:r>
+              <a:rPr lang="en-US" sz="2800" b="1" dirty="0">
+                <a:solidFill>
+                  <a:schemeClr val="tx1"/>
+                </a:solidFill>
+                <a:latin typeface="Arial" panose="020B0604020202020204" pitchFamily="34" charset="0"/>
+                <a:cs typeface="Arial" panose="020B0604020202020204" pitchFamily="34" charset="0"/>
+              </a:rPr>
+              <a:t>C</a:t>
+            </a:r>
+            <a:r>
+              <a:rPr lang="en-US" sz="2800" b="1" baseline="-25000" dirty="0">
+                <a:solidFill>
+                  <a:schemeClr val="tx1"/>
+                </a:solidFill>
+                <a:latin typeface="Arial" panose="020B0604020202020204" pitchFamily="34" charset="0"/>
+                <a:cs typeface="Arial" panose="020B0604020202020204" pitchFamily="34" charset="0"/>
+              </a:rPr>
+              <a:t>4</a:t>
+            </a:r>
+            <a:r>
+              <a:rPr lang="en-US" sz="2800" b="1" dirty="0">
+                <a:solidFill>
+                  <a:schemeClr val="tx1"/>
+                </a:solidFill>
+                <a:latin typeface="Arial" panose="020B0604020202020204" pitchFamily="34" charset="0"/>
+                <a:cs typeface="Arial" panose="020B0604020202020204" pitchFamily="34" charset="0"/>
+              </a:rPr>
+              <a:t> species</a:t>
+            </a:r>
+          </a:p>
+        </p:txBody>
+      </p:sp>
+      <p:sp>
+        <p:nvSpPr>
+          <p:cNvPr id="18" name="Rectangle 17">
+            <a:extLst>
+              <a:ext uri="{FF2B5EF4-FFF2-40B4-BE49-F238E27FC236}">
+                <a16:creationId xmlns:a16="http://schemas.microsoft.com/office/drawing/2014/main" id="{5123465E-6365-184C-F82D-3C89CDF0013E}"/>
+              </a:ext>
+            </a:extLst>
+          </p:cNvPr>
+          <p:cNvSpPr/>
+          <p:nvPr/>
+        </p:nvSpPr>
+        <p:spPr>
+          <a:xfrm>
+            <a:off x="16604517" y="5799171"/>
+            <a:ext cx="1819398" cy="877223"/>
+          </a:xfrm>
+          <a:prstGeom prst="rect">
+            <a:avLst/>
+          </a:prstGeom>
+          <a:solidFill>
+            <a:schemeClr val="bg1"/>
+          </a:solidFill>
+          <a:ln w="38100">
+            <a:solidFill>
+              <a:schemeClr val="tx1"/>
+            </a:solidFill>
+          </a:ln>
+        </p:spPr>
+        <p:style>
+          <a:lnRef idx="2">
+            <a:schemeClr val="accent1">
+              <a:shade val="50000"/>
+            </a:schemeClr>
+          </a:lnRef>
+          <a:fillRef idx="1">
+            <a:schemeClr val="accent1"/>
+          </a:fillRef>
+          <a:effectRef idx="0">
+            <a:schemeClr val="accent1"/>
+          </a:effectRef>
+          <a:fontRef idx="minor">
+            <a:schemeClr val="lt1"/>
+          </a:fontRef>
+        </p:style>
+        <p:txBody>
+          <a:bodyPr rtlCol="0" anchor="ctr"/>
+          <a:lstStyle/>
+          <a:p>
+            <a:pPr algn="ctr"/>
+            <a:r>
+              <a:rPr lang="en-US" sz="2400" b="1" i="1" dirty="0">
+                <a:solidFill>
+                  <a:schemeClr val="tx1"/>
+                </a:solidFill>
+                <a:latin typeface="Arial" panose="020B0604020202020204" pitchFamily="34" charset="0"/>
+                <a:cs typeface="Arial" panose="020B0604020202020204" pitchFamily="34" charset="0"/>
+              </a:rPr>
+              <a:t>M</a:t>
             </a:r>
             <a:r>
               <a:rPr lang="en-US" sz="2400" b="1" baseline="-25000" dirty="0">
@@ -25502,10 +27089,10 @@
       </p:sp>
       <p:sp>
         <p:nvSpPr>
-          <p:cNvPr id="44" name="Rectangle 43">
-            <a:extLst>
-              <a:ext uri="{FF2B5EF4-FFF2-40B4-BE49-F238E27FC236}">
-                <a16:creationId xmlns:a16="http://schemas.microsoft.com/office/drawing/2014/main" id="{6BF891DE-DFE2-9D13-3FB5-FD745634B557}"/>
+          <p:cNvPr id="22" name="Rectangle 21">
+            <a:extLst>
+              <a:ext uri="{FF2B5EF4-FFF2-40B4-BE49-F238E27FC236}">
+                <a16:creationId xmlns:a16="http://schemas.microsoft.com/office/drawing/2014/main" id="{3244C3B3-BFB3-A800-01FE-5E3353CD4BC7}"/>
               </a:ext>
             </a:extLst>
           </p:cNvPr>
@@ -25514,7 +27101,77 @@
         </p:nvSpPr>
         <p:spPr>
           <a:xfrm>
-            <a:off x="16835144" y="4601174"/>
+            <a:off x="9002017" y="5809849"/>
+            <a:ext cx="2011416" cy="877223"/>
+          </a:xfrm>
+          <a:prstGeom prst="rect">
+            <a:avLst/>
+          </a:prstGeom>
+          <a:solidFill>
+            <a:schemeClr val="bg1"/>
+          </a:solidFill>
+          <a:ln w="38100">
+            <a:solidFill>
+              <a:schemeClr val="tx1"/>
+            </a:solidFill>
+          </a:ln>
+        </p:spPr>
+        <p:style>
+          <a:lnRef idx="2">
+            <a:schemeClr val="accent1">
+              <a:shade val="50000"/>
+            </a:schemeClr>
+          </a:lnRef>
+          <a:fillRef idx="1">
+            <a:schemeClr val="accent1"/>
+          </a:fillRef>
+          <a:effectRef idx="0">
+            <a:schemeClr val="accent1"/>
+          </a:effectRef>
+          <a:fontRef idx="minor">
+            <a:schemeClr val="lt1"/>
+          </a:fontRef>
+        </p:style>
+        <p:txBody>
+          <a:bodyPr rtlCol="0" anchor="ctr"/>
+          <a:lstStyle/>
+          <a:p>
+            <a:pPr algn="ctr"/>
+            <a:r>
+              <a:rPr lang="en-US" sz="2400" b="1" i="1" dirty="0">
+                <a:solidFill>
+                  <a:schemeClr val="tx1"/>
+                </a:solidFill>
+                <a:latin typeface="Arial" panose="020B0604020202020204" pitchFamily="34" charset="0"/>
+                <a:cs typeface="Arial" panose="020B0604020202020204" pitchFamily="34" charset="0"/>
+              </a:rPr>
+              <a:t>N availability</a:t>
+            </a:r>
+            <a:endParaRPr lang="en-US" sz="2400" b="1" dirty="0">
+              <a:solidFill>
+                <a:schemeClr val="tx1"/>
+              </a:solidFill>
+              <a:latin typeface="Arial" panose="020B0604020202020204" pitchFamily="34" charset="0"/>
+              <a:cs typeface="Arial" panose="020B0604020202020204" pitchFamily="34" charset="0"/>
+            </a:endParaRPr>
+          </a:p>
+        </p:txBody>
+      </p:sp>
+      <p:sp>
+        <p:nvSpPr>
+          <p:cNvPr id="121" name="Rectangle 120">
+            <a:extLst>
+              <a:ext uri="{FF2B5EF4-FFF2-40B4-BE49-F238E27FC236}">
+                <a16:creationId xmlns:a16="http://schemas.microsoft.com/office/drawing/2014/main" id="{9C4F1978-6E28-9AFB-0B78-5DD0A679A98F}"/>
+              </a:ext>
+            </a:extLst>
+          </p:cNvPr>
+          <p:cNvSpPr/>
+          <p:nvPr/>
+        </p:nvSpPr>
+        <p:spPr>
+          <a:xfrm>
+            <a:off x="16604517" y="13464263"/>
             <a:ext cx="1819398" cy="877223"/>
           </a:xfrm>
           <a:prstGeom prst="rect">
@@ -25582,10 +27239,10 @@
       </p:sp>
       <p:sp>
         <p:nvSpPr>
-          <p:cNvPr id="45" name="Rectangle 44">
-            <a:extLst>
-              <a:ext uri="{FF2B5EF4-FFF2-40B4-BE49-F238E27FC236}">
-                <a16:creationId xmlns:a16="http://schemas.microsoft.com/office/drawing/2014/main" id="{7D5F5F62-F0A6-3AB2-F4A8-2F5FA217E2FE}"/>
+          <p:cNvPr id="123" name="Rectangle 122">
+            <a:extLst>
+              <a:ext uri="{FF2B5EF4-FFF2-40B4-BE49-F238E27FC236}">
+                <a16:creationId xmlns:a16="http://schemas.microsoft.com/office/drawing/2014/main" id="{A3D0FA0D-1025-266A-3EFD-905C037D8388}"/>
               </a:ext>
             </a:extLst>
           </p:cNvPr>
@@ -25594,7 +27251,7 @@
         </p:nvSpPr>
         <p:spPr>
           <a:xfrm>
-            <a:off x="16835144" y="2499876"/>
+            <a:off x="11460730" y="10414273"/>
             <a:ext cx="1819398" cy="877223"/>
           </a:xfrm>
           <a:prstGeom prst="rect">
@@ -25638,180 +27295,7 @@
                 <a:latin typeface="Arial" panose="020B0604020202020204" pitchFamily="34" charset="0"/>
                 <a:cs typeface="Arial" panose="020B0604020202020204" pitchFamily="34" charset="0"/>
               </a:rPr>
-              <a:t>N</a:t>
-            </a:r>
-            <a:r>
-              <a:rPr lang="en-US" sz="2400" b="1" baseline="-25000" dirty="0">
-                <a:solidFill>
-                  <a:schemeClr val="tx1"/>
-                </a:solidFill>
-                <a:latin typeface="Arial" panose="020B0604020202020204" pitchFamily="34" charset="0"/>
-                <a:cs typeface="Arial" panose="020B0604020202020204" pitchFamily="34" charset="0"/>
-              </a:rPr>
-              <a:t>mass</a:t>
-            </a:r>
-            <a:endParaRPr lang="en-US" sz="2400" b="1" i="1" dirty="0">
-              <a:solidFill>
-                <a:schemeClr val="tx1"/>
-              </a:solidFill>
-              <a:latin typeface="Arial" panose="020B0604020202020204" pitchFamily="34" charset="0"/>
-              <a:cs typeface="Arial" panose="020B0604020202020204" pitchFamily="34" charset="0"/>
-            </a:endParaRPr>
-          </a:p>
-        </p:txBody>
-      </p:sp>
-      <p:sp>
-        <p:nvSpPr>
-          <p:cNvPr id="46" name="Rectangle 45">
-            <a:extLst>
-              <a:ext uri="{FF2B5EF4-FFF2-40B4-BE49-F238E27FC236}">
-                <a16:creationId xmlns:a16="http://schemas.microsoft.com/office/drawing/2014/main" id="{701E9487-AEE9-AF08-375A-4CE5F60C6D54}"/>
-              </a:ext>
-            </a:extLst>
-          </p:cNvPr>
-          <p:cNvSpPr/>
-          <p:nvPr/>
-        </p:nvSpPr>
-        <p:spPr>
-          <a:xfrm>
-            <a:off x="14420454" y="3528008"/>
-            <a:ext cx="1819398" cy="877223"/>
-          </a:xfrm>
-          <a:prstGeom prst="rect">
-            <a:avLst/>
-          </a:prstGeom>
-          <a:solidFill>
-            <a:schemeClr val="bg1"/>
-          </a:solidFill>
-          <a:ln w="38100">
-            <a:solidFill>
-              <a:schemeClr val="tx1"/>
-            </a:solidFill>
-          </a:ln>
-        </p:spPr>
-        <p:style>
-          <a:lnRef idx="2">
-            <a:schemeClr val="accent1">
-              <a:shade val="50000"/>
-            </a:schemeClr>
-          </a:lnRef>
-          <a:fillRef idx="1">
-            <a:schemeClr val="accent1"/>
-          </a:fillRef>
-          <a:effectRef idx="0">
-            <a:schemeClr val="accent1"/>
-          </a:effectRef>
-          <a:fontRef idx="minor">
-            <a:schemeClr val="lt1"/>
-          </a:fontRef>
-        </p:style>
-        <p:txBody>
-          <a:bodyPr rtlCol="0" anchor="ctr"/>
-          <a:lstStyle/>
-          <a:p>
-            <a:pPr algn="ctr"/>
-            <a:r>
-              <a:rPr lang="en-US" sz="2400" b="1" i="1" dirty="0">
-                <a:solidFill>
-                  <a:schemeClr val="tx1"/>
-                </a:solidFill>
-                <a:latin typeface="Arial" panose="020B0604020202020204" pitchFamily="34" charset="0"/>
-                <a:cs typeface="Arial" panose="020B0604020202020204" pitchFamily="34" charset="0"/>
-              </a:rPr>
-              <a:t>C</a:t>
-            </a:r>
-            <a:r>
-              <a:rPr lang="en-US" sz="2400" b="1" baseline="-25000" dirty="0">
-                <a:solidFill>
-                  <a:schemeClr val="tx1"/>
-                </a:solidFill>
-                <a:latin typeface="Arial" panose="020B0604020202020204" pitchFamily="34" charset="0"/>
-                <a:cs typeface="Arial" panose="020B0604020202020204" pitchFamily="34" charset="0"/>
-              </a:rPr>
-              <a:t>i</a:t>
-            </a:r>
-            <a:r>
-              <a:rPr lang="en-US" sz="2400" b="1" i="1" dirty="0">
-                <a:solidFill>
-                  <a:schemeClr val="tx1"/>
-                </a:solidFill>
-                <a:latin typeface="Arial" panose="020B0604020202020204" pitchFamily="34" charset="0"/>
-                <a:cs typeface="Arial" panose="020B0604020202020204" pitchFamily="34" charset="0"/>
-              </a:rPr>
-              <a:t>:C</a:t>
-            </a:r>
-            <a:r>
-              <a:rPr lang="en-US" sz="2400" b="1" baseline="-25000" dirty="0">
-                <a:solidFill>
-                  <a:schemeClr val="tx1"/>
-                </a:solidFill>
-                <a:latin typeface="Arial" panose="020B0604020202020204" pitchFamily="34" charset="0"/>
-                <a:cs typeface="Arial" panose="020B0604020202020204" pitchFamily="34" charset="0"/>
-              </a:rPr>
-              <a:t>a</a:t>
-            </a:r>
-          </a:p>
-        </p:txBody>
-      </p:sp>
-      <p:sp>
-        <p:nvSpPr>
-          <p:cNvPr id="47" name="Rectangle 46">
-            <a:extLst>
-              <a:ext uri="{FF2B5EF4-FFF2-40B4-BE49-F238E27FC236}">
-                <a16:creationId xmlns:a16="http://schemas.microsoft.com/office/drawing/2014/main" id="{73D63AA8-E472-4E56-6A4D-456922FB7EE4}"/>
-              </a:ext>
-            </a:extLst>
-          </p:cNvPr>
-          <p:cNvSpPr/>
-          <p:nvPr/>
-        </p:nvSpPr>
-        <p:spPr>
-          <a:xfrm>
-            <a:off x="9232644" y="4611852"/>
-            <a:ext cx="2011416" cy="877223"/>
-          </a:xfrm>
-          <a:prstGeom prst="rect">
-            <a:avLst/>
-          </a:prstGeom>
-          <a:solidFill>
-            <a:schemeClr val="bg1"/>
-          </a:solidFill>
-          <a:ln w="38100">
-            <a:solidFill>
-              <a:schemeClr val="tx1"/>
-            </a:solidFill>
-          </a:ln>
-        </p:spPr>
-        <p:style>
-          <a:lnRef idx="2">
-            <a:schemeClr val="accent1">
-              <a:shade val="50000"/>
-            </a:schemeClr>
-          </a:lnRef>
-          <a:fillRef idx="1">
-            <a:schemeClr val="accent1"/>
-          </a:fillRef>
-          <a:effectRef idx="0">
-            <a:schemeClr val="accent1"/>
-          </a:effectRef>
-          <a:fontRef idx="minor">
-            <a:schemeClr val="lt1"/>
-          </a:fontRef>
-        </p:style>
-        <p:txBody>
-          <a:bodyPr rtlCol="0" anchor="ctr"/>
-          <a:lstStyle/>
-          <a:p>
-            <a:pPr algn="ctr"/>
-            <a:r>
-              <a:rPr lang="en-US" sz="2400" b="1" i="1" dirty="0">
-                <a:solidFill>
-                  <a:schemeClr val="tx1"/>
-                </a:solidFill>
-                <a:latin typeface="Arial" panose="020B0604020202020204" pitchFamily="34" charset="0"/>
-                <a:cs typeface="Arial" panose="020B0604020202020204" pitchFamily="34" charset="0"/>
-              </a:rPr>
-              <a:t>N availability</a:t>
+              <a:t>VPD</a:t>
             </a:r>
             <a:endParaRPr lang="en-US" sz="2400" b="1" dirty="0">
               <a:solidFill>
@@ -25825,10 +27309,10 @@
       </p:sp>
       <p:sp>
         <p:nvSpPr>
-          <p:cNvPr id="48" name="Rectangle 47">
-            <a:extLst>
-              <a:ext uri="{FF2B5EF4-FFF2-40B4-BE49-F238E27FC236}">
-                <a16:creationId xmlns:a16="http://schemas.microsoft.com/office/drawing/2014/main" id="{EFCFB132-3FB5-72D8-6C47-6B0E44401C93}"/>
+          <p:cNvPr id="125" name="Rectangle 124">
+            <a:extLst>
+              <a:ext uri="{FF2B5EF4-FFF2-40B4-BE49-F238E27FC236}">
+                <a16:creationId xmlns:a16="http://schemas.microsoft.com/office/drawing/2014/main" id="{5C207482-5FB8-477F-09C3-E31A8AE7FE8C}"/>
               </a:ext>
             </a:extLst>
           </p:cNvPr>
@@ -25837,7 +27321,7 @@
         </p:nvSpPr>
         <p:spPr>
           <a:xfrm>
-            <a:off x="9328653" y="2498893"/>
+            <a:off x="9098026" y="11361982"/>
             <a:ext cx="1819398" cy="877223"/>
           </a:xfrm>
           <a:prstGeom prst="rect">
@@ -25893,12 +27377,56 @@
           </a:p>
         </p:txBody>
       </p:sp>
+      <p:cxnSp>
+        <p:nvCxnSpPr>
+          <p:cNvPr id="161" name="Elbow Connector 160">
+            <a:extLst>
+              <a:ext uri="{FF2B5EF4-FFF2-40B4-BE49-F238E27FC236}">
+                <a16:creationId xmlns:a16="http://schemas.microsoft.com/office/drawing/2014/main" id="{F6DDB46A-B963-3F96-046F-4EDE45177B15}"/>
+              </a:ext>
+            </a:extLst>
+          </p:cNvPr>
+          <p:cNvCxnSpPr>
+            <a:stCxn id="20" idx="3"/>
+          </p:cNvCxnSpPr>
+          <p:nvPr/>
+        </p:nvCxnSpPr>
+        <p:spPr>
+          <a:xfrm>
+            <a:off x="13280128" y="3187793"/>
+            <a:ext cx="452605" cy="983074"/>
+          </a:xfrm>
+          <a:prstGeom prst="bentConnector2">
+            <a:avLst/>
+          </a:prstGeom>
+          <a:ln w="57911">
+            <a:solidFill>
+              <a:srgbClr val="C00000"/>
+            </a:solidFill>
+            <a:headEnd type="oval"/>
+          </a:ln>
+        </p:spPr>
+        <p:style>
+          <a:lnRef idx="1">
+            <a:schemeClr val="accent1"/>
+          </a:lnRef>
+          <a:fillRef idx="0">
+            <a:schemeClr val="accent1"/>
+          </a:fillRef>
+          <a:effectRef idx="0">
+            <a:schemeClr val="accent1"/>
+          </a:effectRef>
+          <a:fontRef idx="minor">
+            <a:schemeClr val="tx1"/>
+          </a:fontRef>
+        </p:style>
+      </p:cxnSp>
       <p:sp>
         <p:nvSpPr>
-          <p:cNvPr id="49" name="Rectangle 48">
-            <a:extLst>
-              <a:ext uri="{FF2B5EF4-FFF2-40B4-BE49-F238E27FC236}">
-                <a16:creationId xmlns:a16="http://schemas.microsoft.com/office/drawing/2014/main" id="{B52FD14F-6F73-8B8C-21A4-795130C7132B}"/>
+          <p:cNvPr id="20" name="Rectangle 19">
+            <a:extLst>
+              <a:ext uri="{FF2B5EF4-FFF2-40B4-BE49-F238E27FC236}">
+                <a16:creationId xmlns:a16="http://schemas.microsoft.com/office/drawing/2014/main" id="{D9301AC8-820A-6905-E94D-B1A43A6E26EF}"/>
               </a:ext>
             </a:extLst>
           </p:cNvPr>
@@ -25907,7 +27435,7 @@
         </p:nvSpPr>
         <p:spPr>
           <a:xfrm>
-            <a:off x="13922220" y="1562147"/>
+            <a:off x="11460730" y="2749181"/>
             <a:ext cx="1819398" cy="877223"/>
           </a:xfrm>
           <a:prstGeom prst="rect">
@@ -25963,1576 +27491,10 @@
           </a:p>
         </p:txBody>
       </p:sp>
-      <p:cxnSp>
-        <p:nvCxnSpPr>
-          <p:cNvPr id="53" name="Straight Arrow Connector 52">
-            <a:extLst>
-              <a:ext uri="{FF2B5EF4-FFF2-40B4-BE49-F238E27FC236}">
-                <a16:creationId xmlns:a16="http://schemas.microsoft.com/office/drawing/2014/main" id="{9E1E3C21-AED1-2DA9-FC9F-68C67EBA3B77}"/>
-              </a:ext>
-            </a:extLst>
-          </p:cNvPr>
-          <p:cNvCxnSpPr/>
-          <p:nvPr/>
-        </p:nvCxnSpPr>
-        <p:spPr>
-          <a:xfrm>
-            <a:off x="11211729" y="12213921"/>
-            <a:ext cx="5556606" cy="0"/>
-          </a:xfrm>
-          <a:prstGeom prst="straightConnector1">
-            <a:avLst/>
-          </a:prstGeom>
-          <a:ln w="53848">
-            <a:solidFill>
-              <a:srgbClr val="C00000">
-                <a:alpha val="50000"/>
-              </a:srgbClr>
-            </a:solidFill>
-            <a:headEnd type="oval" w="med" len="med"/>
-            <a:tailEnd type="triangle" w="med" len="med"/>
-          </a:ln>
-        </p:spPr>
-        <p:style>
-          <a:lnRef idx="1">
-            <a:schemeClr val="accent1"/>
-          </a:lnRef>
-          <a:fillRef idx="0">
-            <a:schemeClr val="accent1"/>
-          </a:fillRef>
-          <a:effectRef idx="0">
-            <a:schemeClr val="accent1"/>
-          </a:effectRef>
-          <a:fontRef idx="minor">
-            <a:schemeClr val="tx1"/>
-          </a:fontRef>
-        </p:style>
-      </p:cxnSp>
-      <p:cxnSp>
-        <p:nvCxnSpPr>
-          <p:cNvPr id="54" name="Elbow Connector 53">
-            <a:extLst>
-              <a:ext uri="{FF2B5EF4-FFF2-40B4-BE49-F238E27FC236}">
-                <a16:creationId xmlns:a16="http://schemas.microsoft.com/office/drawing/2014/main" id="{F58ED126-7DD4-3369-A686-D333008245AB}"/>
-              </a:ext>
-            </a:extLst>
-          </p:cNvPr>
-          <p:cNvCxnSpPr>
-            <a:cxnSpLocks/>
-          </p:cNvCxnSpPr>
-          <p:nvPr/>
-        </p:nvCxnSpPr>
-        <p:spPr>
-          <a:xfrm flipV="1">
-            <a:off x="12928626" y="10222639"/>
-            <a:ext cx="3864664" cy="264294"/>
-          </a:xfrm>
-          <a:prstGeom prst="bentConnector3">
-            <a:avLst>
-              <a:gd name="adj1" fmla="val 50"/>
-            </a:avLst>
-          </a:prstGeom>
-          <a:ln w="36195">
-            <a:solidFill>
-              <a:srgbClr val="C00000">
-                <a:alpha val="50000"/>
-              </a:srgbClr>
-            </a:solidFill>
-            <a:headEnd type="oval" w="med" len="med"/>
-            <a:tailEnd type="triangle" w="med" len="med"/>
-          </a:ln>
-        </p:spPr>
-        <p:style>
-          <a:lnRef idx="1">
-            <a:schemeClr val="accent1"/>
-          </a:lnRef>
-          <a:fillRef idx="0">
-            <a:schemeClr val="accent1"/>
-          </a:fillRef>
-          <a:effectRef idx="0">
-            <a:schemeClr val="accent1"/>
-          </a:effectRef>
-          <a:fontRef idx="minor">
-            <a:schemeClr val="tx1"/>
-          </a:fontRef>
-        </p:style>
-      </p:cxnSp>
-      <p:cxnSp>
-        <p:nvCxnSpPr>
-          <p:cNvPr id="55" name="Elbow Connector 54">
-            <a:extLst>
-              <a:ext uri="{FF2B5EF4-FFF2-40B4-BE49-F238E27FC236}">
-                <a16:creationId xmlns:a16="http://schemas.microsoft.com/office/drawing/2014/main" id="{F24F7257-3949-B91E-7804-80AC937BB514}"/>
-              </a:ext>
-            </a:extLst>
-          </p:cNvPr>
-          <p:cNvCxnSpPr>
-            <a:cxnSpLocks/>
-          </p:cNvCxnSpPr>
-          <p:nvPr/>
-        </p:nvCxnSpPr>
-        <p:spPr>
-          <a:xfrm rot="5400000" flipH="1" flipV="1">
-            <a:off x="10699753" y="10601505"/>
-            <a:ext cx="452840" cy="1459354"/>
-          </a:xfrm>
-          <a:prstGeom prst="bentConnector2">
-            <a:avLst/>
-          </a:prstGeom>
-          <a:ln w="18161">
-            <a:solidFill>
-              <a:srgbClr val="C00000"/>
-            </a:solidFill>
-            <a:headEnd type="oval" w="med" len="med"/>
-            <a:tailEnd type="triangle" w="med" len="med"/>
-          </a:ln>
-        </p:spPr>
-        <p:style>
-          <a:lnRef idx="1">
-            <a:schemeClr val="accent1"/>
-          </a:lnRef>
-          <a:fillRef idx="0">
-            <a:schemeClr val="accent1"/>
-          </a:fillRef>
-          <a:effectRef idx="0">
-            <a:schemeClr val="accent1"/>
-          </a:effectRef>
-          <a:fontRef idx="minor">
-            <a:schemeClr val="tx1"/>
-          </a:fontRef>
-        </p:style>
-      </p:cxnSp>
-      <p:cxnSp>
-        <p:nvCxnSpPr>
-          <p:cNvPr id="56" name="Straight Arrow Connector 55">
-            <a:extLst>
-              <a:ext uri="{FF2B5EF4-FFF2-40B4-BE49-F238E27FC236}">
-                <a16:creationId xmlns:a16="http://schemas.microsoft.com/office/drawing/2014/main" id="{142FB3DE-CA9F-D588-7C55-6DEFBD578529}"/>
-              </a:ext>
-            </a:extLst>
-          </p:cNvPr>
-          <p:cNvCxnSpPr>
-            <a:stCxn id="74" idx="2"/>
-            <a:endCxn id="73" idx="0"/>
-          </p:cNvCxnSpPr>
-          <p:nvPr/>
-        </p:nvCxnSpPr>
-        <p:spPr>
-          <a:xfrm>
-            <a:off x="12565550" y="9404170"/>
-            <a:ext cx="0" cy="1099316"/>
-          </a:xfrm>
-          <a:prstGeom prst="straightConnector1">
-            <a:avLst/>
-          </a:prstGeom>
-          <a:ln w="24130">
-            <a:solidFill>
-              <a:schemeClr val="bg1">
-                <a:lumMod val="50000"/>
-              </a:schemeClr>
-            </a:solidFill>
-            <a:prstDash val="sysDash"/>
-            <a:tailEnd type="triangle"/>
-          </a:ln>
-        </p:spPr>
-        <p:style>
-          <a:lnRef idx="1">
-            <a:schemeClr val="accent1"/>
-          </a:lnRef>
-          <a:fillRef idx="0">
-            <a:schemeClr val="accent1"/>
-          </a:fillRef>
-          <a:effectRef idx="0">
-            <a:schemeClr val="accent1"/>
-          </a:effectRef>
-          <a:fontRef idx="minor">
-            <a:schemeClr val="tx1"/>
-          </a:fontRef>
-        </p:style>
-      </p:cxnSp>
-      <p:cxnSp>
-        <p:nvCxnSpPr>
-          <p:cNvPr id="57" name="Elbow Connector 56">
-            <a:extLst>
-              <a:ext uri="{FF2B5EF4-FFF2-40B4-BE49-F238E27FC236}">
-                <a16:creationId xmlns:a16="http://schemas.microsoft.com/office/drawing/2014/main" id="{B3FA17EC-6FFB-E863-C38F-119116D7D946}"/>
-              </a:ext>
-            </a:extLst>
-          </p:cNvPr>
-          <p:cNvCxnSpPr>
-            <a:cxnSpLocks/>
-          </p:cNvCxnSpPr>
-          <p:nvPr/>
-        </p:nvCxnSpPr>
-        <p:spPr>
-          <a:xfrm flipV="1">
-            <a:off x="10149570" y="9464676"/>
-            <a:ext cx="7049147" cy="2539909"/>
-          </a:xfrm>
-          <a:prstGeom prst="bentConnector4">
-            <a:avLst>
-              <a:gd name="adj1" fmla="val -15739"/>
-              <a:gd name="adj2" fmla="val 146522"/>
-            </a:avLst>
-          </a:prstGeom>
-          <a:ln w="35052">
-            <a:solidFill>
-              <a:schemeClr val="accent1">
-                <a:lumMod val="75000"/>
-                <a:alpha val="50000"/>
-              </a:schemeClr>
-            </a:solidFill>
-            <a:tailEnd type="triangle"/>
-          </a:ln>
-        </p:spPr>
-        <p:style>
-          <a:lnRef idx="1">
-            <a:schemeClr val="accent1"/>
-          </a:lnRef>
-          <a:fillRef idx="0">
-            <a:schemeClr val="accent1"/>
-          </a:fillRef>
-          <a:effectRef idx="0">
-            <a:schemeClr val="accent1"/>
-          </a:effectRef>
-          <a:fontRef idx="minor">
-            <a:schemeClr val="tx1"/>
-          </a:fontRef>
-        </p:style>
-      </p:cxnSp>
-      <p:cxnSp>
-        <p:nvCxnSpPr>
-          <p:cNvPr id="58" name="Straight Arrow Connector 57">
-            <a:extLst>
-              <a:ext uri="{FF2B5EF4-FFF2-40B4-BE49-F238E27FC236}">
-                <a16:creationId xmlns:a16="http://schemas.microsoft.com/office/drawing/2014/main" id="{9DA5E375-F10C-41D8-AE55-D8F6B0CA9618}"/>
-              </a:ext>
-            </a:extLst>
-          </p:cNvPr>
-          <p:cNvCxnSpPr>
-            <a:stCxn id="76" idx="0"/>
-            <a:endCxn id="77" idx="2"/>
-          </p:cNvCxnSpPr>
-          <p:nvPr/>
-        </p:nvCxnSpPr>
-        <p:spPr>
-          <a:xfrm flipV="1">
-            <a:off x="17702987" y="10341899"/>
-            <a:ext cx="0" cy="1224075"/>
-          </a:xfrm>
-          <a:prstGeom prst="straightConnector1">
-            <a:avLst/>
-          </a:prstGeom>
-          <a:ln w="78994">
-            <a:solidFill>
-              <a:srgbClr val="C00000">
-                <a:alpha val="50000"/>
-              </a:srgbClr>
-            </a:solidFill>
-            <a:headEnd type="oval" w="med" len="med"/>
-            <a:tailEnd type="triangle" w="med" len="med"/>
-          </a:ln>
-        </p:spPr>
-        <p:style>
-          <a:lnRef idx="1">
-            <a:schemeClr val="accent1"/>
-          </a:lnRef>
-          <a:fillRef idx="0">
-            <a:schemeClr val="accent1"/>
-          </a:fillRef>
-          <a:effectRef idx="0">
-            <a:schemeClr val="accent1"/>
-          </a:effectRef>
-          <a:fontRef idx="minor">
-            <a:schemeClr val="tx1"/>
-          </a:fontRef>
-        </p:style>
-      </p:cxnSp>
-      <p:cxnSp>
-        <p:nvCxnSpPr>
-          <p:cNvPr id="59" name="Elbow Connector 58">
-            <a:extLst>
-              <a:ext uri="{FF2B5EF4-FFF2-40B4-BE49-F238E27FC236}">
-                <a16:creationId xmlns:a16="http://schemas.microsoft.com/office/drawing/2014/main" id="{D809BA5C-DD3C-034C-82DA-7E6A71C3727A}"/>
-              </a:ext>
-            </a:extLst>
-          </p:cNvPr>
-          <p:cNvCxnSpPr>
-            <a:cxnSpLocks/>
-          </p:cNvCxnSpPr>
-          <p:nvPr/>
-        </p:nvCxnSpPr>
-        <p:spPr>
-          <a:xfrm rot="16200000" flipH="1">
-            <a:off x="14723037" y="7609759"/>
-            <a:ext cx="241362" cy="3830184"/>
-          </a:xfrm>
-          <a:prstGeom prst="bentConnector2">
-            <a:avLst/>
-          </a:prstGeom>
-          <a:ln w="60960">
-            <a:solidFill>
-              <a:schemeClr val="accent1">
-                <a:lumMod val="75000"/>
-                <a:alpha val="50000"/>
-              </a:schemeClr>
-            </a:solidFill>
-            <a:tailEnd type="triangle"/>
-          </a:ln>
-        </p:spPr>
-        <p:style>
-          <a:lnRef idx="1">
-            <a:schemeClr val="accent1"/>
-          </a:lnRef>
-          <a:fillRef idx="0">
-            <a:schemeClr val="accent1"/>
-          </a:fillRef>
-          <a:effectRef idx="0">
-            <a:schemeClr val="accent1"/>
-          </a:effectRef>
-          <a:fontRef idx="minor">
-            <a:schemeClr val="tx1"/>
-          </a:fontRef>
-        </p:style>
-      </p:cxnSp>
-      <p:cxnSp>
-        <p:nvCxnSpPr>
-          <p:cNvPr id="62" name="Elbow Connector 61">
-            <a:extLst>
-              <a:ext uri="{FF2B5EF4-FFF2-40B4-BE49-F238E27FC236}">
-                <a16:creationId xmlns:a16="http://schemas.microsoft.com/office/drawing/2014/main" id="{1D959147-3D46-8C6F-3373-C29B4F93176E}"/>
-              </a:ext>
-            </a:extLst>
-          </p:cNvPr>
-          <p:cNvCxnSpPr>
-            <a:cxnSpLocks/>
-          </p:cNvCxnSpPr>
-          <p:nvPr/>
-        </p:nvCxnSpPr>
-        <p:spPr>
-          <a:xfrm>
-            <a:off x="11123479" y="9747158"/>
-            <a:ext cx="3922766" cy="729775"/>
-          </a:xfrm>
-          <a:prstGeom prst="bentConnector3">
-            <a:avLst>
-              <a:gd name="adj1" fmla="val 100020"/>
-            </a:avLst>
-          </a:prstGeom>
-          <a:ln w="14731">
-            <a:solidFill>
-              <a:srgbClr val="C00000">
-                <a:alpha val="50000"/>
-              </a:srgbClr>
-            </a:solidFill>
-            <a:headEnd type="oval" w="med" len="med"/>
-            <a:tailEnd type="triangle" w="med" len="med"/>
-          </a:ln>
-        </p:spPr>
-        <p:style>
-          <a:lnRef idx="1">
-            <a:schemeClr val="accent1"/>
-          </a:lnRef>
-          <a:fillRef idx="0">
-            <a:schemeClr val="accent1"/>
-          </a:fillRef>
-          <a:effectRef idx="0">
-            <a:schemeClr val="accent1"/>
-          </a:effectRef>
-          <a:fontRef idx="minor">
-            <a:schemeClr val="tx1"/>
-          </a:fontRef>
-        </p:style>
-      </p:cxnSp>
-      <p:cxnSp>
-        <p:nvCxnSpPr>
-          <p:cNvPr id="63" name="Straight Arrow Connector 62">
-            <a:extLst>
-              <a:ext uri="{FF2B5EF4-FFF2-40B4-BE49-F238E27FC236}">
-                <a16:creationId xmlns:a16="http://schemas.microsoft.com/office/drawing/2014/main" id="{75CD2F80-75C2-1E2B-4E98-A467EBBEF8A4}"/>
-              </a:ext>
-            </a:extLst>
-          </p:cNvPr>
-          <p:cNvCxnSpPr>
-            <a:cxnSpLocks/>
-          </p:cNvCxnSpPr>
-          <p:nvPr/>
-        </p:nvCxnSpPr>
-        <p:spPr>
-          <a:xfrm>
-            <a:off x="9645300" y="10357374"/>
-            <a:ext cx="0" cy="1200465"/>
-          </a:xfrm>
-          <a:prstGeom prst="straightConnector1">
-            <a:avLst/>
-          </a:prstGeom>
-          <a:ln w="41910">
-            <a:solidFill>
-              <a:srgbClr val="C00000">
-                <a:alpha val="50000"/>
-              </a:srgbClr>
-            </a:solidFill>
-            <a:headEnd type="oval" w="med" len="med"/>
-            <a:tailEnd type="triangle" w="med" len="med"/>
-          </a:ln>
-        </p:spPr>
-        <p:style>
-          <a:lnRef idx="1">
-            <a:schemeClr val="accent1"/>
-          </a:lnRef>
-          <a:fillRef idx="0">
-            <a:schemeClr val="accent1"/>
-          </a:fillRef>
-          <a:effectRef idx="0">
-            <a:schemeClr val="accent1"/>
-          </a:effectRef>
-          <a:fontRef idx="minor">
-            <a:schemeClr val="tx1"/>
-          </a:fontRef>
-        </p:style>
-      </p:cxnSp>
-      <p:cxnSp>
-        <p:nvCxnSpPr>
-          <p:cNvPr id="64" name="Elbow Connector 63">
-            <a:extLst>
-              <a:ext uri="{FF2B5EF4-FFF2-40B4-BE49-F238E27FC236}">
-                <a16:creationId xmlns:a16="http://schemas.microsoft.com/office/drawing/2014/main" id="{F120BA14-DB94-690C-A88A-7F7B968525C3}"/>
-              </a:ext>
-            </a:extLst>
-          </p:cNvPr>
-          <p:cNvCxnSpPr>
-            <a:cxnSpLocks/>
-          </p:cNvCxnSpPr>
-          <p:nvPr/>
-        </p:nvCxnSpPr>
-        <p:spPr>
-          <a:xfrm rot="10800000" flipV="1">
-            <a:off x="11123480" y="9394674"/>
-            <a:ext cx="3199099" cy="650028"/>
-          </a:xfrm>
-          <a:prstGeom prst="bentConnector3">
-            <a:avLst>
-              <a:gd name="adj1" fmla="val 97"/>
-            </a:avLst>
-          </a:prstGeom>
-          <a:ln w="142875">
-            <a:solidFill>
-              <a:srgbClr val="C00000">
-                <a:alpha val="50000"/>
-              </a:srgbClr>
-            </a:solidFill>
-            <a:headEnd type="oval" w="med" len="med"/>
-            <a:tailEnd type="triangle" w="med" len="med"/>
-          </a:ln>
-        </p:spPr>
-        <p:style>
-          <a:lnRef idx="1">
-            <a:schemeClr val="accent1"/>
-          </a:lnRef>
-          <a:fillRef idx="0">
-            <a:schemeClr val="accent1"/>
-          </a:fillRef>
-          <a:effectRef idx="0">
-            <a:schemeClr val="accent1"/>
-          </a:effectRef>
-          <a:fontRef idx="minor">
-            <a:schemeClr val="tx1"/>
-          </a:fontRef>
-        </p:style>
-      </p:cxnSp>
-      <p:cxnSp>
-        <p:nvCxnSpPr>
-          <p:cNvPr id="65" name="Elbow Connector 64">
-            <a:extLst>
-              <a:ext uri="{FF2B5EF4-FFF2-40B4-BE49-F238E27FC236}">
-                <a16:creationId xmlns:a16="http://schemas.microsoft.com/office/drawing/2014/main" id="{13B23709-0B52-4175-8B21-FFA6A49AE86F}"/>
-              </a:ext>
-            </a:extLst>
-          </p:cNvPr>
-          <p:cNvCxnSpPr>
-            <a:cxnSpLocks/>
-          </p:cNvCxnSpPr>
-          <p:nvPr/>
-        </p:nvCxnSpPr>
-        <p:spPr>
-          <a:xfrm rot="16200000" flipH="1">
-            <a:off x="10625582" y="9661978"/>
-            <a:ext cx="601182" cy="1459355"/>
-          </a:xfrm>
-          <a:prstGeom prst="bentConnector2">
-            <a:avLst/>
-          </a:prstGeom>
-          <a:ln w="19177">
-            <a:solidFill>
-              <a:schemeClr val="accent1">
-                <a:lumMod val="75000"/>
-              </a:schemeClr>
-            </a:solidFill>
-            <a:tailEnd type="triangle"/>
-          </a:ln>
-        </p:spPr>
-        <p:style>
-          <a:lnRef idx="1">
-            <a:schemeClr val="accent1"/>
-          </a:lnRef>
-          <a:fillRef idx="0">
-            <a:schemeClr val="accent1"/>
-          </a:fillRef>
-          <a:effectRef idx="0">
-            <a:schemeClr val="accent1"/>
-          </a:effectRef>
-          <a:fontRef idx="minor">
-            <a:schemeClr val="tx1"/>
-          </a:fontRef>
-        </p:style>
-      </p:cxnSp>
-      <p:cxnSp>
-        <p:nvCxnSpPr>
-          <p:cNvPr id="66" name="Straight Arrow Connector 65">
-            <a:extLst>
-              <a:ext uri="{FF2B5EF4-FFF2-40B4-BE49-F238E27FC236}">
-                <a16:creationId xmlns:a16="http://schemas.microsoft.com/office/drawing/2014/main" id="{1160F1F7-7D61-ECFA-7464-2DB12E637AC2}"/>
-              </a:ext>
-            </a:extLst>
-          </p:cNvPr>
-          <p:cNvCxnSpPr>
-            <a:cxnSpLocks/>
-          </p:cNvCxnSpPr>
-          <p:nvPr/>
-        </p:nvCxnSpPr>
-        <p:spPr>
-          <a:xfrm>
-            <a:off x="13475249" y="10931419"/>
-            <a:ext cx="892510" cy="0"/>
-          </a:xfrm>
-          <a:prstGeom prst="straightConnector1">
-            <a:avLst/>
-          </a:prstGeom>
-          <a:ln w="66802">
-            <a:solidFill>
-              <a:schemeClr val="accent1">
-                <a:lumMod val="75000"/>
-              </a:schemeClr>
-            </a:solidFill>
-            <a:tailEnd type="triangle"/>
-          </a:ln>
-        </p:spPr>
-        <p:style>
-          <a:lnRef idx="1">
-            <a:schemeClr val="accent1"/>
-          </a:lnRef>
-          <a:fillRef idx="0">
-            <a:schemeClr val="accent1"/>
-          </a:fillRef>
-          <a:effectRef idx="0">
-            <a:schemeClr val="accent1"/>
-          </a:effectRef>
-          <a:fontRef idx="minor">
-            <a:schemeClr val="tx1"/>
-          </a:fontRef>
-        </p:style>
-      </p:cxnSp>
-      <p:cxnSp>
-        <p:nvCxnSpPr>
-          <p:cNvPr id="67" name="Straight Arrow Connector 66">
-            <a:extLst>
-              <a:ext uri="{FF2B5EF4-FFF2-40B4-BE49-F238E27FC236}">
-                <a16:creationId xmlns:a16="http://schemas.microsoft.com/office/drawing/2014/main" id="{8431E736-75D3-EE50-12CB-B1EAC0FEF0CF}"/>
-              </a:ext>
-            </a:extLst>
-          </p:cNvPr>
-          <p:cNvCxnSpPr>
-            <a:cxnSpLocks/>
-          </p:cNvCxnSpPr>
-          <p:nvPr/>
-        </p:nvCxnSpPr>
-        <p:spPr>
-          <a:xfrm>
-            <a:off x="14787585" y="9429816"/>
-            <a:ext cx="5843" cy="1050299"/>
-          </a:xfrm>
-          <a:prstGeom prst="straightConnector1">
-            <a:avLst/>
-          </a:prstGeom>
-          <a:ln w="20193">
-            <a:solidFill>
-              <a:srgbClr val="C00000"/>
-            </a:solidFill>
-            <a:headEnd type="oval"/>
-            <a:tailEnd type="triangle"/>
-          </a:ln>
-        </p:spPr>
-        <p:style>
-          <a:lnRef idx="1">
-            <a:schemeClr val="accent1"/>
-          </a:lnRef>
-          <a:fillRef idx="0">
-            <a:schemeClr val="accent1"/>
-          </a:fillRef>
-          <a:effectRef idx="0">
-            <a:schemeClr val="accent1"/>
-          </a:effectRef>
-          <a:fontRef idx="minor">
-            <a:schemeClr val="tx1"/>
-          </a:fontRef>
-        </p:style>
-      </p:cxnSp>
-      <p:cxnSp>
-        <p:nvCxnSpPr>
-          <p:cNvPr id="68" name="Elbow Connector 67">
-            <a:extLst>
-              <a:ext uri="{FF2B5EF4-FFF2-40B4-BE49-F238E27FC236}">
-                <a16:creationId xmlns:a16="http://schemas.microsoft.com/office/drawing/2014/main" id="{36B0EDF3-3D7C-D7B5-7B86-DBC6C0C895C6}"/>
-              </a:ext>
-            </a:extLst>
-          </p:cNvPr>
-          <p:cNvCxnSpPr>
-            <a:stCxn id="78" idx="0"/>
-            <a:endCxn id="77" idx="1"/>
-          </p:cNvCxnSpPr>
-          <p:nvPr/>
-        </p:nvCxnSpPr>
-        <p:spPr>
-          <a:xfrm rot="5400000" flipH="1" flipV="1">
-            <a:off x="15746032" y="9445553"/>
-            <a:ext cx="589520" cy="1504991"/>
-          </a:xfrm>
-          <a:prstGeom prst="bentConnector2">
-            <a:avLst/>
-          </a:prstGeom>
-          <a:ln w="39116">
-            <a:solidFill>
-              <a:schemeClr val="bg1">
-                <a:lumMod val="50000"/>
-              </a:schemeClr>
-            </a:solidFill>
-            <a:prstDash val="sysDash"/>
-            <a:tailEnd type="triangle"/>
-          </a:ln>
-        </p:spPr>
-        <p:style>
-          <a:lnRef idx="1">
-            <a:schemeClr val="accent1"/>
-          </a:lnRef>
-          <a:fillRef idx="0">
-            <a:schemeClr val="accent1"/>
-          </a:fillRef>
-          <a:effectRef idx="0">
-            <a:schemeClr val="accent1"/>
-          </a:effectRef>
-          <a:fontRef idx="minor">
-            <a:schemeClr val="tx1"/>
-          </a:fontRef>
-        </p:style>
-      </p:cxnSp>
-      <p:cxnSp>
-        <p:nvCxnSpPr>
-          <p:cNvPr id="69" name="Elbow Connector 68">
-            <a:extLst>
-              <a:ext uri="{FF2B5EF4-FFF2-40B4-BE49-F238E27FC236}">
-                <a16:creationId xmlns:a16="http://schemas.microsoft.com/office/drawing/2014/main" id="{CF39511F-3FCE-9E6B-BD59-EC513272F050}"/>
-              </a:ext>
-            </a:extLst>
-          </p:cNvPr>
-          <p:cNvCxnSpPr>
-            <a:cxnSpLocks/>
-          </p:cNvCxnSpPr>
-          <p:nvPr/>
-        </p:nvCxnSpPr>
-        <p:spPr>
-          <a:xfrm rot="16200000" flipH="1">
-            <a:off x="15702495" y="10934812"/>
-            <a:ext cx="634555" cy="1504991"/>
-          </a:xfrm>
-          <a:prstGeom prst="bentConnector2">
-            <a:avLst/>
-          </a:prstGeom>
-          <a:ln w="65532">
-            <a:solidFill>
-              <a:srgbClr val="C00000"/>
-            </a:solidFill>
-            <a:headEnd type="oval" w="med" len="med"/>
-            <a:tailEnd type="triangle" w="med" len="med"/>
-          </a:ln>
-        </p:spPr>
-        <p:style>
-          <a:lnRef idx="1">
-            <a:schemeClr val="accent1"/>
-          </a:lnRef>
-          <a:fillRef idx="0">
-            <a:schemeClr val="accent1"/>
-          </a:fillRef>
-          <a:effectRef idx="0">
-            <a:schemeClr val="accent1"/>
-          </a:effectRef>
-          <a:fontRef idx="minor">
-            <a:schemeClr val="tx1"/>
-          </a:fontRef>
-        </p:style>
-      </p:cxnSp>
-      <p:cxnSp>
-        <p:nvCxnSpPr>
-          <p:cNvPr id="70" name="Elbow Connector 69">
-            <a:extLst>
-              <a:ext uri="{FF2B5EF4-FFF2-40B4-BE49-F238E27FC236}">
-                <a16:creationId xmlns:a16="http://schemas.microsoft.com/office/drawing/2014/main" id="{7167AA64-90C9-75E1-2796-5EB306C9D1B8}"/>
-              </a:ext>
-            </a:extLst>
-          </p:cNvPr>
-          <p:cNvCxnSpPr>
-            <a:cxnSpLocks/>
-          </p:cNvCxnSpPr>
-          <p:nvPr/>
-        </p:nvCxnSpPr>
-        <p:spPr>
-          <a:xfrm rot="16200000" flipH="1">
-            <a:off x="17880147" y="9277005"/>
-            <a:ext cx="1040309" cy="1394631"/>
-          </a:xfrm>
-          <a:prstGeom prst="bentConnector3">
-            <a:avLst>
-              <a:gd name="adj1" fmla="val -21974"/>
-            </a:avLst>
-          </a:prstGeom>
-          <a:ln w="190246">
-            <a:solidFill>
-              <a:schemeClr val="accent1">
-                <a:lumMod val="75000"/>
-              </a:schemeClr>
-            </a:solidFill>
-            <a:tailEnd type="triangle"/>
-          </a:ln>
-        </p:spPr>
-        <p:style>
-          <a:lnRef idx="1">
-            <a:schemeClr val="accent1"/>
-          </a:lnRef>
-          <a:fillRef idx="0">
-            <a:schemeClr val="accent1"/>
-          </a:fillRef>
-          <a:effectRef idx="0">
-            <a:schemeClr val="accent1"/>
-          </a:effectRef>
-          <a:fontRef idx="minor">
-            <a:schemeClr val="tx1"/>
-          </a:fontRef>
-        </p:style>
-      </p:cxnSp>
-      <p:cxnSp>
-        <p:nvCxnSpPr>
-          <p:cNvPr id="71" name="Elbow Connector 70">
-            <a:extLst>
-              <a:ext uri="{FF2B5EF4-FFF2-40B4-BE49-F238E27FC236}">
-                <a16:creationId xmlns:a16="http://schemas.microsoft.com/office/drawing/2014/main" id="{BDCFC548-4344-371B-2C31-60C6AA77B1C9}"/>
-              </a:ext>
-            </a:extLst>
-          </p:cNvPr>
-          <p:cNvCxnSpPr>
-            <a:cxnSpLocks/>
-          </p:cNvCxnSpPr>
-          <p:nvPr/>
-        </p:nvCxnSpPr>
-        <p:spPr>
-          <a:xfrm rot="5400000" flipH="1" flipV="1">
-            <a:off x="17869807" y="11231152"/>
-            <a:ext cx="1060989" cy="1394631"/>
-          </a:xfrm>
-          <a:prstGeom prst="bentConnector3">
-            <a:avLst>
-              <a:gd name="adj1" fmla="val -21546"/>
-            </a:avLst>
-          </a:prstGeom>
-          <a:ln w="173990">
-            <a:solidFill>
-              <a:schemeClr val="accent1">
-                <a:lumMod val="75000"/>
-              </a:schemeClr>
-            </a:solidFill>
-            <a:tailEnd type="triangle"/>
-          </a:ln>
-        </p:spPr>
-        <p:style>
-          <a:lnRef idx="1">
-            <a:schemeClr val="accent1"/>
-          </a:lnRef>
-          <a:fillRef idx="0">
-            <a:schemeClr val="accent1"/>
-          </a:fillRef>
-          <a:effectRef idx="0">
-            <a:schemeClr val="accent1"/>
-          </a:effectRef>
-          <a:fontRef idx="minor">
-            <a:schemeClr val="tx1"/>
-          </a:fontRef>
-        </p:style>
-      </p:cxnSp>
-      <p:sp>
-        <p:nvSpPr>
-          <p:cNvPr id="73" name="Rectangle 72">
-            <a:extLst>
-              <a:ext uri="{FF2B5EF4-FFF2-40B4-BE49-F238E27FC236}">
-                <a16:creationId xmlns:a16="http://schemas.microsoft.com/office/drawing/2014/main" id="{BA637BC2-E627-C4B8-EEC0-E438F2CBE441}"/>
-              </a:ext>
-            </a:extLst>
-          </p:cNvPr>
-          <p:cNvSpPr/>
-          <p:nvPr/>
-        </p:nvSpPr>
-        <p:spPr>
-          <a:xfrm>
-            <a:off x="11655851" y="10503486"/>
-            <a:ext cx="1819398" cy="877223"/>
-          </a:xfrm>
-          <a:prstGeom prst="rect">
-            <a:avLst/>
-          </a:prstGeom>
-          <a:solidFill>
-            <a:schemeClr val="bg1"/>
-          </a:solidFill>
-          <a:ln w="38100">
-            <a:solidFill>
-              <a:schemeClr val="tx1"/>
-            </a:solidFill>
-          </a:ln>
-        </p:spPr>
-        <p:style>
-          <a:lnRef idx="2">
-            <a:schemeClr val="accent1">
-              <a:shade val="50000"/>
-            </a:schemeClr>
-          </a:lnRef>
-          <a:fillRef idx="1">
-            <a:schemeClr val="accent1"/>
-          </a:fillRef>
-          <a:effectRef idx="0">
-            <a:schemeClr val="accent1"/>
-          </a:effectRef>
-          <a:fontRef idx="minor">
-            <a:schemeClr val="lt1"/>
-          </a:fontRef>
-        </p:style>
-        <p:txBody>
-          <a:bodyPr rtlCol="0" anchor="ctr"/>
-          <a:lstStyle/>
-          <a:p>
-            <a:pPr algn="ctr"/>
-            <a:r>
-              <a:rPr lang="el-GR" sz="2400" b="1" i="1" dirty="0">
-                <a:solidFill>
-                  <a:schemeClr val="tx1"/>
-                </a:solidFill>
-                <a:latin typeface="Arial" panose="020B0604020202020204" pitchFamily="34" charset="0"/>
-                <a:cs typeface="Arial" panose="020B0604020202020204" pitchFamily="34" charset="0"/>
-              </a:rPr>
-              <a:t>β</a:t>
-            </a:r>
-            <a:endParaRPr lang="en-US" sz="2400" b="1" i="1" dirty="0">
-              <a:solidFill>
-                <a:schemeClr val="tx1"/>
-              </a:solidFill>
-              <a:latin typeface="Arial" panose="020B0604020202020204" pitchFamily="34" charset="0"/>
-              <a:cs typeface="Arial" panose="020B0604020202020204" pitchFamily="34" charset="0"/>
-            </a:endParaRPr>
-          </a:p>
-        </p:txBody>
-      </p:sp>
-      <p:sp>
-        <p:nvSpPr>
-          <p:cNvPr id="74" name="Rectangle 73">
-            <a:extLst>
-              <a:ext uri="{FF2B5EF4-FFF2-40B4-BE49-F238E27FC236}">
-                <a16:creationId xmlns:a16="http://schemas.microsoft.com/office/drawing/2014/main" id="{98AF7FF1-A7B6-C08B-149F-9B2D6BF93B7E}"/>
-              </a:ext>
-            </a:extLst>
-          </p:cNvPr>
-          <p:cNvSpPr/>
-          <p:nvPr/>
-        </p:nvSpPr>
-        <p:spPr>
-          <a:xfrm>
-            <a:off x="11655851" y="8526947"/>
-            <a:ext cx="1819398" cy="877223"/>
-          </a:xfrm>
-          <a:prstGeom prst="rect">
-            <a:avLst/>
-          </a:prstGeom>
-          <a:solidFill>
-            <a:schemeClr val="bg1"/>
-          </a:solidFill>
-          <a:ln w="38100">
-            <a:solidFill>
-              <a:schemeClr val="tx1"/>
-            </a:solidFill>
-          </a:ln>
-        </p:spPr>
-        <p:style>
-          <a:lnRef idx="2">
-            <a:schemeClr val="accent1">
-              <a:shade val="50000"/>
-            </a:schemeClr>
-          </a:lnRef>
-          <a:fillRef idx="1">
-            <a:schemeClr val="accent1"/>
-          </a:fillRef>
-          <a:effectRef idx="0">
-            <a:schemeClr val="accent1"/>
-          </a:effectRef>
-          <a:fontRef idx="minor">
-            <a:schemeClr val="lt1"/>
-          </a:fontRef>
-        </p:style>
-        <p:txBody>
-          <a:bodyPr rtlCol="0" anchor="ctr"/>
-          <a:lstStyle/>
-          <a:p>
-            <a:pPr algn="ctr"/>
-            <a:r>
-              <a:rPr lang="en-US" sz="2400" b="1" i="1" dirty="0">
-                <a:solidFill>
-                  <a:schemeClr val="tx1"/>
-                </a:solidFill>
-                <a:latin typeface="Arial" panose="020B0604020202020204" pitchFamily="34" charset="0"/>
-                <a:cs typeface="Arial" panose="020B0604020202020204" pitchFamily="34" charset="0"/>
-              </a:rPr>
-              <a:t>N</a:t>
-            </a:r>
-            <a:r>
-              <a:rPr lang="en-US" sz="2400" b="1" baseline="-25000" dirty="0">
-                <a:solidFill>
-                  <a:schemeClr val="tx1"/>
-                </a:solidFill>
-                <a:latin typeface="Arial" panose="020B0604020202020204" pitchFamily="34" charset="0"/>
-                <a:cs typeface="Arial" panose="020B0604020202020204" pitchFamily="34" charset="0"/>
-              </a:rPr>
-              <a:t>fixation</a:t>
-            </a:r>
-            <a:endParaRPr lang="en-US" sz="2400" i="1" dirty="0">
-              <a:solidFill>
-                <a:schemeClr val="tx1"/>
-              </a:solidFill>
-              <a:latin typeface="Arial" panose="020B0604020202020204" pitchFamily="34" charset="0"/>
-              <a:cs typeface="Arial" panose="020B0604020202020204" pitchFamily="34" charset="0"/>
-            </a:endParaRPr>
-          </a:p>
-        </p:txBody>
-      </p:sp>
-      <p:sp>
-        <p:nvSpPr>
-          <p:cNvPr id="75" name="Rectangle 74">
-            <a:extLst>
-              <a:ext uri="{FF2B5EF4-FFF2-40B4-BE49-F238E27FC236}">
-                <a16:creationId xmlns:a16="http://schemas.microsoft.com/office/drawing/2014/main" id="{E4F1E8DC-FD3C-B8B1-7FE7-B87B7BA16C9A}"/>
-              </a:ext>
-            </a:extLst>
-          </p:cNvPr>
-          <p:cNvSpPr/>
-          <p:nvPr/>
-        </p:nvSpPr>
-        <p:spPr>
-          <a:xfrm>
-            <a:off x="18187919" y="10504985"/>
-            <a:ext cx="1819398" cy="877223"/>
-          </a:xfrm>
-          <a:prstGeom prst="rect">
-            <a:avLst/>
-          </a:prstGeom>
-          <a:solidFill>
-            <a:schemeClr val="bg1"/>
-          </a:solidFill>
-          <a:ln w="38100">
-            <a:solidFill>
-              <a:schemeClr val="tx1"/>
-            </a:solidFill>
-          </a:ln>
-        </p:spPr>
-        <p:style>
-          <a:lnRef idx="2">
-            <a:schemeClr val="accent1">
-              <a:shade val="50000"/>
-            </a:schemeClr>
-          </a:lnRef>
-          <a:fillRef idx="1">
-            <a:schemeClr val="accent1"/>
-          </a:fillRef>
-          <a:effectRef idx="0">
-            <a:schemeClr val="accent1"/>
-          </a:effectRef>
-          <a:fontRef idx="minor">
-            <a:schemeClr val="lt1"/>
-          </a:fontRef>
-        </p:style>
-        <p:txBody>
-          <a:bodyPr rtlCol="0" anchor="ctr"/>
-          <a:lstStyle/>
-          <a:p>
-            <a:pPr algn="ctr"/>
-            <a:r>
-              <a:rPr lang="el-GR" sz="2400" b="1" i="1" dirty="0">
-                <a:solidFill>
-                  <a:schemeClr val="tx1"/>
-                </a:solidFill>
-                <a:latin typeface="Arial" panose="020B0604020202020204" pitchFamily="34" charset="0"/>
-                <a:cs typeface="Arial" panose="020B0604020202020204" pitchFamily="34" charset="0"/>
-              </a:rPr>
-              <a:t>Ν</a:t>
-            </a:r>
-            <a:r>
-              <a:rPr lang="en-US" sz="2400" b="1" baseline="-25000" dirty="0">
-                <a:solidFill>
-                  <a:schemeClr val="tx1"/>
-                </a:solidFill>
-                <a:latin typeface="Arial" panose="020B0604020202020204" pitchFamily="34" charset="0"/>
-                <a:cs typeface="Arial" panose="020B0604020202020204" pitchFamily="34" charset="0"/>
-              </a:rPr>
-              <a:t>area</a:t>
-            </a:r>
-            <a:endParaRPr lang="en-US" sz="2400" b="1" i="1" dirty="0">
-              <a:solidFill>
-                <a:schemeClr val="tx1"/>
-              </a:solidFill>
-              <a:latin typeface="Arial" panose="020B0604020202020204" pitchFamily="34" charset="0"/>
-              <a:cs typeface="Arial" panose="020B0604020202020204" pitchFamily="34" charset="0"/>
-            </a:endParaRPr>
-          </a:p>
-        </p:txBody>
-      </p:sp>
-      <p:sp>
-        <p:nvSpPr>
-          <p:cNvPr id="76" name="Rectangle 75">
-            <a:extLst>
-              <a:ext uri="{FF2B5EF4-FFF2-40B4-BE49-F238E27FC236}">
-                <a16:creationId xmlns:a16="http://schemas.microsoft.com/office/drawing/2014/main" id="{777B9E07-94A1-162F-5691-81A421B68E23}"/>
-              </a:ext>
-            </a:extLst>
-          </p:cNvPr>
-          <p:cNvSpPr/>
-          <p:nvPr/>
-        </p:nvSpPr>
-        <p:spPr>
-          <a:xfrm>
-            <a:off x="16793288" y="11565974"/>
-            <a:ext cx="1819398" cy="877223"/>
-          </a:xfrm>
-          <a:prstGeom prst="rect">
-            <a:avLst/>
-          </a:prstGeom>
-          <a:solidFill>
-            <a:schemeClr val="bg1"/>
-          </a:solidFill>
-          <a:ln w="38100">
-            <a:solidFill>
-              <a:schemeClr val="tx1"/>
-            </a:solidFill>
-          </a:ln>
-        </p:spPr>
-        <p:style>
-          <a:lnRef idx="2">
-            <a:schemeClr val="accent1">
-              <a:shade val="50000"/>
-            </a:schemeClr>
-          </a:lnRef>
-          <a:fillRef idx="1">
-            <a:schemeClr val="accent1"/>
-          </a:fillRef>
-          <a:effectRef idx="0">
-            <a:schemeClr val="accent1"/>
-          </a:effectRef>
-          <a:fontRef idx="minor">
-            <a:schemeClr val="lt1"/>
-          </a:fontRef>
-        </p:style>
-        <p:txBody>
-          <a:bodyPr rtlCol="0" anchor="ctr"/>
-          <a:lstStyle/>
-          <a:p>
-            <a:pPr algn="ctr"/>
-            <a:r>
-              <a:rPr lang="en-US" sz="2400" b="1" i="1" dirty="0">
-                <a:solidFill>
-                  <a:schemeClr val="tx1"/>
-                </a:solidFill>
-                <a:latin typeface="Arial" panose="020B0604020202020204" pitchFamily="34" charset="0"/>
-                <a:cs typeface="Arial" panose="020B0604020202020204" pitchFamily="34" charset="0"/>
-              </a:rPr>
-              <a:t>M</a:t>
-            </a:r>
-            <a:r>
-              <a:rPr lang="en-US" sz="2400" b="1" baseline="-25000" dirty="0">
-                <a:solidFill>
-                  <a:schemeClr val="tx1"/>
-                </a:solidFill>
-                <a:latin typeface="Arial" panose="020B0604020202020204" pitchFamily="34" charset="0"/>
-                <a:cs typeface="Arial" panose="020B0604020202020204" pitchFamily="34" charset="0"/>
-              </a:rPr>
-              <a:t>area</a:t>
-            </a:r>
-            <a:endParaRPr lang="en-US" sz="2400" b="1" i="1" dirty="0">
-              <a:solidFill>
-                <a:schemeClr val="tx1"/>
-              </a:solidFill>
-              <a:latin typeface="Arial" panose="020B0604020202020204" pitchFamily="34" charset="0"/>
-              <a:cs typeface="Arial" panose="020B0604020202020204" pitchFamily="34" charset="0"/>
-            </a:endParaRPr>
-          </a:p>
-        </p:txBody>
-      </p:sp>
-      <p:sp>
-        <p:nvSpPr>
-          <p:cNvPr id="77" name="Rectangle 76">
-            <a:extLst>
-              <a:ext uri="{FF2B5EF4-FFF2-40B4-BE49-F238E27FC236}">
-                <a16:creationId xmlns:a16="http://schemas.microsoft.com/office/drawing/2014/main" id="{A5445E8E-E0B7-968C-76C1-5E89862C2117}"/>
-              </a:ext>
-            </a:extLst>
-          </p:cNvPr>
-          <p:cNvSpPr/>
-          <p:nvPr/>
-        </p:nvSpPr>
-        <p:spPr>
-          <a:xfrm>
-            <a:off x="16793288" y="9464676"/>
-            <a:ext cx="1819398" cy="877223"/>
-          </a:xfrm>
-          <a:prstGeom prst="rect">
-            <a:avLst/>
-          </a:prstGeom>
-          <a:solidFill>
-            <a:schemeClr val="bg1"/>
-          </a:solidFill>
-          <a:ln w="38100">
-            <a:solidFill>
-              <a:schemeClr val="tx1"/>
-            </a:solidFill>
-          </a:ln>
-        </p:spPr>
-        <p:style>
-          <a:lnRef idx="2">
-            <a:schemeClr val="accent1">
-              <a:shade val="50000"/>
-            </a:schemeClr>
-          </a:lnRef>
-          <a:fillRef idx="1">
-            <a:schemeClr val="accent1"/>
-          </a:fillRef>
-          <a:effectRef idx="0">
-            <a:schemeClr val="accent1"/>
-          </a:effectRef>
-          <a:fontRef idx="minor">
-            <a:schemeClr val="lt1"/>
-          </a:fontRef>
-        </p:style>
-        <p:txBody>
-          <a:bodyPr rtlCol="0" anchor="ctr"/>
-          <a:lstStyle/>
-          <a:p>
-            <a:pPr algn="ctr"/>
-            <a:r>
-              <a:rPr lang="en-US" sz="2400" b="1" i="1" dirty="0">
-                <a:solidFill>
-                  <a:schemeClr val="tx1"/>
-                </a:solidFill>
-                <a:latin typeface="Arial" panose="020B0604020202020204" pitchFamily="34" charset="0"/>
-                <a:cs typeface="Arial" panose="020B0604020202020204" pitchFamily="34" charset="0"/>
-              </a:rPr>
-              <a:t>N</a:t>
-            </a:r>
-            <a:r>
-              <a:rPr lang="en-US" sz="2400" b="1" baseline="-25000" dirty="0">
-                <a:solidFill>
-                  <a:schemeClr val="tx1"/>
-                </a:solidFill>
-                <a:latin typeface="Arial" panose="020B0604020202020204" pitchFamily="34" charset="0"/>
-                <a:cs typeface="Arial" panose="020B0604020202020204" pitchFamily="34" charset="0"/>
-              </a:rPr>
-              <a:t>mass</a:t>
-            </a:r>
-            <a:endParaRPr lang="en-US" sz="2400" b="1" i="1" dirty="0">
-              <a:solidFill>
-                <a:schemeClr val="tx1"/>
-              </a:solidFill>
-              <a:latin typeface="Arial" panose="020B0604020202020204" pitchFamily="34" charset="0"/>
-              <a:cs typeface="Arial" panose="020B0604020202020204" pitchFamily="34" charset="0"/>
-            </a:endParaRPr>
-          </a:p>
-        </p:txBody>
-      </p:sp>
-      <p:sp>
-        <p:nvSpPr>
-          <p:cNvPr id="78" name="Rectangle 77">
-            <a:extLst>
-              <a:ext uri="{FF2B5EF4-FFF2-40B4-BE49-F238E27FC236}">
-                <a16:creationId xmlns:a16="http://schemas.microsoft.com/office/drawing/2014/main" id="{09CE9B19-A23F-08A7-B3F3-D4D2D6FC07AF}"/>
-              </a:ext>
-            </a:extLst>
-          </p:cNvPr>
-          <p:cNvSpPr/>
-          <p:nvPr/>
-        </p:nvSpPr>
-        <p:spPr>
-          <a:xfrm>
-            <a:off x="14378598" y="10492808"/>
-            <a:ext cx="1819398" cy="877223"/>
-          </a:xfrm>
-          <a:prstGeom prst="rect">
-            <a:avLst/>
-          </a:prstGeom>
-          <a:solidFill>
-            <a:schemeClr val="bg1"/>
-          </a:solidFill>
-          <a:ln w="38100">
-            <a:solidFill>
-              <a:schemeClr val="tx1"/>
-            </a:solidFill>
-          </a:ln>
-        </p:spPr>
-        <p:style>
-          <a:lnRef idx="2">
-            <a:schemeClr val="accent1">
-              <a:shade val="50000"/>
-            </a:schemeClr>
-          </a:lnRef>
-          <a:fillRef idx="1">
-            <a:schemeClr val="accent1"/>
-          </a:fillRef>
-          <a:effectRef idx="0">
-            <a:schemeClr val="accent1"/>
-          </a:effectRef>
-          <a:fontRef idx="minor">
-            <a:schemeClr val="lt1"/>
-          </a:fontRef>
-        </p:style>
-        <p:txBody>
-          <a:bodyPr rtlCol="0" anchor="ctr"/>
-          <a:lstStyle/>
-          <a:p>
-            <a:pPr algn="ctr"/>
-            <a:r>
-              <a:rPr lang="en-US" sz="2400" b="1" i="1" dirty="0">
-                <a:solidFill>
-                  <a:schemeClr val="tx1"/>
-                </a:solidFill>
-                <a:latin typeface="Arial" panose="020B0604020202020204" pitchFamily="34" charset="0"/>
-                <a:cs typeface="Arial" panose="020B0604020202020204" pitchFamily="34" charset="0"/>
-              </a:rPr>
-              <a:t>C</a:t>
-            </a:r>
-            <a:r>
-              <a:rPr lang="en-US" sz="2400" b="1" baseline="-25000" dirty="0">
-                <a:solidFill>
-                  <a:schemeClr val="tx1"/>
-                </a:solidFill>
-                <a:latin typeface="Arial" panose="020B0604020202020204" pitchFamily="34" charset="0"/>
-                <a:cs typeface="Arial" panose="020B0604020202020204" pitchFamily="34" charset="0"/>
-              </a:rPr>
-              <a:t>i</a:t>
-            </a:r>
-            <a:r>
-              <a:rPr lang="en-US" sz="2400" b="1" i="1" dirty="0">
-                <a:solidFill>
-                  <a:schemeClr val="tx1"/>
-                </a:solidFill>
-                <a:latin typeface="Arial" panose="020B0604020202020204" pitchFamily="34" charset="0"/>
-                <a:cs typeface="Arial" panose="020B0604020202020204" pitchFamily="34" charset="0"/>
-              </a:rPr>
-              <a:t>:C</a:t>
-            </a:r>
-            <a:r>
-              <a:rPr lang="en-US" sz="2400" b="1" baseline="-25000" dirty="0">
-                <a:solidFill>
-                  <a:schemeClr val="tx1"/>
-                </a:solidFill>
-                <a:latin typeface="Arial" panose="020B0604020202020204" pitchFamily="34" charset="0"/>
-                <a:cs typeface="Arial" panose="020B0604020202020204" pitchFamily="34" charset="0"/>
-              </a:rPr>
-              <a:t>a</a:t>
-            </a:r>
-          </a:p>
-        </p:txBody>
-      </p:sp>
-      <p:sp>
-        <p:nvSpPr>
-          <p:cNvPr id="79" name="Rectangle 78">
-            <a:extLst>
-              <a:ext uri="{FF2B5EF4-FFF2-40B4-BE49-F238E27FC236}">
-                <a16:creationId xmlns:a16="http://schemas.microsoft.com/office/drawing/2014/main" id="{91F39A0A-FE4E-85B4-6C6F-ECA1B4AF4593}"/>
-              </a:ext>
-            </a:extLst>
-          </p:cNvPr>
-          <p:cNvSpPr/>
-          <p:nvPr/>
-        </p:nvSpPr>
-        <p:spPr>
-          <a:xfrm>
-            <a:off x="9190788" y="11576652"/>
-            <a:ext cx="2011416" cy="877223"/>
-          </a:xfrm>
-          <a:prstGeom prst="rect">
-            <a:avLst/>
-          </a:prstGeom>
-          <a:solidFill>
-            <a:schemeClr val="bg1"/>
-          </a:solidFill>
-          <a:ln w="38100">
-            <a:solidFill>
-              <a:schemeClr val="tx1"/>
-            </a:solidFill>
-          </a:ln>
-        </p:spPr>
-        <p:style>
-          <a:lnRef idx="2">
-            <a:schemeClr val="accent1">
-              <a:shade val="50000"/>
-            </a:schemeClr>
-          </a:lnRef>
-          <a:fillRef idx="1">
-            <a:schemeClr val="accent1"/>
-          </a:fillRef>
-          <a:effectRef idx="0">
-            <a:schemeClr val="accent1"/>
-          </a:effectRef>
-          <a:fontRef idx="minor">
-            <a:schemeClr val="lt1"/>
-          </a:fontRef>
-        </p:style>
-        <p:txBody>
-          <a:bodyPr rtlCol="0" anchor="ctr"/>
-          <a:lstStyle/>
-          <a:p>
-            <a:pPr algn="ctr"/>
-            <a:r>
-              <a:rPr lang="en-US" sz="2400" b="1" i="1" dirty="0">
-                <a:solidFill>
-                  <a:schemeClr val="tx1"/>
-                </a:solidFill>
-                <a:latin typeface="Arial" panose="020B0604020202020204" pitchFamily="34" charset="0"/>
-                <a:cs typeface="Arial" panose="020B0604020202020204" pitchFamily="34" charset="0"/>
-              </a:rPr>
-              <a:t>N availability</a:t>
-            </a:r>
-            <a:endParaRPr lang="en-US" sz="2400" b="1" dirty="0">
-              <a:solidFill>
-                <a:schemeClr val="tx1"/>
-              </a:solidFill>
-              <a:latin typeface="Arial" panose="020B0604020202020204" pitchFamily="34" charset="0"/>
-              <a:cs typeface="Arial" panose="020B0604020202020204" pitchFamily="34" charset="0"/>
-            </a:endParaRPr>
-          </a:p>
-        </p:txBody>
-      </p:sp>
-      <p:sp>
-        <p:nvSpPr>
-          <p:cNvPr id="80" name="Rectangle 79">
-            <a:extLst>
-              <a:ext uri="{FF2B5EF4-FFF2-40B4-BE49-F238E27FC236}">
-                <a16:creationId xmlns:a16="http://schemas.microsoft.com/office/drawing/2014/main" id="{3F234256-4026-95FE-3912-C3701D5B2005}"/>
-              </a:ext>
-            </a:extLst>
-          </p:cNvPr>
-          <p:cNvSpPr/>
-          <p:nvPr/>
-        </p:nvSpPr>
-        <p:spPr>
-          <a:xfrm>
-            <a:off x="9286797" y="9463693"/>
-            <a:ext cx="1819398" cy="877223"/>
-          </a:xfrm>
-          <a:prstGeom prst="rect">
-            <a:avLst/>
-          </a:prstGeom>
-          <a:solidFill>
-            <a:schemeClr val="bg1"/>
-          </a:solidFill>
-          <a:ln w="38100">
-            <a:solidFill>
-              <a:schemeClr val="tx1"/>
-            </a:solidFill>
-          </a:ln>
-        </p:spPr>
-        <p:style>
-          <a:lnRef idx="2">
-            <a:schemeClr val="accent1">
-              <a:shade val="50000"/>
-            </a:schemeClr>
-          </a:lnRef>
-          <a:fillRef idx="1">
-            <a:schemeClr val="accent1"/>
-          </a:fillRef>
-          <a:effectRef idx="0">
-            <a:schemeClr val="accent1"/>
-          </a:effectRef>
-          <a:fontRef idx="minor">
-            <a:schemeClr val="lt1"/>
-          </a:fontRef>
-        </p:style>
-        <p:txBody>
-          <a:bodyPr rtlCol="0" anchor="ctr"/>
-          <a:lstStyle/>
-          <a:p>
-            <a:pPr algn="ctr"/>
-            <a:r>
-              <a:rPr lang="en-US" sz="2400" b="1" i="1" dirty="0">
-                <a:solidFill>
-                  <a:schemeClr val="tx1"/>
-                </a:solidFill>
-                <a:latin typeface="Arial" panose="020B0604020202020204" pitchFamily="34" charset="0"/>
-                <a:cs typeface="Arial" panose="020B0604020202020204" pitchFamily="34" charset="0"/>
-              </a:rPr>
-              <a:t>Soil moisture</a:t>
-            </a:r>
-            <a:endParaRPr lang="en-US" sz="2400" b="1" dirty="0">
-              <a:solidFill>
-                <a:schemeClr val="tx1"/>
-              </a:solidFill>
-              <a:latin typeface="Arial" panose="020B0604020202020204" pitchFamily="34" charset="0"/>
-              <a:cs typeface="Arial" panose="020B0604020202020204" pitchFamily="34" charset="0"/>
-            </a:endParaRPr>
-          </a:p>
-        </p:txBody>
-      </p:sp>
-      <p:sp>
-        <p:nvSpPr>
-          <p:cNvPr id="81" name="Rectangle 80">
-            <a:extLst>
-              <a:ext uri="{FF2B5EF4-FFF2-40B4-BE49-F238E27FC236}">
-                <a16:creationId xmlns:a16="http://schemas.microsoft.com/office/drawing/2014/main" id="{ABC55BFA-8E50-7DD9-E049-91EB3A70B0DA}"/>
-              </a:ext>
-            </a:extLst>
-          </p:cNvPr>
-          <p:cNvSpPr/>
-          <p:nvPr/>
-        </p:nvSpPr>
-        <p:spPr>
-          <a:xfrm>
-            <a:off x="13880364" y="8526947"/>
-            <a:ext cx="1819398" cy="877223"/>
-          </a:xfrm>
-          <a:prstGeom prst="rect">
-            <a:avLst/>
-          </a:prstGeom>
-          <a:solidFill>
-            <a:schemeClr val="bg1"/>
-          </a:solidFill>
-          <a:ln w="38100">
-            <a:solidFill>
-              <a:schemeClr val="tx1"/>
-            </a:solidFill>
-          </a:ln>
-        </p:spPr>
-        <p:style>
-          <a:lnRef idx="2">
-            <a:schemeClr val="accent1">
-              <a:shade val="50000"/>
-            </a:schemeClr>
-          </a:lnRef>
-          <a:fillRef idx="1">
-            <a:schemeClr val="accent1"/>
-          </a:fillRef>
-          <a:effectRef idx="0">
-            <a:schemeClr val="accent1"/>
-          </a:effectRef>
-          <a:fontRef idx="minor">
-            <a:schemeClr val="lt1"/>
-          </a:fontRef>
-        </p:style>
-        <p:txBody>
-          <a:bodyPr rtlCol="0" anchor="ctr"/>
-          <a:lstStyle/>
-          <a:p>
-            <a:pPr algn="ctr"/>
-            <a:r>
-              <a:rPr lang="en-US" sz="2400" b="1" i="1" dirty="0">
-                <a:solidFill>
-                  <a:schemeClr val="tx1"/>
-                </a:solidFill>
-                <a:latin typeface="Arial" panose="020B0604020202020204" pitchFamily="34" charset="0"/>
-                <a:cs typeface="Arial" panose="020B0604020202020204" pitchFamily="34" charset="0"/>
-              </a:rPr>
-              <a:t>VPD</a:t>
-            </a:r>
-            <a:endParaRPr lang="en-US" sz="2400" b="1" dirty="0">
-              <a:solidFill>
-                <a:schemeClr val="tx1"/>
-              </a:solidFill>
-              <a:latin typeface="Arial" panose="020B0604020202020204" pitchFamily="34" charset="0"/>
-              <a:cs typeface="Arial" panose="020B0604020202020204" pitchFamily="34" charset="0"/>
-            </a:endParaRPr>
-          </a:p>
-        </p:txBody>
-      </p:sp>
-      <p:sp>
-        <p:nvSpPr>
-          <p:cNvPr id="85" name="TextBox 84">
-            <a:extLst>
-              <a:ext uri="{FF2B5EF4-FFF2-40B4-BE49-F238E27FC236}">
-                <a16:creationId xmlns:a16="http://schemas.microsoft.com/office/drawing/2014/main" id="{B2ECBE36-DF98-9F62-11B0-19AFDCDF2939}"/>
-              </a:ext>
-            </a:extLst>
-          </p:cNvPr>
-          <p:cNvSpPr txBox="1"/>
-          <p:nvPr/>
-        </p:nvSpPr>
-        <p:spPr>
-          <a:xfrm>
-            <a:off x="2760133" y="10041467"/>
-            <a:ext cx="425116" cy="369332"/>
-          </a:xfrm>
-          <a:prstGeom prst="rect">
-            <a:avLst/>
-          </a:prstGeom>
-          <a:noFill/>
-        </p:spPr>
-        <p:txBody>
-          <a:bodyPr wrap="none" rtlCol="0">
-            <a:spAutoFit/>
-          </a:bodyPr>
-          <a:lstStyle/>
-          <a:p>
-            <a:r>
-              <a:rPr lang="en-US" dirty="0"/>
-              <a:t>C4</a:t>
-            </a:r>
-          </a:p>
-        </p:txBody>
-      </p:sp>
-      <p:sp>
-        <p:nvSpPr>
-          <p:cNvPr id="86" name="TextBox 85">
-            <a:extLst>
-              <a:ext uri="{FF2B5EF4-FFF2-40B4-BE49-F238E27FC236}">
-                <a16:creationId xmlns:a16="http://schemas.microsoft.com/office/drawing/2014/main" id="{099D7460-DD5F-D5B8-21F6-B72E725715C6}"/>
-              </a:ext>
-            </a:extLst>
-          </p:cNvPr>
-          <p:cNvSpPr txBox="1"/>
-          <p:nvPr/>
-        </p:nvSpPr>
-        <p:spPr>
-          <a:xfrm>
-            <a:off x="2980267" y="2573867"/>
-            <a:ext cx="425116" cy="369332"/>
-          </a:xfrm>
-          <a:prstGeom prst="rect">
-            <a:avLst/>
-          </a:prstGeom>
-          <a:noFill/>
-        </p:spPr>
-        <p:txBody>
-          <a:bodyPr wrap="none" rtlCol="0">
-            <a:spAutoFit/>
-          </a:bodyPr>
-          <a:lstStyle/>
-          <a:p>
-            <a:r>
-              <a:rPr lang="en-US" dirty="0"/>
-              <a:t>C3</a:t>
-            </a:r>
-          </a:p>
-        </p:txBody>
-      </p:sp>
     </p:spTree>
     <p:extLst>
       <p:ext uri="{BB962C8B-B14F-4D97-AF65-F5344CB8AC3E}">
-        <p14:creationId xmlns:p14="http://schemas.microsoft.com/office/powerpoint/2010/main" val="282211013"/>
+        <p14:creationId xmlns:p14="http://schemas.microsoft.com/office/powerpoint/2010/main" val="94133528"/>
       </p:ext>
     </p:extLst>
   </p:cSld>

</xml_diff>

<commit_message>
minor edits to fig 6
</commit_message>
<xml_diff>
--- a/working_drafts/figs/TXeco_fig6_SEM.pptx
+++ b/working_drafts/figs/TXeco_fig6_SEM.pptx
@@ -203,7 +203,7 @@
           <a:p>
             <a:fld id="{9C8338E3-F40D-F146-8D3B-4726E84D5200}" type="datetimeFigureOut">
               <a:rPr lang="en-US" smtClean="0"/>
-              <a:t>2/21/24</a:t>
+              <a:t>2/23/24</a:t>
             </a:fld>
             <a:endParaRPr lang="en-US"/>
           </a:p>
@@ -1194,7 +1194,7 @@
           <a:p>
             <a:fld id="{D3A28AA4-801E-B147-9E5C-6E6DBA6E23D1}" type="datetimeFigureOut">
               <a:rPr lang="en-US" smtClean="0"/>
-              <a:t>2/21/24</a:t>
+              <a:t>2/23/24</a:t>
             </a:fld>
             <a:endParaRPr lang="en-US"/>
           </a:p>
@@ -1364,7 +1364,7 @@
           <a:p>
             <a:fld id="{D3A28AA4-801E-B147-9E5C-6E6DBA6E23D1}" type="datetimeFigureOut">
               <a:rPr lang="en-US" smtClean="0"/>
-              <a:t>2/21/24</a:t>
+              <a:t>2/23/24</a:t>
             </a:fld>
             <a:endParaRPr lang="en-US"/>
           </a:p>
@@ -1544,7 +1544,7 @@
           <a:p>
             <a:fld id="{D3A28AA4-801E-B147-9E5C-6E6DBA6E23D1}" type="datetimeFigureOut">
               <a:rPr lang="en-US" smtClean="0"/>
-              <a:t>2/21/24</a:t>
+              <a:t>2/23/24</a:t>
             </a:fld>
             <a:endParaRPr lang="en-US"/>
           </a:p>
@@ -1714,7 +1714,7 @@
           <a:p>
             <a:fld id="{D3A28AA4-801E-B147-9E5C-6E6DBA6E23D1}" type="datetimeFigureOut">
               <a:rPr lang="en-US" smtClean="0"/>
-              <a:t>2/21/24</a:t>
+              <a:t>2/23/24</a:t>
             </a:fld>
             <a:endParaRPr lang="en-US"/>
           </a:p>
@@ -1958,7 +1958,7 @@
           <a:p>
             <a:fld id="{D3A28AA4-801E-B147-9E5C-6E6DBA6E23D1}" type="datetimeFigureOut">
               <a:rPr lang="en-US" smtClean="0"/>
-              <a:t>2/21/24</a:t>
+              <a:t>2/23/24</a:t>
             </a:fld>
             <a:endParaRPr lang="en-US"/>
           </a:p>
@@ -2190,7 +2190,7 @@
           <a:p>
             <a:fld id="{D3A28AA4-801E-B147-9E5C-6E6DBA6E23D1}" type="datetimeFigureOut">
               <a:rPr lang="en-US" smtClean="0"/>
-              <a:t>2/21/24</a:t>
+              <a:t>2/23/24</a:t>
             </a:fld>
             <a:endParaRPr lang="en-US"/>
           </a:p>
@@ -2557,7 +2557,7 @@
           <a:p>
             <a:fld id="{D3A28AA4-801E-B147-9E5C-6E6DBA6E23D1}" type="datetimeFigureOut">
               <a:rPr lang="en-US" smtClean="0"/>
-              <a:t>2/21/24</a:t>
+              <a:t>2/23/24</a:t>
             </a:fld>
             <a:endParaRPr lang="en-US"/>
           </a:p>
@@ -2675,7 +2675,7 @@
           <a:p>
             <a:fld id="{D3A28AA4-801E-B147-9E5C-6E6DBA6E23D1}" type="datetimeFigureOut">
               <a:rPr lang="en-US" smtClean="0"/>
-              <a:t>2/21/24</a:t>
+              <a:t>2/23/24</a:t>
             </a:fld>
             <a:endParaRPr lang="en-US"/>
           </a:p>
@@ -2770,7 +2770,7 @@
           <a:p>
             <a:fld id="{D3A28AA4-801E-B147-9E5C-6E6DBA6E23D1}" type="datetimeFigureOut">
               <a:rPr lang="en-US" smtClean="0"/>
-              <a:t>2/21/24</a:t>
+              <a:t>2/23/24</a:t>
             </a:fld>
             <a:endParaRPr lang="en-US"/>
           </a:p>
@@ -3047,7 +3047,7 @@
           <a:p>
             <a:fld id="{D3A28AA4-801E-B147-9E5C-6E6DBA6E23D1}" type="datetimeFigureOut">
               <a:rPr lang="en-US" smtClean="0"/>
-              <a:t>2/21/24</a:t>
+              <a:t>2/23/24</a:t>
             </a:fld>
             <a:endParaRPr lang="en-US"/>
           </a:p>
@@ -3304,7 +3304,7 @@
           <a:p>
             <a:fld id="{D3A28AA4-801E-B147-9E5C-6E6DBA6E23D1}" type="datetimeFigureOut">
               <a:rPr lang="en-US" smtClean="0"/>
-              <a:t>2/21/24</a:t>
+              <a:t>2/23/24</a:t>
             </a:fld>
             <a:endParaRPr lang="en-US"/>
           </a:p>
@@ -3517,7 +3517,7 @@
           <a:p>
             <a:fld id="{D3A28AA4-801E-B147-9E5C-6E6DBA6E23D1}" type="datetimeFigureOut">
               <a:rPr lang="en-US" smtClean="0"/>
-              <a:t>2/21/24</a:t>
+              <a:t>2/23/24</a:t>
             </a:fld>
             <a:endParaRPr lang="en-US"/>
           </a:p>
@@ -23925,7 +23925,7 @@
           <a:prstGeom prst="bentConnector2">
             <a:avLst/>
           </a:prstGeom>
-          <a:ln w="23749">
+          <a:ln w="23622">
             <a:solidFill>
               <a:schemeClr val="accent1">
                 <a:lumMod val="75000"/>
@@ -24018,7 +24018,7 @@
           <a:prstGeom prst="straightConnector1">
             <a:avLst/>
           </a:prstGeom>
-          <a:ln w="153416">
+          <a:ln w="148082">
             <a:solidFill>
               <a:schemeClr val="accent1">
                 <a:lumMod val="75000"/>
@@ -24058,8 +24058,8 @@
         </p:nvCxnSpPr>
         <p:spPr>
           <a:xfrm rot="5400000" flipH="1" flipV="1">
-            <a:off x="15557261" y="3661974"/>
-            <a:ext cx="589520" cy="1504991"/>
+            <a:off x="15548873" y="3656508"/>
+            <a:ext cx="606296" cy="1504990"/>
           </a:xfrm>
           <a:prstGeom prst="bentConnector2">
             <a:avLst/>
@@ -24384,249 +24384,6 @@
           </a:p>
         </p:txBody>
       </p:sp>
-      <p:sp>
-        <p:nvSpPr>
-          <p:cNvPr id="19" name="Rectangle 18">
-            <a:extLst>
-              <a:ext uri="{FF2B5EF4-FFF2-40B4-BE49-F238E27FC236}">
-                <a16:creationId xmlns:a16="http://schemas.microsoft.com/office/drawing/2014/main" id="{BFD7E968-8F81-887D-0BC6-8F6001755390}"/>
-              </a:ext>
-            </a:extLst>
-          </p:cNvPr>
-          <p:cNvSpPr/>
-          <p:nvPr/>
-        </p:nvSpPr>
-        <p:spPr>
-          <a:xfrm>
-            <a:off x="16604517" y="3697873"/>
-            <a:ext cx="1819398" cy="877223"/>
-          </a:xfrm>
-          <a:prstGeom prst="rect">
-            <a:avLst/>
-          </a:prstGeom>
-          <a:solidFill>
-            <a:schemeClr val="bg1"/>
-          </a:solidFill>
-          <a:ln w="38100">
-            <a:solidFill>
-              <a:schemeClr val="tx1"/>
-            </a:solidFill>
-          </a:ln>
-        </p:spPr>
-        <p:style>
-          <a:lnRef idx="2">
-            <a:schemeClr val="accent1">
-              <a:shade val="50000"/>
-            </a:schemeClr>
-          </a:lnRef>
-          <a:fillRef idx="1">
-            <a:schemeClr val="accent1"/>
-          </a:fillRef>
-          <a:effectRef idx="0">
-            <a:schemeClr val="accent1"/>
-          </a:effectRef>
-          <a:fontRef idx="minor">
-            <a:schemeClr val="lt1"/>
-          </a:fontRef>
-        </p:style>
-        <p:txBody>
-          <a:bodyPr rtlCol="0" anchor="ctr"/>
-          <a:lstStyle/>
-          <a:p>
-            <a:pPr algn="ctr"/>
-            <a:r>
-              <a:rPr lang="en-US" sz="2400" b="1" i="1" dirty="0">
-                <a:solidFill>
-                  <a:schemeClr val="tx1"/>
-                </a:solidFill>
-                <a:latin typeface="Arial" panose="020B0604020202020204" pitchFamily="34" charset="0"/>
-                <a:cs typeface="Arial" panose="020B0604020202020204" pitchFamily="34" charset="0"/>
-              </a:rPr>
-              <a:t>N</a:t>
-            </a:r>
-            <a:r>
-              <a:rPr lang="en-US" sz="2400" b="1" baseline="-25000" dirty="0">
-                <a:solidFill>
-                  <a:schemeClr val="tx1"/>
-                </a:solidFill>
-                <a:latin typeface="Arial" panose="020B0604020202020204" pitchFamily="34" charset="0"/>
-                <a:cs typeface="Arial" panose="020B0604020202020204" pitchFamily="34" charset="0"/>
-              </a:rPr>
-              <a:t>mass</a:t>
-            </a:r>
-            <a:endParaRPr lang="en-US" sz="2400" b="1" i="1" dirty="0">
-              <a:solidFill>
-                <a:schemeClr val="tx1"/>
-              </a:solidFill>
-              <a:latin typeface="Arial" panose="020B0604020202020204" pitchFamily="34" charset="0"/>
-              <a:cs typeface="Arial" panose="020B0604020202020204" pitchFamily="34" charset="0"/>
-            </a:endParaRPr>
-          </a:p>
-        </p:txBody>
-      </p:sp>
-      <p:sp>
-        <p:nvSpPr>
-          <p:cNvPr id="21" name="Rectangle 20">
-            <a:extLst>
-              <a:ext uri="{FF2B5EF4-FFF2-40B4-BE49-F238E27FC236}">
-                <a16:creationId xmlns:a16="http://schemas.microsoft.com/office/drawing/2014/main" id="{162D8A45-A317-DFD4-7949-E7194DB40F11}"/>
-              </a:ext>
-            </a:extLst>
-          </p:cNvPr>
-          <p:cNvSpPr/>
-          <p:nvPr/>
-        </p:nvSpPr>
-        <p:spPr>
-          <a:xfrm>
-            <a:off x="14189827" y="4726005"/>
-            <a:ext cx="1819398" cy="877223"/>
-          </a:xfrm>
-          <a:prstGeom prst="rect">
-            <a:avLst/>
-          </a:prstGeom>
-          <a:solidFill>
-            <a:schemeClr val="bg1"/>
-          </a:solidFill>
-          <a:ln w="38100">
-            <a:solidFill>
-              <a:schemeClr val="tx1"/>
-            </a:solidFill>
-          </a:ln>
-        </p:spPr>
-        <p:style>
-          <a:lnRef idx="2">
-            <a:schemeClr val="accent1">
-              <a:shade val="50000"/>
-            </a:schemeClr>
-          </a:lnRef>
-          <a:fillRef idx="1">
-            <a:schemeClr val="accent1"/>
-          </a:fillRef>
-          <a:effectRef idx="0">
-            <a:schemeClr val="accent1"/>
-          </a:effectRef>
-          <a:fontRef idx="minor">
-            <a:schemeClr val="lt1"/>
-          </a:fontRef>
-        </p:style>
-        <p:txBody>
-          <a:bodyPr rtlCol="0" anchor="ctr"/>
-          <a:lstStyle/>
-          <a:p>
-            <a:pPr algn="ctr"/>
-            <a:r>
-              <a:rPr lang="en-US" sz="2400" b="1" i="1" dirty="0">
-                <a:solidFill>
-                  <a:schemeClr val="tx1"/>
-                </a:solidFill>
-                <a:latin typeface="Arial" panose="020B0604020202020204" pitchFamily="34" charset="0"/>
-                <a:cs typeface="Arial" panose="020B0604020202020204" pitchFamily="34" charset="0"/>
-              </a:rPr>
-              <a:t>C</a:t>
-            </a:r>
-            <a:r>
-              <a:rPr lang="en-US" sz="2400" b="1" baseline="-25000" dirty="0">
-                <a:solidFill>
-                  <a:schemeClr val="tx1"/>
-                </a:solidFill>
-                <a:latin typeface="Arial" panose="020B0604020202020204" pitchFamily="34" charset="0"/>
-                <a:cs typeface="Arial" panose="020B0604020202020204" pitchFamily="34" charset="0"/>
-              </a:rPr>
-              <a:t>i</a:t>
-            </a:r>
-            <a:r>
-              <a:rPr lang="en-US" sz="2400" b="1" i="1" dirty="0">
-                <a:solidFill>
-                  <a:schemeClr val="tx1"/>
-                </a:solidFill>
-                <a:latin typeface="Arial" panose="020B0604020202020204" pitchFamily="34" charset="0"/>
-                <a:cs typeface="Arial" panose="020B0604020202020204" pitchFamily="34" charset="0"/>
-              </a:rPr>
-              <a:t>:C</a:t>
-            </a:r>
-            <a:r>
-              <a:rPr lang="en-US" sz="2400" b="1" baseline="-25000" dirty="0">
-                <a:solidFill>
-                  <a:schemeClr val="tx1"/>
-                </a:solidFill>
-                <a:latin typeface="Arial" panose="020B0604020202020204" pitchFamily="34" charset="0"/>
-                <a:cs typeface="Arial" panose="020B0604020202020204" pitchFamily="34" charset="0"/>
-              </a:rPr>
-              <a:t>a</a:t>
-            </a:r>
-          </a:p>
-        </p:txBody>
-      </p:sp>
-      <p:sp>
-        <p:nvSpPr>
-          <p:cNvPr id="23" name="Rectangle 22">
-            <a:extLst>
-              <a:ext uri="{FF2B5EF4-FFF2-40B4-BE49-F238E27FC236}">
-                <a16:creationId xmlns:a16="http://schemas.microsoft.com/office/drawing/2014/main" id="{3AAD1016-970D-A63E-5FF8-0CE765630A13}"/>
-              </a:ext>
-            </a:extLst>
-          </p:cNvPr>
-          <p:cNvSpPr/>
-          <p:nvPr/>
-        </p:nvSpPr>
-        <p:spPr>
-          <a:xfrm>
-            <a:off x="9098026" y="3696890"/>
-            <a:ext cx="1819398" cy="877223"/>
-          </a:xfrm>
-          <a:prstGeom prst="rect">
-            <a:avLst/>
-          </a:prstGeom>
-          <a:solidFill>
-            <a:schemeClr val="bg1"/>
-          </a:solidFill>
-          <a:ln w="38100">
-            <a:solidFill>
-              <a:schemeClr val="tx1"/>
-            </a:solidFill>
-          </a:ln>
-        </p:spPr>
-        <p:style>
-          <a:lnRef idx="2">
-            <a:schemeClr val="accent1">
-              <a:shade val="50000"/>
-            </a:schemeClr>
-          </a:lnRef>
-          <a:fillRef idx="1">
-            <a:schemeClr val="accent1"/>
-          </a:fillRef>
-          <a:effectRef idx="0">
-            <a:schemeClr val="accent1"/>
-          </a:effectRef>
-          <a:fontRef idx="minor">
-            <a:schemeClr val="lt1"/>
-          </a:fontRef>
-        </p:style>
-        <p:txBody>
-          <a:bodyPr rtlCol="0" anchor="ctr"/>
-          <a:lstStyle/>
-          <a:p>
-            <a:pPr algn="ctr"/>
-            <a:r>
-              <a:rPr lang="en-US" sz="2400" b="1" i="1" dirty="0">
-                <a:solidFill>
-                  <a:schemeClr val="tx1"/>
-                </a:solidFill>
-                <a:latin typeface="Arial" panose="020B0604020202020204" pitchFamily="34" charset="0"/>
-                <a:cs typeface="Arial" panose="020B0604020202020204" pitchFamily="34" charset="0"/>
-              </a:rPr>
-              <a:t>Soil moisture</a:t>
-            </a:r>
-            <a:endParaRPr lang="en-US" sz="2400" b="1" dirty="0">
-              <a:solidFill>
-                <a:schemeClr val="tx1"/>
-              </a:solidFill>
-              <a:latin typeface="Arial" panose="020B0604020202020204" pitchFamily="34" charset="0"/>
-              <a:cs typeface="Arial" panose="020B0604020202020204" pitchFamily="34" charset="0"/>
-            </a:endParaRPr>
-          </a:p>
-        </p:txBody>
-      </p:sp>
       <p:cxnSp>
         <p:nvCxnSpPr>
           <p:cNvPr id="42" name="Elbow Connector 41">
@@ -24638,16 +24395,19 @@
           </p:cNvPr>
           <p:cNvCxnSpPr>
             <a:cxnSpLocks/>
+            <a:stCxn id="16" idx="3"/>
           </p:cNvCxnSpPr>
           <p:nvPr/>
         </p:nvCxnSpPr>
         <p:spPr>
           <a:xfrm>
-            <a:off x="15470371" y="3185534"/>
-            <a:ext cx="1503218" cy="512339"/>
-          </a:xfrm>
-          <a:prstGeom prst="bentConnector2">
-            <a:avLst/>
+            <a:off x="15608175" y="2713271"/>
+            <a:ext cx="1310747" cy="955279"/>
+          </a:xfrm>
+          <a:prstGeom prst="bentConnector3">
+            <a:avLst>
+              <a:gd name="adj1" fmla="val 100031"/>
+            </a:avLst>
           </a:prstGeom>
           <a:ln w="50673">
             <a:solidFill>
@@ -24687,7 +24447,7 @@
         </p:nvSpPr>
         <p:spPr>
           <a:xfrm>
-            <a:off x="14191600" y="2746922"/>
+            <a:off x="13788777" y="2274659"/>
             <a:ext cx="1819398" cy="877223"/>
           </a:xfrm>
           <a:prstGeom prst="rect">
@@ -24764,15 +24524,15 @@
           </p:cNvPr>
           <p:cNvCxnSpPr>
             <a:cxnSpLocks/>
-            <a:stCxn id="20" idx="2"/>
-            <a:endCxn id="23" idx="3"/>
+            <a:stCxn id="20" idx="1"/>
+            <a:endCxn id="23" idx="0"/>
           </p:cNvCxnSpPr>
           <p:nvPr/>
         </p:nvCxnSpPr>
         <p:spPr>
-          <a:xfrm rot="5400000">
-            <a:off x="11389378" y="3154451"/>
-            <a:ext cx="509098" cy="1453005"/>
+          <a:xfrm rot="10800000" flipV="1">
+            <a:off x="10007726" y="2715572"/>
+            <a:ext cx="1459355" cy="981318"/>
           </a:xfrm>
           <a:prstGeom prst="bentConnector2">
             <a:avLst/>
@@ -24867,7 +24627,7 @@
           <a:prstGeom prst="bentConnector4">
             <a:avLst>
               <a:gd name="adj1" fmla="val -15756"/>
-              <a:gd name="adj2" fmla="val 150047"/>
+              <a:gd name="adj2" fmla="val 161224"/>
             </a:avLst>
           </a:prstGeom>
           <a:ln w="52324">
@@ -24922,98 +24682,6 @@
               <a:srgbClr val="C00000"/>
             </a:solidFill>
             <a:headEnd type="oval"/>
-            <a:tailEnd type="triangle"/>
-          </a:ln>
-        </p:spPr>
-        <p:style>
-          <a:lnRef idx="1">
-            <a:schemeClr val="accent1"/>
-          </a:lnRef>
-          <a:fillRef idx="0">
-            <a:schemeClr val="accent1"/>
-          </a:fillRef>
-          <a:effectRef idx="0">
-            <a:schemeClr val="accent1"/>
-          </a:effectRef>
-          <a:fontRef idx="minor">
-            <a:schemeClr val="tx1"/>
-          </a:fontRef>
-        </p:style>
-      </p:cxnSp>
-      <p:cxnSp>
-        <p:nvCxnSpPr>
-          <p:cNvPr id="58" name="Elbow Connector 57">
-            <a:extLst>
-              <a:ext uri="{FF2B5EF4-FFF2-40B4-BE49-F238E27FC236}">
-                <a16:creationId xmlns:a16="http://schemas.microsoft.com/office/drawing/2014/main" id="{00EE9840-85DD-B365-3780-41BF331756A5}"/>
-              </a:ext>
-            </a:extLst>
-          </p:cNvPr>
-          <p:cNvCxnSpPr>
-            <a:cxnSpLocks/>
-          </p:cNvCxnSpPr>
-          <p:nvPr/>
-        </p:nvCxnSpPr>
-        <p:spPr>
-          <a:xfrm>
-            <a:off x="13704124" y="4154092"/>
-            <a:ext cx="955718" cy="570225"/>
-          </a:xfrm>
-          <a:prstGeom prst="bentConnector3">
-            <a:avLst>
-              <a:gd name="adj1" fmla="val 100323"/>
-            </a:avLst>
-          </a:prstGeom>
-          <a:ln w="57911">
-            <a:solidFill>
-              <a:srgbClr val="C00000"/>
-            </a:solidFill>
-            <a:headEnd type="none"/>
-            <a:tailEnd type="triangle"/>
-          </a:ln>
-        </p:spPr>
-        <p:style>
-          <a:lnRef idx="1">
-            <a:schemeClr val="accent1"/>
-          </a:lnRef>
-          <a:fillRef idx="0">
-            <a:schemeClr val="accent1"/>
-          </a:fillRef>
-          <a:effectRef idx="0">
-            <a:schemeClr val="accent1"/>
-          </a:effectRef>
-          <a:fontRef idx="minor">
-            <a:schemeClr val="tx1"/>
-          </a:fontRef>
-        </p:style>
-      </p:cxnSp>
-      <p:cxnSp>
-        <p:nvCxnSpPr>
-          <p:cNvPr id="63" name="Straight Arrow Connector 62">
-            <a:extLst>
-              <a:ext uri="{FF2B5EF4-FFF2-40B4-BE49-F238E27FC236}">
-                <a16:creationId xmlns:a16="http://schemas.microsoft.com/office/drawing/2014/main" id="{B3050AC4-5FC4-1265-17CC-62671EFD71BF}"/>
-              </a:ext>
-            </a:extLst>
-          </p:cNvPr>
-          <p:cNvCxnSpPr>
-            <a:cxnSpLocks/>
-          </p:cNvCxnSpPr>
-          <p:nvPr/>
-        </p:nvCxnSpPr>
-        <p:spPr>
-          <a:xfrm flipH="1">
-            <a:off x="14946016" y="3624145"/>
-            <a:ext cx="1773" cy="1101860"/>
-          </a:xfrm>
-          <a:prstGeom prst="straightConnector1">
-            <a:avLst/>
-          </a:prstGeom>
-          <a:ln w="12700">
-            <a:solidFill>
-              <a:schemeClr val="tx1"/>
-            </a:solidFill>
-            <a:prstDash val="dash"/>
             <a:tailEnd type="triangle"/>
           </a:ln>
         </p:spPr>
@@ -25287,8 +24955,8 @@
           </p:nvSpPr>
           <p:spPr>
             <a:xfrm>
-              <a:off x="12533923" y="13433721"/>
-              <a:ext cx="790601" cy="553998"/>
+              <a:off x="12510871" y="13433721"/>
+              <a:ext cx="846707" cy="553998"/>
             </a:xfrm>
             <a:prstGeom prst="rect">
               <a:avLst/>
@@ -25303,8 +24971,8 @@
             <a:p>
               <a:r>
                 <a:rPr lang="en-US" sz="3000" b="1" dirty="0">
-                  <a:latin typeface="Times New Roman" panose="02020603050405020304" pitchFamily="18" charset="0"/>
-                  <a:cs typeface="Times New Roman" panose="02020603050405020304" pitchFamily="18" charset="0"/>
+                  <a:latin typeface="Arial" panose="020B0604020202020204" pitchFamily="34" charset="0"/>
+                  <a:cs typeface="Arial" panose="020B0604020202020204" pitchFamily="34" charset="0"/>
                 </a:rPr>
                 <a:t>-0.9</a:t>
               </a:r>
@@ -25325,8 +24993,8 @@
           </p:nvSpPr>
           <p:spPr>
             <a:xfrm>
-              <a:off x="13540373" y="13440763"/>
-              <a:ext cx="665567" cy="553998"/>
+              <a:off x="13501953" y="13440763"/>
+              <a:ext cx="718466" cy="553998"/>
             </a:xfrm>
             <a:prstGeom prst="rect">
               <a:avLst/>
@@ -25341,8 +25009,8 @@
             <a:p>
               <a:r>
                 <a:rPr lang="en-US" sz="3000" b="1" dirty="0">
-                  <a:latin typeface="Times New Roman" panose="02020603050405020304" pitchFamily="18" charset="0"/>
-                  <a:cs typeface="Times New Roman" panose="02020603050405020304" pitchFamily="18" charset="0"/>
+                  <a:latin typeface="Arial" panose="020B0604020202020204" pitchFamily="34" charset="0"/>
+                  <a:cs typeface="Arial" panose="020B0604020202020204" pitchFamily="34" charset="0"/>
                 </a:rPr>
                 <a:t>0.9</a:t>
               </a:r>
@@ -25363,8 +25031,8 @@
           </p:nvSpPr>
           <p:spPr>
             <a:xfrm>
-              <a:off x="11590746" y="13440763"/>
-              <a:ext cx="793807" cy="553998"/>
+              <a:off x="11560010" y="13440763"/>
+              <a:ext cx="846707" cy="553998"/>
             </a:xfrm>
             <a:prstGeom prst="rect">
               <a:avLst/>
@@ -25379,8 +25047,8 @@
             <a:p>
               <a:r>
                 <a:rPr lang="en-US" sz="3000" b="1" dirty="0">
-                  <a:latin typeface="Times New Roman" panose="02020603050405020304" pitchFamily="18" charset="0"/>
-                  <a:cs typeface="Times New Roman" panose="02020603050405020304" pitchFamily="18" charset="0"/>
+                  <a:latin typeface="Arial" panose="020B0604020202020204" pitchFamily="34" charset="0"/>
+                  <a:cs typeface="Arial" panose="020B0604020202020204" pitchFamily="34" charset="0"/>
                 </a:rPr>
                 <a:t>-0.6</a:t>
               </a:r>
@@ -25401,8 +25069,8 @@
           </p:nvSpPr>
           <p:spPr>
             <a:xfrm>
-              <a:off x="14483550" y="13444216"/>
-              <a:ext cx="665567" cy="553998"/>
+              <a:off x="14475866" y="13444216"/>
+              <a:ext cx="718466" cy="553998"/>
             </a:xfrm>
             <a:prstGeom prst="rect">
               <a:avLst/>
@@ -25417,8 +25085,8 @@
             <a:p>
               <a:r>
                 <a:rPr lang="en-US" sz="3000" b="1" dirty="0">
-                  <a:latin typeface="Times New Roman" panose="02020603050405020304" pitchFamily="18" charset="0"/>
-                  <a:cs typeface="Times New Roman" panose="02020603050405020304" pitchFamily="18" charset="0"/>
+                  <a:latin typeface="Arial" panose="020B0604020202020204" pitchFamily="34" charset="0"/>
+                  <a:cs typeface="Arial" panose="020B0604020202020204" pitchFamily="34" charset="0"/>
                 </a:rPr>
                 <a:t>0.6</a:t>
               </a:r>
@@ -25439,8 +25107,8 @@
           </p:nvSpPr>
           <p:spPr>
             <a:xfrm>
-              <a:off x="15439734" y="13426392"/>
-              <a:ext cx="665567" cy="553998"/>
+              <a:off x="15416682" y="13426392"/>
+              <a:ext cx="718466" cy="553998"/>
             </a:xfrm>
             <a:prstGeom prst="rect">
               <a:avLst/>
@@ -25455,8 +25123,8 @@
             <a:p>
               <a:r>
                 <a:rPr lang="en-US" sz="3000" b="1" dirty="0">
-                  <a:latin typeface="Times New Roman" panose="02020603050405020304" pitchFamily="18" charset="0"/>
-                  <a:cs typeface="Times New Roman" panose="02020603050405020304" pitchFamily="18" charset="0"/>
+                  <a:latin typeface="Arial" panose="020B0604020202020204" pitchFamily="34" charset="0"/>
+                  <a:cs typeface="Arial" panose="020B0604020202020204" pitchFamily="34" charset="0"/>
                 </a:rPr>
                 <a:t>0.3</a:t>
               </a:r>
@@ -25477,8 +25145,8 @@
           </p:nvSpPr>
           <p:spPr>
             <a:xfrm>
-              <a:off x="10693986" y="13445817"/>
-              <a:ext cx="793807" cy="553998"/>
+              <a:off x="10624830" y="13445817"/>
+              <a:ext cx="846707" cy="553998"/>
             </a:xfrm>
             <a:prstGeom prst="rect">
               <a:avLst/>
@@ -25493,8 +25161,8 @@
             <a:p>
               <a:r>
                 <a:rPr lang="en-US" sz="3000" b="1" dirty="0">
-                  <a:latin typeface="Times New Roman" panose="02020603050405020304" pitchFamily="18" charset="0"/>
-                  <a:cs typeface="Times New Roman" panose="02020603050405020304" pitchFamily="18" charset="0"/>
+                  <a:latin typeface="Arial" panose="020B0604020202020204" pitchFamily="34" charset="0"/>
+                  <a:cs typeface="Arial" panose="020B0604020202020204" pitchFamily="34" charset="0"/>
                 </a:rPr>
                 <a:t>-0.3</a:t>
               </a:r>
@@ -25516,7 +25184,7 @@
           <p:spPr>
             <a:xfrm>
               <a:off x="11276323" y="14044738"/>
-              <a:ext cx="4278735" cy="553998"/>
+              <a:ext cx="4695516" cy="553998"/>
             </a:xfrm>
             <a:prstGeom prst="rect">
               <a:avLst/>
@@ -25531,8 +25199,8 @@
             <a:p>
               <a:r>
                 <a:rPr lang="en-US" sz="3000" b="1" dirty="0">
-                  <a:latin typeface="Times New Roman" panose="02020603050405020304" pitchFamily="18" charset="0"/>
-                  <a:cs typeface="Times New Roman" panose="02020603050405020304" pitchFamily="18" charset="0"/>
+                  <a:latin typeface="Arial" panose="020B0604020202020204" pitchFamily="34" charset="0"/>
+                  <a:cs typeface="Arial" panose="020B0604020202020204" pitchFamily="34" charset="0"/>
                 </a:rPr>
                 <a:t>Standardized Coefficient</a:t>
               </a:r>
@@ -25955,105 +25623,12 @@
           <a:prstGeom prst="straightConnector1">
             <a:avLst/>
           </a:prstGeom>
-          <a:ln w="173863">
+          <a:ln w="171196">
             <a:solidFill>
               <a:schemeClr val="accent1">
                 <a:lumMod val="75000"/>
               </a:schemeClr>
             </a:solidFill>
-            <a:tailEnd type="triangle"/>
-          </a:ln>
-        </p:spPr>
-        <p:style>
-          <a:lnRef idx="1">
-            <a:schemeClr val="accent1"/>
-          </a:lnRef>
-          <a:fillRef idx="0">
-            <a:schemeClr val="accent1"/>
-          </a:fillRef>
-          <a:effectRef idx="0">
-            <a:schemeClr val="accent1"/>
-          </a:effectRef>
-          <a:fontRef idx="minor">
-            <a:schemeClr val="tx1"/>
-          </a:fontRef>
-        </p:style>
-      </p:cxnSp>
-      <p:cxnSp>
-        <p:nvCxnSpPr>
-          <p:cNvPr id="115" name="Elbow Connector 114">
-            <a:extLst>
-              <a:ext uri="{FF2B5EF4-FFF2-40B4-BE49-F238E27FC236}">
-                <a16:creationId xmlns:a16="http://schemas.microsoft.com/office/drawing/2014/main" id="{2B816EFE-1CF3-2286-D032-99C3D857FE47}"/>
-              </a:ext>
-            </a:extLst>
-          </p:cNvPr>
-          <p:cNvCxnSpPr>
-            <a:stCxn id="124" idx="0"/>
-            <a:endCxn id="122" idx="1"/>
-          </p:cNvCxnSpPr>
-          <p:nvPr/>
-        </p:nvCxnSpPr>
-        <p:spPr>
-          <a:xfrm rot="5400000" flipH="1" flipV="1">
-            <a:off x="15557261" y="11343842"/>
-            <a:ext cx="589520" cy="1504991"/>
-          </a:xfrm>
-          <a:prstGeom prst="bentConnector2">
-            <a:avLst/>
-          </a:prstGeom>
-          <a:ln w="12700">
-            <a:solidFill>
-              <a:schemeClr val="tx1"/>
-            </a:solidFill>
-            <a:prstDash val="dash"/>
-            <a:tailEnd type="triangle"/>
-          </a:ln>
-        </p:spPr>
-        <p:style>
-          <a:lnRef idx="1">
-            <a:schemeClr val="accent1"/>
-          </a:lnRef>
-          <a:fillRef idx="0">
-            <a:schemeClr val="accent1"/>
-          </a:fillRef>
-          <a:effectRef idx="0">
-            <a:schemeClr val="accent1"/>
-          </a:effectRef>
-          <a:fontRef idx="minor">
-            <a:schemeClr val="tx1"/>
-          </a:fontRef>
-        </p:style>
-      </p:cxnSp>
-      <p:cxnSp>
-        <p:nvCxnSpPr>
-          <p:cNvPr id="116" name="Elbow Connector 115">
-            <a:extLst>
-              <a:ext uri="{FF2B5EF4-FFF2-40B4-BE49-F238E27FC236}">
-                <a16:creationId xmlns:a16="http://schemas.microsoft.com/office/drawing/2014/main" id="{8DB5DDFE-D769-21E2-1569-302628673D5E}"/>
-              </a:ext>
-            </a:extLst>
-          </p:cNvPr>
-          <p:cNvCxnSpPr>
-            <a:cxnSpLocks/>
-            <a:stCxn id="124" idx="2"/>
-            <a:endCxn id="121" idx="1"/>
-          </p:cNvCxnSpPr>
-          <p:nvPr/>
-        </p:nvCxnSpPr>
-        <p:spPr>
-          <a:xfrm rot="16200000" flipH="1">
-            <a:off x="15534744" y="12833101"/>
-            <a:ext cx="634555" cy="1504991"/>
-          </a:xfrm>
-          <a:prstGeom prst="bentConnector2">
-            <a:avLst/>
-          </a:prstGeom>
-          <a:ln w="12700">
-            <a:solidFill>
-              <a:schemeClr val="tx1"/>
-            </a:solidFill>
-            <a:prstDash val="dash"/>
             <a:tailEnd type="triangle"/>
           </a:ln>
         </p:spPr>
@@ -26324,10 +25899,10 @@
       </p:sp>
       <p:sp>
         <p:nvSpPr>
-          <p:cNvPr id="122" name="Rectangle 121">
-            <a:extLst>
-              <a:ext uri="{FF2B5EF4-FFF2-40B4-BE49-F238E27FC236}">
-                <a16:creationId xmlns:a16="http://schemas.microsoft.com/office/drawing/2014/main" id="{44E7514D-E322-67D6-FAAE-AD7D5D60FCE0}"/>
+          <p:cNvPr id="124" name="Rectangle 123">
+            <a:extLst>
+              <a:ext uri="{FF2B5EF4-FFF2-40B4-BE49-F238E27FC236}">
+                <a16:creationId xmlns:a16="http://schemas.microsoft.com/office/drawing/2014/main" id="{0B11CFA2-D363-9F33-2E4C-2A83DFC30D7F}"/>
               </a:ext>
             </a:extLst>
           </p:cNvPr>
@@ -26336,7 +25911,7 @@
         </p:nvSpPr>
         <p:spPr>
           <a:xfrm>
-            <a:off x="16604517" y="11362965"/>
+            <a:off x="14189827" y="12391097"/>
             <a:ext cx="1819398" cy="877223"/>
           </a:xfrm>
           <a:prstGeom prst="rect">
@@ -26380,86 +25955,6 @@
                 <a:latin typeface="Arial" panose="020B0604020202020204" pitchFamily="34" charset="0"/>
                 <a:cs typeface="Arial" panose="020B0604020202020204" pitchFamily="34" charset="0"/>
               </a:rPr>
-              <a:t>N</a:t>
-            </a:r>
-            <a:r>
-              <a:rPr lang="en-US" sz="2400" b="1" baseline="-25000" dirty="0">
-                <a:solidFill>
-                  <a:schemeClr val="tx1"/>
-                </a:solidFill>
-                <a:latin typeface="Arial" panose="020B0604020202020204" pitchFamily="34" charset="0"/>
-                <a:cs typeface="Arial" panose="020B0604020202020204" pitchFamily="34" charset="0"/>
-              </a:rPr>
-              <a:t>mass</a:t>
-            </a:r>
-            <a:endParaRPr lang="en-US" sz="2400" b="1" i="1" dirty="0">
-              <a:solidFill>
-                <a:schemeClr val="tx1"/>
-              </a:solidFill>
-              <a:latin typeface="Arial" panose="020B0604020202020204" pitchFamily="34" charset="0"/>
-              <a:cs typeface="Arial" panose="020B0604020202020204" pitchFamily="34" charset="0"/>
-            </a:endParaRPr>
-          </a:p>
-        </p:txBody>
-      </p:sp>
-      <p:sp>
-        <p:nvSpPr>
-          <p:cNvPr id="124" name="Rectangle 123">
-            <a:extLst>
-              <a:ext uri="{FF2B5EF4-FFF2-40B4-BE49-F238E27FC236}">
-                <a16:creationId xmlns:a16="http://schemas.microsoft.com/office/drawing/2014/main" id="{0B11CFA2-D363-9F33-2E4C-2A83DFC30D7F}"/>
-              </a:ext>
-            </a:extLst>
-          </p:cNvPr>
-          <p:cNvSpPr/>
-          <p:nvPr/>
-        </p:nvSpPr>
-        <p:spPr>
-          <a:xfrm>
-            <a:off x="14189827" y="12391097"/>
-            <a:ext cx="1819398" cy="877223"/>
-          </a:xfrm>
-          <a:prstGeom prst="rect">
-            <a:avLst/>
-          </a:prstGeom>
-          <a:solidFill>
-            <a:schemeClr val="bg1"/>
-          </a:solidFill>
-          <a:ln w="38100">
-            <a:solidFill>
-              <a:schemeClr val="tx1"/>
-            </a:solidFill>
-          </a:ln>
-        </p:spPr>
-        <p:style>
-          <a:lnRef idx="2">
-            <a:schemeClr val="accent1">
-              <a:shade val="50000"/>
-            </a:schemeClr>
-          </a:lnRef>
-          <a:fillRef idx="1">
-            <a:schemeClr val="accent1"/>
-          </a:fillRef>
-          <a:effectRef idx="0">
-            <a:schemeClr val="accent1"/>
-          </a:effectRef>
-          <a:fontRef idx="minor">
-            <a:schemeClr val="lt1"/>
-          </a:fontRef>
-        </p:style>
-        <p:txBody>
-          <a:bodyPr rtlCol="0" anchor="ctr"/>
-          <a:lstStyle/>
-          <a:p>
-            <a:pPr algn="ctr"/>
-            <a:r>
-              <a:rPr lang="en-US" sz="2400" b="1" i="1" dirty="0">
-                <a:solidFill>
-                  <a:schemeClr val="tx1"/>
-                </a:solidFill>
-                <a:latin typeface="Arial" panose="020B0604020202020204" pitchFamily="34" charset="0"/>
-                <a:cs typeface="Arial" panose="020B0604020202020204" pitchFamily="34" charset="0"/>
-              </a:rPr>
               <a:t>C</a:t>
             </a:r>
             <a:r>
@@ -26495,53 +25990,6 @@
           </a:p>
         </p:txBody>
       </p:sp>
-      <p:cxnSp>
-        <p:nvCxnSpPr>
-          <p:cNvPr id="128" name="Elbow Connector 127">
-            <a:extLst>
-              <a:ext uri="{FF2B5EF4-FFF2-40B4-BE49-F238E27FC236}">
-                <a16:creationId xmlns:a16="http://schemas.microsoft.com/office/drawing/2014/main" id="{95AAB5E0-0ABA-EF78-5C9E-761D69E97560}"/>
-              </a:ext>
-            </a:extLst>
-          </p:cNvPr>
-          <p:cNvCxnSpPr>
-            <a:cxnSpLocks/>
-            <a:stCxn id="123" idx="2"/>
-            <a:endCxn id="125" idx="3"/>
-          </p:cNvCxnSpPr>
-          <p:nvPr/>
-        </p:nvCxnSpPr>
-        <p:spPr>
-          <a:xfrm rot="5400000">
-            <a:off x="11389378" y="10819543"/>
-            <a:ext cx="509098" cy="1453005"/>
-          </a:xfrm>
-          <a:prstGeom prst="bentConnector2">
-            <a:avLst/>
-          </a:prstGeom>
-          <a:ln w="157226">
-            <a:solidFill>
-              <a:srgbClr val="C00000"/>
-            </a:solidFill>
-            <a:headEnd type="oval"/>
-            <a:tailEnd type="triangle"/>
-          </a:ln>
-        </p:spPr>
-        <p:style>
-          <a:lnRef idx="1">
-            <a:schemeClr val="accent1"/>
-          </a:lnRef>
-          <a:fillRef idx="0">
-            <a:schemeClr val="accent1"/>
-          </a:fillRef>
-          <a:effectRef idx="0">
-            <a:schemeClr val="accent1"/>
-          </a:effectRef>
-          <a:fontRef idx="minor">
-            <a:schemeClr val="tx1"/>
-          </a:fontRef>
-        </p:style>
-      </p:cxnSp>
       <p:cxnSp>
         <p:nvCxnSpPr>
           <p:cNvPr id="129" name="Straight Arrow Connector 128">
@@ -26609,7 +26057,7 @@
           <a:prstGeom prst="bentConnector4">
             <a:avLst>
               <a:gd name="adj1" fmla="val -15756"/>
-              <a:gd name="adj2" fmla="val 150047"/>
+              <a:gd name="adj2" fmla="val 160739"/>
             </a:avLst>
           </a:prstGeom>
           <a:ln w="53975">
@@ -26754,52 +26202,6 @@
       </p:sp>
       <p:cxnSp>
         <p:nvCxnSpPr>
-          <p:cNvPr id="134" name="Elbow Connector 133">
-            <a:extLst>
-              <a:ext uri="{FF2B5EF4-FFF2-40B4-BE49-F238E27FC236}">
-                <a16:creationId xmlns:a16="http://schemas.microsoft.com/office/drawing/2014/main" id="{7B7B7EC2-6038-BC27-4DFA-844D72777E06}"/>
-              </a:ext>
-            </a:extLst>
-          </p:cNvPr>
-          <p:cNvCxnSpPr>
-            <a:cxnSpLocks/>
-            <a:stCxn id="123" idx="3"/>
-          </p:cNvCxnSpPr>
-          <p:nvPr/>
-        </p:nvCxnSpPr>
-        <p:spPr>
-          <a:xfrm>
-            <a:off x="13280128" y="10852885"/>
-            <a:ext cx="1472331" cy="1538211"/>
-          </a:xfrm>
-          <a:prstGeom prst="bentConnector2">
-            <a:avLst/>
-          </a:prstGeom>
-          <a:ln w="12700">
-            <a:solidFill>
-              <a:schemeClr val="tx1"/>
-            </a:solidFill>
-            <a:prstDash val="dash"/>
-            <a:tailEnd type="triangle"/>
-          </a:ln>
-        </p:spPr>
-        <p:style>
-          <a:lnRef idx="1">
-            <a:schemeClr val="accent1"/>
-          </a:lnRef>
-          <a:fillRef idx="0">
-            <a:schemeClr val="accent1"/>
-          </a:fillRef>
-          <a:effectRef idx="0">
-            <a:schemeClr val="accent1"/>
-          </a:effectRef>
-          <a:fontRef idx="minor">
-            <a:schemeClr val="tx1"/>
-          </a:fontRef>
-        </p:style>
-      </p:cxnSp>
-      <p:cxnSp>
-        <p:nvCxnSpPr>
           <p:cNvPr id="136" name="Straight Arrow Connector 135">
             <a:extLst>
               <a:ext uri="{FF2B5EF4-FFF2-40B4-BE49-F238E27FC236}">
@@ -27237,12 +26639,105 @@
           </a:p>
         </p:txBody>
       </p:sp>
+      <p:cxnSp>
+        <p:nvCxnSpPr>
+          <p:cNvPr id="87" name="Elbow Connector 86">
+            <a:extLst>
+              <a:ext uri="{FF2B5EF4-FFF2-40B4-BE49-F238E27FC236}">
+                <a16:creationId xmlns:a16="http://schemas.microsoft.com/office/drawing/2014/main" id="{4F0F222A-5003-7CC3-4454-9411960E36D9}"/>
+              </a:ext>
+            </a:extLst>
+          </p:cNvPr>
+          <p:cNvCxnSpPr>
+            <a:cxnSpLocks/>
+          </p:cNvCxnSpPr>
+          <p:nvPr/>
+        </p:nvCxnSpPr>
+        <p:spPr>
+          <a:xfrm>
+            <a:off x="10937412" y="4135502"/>
+            <a:ext cx="3397947" cy="561180"/>
+          </a:xfrm>
+          <a:prstGeom prst="bentConnector3">
+            <a:avLst>
+              <a:gd name="adj1" fmla="val 100013"/>
+            </a:avLst>
+          </a:prstGeom>
+          <a:ln w="15494">
+            <a:solidFill>
+              <a:srgbClr val="C00000"/>
+            </a:solidFill>
+            <a:headEnd type="oval"/>
+            <a:tailEnd type="triangle"/>
+          </a:ln>
+        </p:spPr>
+        <p:style>
+          <a:lnRef idx="1">
+            <a:schemeClr val="accent1"/>
+          </a:lnRef>
+          <a:fillRef idx="0">
+            <a:schemeClr val="accent1"/>
+          </a:fillRef>
+          <a:effectRef idx="0">
+            <a:schemeClr val="accent1"/>
+          </a:effectRef>
+          <a:fontRef idx="minor">
+            <a:schemeClr val="tx1"/>
+          </a:fontRef>
+        </p:style>
+      </p:cxnSp>
+      <p:cxnSp>
+        <p:nvCxnSpPr>
+          <p:cNvPr id="96" name="Elbow Connector 95">
+            <a:extLst>
+              <a:ext uri="{FF2B5EF4-FFF2-40B4-BE49-F238E27FC236}">
+                <a16:creationId xmlns:a16="http://schemas.microsoft.com/office/drawing/2014/main" id="{379B4E34-B7A7-58A8-A750-A42910FBEF06}"/>
+              </a:ext>
+            </a:extLst>
+          </p:cNvPr>
+          <p:cNvCxnSpPr>
+            <a:cxnSpLocks/>
+            <a:stCxn id="97" idx="1"/>
+          </p:cNvCxnSpPr>
+          <p:nvPr/>
+        </p:nvCxnSpPr>
+        <p:spPr>
+          <a:xfrm rot="10800000" flipV="1">
+            <a:off x="10007726" y="10395671"/>
+            <a:ext cx="1459355" cy="981318"/>
+          </a:xfrm>
+          <a:prstGeom prst="bentConnector2">
+            <a:avLst/>
+          </a:prstGeom>
+          <a:ln w="147193">
+            <a:solidFill>
+              <a:srgbClr val="C00000"/>
+            </a:solidFill>
+            <a:headEnd type="oval"/>
+            <a:tailEnd type="triangle"/>
+          </a:ln>
+        </p:spPr>
+        <p:style>
+          <a:lnRef idx="1">
+            <a:schemeClr val="accent1"/>
+          </a:lnRef>
+          <a:fillRef idx="0">
+            <a:schemeClr val="accent1"/>
+          </a:fillRef>
+          <a:effectRef idx="0">
+            <a:schemeClr val="accent1"/>
+          </a:effectRef>
+          <a:fontRef idx="minor">
+            <a:schemeClr val="tx1"/>
+          </a:fontRef>
+        </p:style>
+      </p:cxnSp>
       <p:sp>
         <p:nvSpPr>
-          <p:cNvPr id="123" name="Rectangle 122">
-            <a:extLst>
-              <a:ext uri="{FF2B5EF4-FFF2-40B4-BE49-F238E27FC236}">
-                <a16:creationId xmlns:a16="http://schemas.microsoft.com/office/drawing/2014/main" id="{A3D0FA0D-1025-266A-3EFD-905C037D8388}"/>
+          <p:cNvPr id="97" name="Rectangle 96">
+            <a:extLst>
+              <a:ext uri="{FF2B5EF4-FFF2-40B4-BE49-F238E27FC236}">
+                <a16:creationId xmlns:a16="http://schemas.microsoft.com/office/drawing/2014/main" id="{4AF4D0D3-F69E-970D-D196-ED034D1218FF}"/>
               </a:ext>
             </a:extLst>
           </p:cNvPr>
@@ -27251,7 +26746,7 @@
         </p:nvSpPr>
         <p:spPr>
           <a:xfrm>
-            <a:off x="11460730" y="10414273"/>
+            <a:off x="11467080" y="9957059"/>
             <a:ext cx="1819398" cy="877223"/>
           </a:xfrm>
           <a:prstGeom prst="rect">
@@ -27307,103 +26802,36 @@
           </a:p>
         </p:txBody>
       </p:sp>
-      <p:sp>
-        <p:nvSpPr>
-          <p:cNvPr id="125" name="Rectangle 124">
-            <a:extLst>
-              <a:ext uri="{FF2B5EF4-FFF2-40B4-BE49-F238E27FC236}">
-                <a16:creationId xmlns:a16="http://schemas.microsoft.com/office/drawing/2014/main" id="{5C207482-5FB8-477F-09C3-E31A8AE7FE8C}"/>
-              </a:ext>
-            </a:extLst>
-          </p:cNvPr>
-          <p:cNvSpPr/>
-          <p:nvPr/>
-        </p:nvSpPr>
-        <p:spPr>
-          <a:xfrm>
-            <a:off x="9098026" y="11361982"/>
-            <a:ext cx="1819398" cy="877223"/>
-          </a:xfrm>
-          <a:prstGeom prst="rect">
-            <a:avLst/>
-          </a:prstGeom>
-          <a:solidFill>
-            <a:schemeClr val="bg1"/>
-          </a:solidFill>
-          <a:ln w="38100">
-            <a:solidFill>
-              <a:schemeClr val="tx1"/>
-            </a:solidFill>
-          </a:ln>
-        </p:spPr>
-        <p:style>
-          <a:lnRef idx="2">
-            <a:schemeClr val="accent1">
-              <a:shade val="50000"/>
-            </a:schemeClr>
-          </a:lnRef>
-          <a:fillRef idx="1">
-            <a:schemeClr val="accent1"/>
-          </a:fillRef>
-          <a:effectRef idx="0">
-            <a:schemeClr val="accent1"/>
-          </a:effectRef>
-          <a:fontRef idx="minor">
-            <a:schemeClr val="lt1"/>
-          </a:fontRef>
-        </p:style>
-        <p:txBody>
-          <a:bodyPr rtlCol="0" anchor="ctr"/>
-          <a:lstStyle/>
-          <a:p>
-            <a:pPr algn="ctr"/>
-            <a:r>
-              <a:rPr lang="en-US" sz="2400" b="1" i="1" dirty="0">
-                <a:solidFill>
-                  <a:schemeClr val="tx1"/>
-                </a:solidFill>
-                <a:latin typeface="Arial" panose="020B0604020202020204" pitchFamily="34" charset="0"/>
-                <a:cs typeface="Arial" panose="020B0604020202020204" pitchFamily="34" charset="0"/>
-              </a:rPr>
-              <a:t>Soil moisture</a:t>
-            </a:r>
-            <a:endParaRPr lang="en-US" sz="2400" b="1" dirty="0">
-              <a:solidFill>
-                <a:schemeClr val="tx1"/>
-              </a:solidFill>
-              <a:latin typeface="Arial" panose="020B0604020202020204" pitchFamily="34" charset="0"/>
-              <a:cs typeface="Arial" panose="020B0604020202020204" pitchFamily="34" charset="0"/>
-            </a:endParaRPr>
-          </a:p>
-        </p:txBody>
-      </p:sp>
       <p:cxnSp>
         <p:nvCxnSpPr>
-          <p:cNvPr id="161" name="Elbow Connector 160">
-            <a:extLst>
-              <a:ext uri="{FF2B5EF4-FFF2-40B4-BE49-F238E27FC236}">
-                <a16:creationId xmlns:a16="http://schemas.microsoft.com/office/drawing/2014/main" id="{F6DDB46A-B963-3F96-046F-4EDE45177B15}"/>
+          <p:cNvPr id="103" name="Elbow Connector 102">
+            <a:extLst>
+              <a:ext uri="{FF2B5EF4-FFF2-40B4-BE49-F238E27FC236}">
+                <a16:creationId xmlns:a16="http://schemas.microsoft.com/office/drawing/2014/main" id="{5CB050A9-177C-DD4F-55C1-67DABEFCF568}"/>
               </a:ext>
             </a:extLst>
           </p:cNvPr>
           <p:cNvCxnSpPr>
-            <a:stCxn id="20" idx="3"/>
+            <a:cxnSpLocks/>
           </p:cNvCxnSpPr>
           <p:nvPr/>
         </p:nvCxnSpPr>
         <p:spPr>
-          <a:xfrm>
-            <a:off x="13280128" y="3187793"/>
-            <a:ext cx="452605" cy="983074"/>
-          </a:xfrm>
-          <a:prstGeom prst="bentConnector2">
-            <a:avLst/>
-          </a:prstGeom>
-          <a:ln w="57911">
+          <a:xfrm rot="16200000" flipH="1">
+            <a:off x="12551191" y="2578720"/>
+            <a:ext cx="1571822" cy="2722747"/>
+          </a:xfrm>
+          <a:prstGeom prst="bentConnector3">
+            <a:avLst>
+              <a:gd name="adj1" fmla="val 33670"/>
+            </a:avLst>
+          </a:prstGeom>
+          <a:ln w="77089">
             <a:solidFill>
               <a:srgbClr val="C00000"/>
             </a:solidFill>
             <a:headEnd type="oval"/>
+            <a:tailEnd type="triangle"/>
           </a:ln>
         </p:spPr>
         <p:style>
@@ -27435,7 +26863,7 @@
         </p:nvSpPr>
         <p:spPr>
           <a:xfrm>
-            <a:off x="11460730" y="2749181"/>
+            <a:off x="11467080" y="2276960"/>
             <a:ext cx="1819398" cy="877223"/>
           </a:xfrm>
           <a:prstGeom prst="rect">
@@ -27488,6 +26916,593 @@
               <a:latin typeface="Arial" panose="020B0604020202020204" pitchFamily="34" charset="0"/>
               <a:cs typeface="Arial" panose="020B0604020202020204" pitchFamily="34" charset="0"/>
             </a:endParaRPr>
+          </a:p>
+        </p:txBody>
+      </p:sp>
+      <p:sp>
+        <p:nvSpPr>
+          <p:cNvPr id="23" name="Rectangle 22">
+            <a:extLst>
+              <a:ext uri="{FF2B5EF4-FFF2-40B4-BE49-F238E27FC236}">
+                <a16:creationId xmlns:a16="http://schemas.microsoft.com/office/drawing/2014/main" id="{3AAD1016-970D-A63E-5FF8-0CE765630A13}"/>
+              </a:ext>
+            </a:extLst>
+          </p:cNvPr>
+          <p:cNvSpPr/>
+          <p:nvPr/>
+        </p:nvSpPr>
+        <p:spPr>
+          <a:xfrm>
+            <a:off x="9098026" y="3696890"/>
+            <a:ext cx="1819398" cy="877223"/>
+          </a:xfrm>
+          <a:prstGeom prst="rect">
+            <a:avLst/>
+          </a:prstGeom>
+          <a:solidFill>
+            <a:schemeClr val="bg1"/>
+          </a:solidFill>
+          <a:ln w="38100">
+            <a:solidFill>
+              <a:schemeClr val="tx1"/>
+            </a:solidFill>
+          </a:ln>
+        </p:spPr>
+        <p:style>
+          <a:lnRef idx="2">
+            <a:schemeClr val="accent1">
+              <a:shade val="50000"/>
+            </a:schemeClr>
+          </a:lnRef>
+          <a:fillRef idx="1">
+            <a:schemeClr val="accent1"/>
+          </a:fillRef>
+          <a:effectRef idx="0">
+            <a:schemeClr val="accent1"/>
+          </a:effectRef>
+          <a:fontRef idx="minor">
+            <a:schemeClr val="lt1"/>
+          </a:fontRef>
+        </p:style>
+        <p:txBody>
+          <a:bodyPr rtlCol="0" anchor="ctr"/>
+          <a:lstStyle/>
+          <a:p>
+            <a:pPr algn="ctr"/>
+            <a:r>
+              <a:rPr lang="en-US" sz="2400" b="1" i="1" dirty="0">
+                <a:solidFill>
+                  <a:schemeClr val="tx1"/>
+                </a:solidFill>
+                <a:latin typeface="Arial" panose="020B0604020202020204" pitchFamily="34" charset="0"/>
+                <a:cs typeface="Arial" panose="020B0604020202020204" pitchFamily="34" charset="0"/>
+              </a:rPr>
+              <a:t>Soil moisture</a:t>
+            </a:r>
+            <a:endParaRPr lang="en-US" sz="2400" b="1" dirty="0">
+              <a:solidFill>
+                <a:schemeClr val="tx1"/>
+              </a:solidFill>
+              <a:latin typeface="Arial" panose="020B0604020202020204" pitchFamily="34" charset="0"/>
+              <a:cs typeface="Arial" panose="020B0604020202020204" pitchFamily="34" charset="0"/>
+            </a:endParaRPr>
+          </a:p>
+        </p:txBody>
+      </p:sp>
+      <p:sp>
+        <p:nvSpPr>
+          <p:cNvPr id="19" name="Rectangle 18">
+            <a:extLst>
+              <a:ext uri="{FF2B5EF4-FFF2-40B4-BE49-F238E27FC236}">
+                <a16:creationId xmlns:a16="http://schemas.microsoft.com/office/drawing/2014/main" id="{BFD7E968-8F81-887D-0BC6-8F6001755390}"/>
+              </a:ext>
+            </a:extLst>
+          </p:cNvPr>
+          <p:cNvSpPr/>
+          <p:nvPr/>
+        </p:nvSpPr>
+        <p:spPr>
+          <a:xfrm>
+            <a:off x="16604517" y="3697873"/>
+            <a:ext cx="1819398" cy="877223"/>
+          </a:xfrm>
+          <a:prstGeom prst="rect">
+            <a:avLst/>
+          </a:prstGeom>
+          <a:solidFill>
+            <a:schemeClr val="bg1"/>
+          </a:solidFill>
+          <a:ln w="38100">
+            <a:solidFill>
+              <a:schemeClr val="tx1"/>
+            </a:solidFill>
+          </a:ln>
+        </p:spPr>
+        <p:style>
+          <a:lnRef idx="2">
+            <a:schemeClr val="accent1">
+              <a:shade val="50000"/>
+            </a:schemeClr>
+          </a:lnRef>
+          <a:fillRef idx="1">
+            <a:schemeClr val="accent1"/>
+          </a:fillRef>
+          <a:effectRef idx="0">
+            <a:schemeClr val="accent1"/>
+          </a:effectRef>
+          <a:fontRef idx="minor">
+            <a:schemeClr val="lt1"/>
+          </a:fontRef>
+        </p:style>
+        <p:txBody>
+          <a:bodyPr rtlCol="0" anchor="ctr"/>
+          <a:lstStyle/>
+          <a:p>
+            <a:pPr algn="ctr"/>
+            <a:r>
+              <a:rPr lang="en-US" sz="2400" b="1" i="1" dirty="0">
+                <a:solidFill>
+                  <a:schemeClr val="tx1"/>
+                </a:solidFill>
+                <a:latin typeface="Arial" panose="020B0604020202020204" pitchFamily="34" charset="0"/>
+                <a:cs typeface="Arial" panose="020B0604020202020204" pitchFamily="34" charset="0"/>
+              </a:rPr>
+              <a:t>N</a:t>
+            </a:r>
+            <a:r>
+              <a:rPr lang="en-US" sz="2400" b="1" baseline="-25000" dirty="0">
+                <a:solidFill>
+                  <a:schemeClr val="tx1"/>
+                </a:solidFill>
+                <a:latin typeface="Arial" panose="020B0604020202020204" pitchFamily="34" charset="0"/>
+                <a:cs typeface="Arial" panose="020B0604020202020204" pitchFamily="34" charset="0"/>
+              </a:rPr>
+              <a:t>mass</a:t>
+            </a:r>
+            <a:endParaRPr lang="en-US" sz="2400" b="1" i="1" dirty="0">
+              <a:solidFill>
+                <a:schemeClr val="tx1"/>
+              </a:solidFill>
+              <a:latin typeface="Arial" panose="020B0604020202020204" pitchFamily="34" charset="0"/>
+              <a:cs typeface="Arial" panose="020B0604020202020204" pitchFamily="34" charset="0"/>
+            </a:endParaRPr>
+          </a:p>
+        </p:txBody>
+      </p:sp>
+      <p:sp>
+        <p:nvSpPr>
+          <p:cNvPr id="21" name="Rectangle 20">
+            <a:extLst>
+              <a:ext uri="{FF2B5EF4-FFF2-40B4-BE49-F238E27FC236}">
+                <a16:creationId xmlns:a16="http://schemas.microsoft.com/office/drawing/2014/main" id="{162D8A45-A317-DFD4-7949-E7194DB40F11}"/>
+              </a:ext>
+            </a:extLst>
+          </p:cNvPr>
+          <p:cNvSpPr/>
+          <p:nvPr/>
+        </p:nvSpPr>
+        <p:spPr>
+          <a:xfrm>
+            <a:off x="14189827" y="4726005"/>
+            <a:ext cx="1819398" cy="877223"/>
+          </a:xfrm>
+          <a:prstGeom prst="rect">
+            <a:avLst/>
+          </a:prstGeom>
+          <a:solidFill>
+            <a:schemeClr val="bg1"/>
+          </a:solidFill>
+          <a:ln w="38100">
+            <a:solidFill>
+              <a:schemeClr val="tx1"/>
+            </a:solidFill>
+          </a:ln>
+        </p:spPr>
+        <p:style>
+          <a:lnRef idx="2">
+            <a:schemeClr val="accent1">
+              <a:shade val="50000"/>
+            </a:schemeClr>
+          </a:lnRef>
+          <a:fillRef idx="1">
+            <a:schemeClr val="accent1"/>
+          </a:fillRef>
+          <a:effectRef idx="0">
+            <a:schemeClr val="accent1"/>
+          </a:effectRef>
+          <a:fontRef idx="minor">
+            <a:schemeClr val="lt1"/>
+          </a:fontRef>
+        </p:style>
+        <p:txBody>
+          <a:bodyPr rtlCol="0" anchor="ctr"/>
+          <a:lstStyle/>
+          <a:p>
+            <a:pPr algn="ctr"/>
+            <a:r>
+              <a:rPr lang="en-US" sz="2400" b="1" i="1" dirty="0">
+                <a:solidFill>
+                  <a:schemeClr val="tx1"/>
+                </a:solidFill>
+                <a:latin typeface="Arial" panose="020B0604020202020204" pitchFamily="34" charset="0"/>
+                <a:cs typeface="Arial" panose="020B0604020202020204" pitchFamily="34" charset="0"/>
+              </a:rPr>
+              <a:t>C</a:t>
+            </a:r>
+            <a:r>
+              <a:rPr lang="en-US" sz="2400" b="1" baseline="-25000" dirty="0">
+                <a:solidFill>
+                  <a:schemeClr val="tx1"/>
+                </a:solidFill>
+                <a:latin typeface="Arial" panose="020B0604020202020204" pitchFamily="34" charset="0"/>
+                <a:cs typeface="Arial" panose="020B0604020202020204" pitchFamily="34" charset="0"/>
+              </a:rPr>
+              <a:t>i</a:t>
+            </a:r>
+            <a:r>
+              <a:rPr lang="en-US" sz="2400" b="1" i="1" dirty="0">
+                <a:solidFill>
+                  <a:schemeClr val="tx1"/>
+                </a:solidFill>
+                <a:latin typeface="Arial" panose="020B0604020202020204" pitchFamily="34" charset="0"/>
+                <a:cs typeface="Arial" panose="020B0604020202020204" pitchFamily="34" charset="0"/>
+              </a:rPr>
+              <a:t>:C</a:t>
+            </a:r>
+            <a:r>
+              <a:rPr lang="en-US" sz="2400" b="1" baseline="-25000" dirty="0">
+                <a:solidFill>
+                  <a:schemeClr val="tx1"/>
+                </a:solidFill>
+                <a:latin typeface="Arial" panose="020B0604020202020204" pitchFamily="34" charset="0"/>
+                <a:cs typeface="Arial" panose="020B0604020202020204" pitchFamily="34" charset="0"/>
+              </a:rPr>
+              <a:t>a</a:t>
+            </a:r>
+          </a:p>
+        </p:txBody>
+      </p:sp>
+      <p:sp>
+        <p:nvSpPr>
+          <p:cNvPr id="125" name="Rectangle 124">
+            <a:extLst>
+              <a:ext uri="{FF2B5EF4-FFF2-40B4-BE49-F238E27FC236}">
+                <a16:creationId xmlns:a16="http://schemas.microsoft.com/office/drawing/2014/main" id="{5C207482-5FB8-477F-09C3-E31A8AE7FE8C}"/>
+              </a:ext>
+            </a:extLst>
+          </p:cNvPr>
+          <p:cNvSpPr/>
+          <p:nvPr/>
+        </p:nvSpPr>
+        <p:spPr>
+          <a:xfrm>
+            <a:off x="9098026" y="11361982"/>
+            <a:ext cx="1819398" cy="877223"/>
+          </a:xfrm>
+          <a:prstGeom prst="rect">
+            <a:avLst/>
+          </a:prstGeom>
+          <a:solidFill>
+            <a:schemeClr val="bg1"/>
+          </a:solidFill>
+          <a:ln w="38100">
+            <a:solidFill>
+              <a:schemeClr val="tx1"/>
+            </a:solidFill>
+          </a:ln>
+        </p:spPr>
+        <p:style>
+          <a:lnRef idx="2">
+            <a:schemeClr val="accent1">
+              <a:shade val="50000"/>
+            </a:schemeClr>
+          </a:lnRef>
+          <a:fillRef idx="1">
+            <a:schemeClr val="accent1"/>
+          </a:fillRef>
+          <a:effectRef idx="0">
+            <a:schemeClr val="accent1"/>
+          </a:effectRef>
+          <a:fontRef idx="minor">
+            <a:schemeClr val="lt1"/>
+          </a:fontRef>
+        </p:style>
+        <p:txBody>
+          <a:bodyPr rtlCol="0" anchor="ctr"/>
+          <a:lstStyle/>
+          <a:p>
+            <a:pPr algn="ctr"/>
+            <a:r>
+              <a:rPr lang="en-US" sz="2400" b="1" i="1" dirty="0">
+                <a:solidFill>
+                  <a:schemeClr val="tx1"/>
+                </a:solidFill>
+                <a:latin typeface="Arial" panose="020B0604020202020204" pitchFamily="34" charset="0"/>
+                <a:cs typeface="Arial" panose="020B0604020202020204" pitchFamily="34" charset="0"/>
+              </a:rPr>
+              <a:t>Soil moisture</a:t>
+            </a:r>
+            <a:endParaRPr lang="en-US" sz="2400" b="1" dirty="0">
+              <a:solidFill>
+                <a:schemeClr val="tx1"/>
+              </a:solidFill>
+              <a:latin typeface="Arial" panose="020B0604020202020204" pitchFamily="34" charset="0"/>
+              <a:cs typeface="Arial" panose="020B0604020202020204" pitchFamily="34" charset="0"/>
+            </a:endParaRPr>
+          </a:p>
+        </p:txBody>
+      </p:sp>
+      <p:sp>
+        <p:nvSpPr>
+          <p:cNvPr id="122" name="Rectangle 121">
+            <a:extLst>
+              <a:ext uri="{FF2B5EF4-FFF2-40B4-BE49-F238E27FC236}">
+                <a16:creationId xmlns:a16="http://schemas.microsoft.com/office/drawing/2014/main" id="{44E7514D-E322-67D6-FAAE-AD7D5D60FCE0}"/>
+              </a:ext>
+            </a:extLst>
+          </p:cNvPr>
+          <p:cNvSpPr/>
+          <p:nvPr/>
+        </p:nvSpPr>
+        <p:spPr>
+          <a:xfrm>
+            <a:off x="16604517" y="11362965"/>
+            <a:ext cx="1819398" cy="877223"/>
+          </a:xfrm>
+          <a:prstGeom prst="rect">
+            <a:avLst/>
+          </a:prstGeom>
+          <a:solidFill>
+            <a:schemeClr val="bg1"/>
+          </a:solidFill>
+          <a:ln w="38100">
+            <a:solidFill>
+              <a:schemeClr val="tx1"/>
+            </a:solidFill>
+          </a:ln>
+        </p:spPr>
+        <p:style>
+          <a:lnRef idx="2">
+            <a:schemeClr val="accent1">
+              <a:shade val="50000"/>
+            </a:schemeClr>
+          </a:lnRef>
+          <a:fillRef idx="1">
+            <a:schemeClr val="accent1"/>
+          </a:fillRef>
+          <a:effectRef idx="0">
+            <a:schemeClr val="accent1"/>
+          </a:effectRef>
+          <a:fontRef idx="minor">
+            <a:schemeClr val="lt1"/>
+          </a:fontRef>
+        </p:style>
+        <p:txBody>
+          <a:bodyPr rtlCol="0" anchor="ctr"/>
+          <a:lstStyle/>
+          <a:p>
+            <a:pPr algn="ctr"/>
+            <a:r>
+              <a:rPr lang="en-US" sz="2400" b="1" i="1" dirty="0">
+                <a:solidFill>
+                  <a:schemeClr val="tx1"/>
+                </a:solidFill>
+                <a:latin typeface="Arial" panose="020B0604020202020204" pitchFamily="34" charset="0"/>
+                <a:cs typeface="Arial" panose="020B0604020202020204" pitchFamily="34" charset="0"/>
+              </a:rPr>
+              <a:t>N</a:t>
+            </a:r>
+            <a:r>
+              <a:rPr lang="en-US" sz="2400" b="1" baseline="-25000" dirty="0">
+                <a:solidFill>
+                  <a:schemeClr val="tx1"/>
+                </a:solidFill>
+                <a:latin typeface="Arial" panose="020B0604020202020204" pitchFamily="34" charset="0"/>
+                <a:cs typeface="Arial" panose="020B0604020202020204" pitchFamily="34" charset="0"/>
+              </a:rPr>
+              <a:t>mass</a:t>
+            </a:r>
+            <a:endParaRPr lang="en-US" sz="2400" b="1" i="1" dirty="0">
+              <a:solidFill>
+                <a:schemeClr val="tx1"/>
+              </a:solidFill>
+              <a:latin typeface="Arial" panose="020B0604020202020204" pitchFamily="34" charset="0"/>
+              <a:cs typeface="Arial" panose="020B0604020202020204" pitchFamily="34" charset="0"/>
+            </a:endParaRPr>
+          </a:p>
+        </p:txBody>
+      </p:sp>
+      <p:sp>
+        <p:nvSpPr>
+          <p:cNvPr id="141" name="TextBox 140">
+            <a:extLst>
+              <a:ext uri="{FF2B5EF4-FFF2-40B4-BE49-F238E27FC236}">
+                <a16:creationId xmlns:a16="http://schemas.microsoft.com/office/drawing/2014/main" id="{7CEA00E0-F289-2A57-17CF-927D4D33B123}"/>
+              </a:ext>
+            </a:extLst>
+          </p:cNvPr>
+          <p:cNvSpPr txBox="1"/>
+          <p:nvPr/>
+        </p:nvSpPr>
+        <p:spPr>
+          <a:xfrm>
+            <a:off x="7170675" y="7431412"/>
+            <a:ext cx="7980390" cy="400110"/>
+          </a:xfrm>
+          <a:prstGeom prst="rect">
+            <a:avLst/>
+          </a:prstGeom>
+          <a:solidFill>
+            <a:schemeClr val="bg1"/>
+          </a:solidFill>
+          <a:ln w="19050">
+            <a:solidFill>
+              <a:schemeClr val="tx1"/>
+            </a:solidFill>
+          </a:ln>
+        </p:spPr>
+        <p:txBody>
+          <a:bodyPr wrap="none" rtlCol="0">
+            <a:spAutoFit/>
+          </a:bodyPr>
+          <a:lstStyle/>
+          <a:p>
+            <a:r>
+              <a:rPr lang="en-US" sz="2000" dirty="0">
+                <a:latin typeface="Arial" panose="020B0604020202020204" pitchFamily="34" charset="0"/>
+                <a:cs typeface="Arial" panose="020B0604020202020204" pitchFamily="34" charset="0"/>
+              </a:rPr>
+              <a:t>Fisher’s C = 31.796, </a:t>
+            </a:r>
+            <a:r>
+              <a:rPr lang="en-US" sz="2000" i="1" dirty="0">
+                <a:latin typeface="Arial" panose="020B0604020202020204" pitchFamily="34" charset="0"/>
+                <a:cs typeface="Arial" panose="020B0604020202020204" pitchFamily="34" charset="0"/>
+              </a:rPr>
+              <a:t>p</a:t>
+            </a:r>
+            <a:r>
+              <a:rPr lang="en-US" sz="2000" dirty="0">
+                <a:latin typeface="Arial" panose="020B0604020202020204" pitchFamily="34" charset="0"/>
+                <a:cs typeface="Arial" panose="020B0604020202020204" pitchFamily="34" charset="0"/>
+              </a:rPr>
+              <a:t>=0.200, df = 26, AIC = 103.796, BIC = 196.486</a:t>
+            </a:r>
+          </a:p>
+        </p:txBody>
+      </p:sp>
+      <p:sp>
+        <p:nvSpPr>
+          <p:cNvPr id="142" name="TextBox 141">
+            <a:extLst>
+              <a:ext uri="{FF2B5EF4-FFF2-40B4-BE49-F238E27FC236}">
+                <a16:creationId xmlns:a16="http://schemas.microsoft.com/office/drawing/2014/main" id="{F0AF4C42-47FB-A361-A5F2-7EA7BC4D934C}"/>
+              </a:ext>
+            </a:extLst>
+          </p:cNvPr>
+          <p:cNvSpPr txBox="1"/>
+          <p:nvPr/>
+        </p:nvSpPr>
+        <p:spPr>
+          <a:xfrm>
+            <a:off x="7170675" y="15068776"/>
+            <a:ext cx="7837723" cy="400110"/>
+          </a:xfrm>
+          <a:prstGeom prst="rect">
+            <a:avLst/>
+          </a:prstGeom>
+          <a:solidFill>
+            <a:schemeClr val="bg1"/>
+          </a:solidFill>
+          <a:ln w="19050">
+            <a:solidFill>
+              <a:schemeClr val="tx1"/>
+            </a:solidFill>
+          </a:ln>
+        </p:spPr>
+        <p:txBody>
+          <a:bodyPr wrap="none" rtlCol="0">
+            <a:spAutoFit/>
+          </a:bodyPr>
+          <a:lstStyle/>
+          <a:p>
+            <a:r>
+              <a:rPr lang="en-US" sz="2000" dirty="0">
+                <a:latin typeface="Arial" panose="020B0604020202020204" pitchFamily="34" charset="0"/>
+                <a:cs typeface="Arial" panose="020B0604020202020204" pitchFamily="34" charset="0"/>
+              </a:rPr>
+              <a:t>Fisher’s C = 25.750, </a:t>
+            </a:r>
+            <a:r>
+              <a:rPr lang="en-US" sz="2000" i="1" dirty="0">
+                <a:latin typeface="Arial" panose="020B0604020202020204" pitchFamily="34" charset="0"/>
+                <a:cs typeface="Arial" panose="020B0604020202020204" pitchFamily="34" charset="0"/>
+              </a:rPr>
+              <a:t>p</a:t>
+            </a:r>
+            <a:r>
+              <a:rPr lang="en-US" sz="2000" dirty="0">
+                <a:latin typeface="Arial" panose="020B0604020202020204" pitchFamily="34" charset="0"/>
+                <a:cs typeface="Arial" panose="020B0604020202020204" pitchFamily="34" charset="0"/>
+              </a:rPr>
+              <a:t>=0.263, df = 22, AIC = 95.750, BIC = 185.865</a:t>
+            </a:r>
+          </a:p>
+        </p:txBody>
+      </p:sp>
+      <p:sp>
+        <p:nvSpPr>
+          <p:cNvPr id="143" name="TextBox 142">
+            <a:extLst>
+              <a:ext uri="{FF2B5EF4-FFF2-40B4-BE49-F238E27FC236}">
+                <a16:creationId xmlns:a16="http://schemas.microsoft.com/office/drawing/2014/main" id="{DDB25BE9-98C5-A286-D683-3E32B1D10310}"/>
+              </a:ext>
+            </a:extLst>
+          </p:cNvPr>
+          <p:cNvSpPr txBox="1"/>
+          <p:nvPr/>
+        </p:nvSpPr>
+        <p:spPr>
+          <a:xfrm>
+            <a:off x="5315685" y="464948"/>
+            <a:ext cx="938077" cy="830997"/>
+          </a:xfrm>
+          <a:prstGeom prst="rect">
+            <a:avLst/>
+          </a:prstGeom>
+          <a:noFill/>
+        </p:spPr>
+        <p:txBody>
+          <a:bodyPr wrap="none" rtlCol="0">
+            <a:spAutoFit/>
+          </a:bodyPr>
+          <a:lstStyle/>
+          <a:p>
+            <a:r>
+              <a:rPr lang="en-US" sz="4800" dirty="0">
+                <a:latin typeface="Arial" panose="020B0604020202020204" pitchFamily="34" charset="0"/>
+                <a:cs typeface="Arial" panose="020B0604020202020204" pitchFamily="34" charset="0"/>
+              </a:rPr>
+              <a:t>(a)</a:t>
+            </a:r>
+          </a:p>
+        </p:txBody>
+      </p:sp>
+      <p:sp>
+        <p:nvSpPr>
+          <p:cNvPr id="144" name="TextBox 143">
+            <a:extLst>
+              <a:ext uri="{FF2B5EF4-FFF2-40B4-BE49-F238E27FC236}">
+                <a16:creationId xmlns:a16="http://schemas.microsoft.com/office/drawing/2014/main" id="{AE1C6EBA-6B57-5C61-7E24-5C333A2AB63A}"/>
+              </a:ext>
+            </a:extLst>
+          </p:cNvPr>
+          <p:cNvSpPr txBox="1"/>
+          <p:nvPr/>
+        </p:nvSpPr>
+        <p:spPr>
+          <a:xfrm>
+            <a:off x="5315685" y="8132543"/>
+            <a:ext cx="938077" cy="830997"/>
+          </a:xfrm>
+          <a:prstGeom prst="rect">
+            <a:avLst/>
+          </a:prstGeom>
+          <a:noFill/>
+        </p:spPr>
+        <p:txBody>
+          <a:bodyPr wrap="none" rtlCol="0">
+            <a:spAutoFit/>
+          </a:bodyPr>
+          <a:lstStyle/>
+          <a:p>
+            <a:r>
+              <a:rPr lang="en-US" sz="4800" dirty="0">
+                <a:latin typeface="Arial" panose="020B0604020202020204" pitchFamily="34" charset="0"/>
+                <a:cs typeface="Arial" panose="020B0604020202020204" pitchFamily="34" charset="0"/>
+              </a:rPr>
+              <a:t>(b)</a:t>
+            </a:r>
           </a:p>
         </p:txBody>
       </p:sp>

</xml_diff>